<commit_message>
Done with Tylers slides
</commit_message>
<xml_diff>
--- a/CMQA/Presentations/SRR Presentation.pptx
+++ b/CMQA/Presentations/SRR Presentation.pptx
@@ -23,7 +23,7 @@
     <p:sldId id="337" r:id="rId14"/>
     <p:sldId id="338" r:id="rId15"/>
     <p:sldId id="339" r:id="rId16"/>
-    <p:sldId id="270" r:id="rId17"/>
+    <p:sldId id="340" r:id="rId17"/>
     <p:sldId id="271" r:id="rId18"/>
     <p:sldId id="272" r:id="rId19"/>
     <p:sldId id="273" r:id="rId20"/>
@@ -1552,365 +1552,6 @@
       </p:grpSpPr>
       <p:sp>
         <p:nvSpPr>
-          <p:cNvPr id="77826" name="Rectangle 11"/>
-          <p:cNvSpPr>
-            <a:spLocks noGrp="1" noChangeArrowheads="1"/>
-          </p:cNvSpPr>
-          <p:nvPr>
-            <p:ph type="sldNum" sz="quarter"/>
-          </p:nvPr>
-        </p:nvSpPr>
-        <p:spPr>
-          <a:noFill/>
-          <a:extLst>
-            <a:ext uri="{91240B29-F687-4F45-9708-019B960494DF}">
-              <a14:hiddenLine xmlns:a14="http://schemas.microsoft.com/office/drawing/2010/main" xmlns="" w="9525">
-                <a:solidFill>
-                  <a:srgbClr val="808080"/>
-                </a:solidFill>
-                <a:round/>
-                <a:headEnd/>
-                <a:tailEnd/>
-              </a14:hiddenLine>
-            </a:ext>
-          </a:extLst>
-        </p:spPr>
-        <p:txBody>
-          <a:bodyPr/>
-          <a:lstStyle>
-            <a:lvl1pPr eaLnBrk="0">
-              <a:tabLst>
-                <a:tab pos="723900" algn="l"/>
-                <a:tab pos="1447800" algn="l"/>
-                <a:tab pos="2171700" algn="l"/>
-                <a:tab pos="2895600" algn="l"/>
-              </a:tabLst>
-              <a:defRPr>
-                <a:solidFill>
-                  <a:schemeClr val="bg1"/>
-                </a:solidFill>
-                <a:latin typeface="Arial" charset="0"/>
-                <a:ea typeface="Microsoft YaHei" charset="-122"/>
-              </a:defRPr>
-            </a:lvl1pPr>
-            <a:lvl2pPr eaLnBrk="0">
-              <a:tabLst>
-                <a:tab pos="723900" algn="l"/>
-                <a:tab pos="1447800" algn="l"/>
-                <a:tab pos="2171700" algn="l"/>
-                <a:tab pos="2895600" algn="l"/>
-              </a:tabLst>
-              <a:defRPr>
-                <a:solidFill>
-                  <a:schemeClr val="bg1"/>
-                </a:solidFill>
-                <a:latin typeface="Arial" charset="0"/>
-                <a:ea typeface="Microsoft YaHei" charset="-122"/>
-              </a:defRPr>
-            </a:lvl2pPr>
-            <a:lvl3pPr eaLnBrk="0">
-              <a:tabLst>
-                <a:tab pos="723900" algn="l"/>
-                <a:tab pos="1447800" algn="l"/>
-                <a:tab pos="2171700" algn="l"/>
-                <a:tab pos="2895600" algn="l"/>
-              </a:tabLst>
-              <a:defRPr>
-                <a:solidFill>
-                  <a:schemeClr val="bg1"/>
-                </a:solidFill>
-                <a:latin typeface="Arial" charset="0"/>
-                <a:ea typeface="Microsoft YaHei" charset="-122"/>
-              </a:defRPr>
-            </a:lvl3pPr>
-            <a:lvl4pPr eaLnBrk="0">
-              <a:tabLst>
-                <a:tab pos="723900" algn="l"/>
-                <a:tab pos="1447800" algn="l"/>
-                <a:tab pos="2171700" algn="l"/>
-                <a:tab pos="2895600" algn="l"/>
-              </a:tabLst>
-              <a:defRPr>
-                <a:solidFill>
-                  <a:schemeClr val="bg1"/>
-                </a:solidFill>
-                <a:latin typeface="Arial" charset="0"/>
-                <a:ea typeface="Microsoft YaHei" charset="-122"/>
-              </a:defRPr>
-            </a:lvl4pPr>
-            <a:lvl5pPr eaLnBrk="0">
-              <a:tabLst>
-                <a:tab pos="723900" algn="l"/>
-                <a:tab pos="1447800" algn="l"/>
-                <a:tab pos="2171700" algn="l"/>
-                <a:tab pos="2895600" algn="l"/>
-              </a:tabLst>
-              <a:defRPr>
-                <a:solidFill>
-                  <a:schemeClr val="bg1"/>
-                </a:solidFill>
-                <a:latin typeface="Arial" charset="0"/>
-                <a:ea typeface="Microsoft YaHei" charset="-122"/>
-              </a:defRPr>
-            </a:lvl5pPr>
-            <a:lvl6pPr marL="2514600" indent="-228600" defTabSz="457200" eaLnBrk="0" fontAlgn="base" hangingPunct="0">
-              <a:lnSpc>
-                <a:spcPct val="93000"/>
-              </a:lnSpc>
-              <a:spcBef>
-                <a:spcPct val="0"/>
-              </a:spcBef>
-              <a:spcAft>
-                <a:spcPct val="0"/>
-              </a:spcAft>
-              <a:buClr>
-                <a:srgbClr val="000000"/>
-              </a:buClr>
-              <a:buSzPct val="100000"/>
-              <a:buFont typeface="Times New Roman" pitchFamily="16" charset="0"/>
-              <a:tabLst>
-                <a:tab pos="723900" algn="l"/>
-                <a:tab pos="1447800" algn="l"/>
-                <a:tab pos="2171700" algn="l"/>
-                <a:tab pos="2895600" algn="l"/>
-              </a:tabLst>
-              <a:defRPr>
-                <a:solidFill>
-                  <a:schemeClr val="bg1"/>
-                </a:solidFill>
-                <a:latin typeface="Arial" charset="0"/>
-                <a:ea typeface="Microsoft YaHei" charset="-122"/>
-              </a:defRPr>
-            </a:lvl6pPr>
-            <a:lvl7pPr marL="2971800" indent="-228600" defTabSz="457200" eaLnBrk="0" fontAlgn="base" hangingPunct="0">
-              <a:lnSpc>
-                <a:spcPct val="93000"/>
-              </a:lnSpc>
-              <a:spcBef>
-                <a:spcPct val="0"/>
-              </a:spcBef>
-              <a:spcAft>
-                <a:spcPct val="0"/>
-              </a:spcAft>
-              <a:buClr>
-                <a:srgbClr val="000000"/>
-              </a:buClr>
-              <a:buSzPct val="100000"/>
-              <a:buFont typeface="Times New Roman" pitchFamily="16" charset="0"/>
-              <a:tabLst>
-                <a:tab pos="723900" algn="l"/>
-                <a:tab pos="1447800" algn="l"/>
-                <a:tab pos="2171700" algn="l"/>
-                <a:tab pos="2895600" algn="l"/>
-              </a:tabLst>
-              <a:defRPr>
-                <a:solidFill>
-                  <a:schemeClr val="bg1"/>
-                </a:solidFill>
-                <a:latin typeface="Arial" charset="0"/>
-                <a:ea typeface="Microsoft YaHei" charset="-122"/>
-              </a:defRPr>
-            </a:lvl7pPr>
-            <a:lvl8pPr marL="3429000" indent="-228600" defTabSz="457200" eaLnBrk="0" fontAlgn="base" hangingPunct="0">
-              <a:lnSpc>
-                <a:spcPct val="93000"/>
-              </a:lnSpc>
-              <a:spcBef>
-                <a:spcPct val="0"/>
-              </a:spcBef>
-              <a:spcAft>
-                <a:spcPct val="0"/>
-              </a:spcAft>
-              <a:buClr>
-                <a:srgbClr val="000000"/>
-              </a:buClr>
-              <a:buSzPct val="100000"/>
-              <a:buFont typeface="Times New Roman" pitchFamily="16" charset="0"/>
-              <a:tabLst>
-                <a:tab pos="723900" algn="l"/>
-                <a:tab pos="1447800" algn="l"/>
-                <a:tab pos="2171700" algn="l"/>
-                <a:tab pos="2895600" algn="l"/>
-              </a:tabLst>
-              <a:defRPr>
-                <a:solidFill>
-                  <a:schemeClr val="bg1"/>
-                </a:solidFill>
-                <a:latin typeface="Arial" charset="0"/>
-                <a:ea typeface="Microsoft YaHei" charset="-122"/>
-              </a:defRPr>
-            </a:lvl8pPr>
-            <a:lvl9pPr marL="3886200" indent="-228600" defTabSz="457200" eaLnBrk="0" fontAlgn="base" hangingPunct="0">
-              <a:lnSpc>
-                <a:spcPct val="93000"/>
-              </a:lnSpc>
-              <a:spcBef>
-                <a:spcPct val="0"/>
-              </a:spcBef>
-              <a:spcAft>
-                <a:spcPct val="0"/>
-              </a:spcAft>
-              <a:buClr>
-                <a:srgbClr val="000000"/>
-              </a:buClr>
-              <a:buSzPct val="100000"/>
-              <a:buFont typeface="Times New Roman" pitchFamily="16" charset="0"/>
-              <a:tabLst>
-                <a:tab pos="723900" algn="l"/>
-                <a:tab pos="1447800" algn="l"/>
-                <a:tab pos="2171700" algn="l"/>
-                <a:tab pos="2895600" algn="l"/>
-              </a:tabLst>
-              <a:defRPr>
-                <a:solidFill>
-                  <a:schemeClr val="bg1"/>
-                </a:solidFill>
-                <a:latin typeface="Arial" charset="0"/>
-                <a:ea typeface="Microsoft YaHei" charset="-122"/>
-              </a:defRPr>
-            </a:lvl9pPr>
-          </a:lstStyle>
-          <a:p>
-            <a:pPr eaLnBrk="1"/>
-            <a:fld id="{02F1F521-0C7C-4ECC-9807-E81016F4FE96}" type="slidenum">
-              <a:rPr lang="en-US" altLang="en-US" smtClean="0">
-                <a:solidFill>
-                  <a:srgbClr val="FFFFFF"/>
-                </a:solidFill>
-                <a:latin typeface="Times New Roman" pitchFamily="16" charset="0"/>
-              </a:rPr>
-              <a:pPr eaLnBrk="1"/>
-              <a:t>17</a:t>
-            </a:fld>
-            <a:endParaRPr lang="en-US" altLang="en-US" smtClean="0">
-              <a:solidFill>
-                <a:srgbClr val="FFFFFF"/>
-              </a:solidFill>
-              <a:latin typeface="Times New Roman" pitchFamily="16" charset="0"/>
-            </a:endParaRPr>
-          </a:p>
-        </p:txBody>
-      </p:sp>
-      <p:sp>
-        <p:nvSpPr>
-          <p:cNvPr id="77827" name="Rectangle 1"/>
-          <p:cNvSpPr>
-            <a:spLocks noGrp="1" noRot="1" noChangeAspect="1" noChangeArrowheads="1" noTextEdit="1"/>
-          </p:cNvSpPr>
-          <p:nvPr>
-            <p:ph type="sldImg"/>
-          </p:nvPr>
-        </p:nvSpPr>
-        <p:spPr>
-          <a:xfrm>
-            <a:off x="1373188" y="763588"/>
-            <a:ext cx="5026025" cy="3771900"/>
-          </a:xfrm>
-          <a:solidFill>
-            <a:srgbClr val="FFFFFF"/>
-          </a:solidFill>
-          <a:ln>
-            <a:solidFill>
-              <a:srgbClr val="000000"/>
-            </a:solidFill>
-            <a:miter lim="800000"/>
-            <a:headEnd/>
-            <a:tailEnd/>
-          </a:ln>
-          <a:extLst>
-            <a:ext uri="{AF507438-7753-43E0-B8FC-AC1667EBCBE1}">
-              <a14:hiddenEffects xmlns:a14="http://schemas.microsoft.com/office/drawing/2010/main" xmlns="">
-                <a:effectLst>
-                  <a:outerShdw dist="35921" dir="2700000" algn="ctr" rotWithShape="0">
-                    <a:srgbClr val="808080"/>
-                  </a:outerShdw>
-                </a:effectLst>
-              </a14:hiddenEffects>
-            </a:ext>
-          </a:extLst>
-        </p:spPr>
-      </p:sp>
-      <p:sp>
-        <p:nvSpPr>
-          <p:cNvPr id="77828" name="Rectangle 2"/>
-          <p:cNvSpPr>
-            <a:spLocks noGrp="1" noChangeArrowheads="1"/>
-          </p:cNvSpPr>
-          <p:nvPr>
-            <p:ph type="body" idx="1"/>
-          </p:nvPr>
-        </p:nvSpPr>
-        <p:spPr>
-          <a:xfrm>
-            <a:off x="777875" y="4776788"/>
-            <a:ext cx="6210300" cy="4518025"/>
-          </a:xfrm>
-          <a:noFill/>
-          <a:extLst>
-            <a:ext uri="{91240B29-F687-4F45-9708-019B960494DF}">
-              <a14:hiddenLine xmlns:a14="http://schemas.microsoft.com/office/drawing/2010/main" xmlns="" w="9525">
-                <a:solidFill>
-                  <a:srgbClr val="808080"/>
-                </a:solidFill>
-                <a:miter lim="800000"/>
-                <a:headEnd/>
-                <a:tailEnd/>
-              </a14:hiddenLine>
-            </a:ext>
-            <a:ext uri="{AF507438-7753-43E0-B8FC-AC1667EBCBE1}">
-              <a14:hiddenEffects xmlns:a14="http://schemas.microsoft.com/office/drawing/2010/main" xmlns="">
-                <a:effectLst>
-                  <a:outerShdw dist="35921" dir="2700000" algn="ctr" rotWithShape="0">
-                    <a:srgbClr val="808080"/>
-                  </a:outerShdw>
-                </a:effectLst>
-              </a14:hiddenEffects>
-            </a:ext>
-          </a:extLst>
-        </p:spPr>
-        <p:txBody>
-          <a:bodyPr wrap="none" anchor="ctr"/>
-          <a:lstStyle/>
-          <a:p>
-            <a:endParaRPr lang="en-US" altLang="en-US" smtClean="0"/>
-          </a:p>
-        </p:txBody>
-      </p:sp>
-    </p:spTree>
-  </p:cSld>
-  <p:clrMapOvr>
-    <a:masterClrMapping/>
-  </p:clrMapOvr>
-</p:notes>
-</file>
-
-<file path=ppt/notesSlides/notesSlide11.xml><?xml version="1.0" encoding="utf-8"?>
-<p:notes xmlns:a="http://schemas.openxmlformats.org/drawingml/2006/main" xmlns:r="http://schemas.openxmlformats.org/officeDocument/2006/relationships" xmlns:p="http://schemas.openxmlformats.org/presentationml/2006/main">
-  <p:cSld>
-    <p:bg>
-      <p:bgPr>
-        <a:solidFill>
-          <a:srgbClr val="FFFFFF"/>
-        </a:solidFill>
-        <a:effectLst/>
-      </p:bgPr>
-    </p:bg>
-    <p:spTree>
-      <p:nvGrpSpPr>
-        <p:cNvPr id="1" name=""/>
-        <p:cNvGrpSpPr/>
-        <p:nvPr/>
-      </p:nvGrpSpPr>
-      <p:grpSpPr>
-        <a:xfrm>
-          <a:off x="0" y="0"/>
-          <a:ext cx="0" cy="0"/>
-          <a:chOff x="0" y="0"/>
-          <a:chExt cx="0" cy="0"/>
-        </a:xfrm>
-      </p:grpSpPr>
-      <p:sp>
-        <p:nvSpPr>
           <p:cNvPr id="78850" name="Rectangle 11"/>
           <p:cNvSpPr>
             <a:spLocks noGrp="1" noChangeArrowheads="1"/>
@@ -2243,7 +1884,7 @@
 </p:notes>
 </file>
 
-<file path=ppt/notesSlides/notesSlide12.xml><?xml version="1.0" encoding="utf-8"?>
+<file path=ppt/notesSlides/notesSlide11.xml><?xml version="1.0" encoding="utf-8"?>
 <p:notes xmlns:a="http://schemas.openxmlformats.org/drawingml/2006/main" xmlns:r="http://schemas.openxmlformats.org/officeDocument/2006/relationships" xmlns:p="http://schemas.openxmlformats.org/presentationml/2006/main">
   <p:cSld>
     <p:bg>
@@ -2602,7 +2243,7 @@
 </p:notes>
 </file>
 
-<file path=ppt/notesSlides/notesSlide13.xml><?xml version="1.0" encoding="utf-8"?>
+<file path=ppt/notesSlides/notesSlide12.xml><?xml version="1.0" encoding="utf-8"?>
 <p:notes xmlns:a="http://schemas.openxmlformats.org/drawingml/2006/main" xmlns:r="http://schemas.openxmlformats.org/officeDocument/2006/relationships" xmlns:p="http://schemas.openxmlformats.org/presentationml/2006/main">
   <p:cSld>
     <p:bg>
@@ -2961,7 +2602,7 @@
 </p:notes>
 </file>
 
-<file path=ppt/notesSlides/notesSlide14.xml><?xml version="1.0" encoding="utf-8"?>
+<file path=ppt/notesSlides/notesSlide13.xml><?xml version="1.0" encoding="utf-8"?>
 <p:notes xmlns:a="http://schemas.openxmlformats.org/drawingml/2006/main" xmlns:r="http://schemas.openxmlformats.org/officeDocument/2006/relationships" xmlns:p="http://schemas.openxmlformats.org/presentationml/2006/main">
   <p:cSld>
     <p:bg>
@@ -3320,7 +2961,7 @@
 </p:notes>
 </file>
 
-<file path=ppt/notesSlides/notesSlide15.xml><?xml version="1.0" encoding="utf-8"?>
+<file path=ppt/notesSlides/notesSlide14.xml><?xml version="1.0" encoding="utf-8"?>
 <p:notes xmlns:a="http://schemas.openxmlformats.org/drawingml/2006/main" xmlns:r="http://schemas.openxmlformats.org/officeDocument/2006/relationships" xmlns:p="http://schemas.openxmlformats.org/presentationml/2006/main">
   <p:cSld>
     <p:bg>
@@ -3679,7 +3320,7 @@
 </p:notes>
 </file>
 
-<file path=ppt/notesSlides/notesSlide16.xml><?xml version="1.0" encoding="utf-8"?>
+<file path=ppt/notesSlides/notesSlide15.xml><?xml version="1.0" encoding="utf-8"?>
 <p:notes xmlns:a="http://schemas.openxmlformats.org/drawingml/2006/main" xmlns:r="http://schemas.openxmlformats.org/officeDocument/2006/relationships" xmlns:p="http://schemas.openxmlformats.org/presentationml/2006/main">
   <p:cSld>
     <p:bg>
@@ -4038,7 +3679,7 @@
 </p:notes>
 </file>
 
-<file path=ppt/notesSlides/notesSlide17.xml><?xml version="1.0" encoding="utf-8"?>
+<file path=ppt/notesSlides/notesSlide16.xml><?xml version="1.0" encoding="utf-8"?>
 <p:notes xmlns:a="http://schemas.openxmlformats.org/drawingml/2006/main" xmlns:r="http://schemas.openxmlformats.org/officeDocument/2006/relationships" xmlns:p="http://schemas.openxmlformats.org/presentationml/2006/main">
   <p:cSld>
     <p:bg>
@@ -4397,7 +4038,7 @@
 </p:notes>
 </file>
 
-<file path=ppt/notesSlides/notesSlide18.xml><?xml version="1.0" encoding="utf-8"?>
+<file path=ppt/notesSlides/notesSlide17.xml><?xml version="1.0" encoding="utf-8"?>
 <p:notes xmlns:a="http://schemas.openxmlformats.org/drawingml/2006/main" xmlns:r="http://schemas.openxmlformats.org/officeDocument/2006/relationships" xmlns:p="http://schemas.openxmlformats.org/presentationml/2006/main">
   <p:cSld>
     <p:bg>
@@ -4756,7 +4397,7 @@
 </p:notes>
 </file>
 
-<file path=ppt/notesSlides/notesSlide19.xml><?xml version="1.0" encoding="utf-8"?>
+<file path=ppt/notesSlides/notesSlide18.xml><?xml version="1.0" encoding="utf-8"?>
 <p:notes xmlns:a="http://schemas.openxmlformats.org/drawingml/2006/main" xmlns:r="http://schemas.openxmlformats.org/officeDocument/2006/relationships" xmlns:p="http://schemas.openxmlformats.org/presentationml/2006/main">
   <p:cSld>
     <p:bg>
@@ -7296,7 +6937,7 @@
       </p:grpSpPr>
       <p:sp>
         <p:nvSpPr>
-          <p:cNvPr id="75778" name="Rectangle 11"/>
+          <p:cNvPr id="76802" name="Rectangle 11"/>
           <p:cNvSpPr>
             <a:spLocks noGrp="1" noChangeArrowheads="1"/>
           </p:cNvSpPr>
@@ -7516,7 +7157,7 @@
           </a:lstStyle>
           <a:p>
             <a:pPr eaLnBrk="1"/>
-            <a:fld id="{1FE5F237-2A9C-48CD-9C2E-58DC66D18297}" type="slidenum">
+            <a:fld id="{AED7F348-077E-4984-9303-3487EE94BE64}" type="slidenum">
               <a:rPr lang="en-US" altLang="en-US" smtClean="0">
                 <a:solidFill>
                   <a:srgbClr val="FFFFFF"/>
@@ -7524,7 +7165,7 @@
                 <a:latin typeface="Times New Roman" pitchFamily="16" charset="0"/>
               </a:rPr>
               <a:pPr eaLnBrk="1"/>
-              <a:t>15</a:t>
+              <a:t>16</a:t>
             </a:fld>
             <a:endParaRPr lang="en-US" altLang="en-US" smtClean="0">
               <a:solidFill>
@@ -7537,7 +7178,7 @@
       </p:sp>
       <p:sp>
         <p:nvSpPr>
-          <p:cNvPr id="75779" name="Rectangle 1"/>
+          <p:cNvPr id="76803" name="Rectangle 1"/>
           <p:cNvSpPr>
             <a:spLocks noGrp="1" noRot="1" noChangeAspect="1" noChangeArrowheads="1" noTextEdit="1"/>
           </p:cNvSpPr>
@@ -7576,7 +7217,7 @@
       </p:sp>
       <p:sp>
         <p:nvSpPr>
-          <p:cNvPr id="75780" name="Rectangle 2"/>
+          <p:cNvPr id="76804" name="Rectangle 2"/>
           <p:cNvSpPr>
             <a:spLocks noGrp="1" noChangeArrowheads="1"/>
           </p:cNvSpPr>
@@ -7655,7 +7296,7 @@
       </p:grpSpPr>
       <p:sp>
         <p:nvSpPr>
-          <p:cNvPr id="76802" name="Rectangle 11"/>
+          <p:cNvPr id="77826" name="Rectangle 11"/>
           <p:cNvSpPr>
             <a:spLocks noGrp="1" noChangeArrowheads="1"/>
           </p:cNvSpPr>
@@ -7875,7 +7516,7 @@
           </a:lstStyle>
           <a:p>
             <a:pPr eaLnBrk="1"/>
-            <a:fld id="{AED7F348-077E-4984-9303-3487EE94BE64}" type="slidenum">
+            <a:fld id="{02F1F521-0C7C-4ECC-9807-E81016F4FE96}" type="slidenum">
               <a:rPr lang="en-US" altLang="en-US" smtClean="0">
                 <a:solidFill>
                   <a:srgbClr val="FFFFFF"/>
@@ -7883,7 +7524,7 @@
                 <a:latin typeface="Times New Roman" pitchFamily="16" charset="0"/>
               </a:rPr>
               <a:pPr eaLnBrk="1"/>
-              <a:t>16</a:t>
+              <a:t>17</a:t>
             </a:fld>
             <a:endParaRPr lang="en-US" altLang="en-US" smtClean="0">
               <a:solidFill>
@@ -7896,7 +7537,7 @@
       </p:sp>
       <p:sp>
         <p:nvSpPr>
-          <p:cNvPr id="76803" name="Rectangle 1"/>
+          <p:cNvPr id="77827" name="Rectangle 1"/>
           <p:cNvSpPr>
             <a:spLocks noGrp="1" noRot="1" noChangeAspect="1" noChangeArrowheads="1" noTextEdit="1"/>
           </p:cNvSpPr>
@@ -7935,7 +7576,7 @@
       </p:sp>
       <p:sp>
         <p:nvSpPr>
-          <p:cNvPr id="76804" name="Rectangle 2"/>
+          <p:cNvPr id="77828" name="Rectangle 2"/>
           <p:cNvSpPr>
             <a:spLocks noGrp="1" noChangeArrowheads="1"/>
           </p:cNvSpPr>
@@ -19430,103 +19071,593 @@
       </p:grpSpPr>
       <p:sp>
         <p:nvSpPr>
-          <p:cNvPr id="21506" name="Slide Number Placeholder 5"/>
+          <p:cNvPr id="5" name="Title 1"/>
           <p:cNvSpPr>
             <a:spLocks noGrp="1"/>
           </p:cNvSpPr>
           <p:nvPr>
-            <p:ph type="sldNum" sz="quarter" idx="12"/>
+            <p:ph type="title"/>
           </p:nvPr>
         </p:nvSpPr>
         <p:spPr>
+          <a:xfrm>
+            <a:off x="503793" y="302865"/>
+            <a:ext cx="9068277" cy="1260475"/>
+          </a:xfrm>
+        </p:spPr>
+        <p:txBody>
+          <a:bodyPr>
+            <a:normAutofit/>
+          </a:bodyPr>
+          <a:lstStyle/>
+          <a:p>
+            <a:r>
+              <a:rPr lang="en-US" i="1" dirty="0" smtClean="0"/>
+              <a:t>RCL.PL.STR6</a:t>
+            </a:r>
+            <a:endParaRPr lang="en-US" i="1" dirty="0"/>
+          </a:p>
+        </p:txBody>
+      </p:sp>
+      <p:graphicFrame>
+        <p:nvGraphicFramePr>
+          <p:cNvPr id="6" name="Content Placeholder 3"/>
+          <p:cNvGraphicFramePr>
+            <a:graphicFrameLocks noGrp="1"/>
+          </p:cNvGraphicFramePr>
+          <p:nvPr>
+            <p:ph idx="1"/>
+            <p:extLst>
+              <p:ext uri="{D42A27DB-BD31-4B8C-83A1-F6EECF244321}">
+                <p14:modId xmlns:p14="http://schemas.microsoft.com/office/powerpoint/2010/main" xmlns="" val="2890384289"/>
+              </p:ext>
+            </p:extLst>
+          </p:nvPr>
+        </p:nvGraphicFramePr>
+        <p:xfrm>
+          <a:off x="542131" y="733425"/>
+          <a:ext cx="9068277" cy="1528346"/>
+        </p:xfrm>
+        <a:graphic>
+          <a:graphicData uri="http://schemas.openxmlformats.org/drawingml/2006/table">
+            <a:tbl>
+              <a:tblPr firstRow="1" bandRow="1">
+                <a:tableStyleId>{5C22544A-7EE6-4342-B048-85BDC9FD1C3A}</a:tableStyleId>
+              </a:tblPr>
+              <a:tblGrid>
+                <a:gridCol w="3526552"/>
+                <a:gridCol w="5541725"/>
+              </a:tblGrid>
+              <a:tr h="408954">
+                <a:tc>
+                  <a:txBody>
+                    <a:bodyPr/>
+                    <a:lstStyle/>
+                    <a:p>
+                      <a:r>
+                        <a:rPr lang="en-US" sz="2000" b="0" dirty="0" smtClean="0">
+                          <a:solidFill>
+                            <a:schemeClr val="bg1"/>
+                          </a:solidFill>
+                        </a:rPr>
+                        <a:t> RVM Requirement Number</a:t>
+                      </a:r>
+                      <a:endParaRPr lang="en-US" sz="2000" b="0" dirty="0">
+                        <a:solidFill>
+                          <a:schemeClr val="bg1"/>
+                        </a:solidFill>
+                      </a:endParaRPr>
+                    </a:p>
+                  </a:txBody>
+                  <a:tcPr marL="100759" marR="100759" marT="50419" marB="50419" anchor="ctr">
+                    <a:lnL w="12700" cap="flat" cmpd="sng" algn="ctr">
+                      <a:solidFill>
+                        <a:schemeClr val="tx1"/>
+                      </a:solidFill>
+                      <a:prstDash val="solid"/>
+                      <a:round/>
+                      <a:headEnd type="none" w="med" len="med"/>
+                      <a:tailEnd type="none" w="med" len="med"/>
+                    </a:lnL>
+                    <a:lnR w="12700" cap="flat" cmpd="sng" algn="ctr">
+                      <a:solidFill>
+                        <a:schemeClr val="tx1"/>
+                      </a:solidFill>
+                      <a:prstDash val="solid"/>
+                      <a:round/>
+                      <a:headEnd type="none" w="med" len="med"/>
+                      <a:tailEnd type="none" w="med" len="med"/>
+                    </a:lnR>
+                    <a:lnT w="12700" cap="flat" cmpd="sng" algn="ctr">
+                      <a:solidFill>
+                        <a:schemeClr val="tx1"/>
+                      </a:solidFill>
+                      <a:prstDash val="solid"/>
+                      <a:round/>
+                      <a:headEnd type="none" w="med" len="med"/>
+                      <a:tailEnd type="none" w="med" len="med"/>
+                    </a:lnT>
+                    <a:lnB w="12700" cap="flat" cmpd="sng" algn="ctr">
+                      <a:solidFill>
+                        <a:schemeClr val="tx1"/>
+                      </a:solidFill>
+                      <a:prstDash val="solid"/>
+                      <a:round/>
+                      <a:headEnd type="none" w="med" len="med"/>
+                      <a:tailEnd type="none" w="med" len="med"/>
+                    </a:lnB>
+                    <a:solidFill>
+                      <a:srgbClr val="0070C0"/>
+                    </a:solidFill>
+                  </a:tcPr>
+                </a:tc>
+                <a:tc>
+                  <a:txBody>
+                    <a:bodyPr/>
+                    <a:lstStyle/>
+                    <a:p>
+                      <a:r>
+                        <a:rPr lang="en-US" sz="2000" b="1" dirty="0" smtClean="0">
+                          <a:solidFill>
+                            <a:schemeClr val="tx1"/>
+                          </a:solidFill>
+                        </a:rPr>
+                        <a:t>RCL.PL.STR6</a:t>
+                      </a:r>
+                      <a:endParaRPr lang="en-US" sz="2000" b="1" dirty="0">
+                        <a:solidFill>
+                          <a:schemeClr val="tx1"/>
+                        </a:solidFill>
+                      </a:endParaRPr>
+                    </a:p>
+                  </a:txBody>
+                  <a:tcPr marL="100759" marR="100759" marT="50419" marB="50419">
+                    <a:lnL w="12700" cap="flat" cmpd="sng" algn="ctr">
+                      <a:solidFill>
+                        <a:schemeClr val="tx1"/>
+                      </a:solidFill>
+                      <a:prstDash val="solid"/>
+                      <a:round/>
+                      <a:headEnd type="none" w="med" len="med"/>
+                      <a:tailEnd type="none" w="med" len="med"/>
+                    </a:lnL>
+                    <a:lnR w="12700" cap="flat" cmpd="sng" algn="ctr">
+                      <a:solidFill>
+                        <a:schemeClr val="tx1"/>
+                      </a:solidFill>
+                      <a:prstDash val="solid"/>
+                      <a:round/>
+                      <a:headEnd type="none" w="med" len="med"/>
+                      <a:tailEnd type="none" w="med" len="med"/>
+                    </a:lnR>
+                    <a:lnT w="12700" cap="flat" cmpd="sng" algn="ctr">
+                      <a:solidFill>
+                        <a:schemeClr val="tx1"/>
+                      </a:solidFill>
+                      <a:prstDash val="solid"/>
+                      <a:round/>
+                      <a:headEnd type="none" w="med" len="med"/>
+                      <a:tailEnd type="none" w="med" len="med"/>
+                    </a:lnT>
+                    <a:lnB w="12700" cap="flat" cmpd="sng" algn="ctr">
+                      <a:solidFill>
+                        <a:schemeClr val="tx1"/>
+                      </a:solidFill>
+                      <a:prstDash val="solid"/>
+                      <a:round/>
+                      <a:headEnd type="none" w="med" len="med"/>
+                      <a:tailEnd type="none" w="med" len="med"/>
+                    </a:lnB>
+                    <a:noFill/>
+                  </a:tcPr>
+                </a:tc>
+              </a:tr>
+              <a:tr h="705866">
+                <a:tc>
+                  <a:txBody>
+                    <a:bodyPr/>
+                    <a:lstStyle/>
+                    <a:p>
+                      <a:r>
+                        <a:rPr lang="en-US" sz="2000" b="0" dirty="0" smtClean="0">
+                          <a:solidFill>
+                            <a:schemeClr val="bg1"/>
+                          </a:solidFill>
+                        </a:rPr>
+                        <a:t>RVM </a:t>
+                      </a:r>
+                      <a:r>
+                        <a:rPr lang="en-US" sz="2000" b="0" baseline="0" dirty="0" smtClean="0">
+                          <a:solidFill>
+                            <a:schemeClr val="bg1"/>
+                          </a:solidFill>
+                        </a:rPr>
+                        <a:t>Requirement Wording</a:t>
+                      </a:r>
+                      <a:endParaRPr lang="en-US" sz="2000" b="0" dirty="0">
+                        <a:solidFill>
+                          <a:schemeClr val="bg1"/>
+                        </a:solidFill>
+                      </a:endParaRPr>
+                    </a:p>
+                  </a:txBody>
+                  <a:tcPr marL="100759" marR="100759" marT="50419" marB="50419" anchor="ctr">
+                    <a:lnL w="12700" cap="flat" cmpd="sng" algn="ctr">
+                      <a:solidFill>
+                        <a:schemeClr val="tx1"/>
+                      </a:solidFill>
+                      <a:prstDash val="solid"/>
+                      <a:round/>
+                      <a:headEnd type="none" w="med" len="med"/>
+                      <a:tailEnd type="none" w="med" len="med"/>
+                    </a:lnL>
+                    <a:lnR w="12700" cap="flat" cmpd="sng" algn="ctr">
+                      <a:solidFill>
+                        <a:schemeClr val="tx1"/>
+                      </a:solidFill>
+                      <a:prstDash val="solid"/>
+                      <a:round/>
+                      <a:headEnd type="none" w="med" len="med"/>
+                      <a:tailEnd type="none" w="med" len="med"/>
+                    </a:lnR>
+                    <a:lnT w="12700" cap="flat" cmpd="sng" algn="ctr">
+                      <a:solidFill>
+                        <a:schemeClr val="tx1"/>
+                      </a:solidFill>
+                      <a:prstDash val="solid"/>
+                      <a:round/>
+                      <a:headEnd type="none" w="med" len="med"/>
+                      <a:tailEnd type="none" w="med" len="med"/>
+                    </a:lnT>
+                    <a:lnB w="12700" cap="flat" cmpd="sng" algn="ctr">
+                      <a:solidFill>
+                        <a:schemeClr val="tx1"/>
+                      </a:solidFill>
+                      <a:prstDash val="solid"/>
+                      <a:round/>
+                      <a:headEnd type="none" w="med" len="med"/>
+                      <a:tailEnd type="none" w="med" len="med"/>
+                    </a:lnB>
+                    <a:solidFill>
+                      <a:srgbClr val="0070C0"/>
+                    </a:solidFill>
+                  </a:tcPr>
+                </a:tc>
+                <a:tc>
+                  <a:txBody>
+                    <a:bodyPr/>
+                    <a:lstStyle/>
+                    <a:p>
+                      <a:r>
+                        <a:rPr lang="en-US" sz="2000" b="1" dirty="0" smtClean="0">
+                          <a:solidFill>
+                            <a:schemeClr val="tx1"/>
+                          </a:solidFill>
+                        </a:rPr>
+                        <a:t>“</a:t>
+                      </a:r>
+                      <a:r>
+                        <a:rPr lang="en-US" sz="2000" b="1" i="1" dirty="0" smtClean="0">
+                          <a:solidFill>
+                            <a:schemeClr val="tx1"/>
+                          </a:solidFill>
+                        </a:rPr>
+                        <a:t>The </a:t>
+                      </a:r>
+                      <a:r>
+                        <a:rPr lang="en-US" sz="2000" b="1" i="1" dirty="0" smtClean="0">
+                          <a:solidFill>
+                            <a:schemeClr val="tx1"/>
+                          </a:solidFill>
+                        </a:rPr>
+                        <a:t>CubeSat shall incorporate a Remove</a:t>
+                      </a:r>
+                      <a:r>
+                        <a:rPr lang="en-US" sz="2000" b="1" i="1" baseline="0" dirty="0" smtClean="0">
+                          <a:solidFill>
+                            <a:schemeClr val="tx1"/>
+                          </a:solidFill>
+                        </a:rPr>
+                        <a:t> Before Flight </a:t>
+                      </a:r>
+                      <a:r>
+                        <a:rPr lang="en-US" sz="2000" b="1" i="1" baseline="0" dirty="0" smtClean="0">
+                          <a:solidFill>
+                            <a:schemeClr val="tx1"/>
+                          </a:solidFill>
+                        </a:rPr>
+                        <a:t>pin”</a:t>
+                      </a:r>
+                      <a:endParaRPr lang="en-US" sz="2000" b="1" i="1" dirty="0">
+                        <a:solidFill>
+                          <a:schemeClr val="tx1"/>
+                        </a:solidFill>
+                      </a:endParaRPr>
+                    </a:p>
+                  </a:txBody>
+                  <a:tcPr marL="100759" marR="100759" marT="50419" marB="50419">
+                    <a:lnL w="12700" cap="flat" cmpd="sng" algn="ctr">
+                      <a:solidFill>
+                        <a:schemeClr val="tx1"/>
+                      </a:solidFill>
+                      <a:prstDash val="solid"/>
+                      <a:round/>
+                      <a:headEnd type="none" w="med" len="med"/>
+                      <a:tailEnd type="none" w="med" len="med"/>
+                    </a:lnL>
+                    <a:lnR w="12700" cap="flat" cmpd="sng" algn="ctr">
+                      <a:solidFill>
+                        <a:schemeClr val="tx1"/>
+                      </a:solidFill>
+                      <a:prstDash val="solid"/>
+                      <a:round/>
+                      <a:headEnd type="none" w="med" len="med"/>
+                      <a:tailEnd type="none" w="med" len="med"/>
+                    </a:lnR>
+                    <a:lnT w="12700" cap="flat" cmpd="sng" algn="ctr">
+                      <a:solidFill>
+                        <a:schemeClr val="tx1"/>
+                      </a:solidFill>
+                      <a:prstDash val="solid"/>
+                      <a:round/>
+                      <a:headEnd type="none" w="med" len="med"/>
+                      <a:tailEnd type="none" w="med" len="med"/>
+                    </a:lnT>
+                    <a:lnB w="12700" cap="flat" cmpd="sng" algn="ctr">
+                      <a:solidFill>
+                        <a:schemeClr val="tx1"/>
+                      </a:solidFill>
+                      <a:prstDash val="solid"/>
+                      <a:round/>
+                      <a:headEnd type="none" w="med" len="med"/>
+                      <a:tailEnd type="none" w="med" len="med"/>
+                    </a:lnB>
+                    <a:noFill/>
+                  </a:tcPr>
+                </a:tc>
+              </a:tr>
+              <a:tr h="408954">
+                <a:tc>
+                  <a:txBody>
+                    <a:bodyPr/>
+                    <a:lstStyle/>
+                    <a:p>
+                      <a:r>
+                        <a:rPr lang="en-US" sz="2000" b="0" dirty="0" smtClean="0">
+                          <a:solidFill>
+                            <a:schemeClr val="bg1"/>
+                          </a:solidFill>
+                        </a:rPr>
+                        <a:t>Validation Method</a:t>
+                      </a:r>
+                      <a:endParaRPr lang="en-US" sz="2000" b="0" dirty="0">
+                        <a:solidFill>
+                          <a:schemeClr val="bg1"/>
+                        </a:solidFill>
+                      </a:endParaRPr>
+                    </a:p>
+                  </a:txBody>
+                  <a:tcPr marL="100759" marR="100759" marT="50419" marB="50419" anchor="ctr">
+                    <a:lnL w="12700" cap="flat" cmpd="sng" algn="ctr">
+                      <a:solidFill>
+                        <a:schemeClr val="tx1"/>
+                      </a:solidFill>
+                      <a:prstDash val="solid"/>
+                      <a:round/>
+                      <a:headEnd type="none" w="med" len="med"/>
+                      <a:tailEnd type="none" w="med" len="med"/>
+                    </a:lnL>
+                    <a:lnR w="12700" cap="flat" cmpd="sng" algn="ctr">
+                      <a:solidFill>
+                        <a:schemeClr val="tx1"/>
+                      </a:solidFill>
+                      <a:prstDash val="solid"/>
+                      <a:round/>
+                      <a:headEnd type="none" w="med" len="med"/>
+                      <a:tailEnd type="none" w="med" len="med"/>
+                    </a:lnR>
+                    <a:lnT w="12700" cap="flat" cmpd="sng" algn="ctr">
+                      <a:solidFill>
+                        <a:schemeClr val="tx1"/>
+                      </a:solidFill>
+                      <a:prstDash val="solid"/>
+                      <a:round/>
+                      <a:headEnd type="none" w="med" len="med"/>
+                      <a:tailEnd type="none" w="med" len="med"/>
+                    </a:lnT>
+                    <a:lnB w="12700" cap="flat" cmpd="sng" algn="ctr">
+                      <a:solidFill>
+                        <a:schemeClr val="tx1"/>
+                      </a:solidFill>
+                      <a:prstDash val="solid"/>
+                      <a:round/>
+                      <a:headEnd type="none" w="med" len="med"/>
+                      <a:tailEnd type="none" w="med" len="med"/>
+                    </a:lnB>
+                    <a:solidFill>
+                      <a:srgbClr val="0070C0"/>
+                    </a:solidFill>
+                  </a:tcPr>
+                </a:tc>
+                <a:tc>
+                  <a:txBody>
+                    <a:bodyPr/>
+                    <a:lstStyle/>
+                    <a:p>
+                      <a:r>
+                        <a:rPr lang="en-US" sz="2000" b="1" i="0" dirty="0" smtClean="0">
+                          <a:solidFill>
+                            <a:schemeClr val="tx1"/>
+                          </a:solidFill>
+                        </a:rPr>
+                        <a:t>Examine</a:t>
+                      </a:r>
+                      <a:endParaRPr lang="en-US" sz="2000" b="1" i="0" dirty="0">
+                        <a:solidFill>
+                          <a:schemeClr val="tx1"/>
+                        </a:solidFill>
+                      </a:endParaRPr>
+                    </a:p>
+                  </a:txBody>
+                  <a:tcPr marL="100759" marR="100759" marT="50419" marB="50419">
+                    <a:lnL w="12700" cap="flat" cmpd="sng" algn="ctr">
+                      <a:solidFill>
+                        <a:schemeClr val="tx1"/>
+                      </a:solidFill>
+                      <a:prstDash val="solid"/>
+                      <a:round/>
+                      <a:headEnd type="none" w="med" len="med"/>
+                      <a:tailEnd type="none" w="med" len="med"/>
+                    </a:lnL>
+                    <a:lnR w="12700" cap="flat" cmpd="sng" algn="ctr">
+                      <a:solidFill>
+                        <a:schemeClr val="tx1"/>
+                      </a:solidFill>
+                      <a:prstDash val="solid"/>
+                      <a:round/>
+                      <a:headEnd type="none" w="med" len="med"/>
+                      <a:tailEnd type="none" w="med" len="med"/>
+                    </a:lnR>
+                    <a:lnT w="12700" cap="flat" cmpd="sng" algn="ctr">
+                      <a:solidFill>
+                        <a:schemeClr val="tx1"/>
+                      </a:solidFill>
+                      <a:prstDash val="solid"/>
+                      <a:round/>
+                      <a:headEnd type="none" w="med" len="med"/>
+                      <a:tailEnd type="none" w="med" len="med"/>
+                    </a:lnT>
+                    <a:lnB w="12700" cap="flat" cmpd="sng" algn="ctr">
+                      <a:solidFill>
+                        <a:schemeClr val="tx1"/>
+                      </a:solidFill>
+                      <a:prstDash val="solid"/>
+                      <a:round/>
+                      <a:headEnd type="none" w="med" len="med"/>
+                      <a:tailEnd type="none" w="med" len="med"/>
+                    </a:lnB>
+                    <a:noFill/>
+                  </a:tcPr>
+                </a:tc>
+              </a:tr>
+            </a:tbl>
+          </a:graphicData>
+        </a:graphic>
+      </p:graphicFrame>
+      <p:sp>
+        <p:nvSpPr>
+          <p:cNvPr id="7" name="TextBox 6"/>
+          <p:cNvSpPr txBox="1"/>
+          <p:nvPr/>
+        </p:nvSpPr>
+        <p:spPr>
+          <a:xfrm>
+            <a:off x="465931" y="2333625"/>
+            <a:ext cx="9152242" cy="1962216"/>
+          </a:xfrm>
+          <a:prstGeom prst="rect">
+            <a:avLst/>
+          </a:prstGeom>
           <a:noFill/>
+        </p:spPr>
+        <p:txBody>
+          <a:bodyPr wrap="square" lIns="100785" tIns="50393" rIns="100785" bIns="50393" rtlCol="0">
+            <a:spAutoFit/>
+          </a:bodyPr>
+          <a:lstStyle/>
+          <a:p>
+            <a:r>
+              <a:rPr lang="en-US" sz="2600" b="1" dirty="0" smtClean="0">
+                <a:solidFill>
+                  <a:schemeClr val="tx1"/>
+                </a:solidFill>
+              </a:rPr>
+              <a:t>The Remove Before Flight (RBF) pin is used to cur all power to the spacecraft by physically separating the battery circuit from the rest of the spacecraft, enabling the spacecraft to be handled safely and easily while the pin is inserted.</a:t>
+            </a:r>
+            <a:endParaRPr lang="en-US" sz="2600" b="1" dirty="0">
+              <a:solidFill>
+                <a:schemeClr val="tx1"/>
+              </a:solidFill>
+            </a:endParaRPr>
+          </a:p>
+        </p:txBody>
+      </p:sp>
+      <p:pic>
+        <p:nvPicPr>
+          <p:cNvPr id="8" name="Picture 7"/>
+          <p:cNvPicPr/>
+          <p:nvPr/>
+        </p:nvPicPr>
+        <p:blipFill>
+          <a:blip r:embed="rId2" cstate="print"/>
+          <a:srcRect/>
+          <a:stretch>
+            <a:fillRect/>
+          </a:stretch>
+        </p:blipFill>
+        <p:spPr bwMode="auto">
+          <a:xfrm>
+            <a:off x="2447131" y="4238625"/>
+            <a:ext cx="4572000" cy="2514600"/>
+          </a:xfrm>
+          <a:prstGeom prst="rect">
+            <a:avLst/>
+          </a:prstGeom>
+          <a:noFill/>
+          <a:ln w="9525">
+            <a:noFill/>
+            <a:miter lim="800000"/>
+            <a:headEnd/>
+            <a:tailEnd/>
+          </a:ln>
+        </p:spPr>
+      </p:pic>
+      <p:sp>
+        <p:nvSpPr>
+          <p:cNvPr id="9" name="Oval 8"/>
+          <p:cNvSpPr/>
+          <p:nvPr/>
+        </p:nvSpPr>
+        <p:spPr bwMode="auto">
+          <a:xfrm>
+            <a:off x="4961731" y="4695825"/>
+            <a:ext cx="609600" cy="381000"/>
+          </a:xfrm>
+          <a:prstGeom prst="ellipse">
+            <a:avLst/>
+          </a:prstGeom>
+          <a:noFill/>
+          <a:ln w="9525" cap="flat" cmpd="sng" algn="ctr">
+            <a:solidFill>
+              <a:schemeClr val="tx1"/>
+            </a:solidFill>
+            <a:prstDash val="solid"/>
+            <a:round/>
+            <a:headEnd type="none" w="med" len="med"/>
+            <a:tailEnd type="none" w="med" len="med"/>
+          </a:ln>
+          <a:effectLst/>
           <a:extLst>
-            <a:ext uri="{91240B29-F687-4F45-9708-019B960494DF}">
-              <a14:hiddenLine xmlns:a14="http://schemas.microsoft.com/office/drawing/2010/main" xmlns="" w="9525">
-                <a:solidFill>
-                  <a:srgbClr val="808080"/>
-                </a:solidFill>
-                <a:round/>
-                <a:headEnd/>
-                <a:tailEnd/>
-              </a14:hiddenLine>
+            <a:ext uri="{AF507438-7753-43E0-B8FC-AC1667EBCBE1}">
+              <a14:hiddenEffects xmlns:a14="http://schemas.microsoft.com/office/drawing/2010/main" xmlns="">
+                <a:effectLst>
+                  <a:outerShdw dist="35921" dir="2700000" algn="ctr" rotWithShape="0">
+                    <a:schemeClr val="bg2"/>
+                  </a:outerShdw>
+                </a:effectLst>
+              </a14:hiddenEffects>
             </a:ext>
           </a:extLst>
         </p:spPr>
         <p:txBody>
-          <a:bodyPr/>
-          <a:lstStyle>
-            <a:lvl1pPr eaLnBrk="0">
-              <a:tabLst>
-                <a:tab pos="723900" algn="l"/>
-                <a:tab pos="1447800" algn="l"/>
-                <a:tab pos="2171700" algn="l"/>
-              </a:tabLst>
-              <a:defRPr>
-                <a:solidFill>
-                  <a:schemeClr val="bg1"/>
-                </a:solidFill>
-                <a:latin typeface="Arial" charset="0"/>
-                <a:ea typeface="Microsoft YaHei" charset="-122"/>
-              </a:defRPr>
-            </a:lvl1pPr>
-            <a:lvl2pPr eaLnBrk="0">
-              <a:tabLst>
-                <a:tab pos="723900" algn="l"/>
-                <a:tab pos="1447800" algn="l"/>
-                <a:tab pos="2171700" algn="l"/>
-              </a:tabLst>
-              <a:defRPr>
-                <a:solidFill>
-                  <a:schemeClr val="bg1"/>
-                </a:solidFill>
-                <a:latin typeface="Arial" charset="0"/>
-                <a:ea typeface="Microsoft YaHei" charset="-122"/>
-              </a:defRPr>
-            </a:lvl2pPr>
-            <a:lvl3pPr eaLnBrk="0">
-              <a:tabLst>
-                <a:tab pos="723900" algn="l"/>
-                <a:tab pos="1447800" algn="l"/>
-                <a:tab pos="2171700" algn="l"/>
-              </a:tabLst>
-              <a:defRPr>
-                <a:solidFill>
-                  <a:schemeClr val="bg1"/>
-                </a:solidFill>
-                <a:latin typeface="Arial" charset="0"/>
-                <a:ea typeface="Microsoft YaHei" charset="-122"/>
-              </a:defRPr>
-            </a:lvl3pPr>
-            <a:lvl4pPr eaLnBrk="0">
-              <a:tabLst>
-                <a:tab pos="723900" algn="l"/>
-                <a:tab pos="1447800" algn="l"/>
-                <a:tab pos="2171700" algn="l"/>
-              </a:tabLst>
-              <a:defRPr>
-                <a:solidFill>
-                  <a:schemeClr val="bg1"/>
-                </a:solidFill>
-                <a:latin typeface="Arial" charset="0"/>
-                <a:ea typeface="Microsoft YaHei" charset="-122"/>
-              </a:defRPr>
-            </a:lvl4pPr>
-            <a:lvl5pPr eaLnBrk="0">
-              <a:tabLst>
-                <a:tab pos="723900" algn="l"/>
-                <a:tab pos="1447800" algn="l"/>
-                <a:tab pos="2171700" algn="l"/>
-              </a:tabLst>
-              <a:defRPr>
-                <a:solidFill>
-                  <a:schemeClr val="bg1"/>
-                </a:solidFill>
-                <a:latin typeface="Arial" charset="0"/>
-                <a:ea typeface="Microsoft YaHei" charset="-122"/>
-              </a:defRPr>
-            </a:lvl5pPr>
-            <a:lvl6pPr marL="2514600" indent="-228600" defTabSz="457200" eaLnBrk="0" fontAlgn="base" hangingPunct="0">
+          <a:bodyPr vert="horz" wrap="square" lIns="91440" tIns="45720" rIns="91440" bIns="45720" numCol="1" rtlCol="0" anchor="t" anchorCtr="0" compatLnSpc="1">
+            <a:prstTxWarp prst="textNoShape">
+              <a:avLst/>
+            </a:prstTxWarp>
+          </a:bodyPr>
+          <a:lstStyle/>
+          <a:p>
+            <a:pPr marL="0" marR="0" indent="0" algn="l" defTabSz="457200" rtl="0" eaLnBrk="1" fontAlgn="base" latinLnBrk="0" hangingPunct="0">
               <a:lnSpc>
                 <a:spcPct val="93000"/>
               </a:lnSpc>
@@ -19541,20 +19672,69 @@
               </a:buClr>
               <a:buSzPct val="100000"/>
               <a:buFont typeface="Times New Roman" pitchFamily="16" charset="0"/>
-              <a:tabLst>
-                <a:tab pos="723900" algn="l"/>
-                <a:tab pos="1447800" algn="l"/>
-                <a:tab pos="2171700" algn="l"/>
-              </a:tabLst>
-              <a:defRPr>
-                <a:solidFill>
-                  <a:schemeClr val="bg1"/>
-                </a:solidFill>
-                <a:latin typeface="Arial" charset="0"/>
-                <a:ea typeface="Microsoft YaHei" charset="-122"/>
-              </a:defRPr>
-            </a:lvl6pPr>
-            <a:lvl7pPr marL="2971800" indent="-228600" defTabSz="457200" eaLnBrk="0" fontAlgn="base" hangingPunct="0">
+              <a:buNone/>
+              <a:tabLst/>
+            </a:pPr>
+            <a:endParaRPr kumimoji="0" lang="en-US" sz="1800" b="0" i="0" u="none" strike="noStrike" cap="none" normalizeH="0" baseline="0" smtClean="0">
+              <a:ln>
+                <a:noFill/>
+              </a:ln>
+              <a:solidFill>
+                <a:schemeClr val="bg1"/>
+              </a:solidFill>
+              <a:effectLst/>
+              <a:latin typeface="Arial" charset="0"/>
+              <a:ea typeface="Microsoft YaHei" charset="-122"/>
+            </a:endParaRPr>
+          </a:p>
+        </p:txBody>
+      </p:sp>
+      <p:sp>
+        <p:nvSpPr>
+          <p:cNvPr id="10" name="Oval 9"/>
+          <p:cNvSpPr/>
+          <p:nvPr/>
+        </p:nvSpPr>
+        <p:spPr bwMode="auto">
+          <a:xfrm>
+            <a:off x="5571331" y="4695825"/>
+            <a:ext cx="609600" cy="381000"/>
+          </a:xfrm>
+          <a:prstGeom prst="ellipse">
+            <a:avLst/>
+          </a:prstGeom>
+          <a:noFill/>
+          <a:ln w="9525" cap="flat" cmpd="sng" algn="ctr">
+            <a:solidFill>
+              <a:schemeClr val="tx1"/>
+            </a:solidFill>
+            <a:prstDash val="solid"/>
+            <a:round/>
+            <a:headEnd type="none" w="med" len="med"/>
+            <a:tailEnd type="none" w="med" len="med"/>
+          </a:ln>
+          <a:effectLst/>
+          <a:extLst>
+            <a:ext uri="{AF507438-7753-43E0-B8FC-AC1667EBCBE1}">
+              <a14:hiddenEffects xmlns:a14="http://schemas.microsoft.com/office/drawing/2010/main" xmlns="">
+                <a:effectLst>
+                  <a:outerShdw dist="35921" dir="2700000" algn="ctr" rotWithShape="0">
+                    <a:schemeClr val="bg2"/>
+                  </a:outerShdw>
+                </a:effectLst>
+              </a14:hiddenEffects>
+            </a:ext>
+          </a:extLst>
+        </p:spPr>
+        <p:txBody>
+          <a:bodyPr vert="horz" wrap="square" lIns="91440" tIns="45720" rIns="91440" bIns="45720" numCol="1" rtlCol="0" anchor="t" anchorCtr="0" compatLnSpc="1">
+            <a:prstTxWarp prst="textNoShape">
+              <a:avLst/>
+            </a:prstTxWarp>
+          </a:bodyPr>
+          <a:lstStyle/>
+          <a:p>
+            <a:pPr marL="0" marR="0" indent="0" algn="l" defTabSz="457200" rtl="0" eaLnBrk="1" fontAlgn="base" latinLnBrk="0" hangingPunct="0">
               <a:lnSpc>
                 <a:spcPct val="93000"/>
               </a:lnSpc>
@@ -19569,20 +19749,69 @@
               </a:buClr>
               <a:buSzPct val="100000"/>
               <a:buFont typeface="Times New Roman" pitchFamily="16" charset="0"/>
-              <a:tabLst>
-                <a:tab pos="723900" algn="l"/>
-                <a:tab pos="1447800" algn="l"/>
-                <a:tab pos="2171700" algn="l"/>
-              </a:tabLst>
-              <a:defRPr>
-                <a:solidFill>
-                  <a:schemeClr val="bg1"/>
-                </a:solidFill>
-                <a:latin typeface="Arial" charset="0"/>
-                <a:ea typeface="Microsoft YaHei" charset="-122"/>
-              </a:defRPr>
-            </a:lvl7pPr>
-            <a:lvl8pPr marL="3429000" indent="-228600" defTabSz="457200" eaLnBrk="0" fontAlgn="base" hangingPunct="0">
+              <a:buNone/>
+              <a:tabLst/>
+            </a:pPr>
+            <a:endParaRPr kumimoji="0" lang="en-US" sz="1800" b="0" i="0" u="none" strike="noStrike" cap="none" normalizeH="0" baseline="0" smtClean="0">
+              <a:ln>
+                <a:noFill/>
+              </a:ln>
+              <a:solidFill>
+                <a:schemeClr val="bg1"/>
+              </a:solidFill>
+              <a:effectLst/>
+              <a:latin typeface="Arial" charset="0"/>
+              <a:ea typeface="Microsoft YaHei" charset="-122"/>
+            </a:endParaRPr>
+          </a:p>
+        </p:txBody>
+      </p:sp>
+      <p:sp>
+        <p:nvSpPr>
+          <p:cNvPr id="11" name="Oval 10"/>
+          <p:cNvSpPr/>
+          <p:nvPr/>
+        </p:nvSpPr>
+        <p:spPr bwMode="auto">
+          <a:xfrm>
+            <a:off x="6180931" y="4695825"/>
+            <a:ext cx="609600" cy="381000"/>
+          </a:xfrm>
+          <a:prstGeom prst="ellipse">
+            <a:avLst/>
+          </a:prstGeom>
+          <a:noFill/>
+          <a:ln w="9525" cap="flat" cmpd="sng" algn="ctr">
+            <a:solidFill>
+              <a:schemeClr val="tx1"/>
+            </a:solidFill>
+            <a:prstDash val="solid"/>
+            <a:round/>
+            <a:headEnd type="none" w="med" len="med"/>
+            <a:tailEnd type="none" w="med" len="med"/>
+          </a:ln>
+          <a:effectLst/>
+          <a:extLst>
+            <a:ext uri="{AF507438-7753-43E0-B8FC-AC1667EBCBE1}">
+              <a14:hiddenEffects xmlns:a14="http://schemas.microsoft.com/office/drawing/2010/main" xmlns="">
+                <a:effectLst>
+                  <a:outerShdw dist="35921" dir="2700000" algn="ctr" rotWithShape="0">
+                    <a:schemeClr val="bg2"/>
+                  </a:outerShdw>
+                </a:effectLst>
+              </a14:hiddenEffects>
+            </a:ext>
+          </a:extLst>
+        </p:spPr>
+        <p:txBody>
+          <a:bodyPr vert="horz" wrap="square" lIns="91440" tIns="45720" rIns="91440" bIns="45720" numCol="1" rtlCol="0" anchor="t" anchorCtr="0" compatLnSpc="1">
+            <a:prstTxWarp prst="textNoShape">
+              <a:avLst/>
+            </a:prstTxWarp>
+          </a:bodyPr>
+          <a:lstStyle/>
+          <a:p>
+            <a:pPr marL="0" marR="0" indent="0" algn="l" defTabSz="457200" rtl="0" eaLnBrk="1" fontAlgn="base" latinLnBrk="0" hangingPunct="0">
               <a:lnSpc>
                 <a:spcPct val="93000"/>
               </a:lnSpc>
@@ -19597,186 +19826,33 @@
               </a:buClr>
               <a:buSzPct val="100000"/>
               <a:buFont typeface="Times New Roman" pitchFamily="16" charset="0"/>
-              <a:tabLst>
-                <a:tab pos="723900" algn="l"/>
-                <a:tab pos="1447800" algn="l"/>
-                <a:tab pos="2171700" algn="l"/>
-              </a:tabLst>
-              <a:defRPr>
-                <a:solidFill>
-                  <a:schemeClr val="bg1"/>
-                </a:solidFill>
-                <a:latin typeface="Arial" charset="0"/>
-                <a:ea typeface="Microsoft YaHei" charset="-122"/>
-              </a:defRPr>
-            </a:lvl8pPr>
-            <a:lvl9pPr marL="3886200" indent="-228600" defTabSz="457200" eaLnBrk="0" fontAlgn="base" hangingPunct="0">
-              <a:lnSpc>
-                <a:spcPct val="93000"/>
-              </a:lnSpc>
-              <a:spcBef>
-                <a:spcPct val="0"/>
-              </a:spcBef>
-              <a:spcAft>
-                <a:spcPct val="0"/>
-              </a:spcAft>
-              <a:buClr>
-                <a:srgbClr val="000000"/>
-              </a:buClr>
-              <a:buSzPct val="100000"/>
-              <a:buFont typeface="Times New Roman" pitchFamily="16" charset="0"/>
-              <a:tabLst>
-                <a:tab pos="723900" algn="l"/>
-                <a:tab pos="1447800" algn="l"/>
-                <a:tab pos="2171700" algn="l"/>
-              </a:tabLst>
-              <a:defRPr>
-                <a:solidFill>
-                  <a:schemeClr val="bg1"/>
-                </a:solidFill>
-                <a:latin typeface="Arial" charset="0"/>
-                <a:ea typeface="Microsoft YaHei" charset="-122"/>
-              </a:defRPr>
-            </a:lvl9pPr>
-          </a:lstStyle>
-          <a:p>
-            <a:pPr eaLnBrk="1"/>
-            <a:fld id="{6E73BCBB-AAA3-46AB-8F1A-3119E323CFF0}" type="slidenum">
-              <a:rPr lang="en-US" altLang="en-US">
-                <a:solidFill>
-                  <a:srgbClr val="FFFFFF"/>
-                </a:solidFill>
-                <a:latin typeface="Times New Roman" pitchFamily="16" charset="0"/>
-              </a:rPr>
-              <a:pPr eaLnBrk="1"/>
-              <a:t>15</a:t>
-            </a:fld>
-            <a:endParaRPr lang="en-US" altLang="en-US">
+              <a:buNone/>
+              <a:tabLst/>
+            </a:pPr>
+            <a:endParaRPr kumimoji="0" lang="en-US" sz="1800" b="0" i="0" u="none" strike="noStrike" cap="none" normalizeH="0" baseline="0" smtClean="0">
+              <a:ln>
+                <a:noFill/>
+              </a:ln>
               <a:solidFill>
-                <a:srgbClr val="FFFFFF"/>
+                <a:schemeClr val="bg1"/>
               </a:solidFill>
-              <a:latin typeface="Times New Roman" pitchFamily="16" charset="0"/>
+              <a:effectLst/>
+              <a:latin typeface="Arial" charset="0"/>
+              <a:ea typeface="Microsoft YaHei" charset="-122"/>
             </a:endParaRPr>
           </a:p>
         </p:txBody>
       </p:sp>
-      <p:sp>
-        <p:nvSpPr>
-          <p:cNvPr id="21507" name="Rectangle 1"/>
-          <p:cNvSpPr>
-            <a:spLocks noGrp="1" noChangeArrowheads="1"/>
-          </p:cNvSpPr>
-          <p:nvPr>
-            <p:ph type="title"/>
-          </p:nvPr>
-        </p:nvSpPr>
-        <p:spPr>
-          <a:xfrm>
-            <a:off x="503238" y="301625"/>
-            <a:ext cx="9067800" cy="1262063"/>
-          </a:xfrm>
-        </p:spPr>
-        <p:txBody>
-          <a:bodyPr tIns="38880"/>
-          <a:lstStyle/>
-          <a:p>
-            <a:pPr eaLnBrk="1">
-              <a:buClrTx/>
-              <a:buFontTx/>
-              <a:buNone/>
-              <a:tabLst>
-                <a:tab pos="0" algn="l"/>
-                <a:tab pos="457200" algn="l"/>
-                <a:tab pos="914400" algn="l"/>
-                <a:tab pos="1371600" algn="l"/>
-                <a:tab pos="1828800" algn="l"/>
-                <a:tab pos="2286000" algn="l"/>
-                <a:tab pos="2743200" algn="l"/>
-                <a:tab pos="3200400" algn="l"/>
-                <a:tab pos="3657600" algn="l"/>
-                <a:tab pos="4114800" algn="l"/>
-                <a:tab pos="4572000" algn="l"/>
-                <a:tab pos="5029200" algn="l"/>
-                <a:tab pos="5486400" algn="l"/>
-                <a:tab pos="5943600" algn="l"/>
-                <a:tab pos="6400800" algn="l"/>
-                <a:tab pos="6858000" algn="l"/>
-                <a:tab pos="7315200" algn="l"/>
-                <a:tab pos="7772400" algn="l"/>
-                <a:tab pos="8229600" algn="l"/>
-                <a:tab pos="8686800" algn="l"/>
-                <a:tab pos="9144000" algn="l"/>
-              </a:tabLst>
-            </a:pPr>
-            <a:r>
-              <a:rPr lang="en-US" altLang="en-US" smtClean="0">
-                <a:solidFill>
-                  <a:srgbClr val="000000"/>
-                </a:solidFill>
-              </a:rPr>
-              <a:t>RCL.PL.STR6</a:t>
-            </a:r>
-          </a:p>
-        </p:txBody>
-      </p:sp>
-      <p:sp>
-        <p:nvSpPr>
-          <p:cNvPr id="21508" name="Rectangle 2"/>
-          <p:cNvSpPr>
-            <a:spLocks noGrp="1" noChangeArrowheads="1"/>
-          </p:cNvSpPr>
-          <p:nvPr>
-            <p:ph type="body" idx="1"/>
-          </p:nvPr>
-        </p:nvSpPr>
-        <p:spPr>
-          <a:xfrm>
-            <a:off x="503238" y="1768475"/>
-            <a:ext cx="9067800" cy="5130800"/>
-          </a:xfrm>
-        </p:spPr>
-        <p:txBody>
-          <a:bodyPr/>
-          <a:lstStyle/>
-          <a:p>
-            <a:pPr eaLnBrk="1"/>
-            <a:endParaRPr lang="en-US" altLang="en-US" smtClean="0"/>
-          </a:p>
-        </p:txBody>
-      </p:sp>
     </p:spTree>
+    <p:extLst>
+      <p:ext uri="{BB962C8B-B14F-4D97-AF65-F5344CB8AC3E}">
+        <p14:creationId xmlns:p14="http://schemas.microsoft.com/office/powerpoint/2010/main" xmlns="" val="3869352076"/>
+      </p:ext>
+    </p:extLst>
   </p:cSld>
   <p:clrMapOvr>
     <a:masterClrMapping/>
   </p:clrMapOvr>
-  <p:transition spd="med"/>
-  <p:timing>
-    <p:tnLst>
-      <p:par>
-        <p:cTn id="1" dur="indefinite" restart="never" nodeType="tmRoot">
-          <p:childTnLst>
-            <p:seq concurrent="1" nextAc="seek">
-              <p:cTn id="2" dur="indefinite" nodeType="mainSeq"/>
-              <p:prevCondLst>
-                <p:cond evt="onPrev" delay="0">
-                  <p:tgtEl>
-                    <p:sldTgt/>
-                  </p:tgtEl>
-                </p:cond>
-              </p:prevCondLst>
-              <p:nextCondLst>
-                <p:cond evt="onNext" delay="0">
-                  <p:tgtEl>
-                    <p:sldTgt/>
-                  </p:tgtEl>
-                </p:cond>
-              </p:nextCondLst>
-            </p:seq>
-          </p:childTnLst>
-        </p:cTn>
-      </p:par>
-    </p:tnLst>
-  </p:timing>
 </p:sld>
 </file>
 

</xml_diff>

<commit_message>
Actually added all of bryants slides this time
</commit_message>
<xml_diff>
--- a/CMQA/Presentations/SRR Presentation.pptx
+++ b/CMQA/Presentations/SRR Presentation.pptx
@@ -6,7 +6,7 @@
     <p:sldMasterId id="2147483649" r:id="rId2"/>
   </p:sldMasterIdLst>
   <p:notesMasterIdLst>
-    <p:notesMasterId r:id="rId54"/>
+    <p:notesMasterId r:id="rId55"/>
   </p:notesMasterIdLst>
   <p:sldIdLst>
     <p:sldId id="256" r:id="rId3"/>
@@ -48,18 +48,19 @@
     <p:sldId id="322" r:id="rId39"/>
     <p:sldId id="323" r:id="rId40"/>
     <p:sldId id="324" r:id="rId41"/>
-    <p:sldId id="296" r:id="rId42"/>
-    <p:sldId id="308" r:id="rId43"/>
-    <p:sldId id="309" r:id="rId44"/>
-    <p:sldId id="310" r:id="rId45"/>
-    <p:sldId id="311" r:id="rId46"/>
-    <p:sldId id="312" r:id="rId47"/>
-    <p:sldId id="313" r:id="rId48"/>
-    <p:sldId id="314" r:id="rId49"/>
-    <p:sldId id="315" r:id="rId50"/>
-    <p:sldId id="316" r:id="rId51"/>
-    <p:sldId id="306" r:id="rId52"/>
-    <p:sldId id="307" r:id="rId53"/>
+    <p:sldId id="341" r:id="rId42"/>
+    <p:sldId id="342" r:id="rId43"/>
+    <p:sldId id="308" r:id="rId44"/>
+    <p:sldId id="309" r:id="rId45"/>
+    <p:sldId id="310" r:id="rId46"/>
+    <p:sldId id="311" r:id="rId47"/>
+    <p:sldId id="312" r:id="rId48"/>
+    <p:sldId id="313" r:id="rId49"/>
+    <p:sldId id="314" r:id="rId50"/>
+    <p:sldId id="315" r:id="rId51"/>
+    <p:sldId id="316" r:id="rId52"/>
+    <p:sldId id="306" r:id="rId53"/>
+    <p:sldId id="307" r:id="rId54"/>
   </p:sldIdLst>
   <p:sldSz cx="10075863" cy="7562850"/>
   <p:notesSz cx="7772400" cy="10058400"/>
@@ -3706,7 +3707,7 @@
       </p:grpSpPr>
       <p:sp>
         <p:nvSpPr>
-          <p:cNvPr id="102402" name="Rectangle 11"/>
+          <p:cNvPr id="112642" name="Rectangle 11"/>
           <p:cNvSpPr>
             <a:spLocks noGrp="1" noChangeArrowheads="1"/>
           </p:cNvSpPr>
@@ -3926,7 +3927,7 @@
           </a:lstStyle>
           <a:p>
             <a:pPr eaLnBrk="1"/>
-            <a:fld id="{08FF4278-32AC-4AC9-A1AE-96D6C9622ABB}" type="slidenum">
+            <a:fld id="{440853DC-9D90-4AF3-A3A0-36CB3957F58B}" type="slidenum">
               <a:rPr lang="en-US" altLang="en-US" smtClean="0">
                 <a:solidFill>
                   <a:srgbClr val="FFFFFF"/>
@@ -3934,366 +3935,7 @@
                 <a:latin typeface="Times New Roman" pitchFamily="16" charset="0"/>
               </a:rPr>
               <a:pPr eaLnBrk="1"/>
-              <a:t>40</a:t>
-            </a:fld>
-            <a:endParaRPr lang="en-US" altLang="en-US" smtClean="0">
-              <a:solidFill>
-                <a:srgbClr val="FFFFFF"/>
-              </a:solidFill>
-              <a:latin typeface="Times New Roman" pitchFamily="16" charset="0"/>
-            </a:endParaRPr>
-          </a:p>
-        </p:txBody>
-      </p:sp>
-      <p:sp>
-        <p:nvSpPr>
-          <p:cNvPr id="102403" name="Rectangle 1"/>
-          <p:cNvSpPr>
-            <a:spLocks noGrp="1" noRot="1" noChangeAspect="1" noChangeArrowheads="1" noTextEdit="1"/>
-          </p:cNvSpPr>
-          <p:nvPr>
-            <p:ph type="sldImg"/>
-          </p:nvPr>
-        </p:nvSpPr>
-        <p:spPr>
-          <a:xfrm>
-            <a:off x="1373188" y="763588"/>
-            <a:ext cx="5026025" cy="3771900"/>
-          </a:xfrm>
-          <a:solidFill>
-            <a:srgbClr val="FFFFFF"/>
-          </a:solidFill>
-          <a:ln>
-            <a:solidFill>
-              <a:srgbClr val="000000"/>
-            </a:solidFill>
-            <a:miter lim="800000"/>
-            <a:headEnd/>
-            <a:tailEnd/>
-          </a:ln>
-          <a:extLst>
-            <a:ext uri="{AF507438-7753-43E0-B8FC-AC1667EBCBE1}">
-              <a14:hiddenEffects xmlns:a14="http://schemas.microsoft.com/office/drawing/2010/main" xmlns="">
-                <a:effectLst>
-                  <a:outerShdw dist="35921" dir="2700000" algn="ctr" rotWithShape="0">
-                    <a:srgbClr val="808080"/>
-                  </a:outerShdw>
-                </a:effectLst>
-              </a14:hiddenEffects>
-            </a:ext>
-          </a:extLst>
-        </p:spPr>
-      </p:sp>
-      <p:sp>
-        <p:nvSpPr>
-          <p:cNvPr id="102404" name="Rectangle 2"/>
-          <p:cNvSpPr>
-            <a:spLocks noGrp="1" noChangeArrowheads="1"/>
-          </p:cNvSpPr>
-          <p:nvPr>
-            <p:ph type="body" idx="1"/>
-          </p:nvPr>
-        </p:nvSpPr>
-        <p:spPr>
-          <a:xfrm>
-            <a:off x="777875" y="4776788"/>
-            <a:ext cx="6210300" cy="4518025"/>
-          </a:xfrm>
-          <a:noFill/>
-          <a:extLst>
-            <a:ext uri="{91240B29-F687-4F45-9708-019B960494DF}">
-              <a14:hiddenLine xmlns:a14="http://schemas.microsoft.com/office/drawing/2010/main" xmlns="" w="9525">
-                <a:solidFill>
-                  <a:srgbClr val="808080"/>
-                </a:solidFill>
-                <a:miter lim="800000"/>
-                <a:headEnd/>
-                <a:tailEnd/>
-              </a14:hiddenLine>
-            </a:ext>
-            <a:ext uri="{AF507438-7753-43E0-B8FC-AC1667EBCBE1}">
-              <a14:hiddenEffects xmlns:a14="http://schemas.microsoft.com/office/drawing/2010/main" xmlns="">
-                <a:effectLst>
-                  <a:outerShdw dist="35921" dir="2700000" algn="ctr" rotWithShape="0">
-                    <a:srgbClr val="808080"/>
-                  </a:outerShdw>
-                </a:effectLst>
-              </a14:hiddenEffects>
-            </a:ext>
-          </a:extLst>
-        </p:spPr>
-        <p:txBody>
-          <a:bodyPr wrap="none" anchor="ctr"/>
-          <a:lstStyle/>
-          <a:p>
-            <a:endParaRPr lang="en-US" altLang="en-US" smtClean="0"/>
-          </a:p>
-        </p:txBody>
-      </p:sp>
-    </p:spTree>
-  </p:cSld>
-  <p:clrMapOvr>
-    <a:masterClrMapping/>
-  </p:clrMapOvr>
-</p:notes>
-</file>
-
-<file path=ppt/notesSlides/notesSlide17.xml><?xml version="1.0" encoding="utf-8"?>
-<p:notes xmlns:a="http://schemas.openxmlformats.org/drawingml/2006/main" xmlns:r="http://schemas.openxmlformats.org/officeDocument/2006/relationships" xmlns:p="http://schemas.openxmlformats.org/presentationml/2006/main">
-  <p:cSld>
-    <p:bg>
-      <p:bgPr>
-        <a:solidFill>
-          <a:srgbClr val="FFFFFF"/>
-        </a:solidFill>
-        <a:effectLst/>
-      </p:bgPr>
-    </p:bg>
-    <p:spTree>
-      <p:nvGrpSpPr>
-        <p:cNvPr id="1" name=""/>
-        <p:cNvGrpSpPr/>
-        <p:nvPr/>
-      </p:nvGrpSpPr>
-      <p:grpSpPr>
-        <a:xfrm>
-          <a:off x="0" y="0"/>
-          <a:ext cx="0" cy="0"/>
-          <a:chOff x="0" y="0"/>
-          <a:chExt cx="0" cy="0"/>
-        </a:xfrm>
-      </p:grpSpPr>
-      <p:sp>
-        <p:nvSpPr>
-          <p:cNvPr id="112642" name="Rectangle 11"/>
-          <p:cNvSpPr>
-            <a:spLocks noGrp="1" noChangeArrowheads="1"/>
-          </p:cNvSpPr>
-          <p:nvPr>
-            <p:ph type="sldNum" sz="quarter"/>
-          </p:nvPr>
-        </p:nvSpPr>
-        <p:spPr>
-          <a:noFill/>
-          <a:extLst>
-            <a:ext uri="{91240B29-F687-4F45-9708-019B960494DF}">
-              <a14:hiddenLine xmlns:a14="http://schemas.microsoft.com/office/drawing/2010/main" xmlns="" w="9525">
-                <a:solidFill>
-                  <a:srgbClr val="808080"/>
-                </a:solidFill>
-                <a:round/>
-                <a:headEnd/>
-                <a:tailEnd/>
-              </a14:hiddenLine>
-            </a:ext>
-          </a:extLst>
-        </p:spPr>
-        <p:txBody>
-          <a:bodyPr/>
-          <a:lstStyle>
-            <a:lvl1pPr eaLnBrk="0">
-              <a:tabLst>
-                <a:tab pos="723900" algn="l"/>
-                <a:tab pos="1447800" algn="l"/>
-                <a:tab pos="2171700" algn="l"/>
-                <a:tab pos="2895600" algn="l"/>
-              </a:tabLst>
-              <a:defRPr>
-                <a:solidFill>
-                  <a:schemeClr val="bg1"/>
-                </a:solidFill>
-                <a:latin typeface="Arial" charset="0"/>
-                <a:ea typeface="Microsoft YaHei" charset="-122"/>
-              </a:defRPr>
-            </a:lvl1pPr>
-            <a:lvl2pPr eaLnBrk="0">
-              <a:tabLst>
-                <a:tab pos="723900" algn="l"/>
-                <a:tab pos="1447800" algn="l"/>
-                <a:tab pos="2171700" algn="l"/>
-                <a:tab pos="2895600" algn="l"/>
-              </a:tabLst>
-              <a:defRPr>
-                <a:solidFill>
-                  <a:schemeClr val="bg1"/>
-                </a:solidFill>
-                <a:latin typeface="Arial" charset="0"/>
-                <a:ea typeface="Microsoft YaHei" charset="-122"/>
-              </a:defRPr>
-            </a:lvl2pPr>
-            <a:lvl3pPr eaLnBrk="0">
-              <a:tabLst>
-                <a:tab pos="723900" algn="l"/>
-                <a:tab pos="1447800" algn="l"/>
-                <a:tab pos="2171700" algn="l"/>
-                <a:tab pos="2895600" algn="l"/>
-              </a:tabLst>
-              <a:defRPr>
-                <a:solidFill>
-                  <a:schemeClr val="bg1"/>
-                </a:solidFill>
-                <a:latin typeface="Arial" charset="0"/>
-                <a:ea typeface="Microsoft YaHei" charset="-122"/>
-              </a:defRPr>
-            </a:lvl3pPr>
-            <a:lvl4pPr eaLnBrk="0">
-              <a:tabLst>
-                <a:tab pos="723900" algn="l"/>
-                <a:tab pos="1447800" algn="l"/>
-                <a:tab pos="2171700" algn="l"/>
-                <a:tab pos="2895600" algn="l"/>
-              </a:tabLst>
-              <a:defRPr>
-                <a:solidFill>
-                  <a:schemeClr val="bg1"/>
-                </a:solidFill>
-                <a:latin typeface="Arial" charset="0"/>
-                <a:ea typeface="Microsoft YaHei" charset="-122"/>
-              </a:defRPr>
-            </a:lvl4pPr>
-            <a:lvl5pPr eaLnBrk="0">
-              <a:tabLst>
-                <a:tab pos="723900" algn="l"/>
-                <a:tab pos="1447800" algn="l"/>
-                <a:tab pos="2171700" algn="l"/>
-                <a:tab pos="2895600" algn="l"/>
-              </a:tabLst>
-              <a:defRPr>
-                <a:solidFill>
-                  <a:schemeClr val="bg1"/>
-                </a:solidFill>
-                <a:latin typeface="Arial" charset="0"/>
-                <a:ea typeface="Microsoft YaHei" charset="-122"/>
-              </a:defRPr>
-            </a:lvl5pPr>
-            <a:lvl6pPr marL="2514600" indent="-228600" defTabSz="457200" eaLnBrk="0" fontAlgn="base" hangingPunct="0">
-              <a:lnSpc>
-                <a:spcPct val="93000"/>
-              </a:lnSpc>
-              <a:spcBef>
-                <a:spcPct val="0"/>
-              </a:spcBef>
-              <a:spcAft>
-                <a:spcPct val="0"/>
-              </a:spcAft>
-              <a:buClr>
-                <a:srgbClr val="000000"/>
-              </a:buClr>
-              <a:buSzPct val="100000"/>
-              <a:buFont typeface="Times New Roman" pitchFamily="16" charset="0"/>
-              <a:tabLst>
-                <a:tab pos="723900" algn="l"/>
-                <a:tab pos="1447800" algn="l"/>
-                <a:tab pos="2171700" algn="l"/>
-                <a:tab pos="2895600" algn="l"/>
-              </a:tabLst>
-              <a:defRPr>
-                <a:solidFill>
-                  <a:schemeClr val="bg1"/>
-                </a:solidFill>
-                <a:latin typeface="Arial" charset="0"/>
-                <a:ea typeface="Microsoft YaHei" charset="-122"/>
-              </a:defRPr>
-            </a:lvl6pPr>
-            <a:lvl7pPr marL="2971800" indent="-228600" defTabSz="457200" eaLnBrk="0" fontAlgn="base" hangingPunct="0">
-              <a:lnSpc>
-                <a:spcPct val="93000"/>
-              </a:lnSpc>
-              <a:spcBef>
-                <a:spcPct val="0"/>
-              </a:spcBef>
-              <a:spcAft>
-                <a:spcPct val="0"/>
-              </a:spcAft>
-              <a:buClr>
-                <a:srgbClr val="000000"/>
-              </a:buClr>
-              <a:buSzPct val="100000"/>
-              <a:buFont typeface="Times New Roman" pitchFamily="16" charset="0"/>
-              <a:tabLst>
-                <a:tab pos="723900" algn="l"/>
-                <a:tab pos="1447800" algn="l"/>
-                <a:tab pos="2171700" algn="l"/>
-                <a:tab pos="2895600" algn="l"/>
-              </a:tabLst>
-              <a:defRPr>
-                <a:solidFill>
-                  <a:schemeClr val="bg1"/>
-                </a:solidFill>
-                <a:latin typeface="Arial" charset="0"/>
-                <a:ea typeface="Microsoft YaHei" charset="-122"/>
-              </a:defRPr>
-            </a:lvl7pPr>
-            <a:lvl8pPr marL="3429000" indent="-228600" defTabSz="457200" eaLnBrk="0" fontAlgn="base" hangingPunct="0">
-              <a:lnSpc>
-                <a:spcPct val="93000"/>
-              </a:lnSpc>
-              <a:spcBef>
-                <a:spcPct val="0"/>
-              </a:spcBef>
-              <a:spcAft>
-                <a:spcPct val="0"/>
-              </a:spcAft>
-              <a:buClr>
-                <a:srgbClr val="000000"/>
-              </a:buClr>
-              <a:buSzPct val="100000"/>
-              <a:buFont typeface="Times New Roman" pitchFamily="16" charset="0"/>
-              <a:tabLst>
-                <a:tab pos="723900" algn="l"/>
-                <a:tab pos="1447800" algn="l"/>
-                <a:tab pos="2171700" algn="l"/>
-                <a:tab pos="2895600" algn="l"/>
-              </a:tabLst>
-              <a:defRPr>
-                <a:solidFill>
-                  <a:schemeClr val="bg1"/>
-                </a:solidFill>
-                <a:latin typeface="Arial" charset="0"/>
-                <a:ea typeface="Microsoft YaHei" charset="-122"/>
-              </a:defRPr>
-            </a:lvl8pPr>
-            <a:lvl9pPr marL="3886200" indent="-228600" defTabSz="457200" eaLnBrk="0" fontAlgn="base" hangingPunct="0">
-              <a:lnSpc>
-                <a:spcPct val="93000"/>
-              </a:lnSpc>
-              <a:spcBef>
-                <a:spcPct val="0"/>
-              </a:spcBef>
-              <a:spcAft>
-                <a:spcPct val="0"/>
-              </a:spcAft>
-              <a:buClr>
-                <a:srgbClr val="000000"/>
-              </a:buClr>
-              <a:buSzPct val="100000"/>
-              <a:buFont typeface="Times New Roman" pitchFamily="16" charset="0"/>
-              <a:tabLst>
-                <a:tab pos="723900" algn="l"/>
-                <a:tab pos="1447800" algn="l"/>
-                <a:tab pos="2171700" algn="l"/>
-                <a:tab pos="2895600" algn="l"/>
-              </a:tabLst>
-              <a:defRPr>
-                <a:solidFill>
-                  <a:schemeClr val="bg1"/>
-                </a:solidFill>
-                <a:latin typeface="Arial" charset="0"/>
-                <a:ea typeface="Microsoft YaHei" charset="-122"/>
-              </a:defRPr>
-            </a:lvl9pPr>
-          </a:lstStyle>
-          <a:p>
-            <a:pPr eaLnBrk="1"/>
-            <a:fld id="{440853DC-9D90-4AF3-A3A0-36CB3957F58B}" type="slidenum">
-              <a:rPr lang="en-US" altLang="en-US" smtClean="0">
-                <a:solidFill>
-                  <a:srgbClr val="FFFFFF"/>
-                </a:solidFill>
-                <a:latin typeface="Times New Roman" pitchFamily="16" charset="0"/>
-              </a:rPr>
-              <a:pPr eaLnBrk="1"/>
-              <a:t>50</a:t>
+              <a:t>51</a:t>
             </a:fld>
             <a:endParaRPr lang="en-US" altLang="en-US" smtClean="0">
               <a:solidFill>
@@ -4397,7 +4039,7 @@
 </p:notes>
 </file>
 
-<file path=ppt/notesSlides/notesSlide18.xml><?xml version="1.0" encoding="utf-8"?>
+<file path=ppt/notesSlides/notesSlide17.xml><?xml version="1.0" encoding="utf-8"?>
 <p:notes xmlns:a="http://schemas.openxmlformats.org/drawingml/2006/main" xmlns:r="http://schemas.openxmlformats.org/officeDocument/2006/relationships" xmlns:p="http://schemas.openxmlformats.org/presentationml/2006/main">
   <p:cSld>
     <p:bg>
@@ -4652,7 +4294,7 @@
                 <a:latin typeface="Times New Roman" pitchFamily="16" charset="0"/>
               </a:rPr>
               <a:pPr eaLnBrk="1"/>
-              <a:t>51</a:t>
+              <a:t>52</a:t>
             </a:fld>
             <a:endParaRPr lang="en-US" altLang="en-US" smtClean="0">
               <a:solidFill>
@@ -35533,239 +35175,7 @@
       </p:grpSpPr>
       <p:sp>
         <p:nvSpPr>
-          <p:cNvPr id="48130" name="Slide Number Placeholder 5"/>
-          <p:cNvSpPr>
-            <a:spLocks noGrp="1"/>
-          </p:cNvSpPr>
-          <p:nvPr>
-            <p:ph type="sldNum" sz="quarter" idx="12"/>
-          </p:nvPr>
-        </p:nvSpPr>
-        <p:spPr>
-          <a:noFill/>
-          <a:extLst>
-            <a:ext uri="{91240B29-F687-4F45-9708-019B960494DF}">
-              <a14:hiddenLine xmlns:a14="http://schemas.microsoft.com/office/drawing/2010/main" xmlns="" w="9525">
-                <a:solidFill>
-                  <a:srgbClr val="808080"/>
-                </a:solidFill>
-                <a:round/>
-                <a:headEnd/>
-                <a:tailEnd/>
-              </a14:hiddenLine>
-            </a:ext>
-          </a:extLst>
-        </p:spPr>
-        <p:txBody>
-          <a:bodyPr/>
-          <a:lstStyle>
-            <a:lvl1pPr eaLnBrk="0">
-              <a:tabLst>
-                <a:tab pos="723900" algn="l"/>
-                <a:tab pos="1447800" algn="l"/>
-                <a:tab pos="2171700" algn="l"/>
-              </a:tabLst>
-              <a:defRPr>
-                <a:solidFill>
-                  <a:schemeClr val="bg1"/>
-                </a:solidFill>
-                <a:latin typeface="Arial" charset="0"/>
-                <a:ea typeface="Microsoft YaHei" charset="-122"/>
-              </a:defRPr>
-            </a:lvl1pPr>
-            <a:lvl2pPr eaLnBrk="0">
-              <a:tabLst>
-                <a:tab pos="723900" algn="l"/>
-                <a:tab pos="1447800" algn="l"/>
-                <a:tab pos="2171700" algn="l"/>
-              </a:tabLst>
-              <a:defRPr>
-                <a:solidFill>
-                  <a:schemeClr val="bg1"/>
-                </a:solidFill>
-                <a:latin typeface="Arial" charset="0"/>
-                <a:ea typeface="Microsoft YaHei" charset="-122"/>
-              </a:defRPr>
-            </a:lvl2pPr>
-            <a:lvl3pPr eaLnBrk="0">
-              <a:tabLst>
-                <a:tab pos="723900" algn="l"/>
-                <a:tab pos="1447800" algn="l"/>
-                <a:tab pos="2171700" algn="l"/>
-              </a:tabLst>
-              <a:defRPr>
-                <a:solidFill>
-                  <a:schemeClr val="bg1"/>
-                </a:solidFill>
-                <a:latin typeface="Arial" charset="0"/>
-                <a:ea typeface="Microsoft YaHei" charset="-122"/>
-              </a:defRPr>
-            </a:lvl3pPr>
-            <a:lvl4pPr eaLnBrk="0">
-              <a:tabLst>
-                <a:tab pos="723900" algn="l"/>
-                <a:tab pos="1447800" algn="l"/>
-                <a:tab pos="2171700" algn="l"/>
-              </a:tabLst>
-              <a:defRPr>
-                <a:solidFill>
-                  <a:schemeClr val="bg1"/>
-                </a:solidFill>
-                <a:latin typeface="Arial" charset="0"/>
-                <a:ea typeface="Microsoft YaHei" charset="-122"/>
-              </a:defRPr>
-            </a:lvl4pPr>
-            <a:lvl5pPr eaLnBrk="0">
-              <a:tabLst>
-                <a:tab pos="723900" algn="l"/>
-                <a:tab pos="1447800" algn="l"/>
-                <a:tab pos="2171700" algn="l"/>
-              </a:tabLst>
-              <a:defRPr>
-                <a:solidFill>
-                  <a:schemeClr val="bg1"/>
-                </a:solidFill>
-                <a:latin typeface="Arial" charset="0"/>
-                <a:ea typeface="Microsoft YaHei" charset="-122"/>
-              </a:defRPr>
-            </a:lvl5pPr>
-            <a:lvl6pPr marL="2514600" indent="-228600" defTabSz="457200" eaLnBrk="0" fontAlgn="base" hangingPunct="0">
-              <a:lnSpc>
-                <a:spcPct val="93000"/>
-              </a:lnSpc>
-              <a:spcBef>
-                <a:spcPct val="0"/>
-              </a:spcBef>
-              <a:spcAft>
-                <a:spcPct val="0"/>
-              </a:spcAft>
-              <a:buClr>
-                <a:srgbClr val="000000"/>
-              </a:buClr>
-              <a:buSzPct val="100000"/>
-              <a:buFont typeface="Times New Roman" pitchFamily="16" charset="0"/>
-              <a:tabLst>
-                <a:tab pos="723900" algn="l"/>
-                <a:tab pos="1447800" algn="l"/>
-                <a:tab pos="2171700" algn="l"/>
-              </a:tabLst>
-              <a:defRPr>
-                <a:solidFill>
-                  <a:schemeClr val="bg1"/>
-                </a:solidFill>
-                <a:latin typeface="Arial" charset="0"/>
-                <a:ea typeface="Microsoft YaHei" charset="-122"/>
-              </a:defRPr>
-            </a:lvl6pPr>
-            <a:lvl7pPr marL="2971800" indent="-228600" defTabSz="457200" eaLnBrk="0" fontAlgn="base" hangingPunct="0">
-              <a:lnSpc>
-                <a:spcPct val="93000"/>
-              </a:lnSpc>
-              <a:spcBef>
-                <a:spcPct val="0"/>
-              </a:spcBef>
-              <a:spcAft>
-                <a:spcPct val="0"/>
-              </a:spcAft>
-              <a:buClr>
-                <a:srgbClr val="000000"/>
-              </a:buClr>
-              <a:buSzPct val="100000"/>
-              <a:buFont typeface="Times New Roman" pitchFamily="16" charset="0"/>
-              <a:tabLst>
-                <a:tab pos="723900" algn="l"/>
-                <a:tab pos="1447800" algn="l"/>
-                <a:tab pos="2171700" algn="l"/>
-              </a:tabLst>
-              <a:defRPr>
-                <a:solidFill>
-                  <a:schemeClr val="bg1"/>
-                </a:solidFill>
-                <a:latin typeface="Arial" charset="0"/>
-                <a:ea typeface="Microsoft YaHei" charset="-122"/>
-              </a:defRPr>
-            </a:lvl7pPr>
-            <a:lvl8pPr marL="3429000" indent="-228600" defTabSz="457200" eaLnBrk="0" fontAlgn="base" hangingPunct="0">
-              <a:lnSpc>
-                <a:spcPct val="93000"/>
-              </a:lnSpc>
-              <a:spcBef>
-                <a:spcPct val="0"/>
-              </a:spcBef>
-              <a:spcAft>
-                <a:spcPct val="0"/>
-              </a:spcAft>
-              <a:buClr>
-                <a:srgbClr val="000000"/>
-              </a:buClr>
-              <a:buSzPct val="100000"/>
-              <a:buFont typeface="Times New Roman" pitchFamily="16" charset="0"/>
-              <a:tabLst>
-                <a:tab pos="723900" algn="l"/>
-                <a:tab pos="1447800" algn="l"/>
-                <a:tab pos="2171700" algn="l"/>
-              </a:tabLst>
-              <a:defRPr>
-                <a:solidFill>
-                  <a:schemeClr val="bg1"/>
-                </a:solidFill>
-                <a:latin typeface="Arial" charset="0"/>
-                <a:ea typeface="Microsoft YaHei" charset="-122"/>
-              </a:defRPr>
-            </a:lvl8pPr>
-            <a:lvl9pPr marL="3886200" indent="-228600" defTabSz="457200" eaLnBrk="0" fontAlgn="base" hangingPunct="0">
-              <a:lnSpc>
-                <a:spcPct val="93000"/>
-              </a:lnSpc>
-              <a:spcBef>
-                <a:spcPct val="0"/>
-              </a:spcBef>
-              <a:spcAft>
-                <a:spcPct val="0"/>
-              </a:spcAft>
-              <a:buClr>
-                <a:srgbClr val="000000"/>
-              </a:buClr>
-              <a:buSzPct val="100000"/>
-              <a:buFont typeface="Times New Roman" pitchFamily="16" charset="0"/>
-              <a:tabLst>
-                <a:tab pos="723900" algn="l"/>
-                <a:tab pos="1447800" algn="l"/>
-                <a:tab pos="2171700" algn="l"/>
-              </a:tabLst>
-              <a:defRPr>
-                <a:solidFill>
-                  <a:schemeClr val="bg1"/>
-                </a:solidFill>
-                <a:latin typeface="Arial" charset="0"/>
-                <a:ea typeface="Microsoft YaHei" charset="-122"/>
-              </a:defRPr>
-            </a:lvl9pPr>
-          </a:lstStyle>
-          <a:p>
-            <a:pPr eaLnBrk="1"/>
-            <a:fld id="{F1F322A6-40EC-4EDA-AEFA-232629E9BA0A}" type="slidenum">
-              <a:rPr lang="en-US" altLang="en-US">
-                <a:solidFill>
-                  <a:srgbClr val="FFFFFF"/>
-                </a:solidFill>
-                <a:latin typeface="Times New Roman" pitchFamily="16" charset="0"/>
-              </a:rPr>
-              <a:pPr eaLnBrk="1"/>
-              <a:t>40</a:t>
-            </a:fld>
-            <a:endParaRPr lang="en-US" altLang="en-US">
-              <a:solidFill>
-                <a:srgbClr val="FFFFFF"/>
-              </a:solidFill>
-              <a:latin typeface="Times New Roman" pitchFamily="16" charset="0"/>
-            </a:endParaRPr>
-          </a:p>
-        </p:txBody>
-      </p:sp>
-      <p:sp>
-        <p:nvSpPr>
-          <p:cNvPr id="48131" name="Rectangle 1"/>
+          <p:cNvPr id="21522" name="Rectangle 18"/>
           <p:cNvSpPr>
             <a:spLocks noGrp="1" noChangeArrowheads="1"/>
           </p:cNvSpPr>
@@ -35773,77 +35183,613 @@
             <p:ph type="title"/>
           </p:nvPr>
         </p:nvSpPr>
-        <p:spPr>
-          <a:xfrm>
-            <a:off x="503238" y="301625"/>
-            <a:ext cx="9067800" cy="1262063"/>
-          </a:xfrm>
-        </p:spPr>
-        <p:txBody>
-          <a:bodyPr tIns="38880"/>
-          <a:lstStyle/>
-          <a:p>
-            <a:pPr eaLnBrk="1">
-              <a:buClrTx/>
-              <a:buFontTx/>
-              <a:buNone/>
-              <a:tabLst>
-                <a:tab pos="0" algn="l"/>
-                <a:tab pos="457200" algn="l"/>
-                <a:tab pos="914400" algn="l"/>
-                <a:tab pos="1371600" algn="l"/>
-                <a:tab pos="1828800" algn="l"/>
-                <a:tab pos="2286000" algn="l"/>
-                <a:tab pos="2743200" algn="l"/>
-                <a:tab pos="3200400" algn="l"/>
-                <a:tab pos="3657600" algn="l"/>
-                <a:tab pos="4114800" algn="l"/>
-                <a:tab pos="4572000" algn="l"/>
-                <a:tab pos="5029200" algn="l"/>
-                <a:tab pos="5486400" algn="l"/>
-                <a:tab pos="5943600" algn="l"/>
-                <a:tab pos="6400800" algn="l"/>
-                <a:tab pos="6858000" algn="l"/>
-                <a:tab pos="7315200" algn="l"/>
-                <a:tab pos="7772400" algn="l"/>
-                <a:tab pos="8229600" algn="l"/>
-                <a:tab pos="8686800" algn="l"/>
-                <a:tab pos="9144000" algn="l"/>
-              </a:tabLst>
-            </a:pPr>
-            <a:r>
-              <a:rPr lang="en-US" altLang="en-US" smtClean="0">
-                <a:solidFill>
-                  <a:srgbClr val="000000"/>
-                </a:solidFill>
-              </a:rPr>
-              <a:t>RCL.PLE.MOP1</a:t>
-            </a:r>
-          </a:p>
-        </p:txBody>
-      </p:sp>
-      <p:sp>
-        <p:nvSpPr>
-          <p:cNvPr id="48132" name="Rectangle 2"/>
-          <p:cNvSpPr>
-            <a:spLocks noGrp="1" noChangeArrowheads="1"/>
-          </p:cNvSpPr>
-          <p:nvPr>
-            <p:ph type="body" idx="1"/>
-          </p:nvPr>
-        </p:nvSpPr>
-        <p:spPr>
-          <a:xfrm>
-            <a:off x="503238" y="1768475"/>
-            <a:ext cx="9067800" cy="5130800"/>
-          </a:xfrm>
-        </p:spPr>
+        <p:spPr/>
         <p:txBody>
           <a:bodyPr/>
           <a:lstStyle/>
           <a:p>
-            <a:pPr eaLnBrk="1"/>
-            <a:endParaRPr lang="en-US" altLang="en-US" smtClean="0"/>
+            <a:endParaRPr lang="en-US"/>
+          </a:p>
+        </p:txBody>
+      </p:sp>
+      <p:graphicFrame>
+        <p:nvGraphicFramePr>
+          <p:cNvPr id="21528" name="Group 24"/>
+          <p:cNvGraphicFramePr>
+            <a:graphicFrameLocks noGrp="1"/>
+          </p:cNvGraphicFramePr>
+          <p:nvPr>
+            <p:ph idx="1"/>
+          </p:nvPr>
+        </p:nvGraphicFramePr>
+        <p:xfrm>
+          <a:off x="465931" y="581025"/>
+          <a:ext cx="9068276" cy="2119983"/>
+        </p:xfrm>
+        <a:graphic>
+          <a:graphicData uri="http://schemas.openxmlformats.org/drawingml/2006/table">
+            <a:tbl>
+              <a:tblPr/>
+              <a:tblGrid>
+                <a:gridCol w="3314938"/>
+                <a:gridCol w="5753338"/>
+              </a:tblGrid>
+              <a:tr h="699107">
+                <a:tc>
+                  <a:txBody>
+                    <a:bodyPr/>
+                    <a:lstStyle/>
+                    <a:p>
+                      <a:pPr marL="0" marR="0" lvl="0" indent="0" algn="l" defTabSz="914400" rtl="0" eaLnBrk="1" fontAlgn="base" latinLnBrk="0" hangingPunct="1">
+                        <a:lnSpc>
+                          <a:spcPct val="100000"/>
+                        </a:lnSpc>
+                        <a:spcBef>
+                          <a:spcPct val="0"/>
+                        </a:spcBef>
+                        <a:spcAft>
+                          <a:spcPct val="0"/>
+                        </a:spcAft>
+                        <a:buClrTx/>
+                        <a:buSzTx/>
+                        <a:buFontTx/>
+                        <a:buNone/>
+                        <a:tabLst/>
+                      </a:pPr>
+                      <a:r>
+                        <a:rPr kumimoji="0" lang="en-US" sz="2000" b="0" i="0" u="none" strike="noStrike" cap="none" normalizeH="0" baseline="0" dirty="0" smtClean="0">
+                          <a:ln>
+                            <a:noFill/>
+                          </a:ln>
+                          <a:solidFill>
+                            <a:schemeClr val="bg1"/>
+                          </a:solidFill>
+                          <a:effectLst/>
+                          <a:latin typeface="Arial" pitchFamily="34" charset="0"/>
+                          <a:cs typeface="Arial" pitchFamily="34" charset="0"/>
+                        </a:rPr>
+                        <a:t> RVM Requirement Number</a:t>
+                      </a:r>
+                    </a:p>
+                  </a:txBody>
+                  <a:tcPr marL="100759" marR="100759" marT="50419" marB="50419" anchor="ctr" horzOverflow="overflow">
+                    <a:lnL w="12700" cap="flat" cmpd="sng" algn="ctr">
+                      <a:solidFill>
+                        <a:schemeClr val="tx1"/>
+                      </a:solidFill>
+                      <a:prstDash val="solid"/>
+                      <a:round/>
+                      <a:headEnd type="none" w="med" len="med"/>
+                      <a:tailEnd type="none" w="med" len="med"/>
+                    </a:lnL>
+                    <a:lnR w="12700" cap="flat" cmpd="sng" algn="ctr">
+                      <a:solidFill>
+                        <a:schemeClr val="tx1"/>
+                      </a:solidFill>
+                      <a:prstDash val="solid"/>
+                      <a:round/>
+                      <a:headEnd type="none" w="med" len="med"/>
+                      <a:tailEnd type="none" w="med" len="med"/>
+                    </a:lnR>
+                    <a:lnT w="12700" cap="flat" cmpd="sng" algn="ctr">
+                      <a:solidFill>
+                        <a:schemeClr val="tx1"/>
+                      </a:solidFill>
+                      <a:prstDash val="solid"/>
+                      <a:round/>
+                      <a:headEnd type="none" w="med" len="med"/>
+                      <a:tailEnd type="none" w="med" len="med"/>
+                    </a:lnT>
+                    <a:lnB w="12700" cap="flat" cmpd="sng" algn="ctr">
+                      <a:solidFill>
+                        <a:schemeClr val="tx1"/>
+                      </a:solidFill>
+                      <a:prstDash val="solid"/>
+                      <a:round/>
+                      <a:headEnd type="none" w="med" len="med"/>
+                      <a:tailEnd type="none" w="med" len="med"/>
+                    </a:lnB>
+                    <a:lnTlToBr>
+                      <a:noFill/>
+                    </a:lnTlToBr>
+                    <a:lnBlToTr>
+                      <a:noFill/>
+                    </a:lnBlToTr>
+                    <a:solidFill>
+                      <a:srgbClr val="0070C0"/>
+                    </a:solidFill>
+                  </a:tcPr>
+                </a:tc>
+                <a:tc>
+                  <a:txBody>
+                    <a:bodyPr/>
+                    <a:lstStyle/>
+                    <a:p>
+                      <a:pPr marL="0" marR="0" lvl="0" indent="0" algn="l" defTabSz="914400" rtl="0" eaLnBrk="1" fontAlgn="base" latinLnBrk="0" hangingPunct="1">
+                        <a:lnSpc>
+                          <a:spcPct val="100000"/>
+                        </a:lnSpc>
+                        <a:spcBef>
+                          <a:spcPct val="0"/>
+                        </a:spcBef>
+                        <a:spcAft>
+                          <a:spcPct val="0"/>
+                        </a:spcAft>
+                        <a:buClrTx/>
+                        <a:buSzTx/>
+                        <a:buFontTx/>
+                        <a:buNone/>
+                        <a:tabLst/>
+                      </a:pPr>
+                      <a:r>
+                        <a:rPr kumimoji="0" lang="en-US" sz="2000" b="1" i="0" u="none" strike="noStrike" cap="none" normalizeH="0" baseline="0" dirty="0" smtClean="0">
+                          <a:ln>
+                            <a:noFill/>
+                          </a:ln>
+                          <a:solidFill>
+                            <a:schemeClr val="tx1"/>
+                          </a:solidFill>
+                          <a:effectLst/>
+                          <a:latin typeface="Arial" pitchFamily="34" charset="0"/>
+                          <a:cs typeface="Arial" pitchFamily="34" charset="0"/>
+                        </a:rPr>
+                        <a:t>RCL.PLE.MOP1</a:t>
+                      </a:r>
+                    </a:p>
+                  </a:txBody>
+                  <a:tcPr marL="100759" marR="100759" marT="50419" marB="50419" anchor="ctr" horzOverflow="overflow">
+                    <a:lnL w="12700" cap="flat" cmpd="sng" algn="ctr">
+                      <a:solidFill>
+                        <a:schemeClr val="tx1"/>
+                      </a:solidFill>
+                      <a:prstDash val="solid"/>
+                      <a:round/>
+                      <a:headEnd type="none" w="med" len="med"/>
+                      <a:tailEnd type="none" w="med" len="med"/>
+                    </a:lnL>
+                    <a:lnR w="12700" cap="flat" cmpd="sng" algn="ctr">
+                      <a:solidFill>
+                        <a:schemeClr val="tx1"/>
+                      </a:solidFill>
+                      <a:prstDash val="solid"/>
+                      <a:round/>
+                      <a:headEnd type="none" w="med" len="med"/>
+                      <a:tailEnd type="none" w="med" len="med"/>
+                    </a:lnR>
+                    <a:lnT w="12700" cap="flat" cmpd="sng" algn="ctr">
+                      <a:solidFill>
+                        <a:schemeClr val="tx1"/>
+                      </a:solidFill>
+                      <a:prstDash val="solid"/>
+                      <a:round/>
+                      <a:headEnd type="none" w="med" len="med"/>
+                      <a:tailEnd type="none" w="med" len="med"/>
+                    </a:lnT>
+                    <a:lnB w="12700" cap="flat" cmpd="sng" algn="ctr">
+                      <a:solidFill>
+                        <a:schemeClr val="tx1"/>
+                      </a:solidFill>
+                      <a:prstDash val="solid"/>
+                      <a:round/>
+                      <a:headEnd type="none" w="med" len="med"/>
+                      <a:tailEnd type="none" w="med" len="med"/>
+                    </a:lnB>
+                    <a:lnTlToBr>
+                      <a:noFill/>
+                    </a:lnTlToBr>
+                    <a:lnBlToTr>
+                      <a:noFill/>
+                    </a:lnBlToTr>
+                    <a:solidFill>
+                      <a:srgbClr val="8EB4E3"/>
+                    </a:solidFill>
+                  </a:tcPr>
+                </a:tc>
+              </a:tr>
+              <a:tr h="694746">
+                <a:tc>
+                  <a:txBody>
+                    <a:bodyPr/>
+                    <a:lstStyle/>
+                    <a:p>
+                      <a:pPr marL="0" marR="0" lvl="0" indent="0" algn="l" defTabSz="914400" rtl="0" eaLnBrk="1" fontAlgn="base" latinLnBrk="0" hangingPunct="1">
+                        <a:lnSpc>
+                          <a:spcPct val="100000"/>
+                        </a:lnSpc>
+                        <a:spcBef>
+                          <a:spcPct val="0"/>
+                        </a:spcBef>
+                        <a:spcAft>
+                          <a:spcPct val="0"/>
+                        </a:spcAft>
+                        <a:buClrTx/>
+                        <a:buSzTx/>
+                        <a:buFontTx/>
+                        <a:buNone/>
+                        <a:tabLst/>
+                      </a:pPr>
+                      <a:r>
+                        <a:rPr kumimoji="0" lang="en-US" sz="2000" b="0" i="0" u="none" strike="noStrike" cap="none" normalizeH="0" baseline="0" dirty="0" smtClean="0">
+                          <a:ln>
+                            <a:noFill/>
+                          </a:ln>
+                          <a:solidFill>
+                            <a:schemeClr val="bg1"/>
+                          </a:solidFill>
+                          <a:effectLst/>
+                          <a:latin typeface="Arial" pitchFamily="34" charset="0"/>
+                          <a:cs typeface="Arial" pitchFamily="34" charset="0"/>
+                        </a:rPr>
+                        <a:t>RVM Requirement Wording</a:t>
+                      </a:r>
+                    </a:p>
+                  </a:txBody>
+                  <a:tcPr marL="100759" marR="100759" marT="50419" marB="50419" anchor="ctr" horzOverflow="overflow">
+                    <a:lnL w="12700" cap="flat" cmpd="sng" algn="ctr">
+                      <a:solidFill>
+                        <a:schemeClr val="tx1"/>
+                      </a:solidFill>
+                      <a:prstDash val="solid"/>
+                      <a:round/>
+                      <a:headEnd type="none" w="med" len="med"/>
+                      <a:tailEnd type="none" w="med" len="med"/>
+                    </a:lnL>
+                    <a:lnR w="12700" cap="flat" cmpd="sng" algn="ctr">
+                      <a:solidFill>
+                        <a:schemeClr val="tx1"/>
+                      </a:solidFill>
+                      <a:prstDash val="solid"/>
+                      <a:round/>
+                      <a:headEnd type="none" w="med" len="med"/>
+                      <a:tailEnd type="none" w="med" len="med"/>
+                    </a:lnR>
+                    <a:lnT w="12700" cap="flat" cmpd="sng" algn="ctr">
+                      <a:solidFill>
+                        <a:schemeClr val="tx1"/>
+                      </a:solidFill>
+                      <a:prstDash val="solid"/>
+                      <a:round/>
+                      <a:headEnd type="none" w="med" len="med"/>
+                      <a:tailEnd type="none" w="med" len="med"/>
+                    </a:lnT>
+                    <a:lnB w="12700" cap="flat" cmpd="sng" algn="ctr">
+                      <a:solidFill>
+                        <a:schemeClr val="tx1"/>
+                      </a:solidFill>
+                      <a:prstDash val="solid"/>
+                      <a:round/>
+                      <a:headEnd type="none" w="med" len="med"/>
+                      <a:tailEnd type="none" w="med" len="med"/>
+                    </a:lnB>
+                    <a:lnTlToBr>
+                      <a:noFill/>
+                    </a:lnTlToBr>
+                    <a:lnBlToTr>
+                      <a:noFill/>
+                    </a:lnBlToTr>
+                    <a:solidFill>
+                      <a:srgbClr val="0070C0"/>
+                    </a:solidFill>
+                  </a:tcPr>
+                </a:tc>
+                <a:tc>
+                  <a:txBody>
+                    <a:bodyPr/>
+                    <a:lstStyle/>
+                    <a:p>
+                      <a:pPr marL="533400" marR="0" lvl="0" indent="-533400" algn="l" defTabSz="914400" rtl="0" eaLnBrk="1" fontAlgn="base" latinLnBrk="0" hangingPunct="1">
+                        <a:lnSpc>
+                          <a:spcPct val="100000"/>
+                        </a:lnSpc>
+                        <a:spcBef>
+                          <a:spcPct val="0"/>
+                        </a:spcBef>
+                        <a:spcAft>
+                          <a:spcPct val="0"/>
+                        </a:spcAft>
+                        <a:buClrTx/>
+                        <a:buSzTx/>
+                        <a:buFontTx/>
+                        <a:buNone/>
+                        <a:tabLst/>
+                      </a:pPr>
+                      <a:r>
+                        <a:rPr kumimoji="0" lang="en-US" sz="2000" b="1" i="1" u="none" strike="noStrike" cap="none" normalizeH="0" baseline="0" dirty="0" smtClean="0">
+                          <a:ln>
+                            <a:noFill/>
+                          </a:ln>
+                          <a:solidFill>
+                            <a:schemeClr val="tx1"/>
+                          </a:solidFill>
+                          <a:effectLst/>
+                          <a:latin typeface="Arial" pitchFamily="34" charset="0"/>
+                          <a:cs typeface="Arial" pitchFamily="34" charset="0"/>
+                        </a:rPr>
+                        <a:t>“The CubeSat System Shall not Broadcast in RF Until Ejection +45 Minutes”</a:t>
+                      </a:r>
+                    </a:p>
+                  </a:txBody>
+                  <a:tcPr marL="100759" marR="100759" marT="50419" marB="50419" anchor="ctr" horzOverflow="overflow">
+                    <a:lnL w="12700" cap="flat" cmpd="sng" algn="ctr">
+                      <a:solidFill>
+                        <a:schemeClr val="tx1"/>
+                      </a:solidFill>
+                      <a:prstDash val="solid"/>
+                      <a:round/>
+                      <a:headEnd type="none" w="med" len="med"/>
+                      <a:tailEnd type="none" w="med" len="med"/>
+                    </a:lnL>
+                    <a:lnR w="12700" cap="flat" cmpd="sng" algn="ctr">
+                      <a:solidFill>
+                        <a:schemeClr val="tx1"/>
+                      </a:solidFill>
+                      <a:prstDash val="solid"/>
+                      <a:round/>
+                      <a:headEnd type="none" w="med" len="med"/>
+                      <a:tailEnd type="none" w="med" len="med"/>
+                    </a:lnR>
+                    <a:lnT w="12700" cap="flat" cmpd="sng" algn="ctr">
+                      <a:solidFill>
+                        <a:schemeClr val="tx1"/>
+                      </a:solidFill>
+                      <a:prstDash val="solid"/>
+                      <a:round/>
+                      <a:headEnd type="none" w="med" len="med"/>
+                      <a:tailEnd type="none" w="med" len="med"/>
+                    </a:lnT>
+                    <a:lnB w="12700" cap="flat" cmpd="sng" algn="ctr">
+                      <a:solidFill>
+                        <a:schemeClr val="tx1"/>
+                      </a:solidFill>
+                      <a:prstDash val="solid"/>
+                      <a:round/>
+                      <a:headEnd type="none" w="med" len="med"/>
+                      <a:tailEnd type="none" w="med" len="med"/>
+                    </a:lnB>
+                    <a:lnTlToBr>
+                      <a:noFill/>
+                    </a:lnTlToBr>
+                    <a:lnBlToTr>
+                      <a:noFill/>
+                    </a:lnBlToTr>
+                    <a:solidFill>
+                      <a:srgbClr val="8EB4E3"/>
+                    </a:solidFill>
+                  </a:tcPr>
+                </a:tc>
+              </a:tr>
+              <a:tr h="699107">
+                <a:tc>
+                  <a:txBody>
+                    <a:bodyPr/>
+                    <a:lstStyle/>
+                    <a:p>
+                      <a:pPr marL="0" marR="0" lvl="0" indent="0" algn="l" defTabSz="914400" rtl="0" eaLnBrk="1" fontAlgn="base" latinLnBrk="0" hangingPunct="1">
+                        <a:lnSpc>
+                          <a:spcPct val="100000"/>
+                        </a:lnSpc>
+                        <a:spcBef>
+                          <a:spcPct val="0"/>
+                        </a:spcBef>
+                        <a:spcAft>
+                          <a:spcPct val="0"/>
+                        </a:spcAft>
+                        <a:buClrTx/>
+                        <a:buSzTx/>
+                        <a:buFontTx/>
+                        <a:buNone/>
+                        <a:tabLst/>
+                      </a:pPr>
+                      <a:r>
+                        <a:rPr kumimoji="0" lang="en-US" sz="2000" b="0" i="0" u="none" strike="noStrike" cap="none" normalizeH="0" baseline="0" dirty="0" smtClean="0">
+                          <a:ln>
+                            <a:noFill/>
+                          </a:ln>
+                          <a:solidFill>
+                            <a:schemeClr val="bg1"/>
+                          </a:solidFill>
+                          <a:effectLst/>
+                          <a:latin typeface="Arial" pitchFamily="34" charset="0"/>
+                          <a:cs typeface="Arial" pitchFamily="34" charset="0"/>
+                        </a:rPr>
+                        <a:t>Validation Method</a:t>
+                      </a:r>
+                    </a:p>
+                  </a:txBody>
+                  <a:tcPr marL="100759" marR="100759" marT="50419" marB="50419" anchor="ctr" horzOverflow="overflow">
+                    <a:lnL w="12700" cap="flat" cmpd="sng" algn="ctr">
+                      <a:solidFill>
+                        <a:schemeClr val="tx1"/>
+                      </a:solidFill>
+                      <a:prstDash val="solid"/>
+                      <a:round/>
+                      <a:headEnd type="none" w="med" len="med"/>
+                      <a:tailEnd type="none" w="med" len="med"/>
+                    </a:lnL>
+                    <a:lnR w="12700" cap="flat" cmpd="sng" algn="ctr">
+                      <a:solidFill>
+                        <a:schemeClr val="tx1"/>
+                      </a:solidFill>
+                      <a:prstDash val="solid"/>
+                      <a:round/>
+                      <a:headEnd type="none" w="med" len="med"/>
+                      <a:tailEnd type="none" w="med" len="med"/>
+                    </a:lnR>
+                    <a:lnT w="12700" cap="flat" cmpd="sng" algn="ctr">
+                      <a:solidFill>
+                        <a:schemeClr val="tx1"/>
+                      </a:solidFill>
+                      <a:prstDash val="solid"/>
+                      <a:round/>
+                      <a:headEnd type="none" w="med" len="med"/>
+                      <a:tailEnd type="none" w="med" len="med"/>
+                    </a:lnT>
+                    <a:lnB w="12700" cap="flat" cmpd="sng" algn="ctr">
+                      <a:solidFill>
+                        <a:schemeClr val="tx1"/>
+                      </a:solidFill>
+                      <a:prstDash val="solid"/>
+                      <a:round/>
+                      <a:headEnd type="none" w="med" len="med"/>
+                      <a:tailEnd type="none" w="med" len="med"/>
+                    </a:lnB>
+                    <a:lnTlToBr>
+                      <a:noFill/>
+                    </a:lnTlToBr>
+                    <a:lnBlToTr>
+                      <a:noFill/>
+                    </a:lnBlToTr>
+                    <a:solidFill>
+                      <a:srgbClr val="0070C0"/>
+                    </a:solidFill>
+                  </a:tcPr>
+                </a:tc>
+                <a:tc>
+                  <a:txBody>
+                    <a:bodyPr/>
+                    <a:lstStyle/>
+                    <a:p>
+                      <a:pPr marL="0" marR="0" lvl="0" indent="0" algn="l" defTabSz="914400" rtl="0" eaLnBrk="1" fontAlgn="base" latinLnBrk="0" hangingPunct="1">
+                        <a:lnSpc>
+                          <a:spcPct val="100000"/>
+                        </a:lnSpc>
+                        <a:spcBef>
+                          <a:spcPct val="0"/>
+                        </a:spcBef>
+                        <a:spcAft>
+                          <a:spcPct val="0"/>
+                        </a:spcAft>
+                        <a:buClrTx/>
+                        <a:buSzTx/>
+                        <a:buFontTx/>
+                        <a:buNone/>
+                        <a:tabLst/>
+                      </a:pPr>
+                      <a:r>
+                        <a:rPr kumimoji="0" lang="en-US" sz="2000" b="1" i="0" u="none" strike="noStrike" cap="none" normalizeH="0" baseline="0" dirty="0" smtClean="0">
+                          <a:ln>
+                            <a:noFill/>
+                          </a:ln>
+                          <a:solidFill>
+                            <a:schemeClr val="tx1"/>
+                          </a:solidFill>
+                          <a:effectLst/>
+                          <a:latin typeface="Arial" pitchFamily="34" charset="0"/>
+                          <a:cs typeface="Arial" pitchFamily="34" charset="0"/>
+                        </a:rPr>
+                        <a:t>Demo</a:t>
+                      </a:r>
+                    </a:p>
+                  </a:txBody>
+                  <a:tcPr marL="100759" marR="100759" marT="50419" marB="50419" anchor="ctr" horzOverflow="overflow">
+                    <a:lnL w="12700" cap="flat" cmpd="sng" algn="ctr">
+                      <a:solidFill>
+                        <a:schemeClr val="tx1"/>
+                      </a:solidFill>
+                      <a:prstDash val="solid"/>
+                      <a:round/>
+                      <a:headEnd type="none" w="med" len="med"/>
+                      <a:tailEnd type="none" w="med" len="med"/>
+                    </a:lnL>
+                    <a:lnR w="12700" cap="flat" cmpd="sng" algn="ctr">
+                      <a:solidFill>
+                        <a:schemeClr val="tx1"/>
+                      </a:solidFill>
+                      <a:prstDash val="solid"/>
+                      <a:round/>
+                      <a:headEnd type="none" w="med" len="med"/>
+                      <a:tailEnd type="none" w="med" len="med"/>
+                    </a:lnR>
+                    <a:lnT w="12700" cap="flat" cmpd="sng" algn="ctr">
+                      <a:solidFill>
+                        <a:schemeClr val="tx1"/>
+                      </a:solidFill>
+                      <a:prstDash val="solid"/>
+                      <a:round/>
+                      <a:headEnd type="none" w="med" len="med"/>
+                      <a:tailEnd type="none" w="med" len="med"/>
+                    </a:lnT>
+                    <a:lnB w="12700" cap="flat" cmpd="sng" algn="ctr">
+                      <a:solidFill>
+                        <a:schemeClr val="tx1"/>
+                      </a:solidFill>
+                      <a:prstDash val="solid"/>
+                      <a:round/>
+                      <a:headEnd type="none" w="med" len="med"/>
+                      <a:tailEnd type="none" w="med" len="med"/>
+                    </a:lnB>
+                    <a:lnTlToBr>
+                      <a:noFill/>
+                    </a:lnTlToBr>
+                    <a:lnBlToTr>
+                      <a:noFill/>
+                    </a:lnBlToTr>
+                    <a:solidFill>
+                      <a:srgbClr val="8EB4E3"/>
+                    </a:solidFill>
+                  </a:tcPr>
+                </a:tc>
+              </a:tr>
+            </a:tbl>
+          </a:graphicData>
+        </a:graphic>
+      </p:graphicFrame>
+      <p:sp>
+        <p:nvSpPr>
+          <p:cNvPr id="21530" name="Text Box 26"/>
+          <p:cNvSpPr txBox="1">
+            <a:spLocks noChangeArrowheads="1"/>
+          </p:cNvSpPr>
+          <p:nvPr/>
+        </p:nvSpPr>
+        <p:spPr bwMode="auto">
+          <a:xfrm>
+            <a:off x="465931" y="2867025"/>
+            <a:ext cx="9152242" cy="1790181"/>
+          </a:xfrm>
+          <a:prstGeom prst="rect">
+            <a:avLst/>
+          </a:prstGeom>
+          <a:noFill/>
+          <a:ln w="9525">
+            <a:noFill/>
+            <a:miter lim="800000"/>
+            <a:headEnd/>
+            <a:tailEnd/>
+          </a:ln>
+          <a:effectLst/>
+        </p:spPr>
+        <p:txBody>
+          <a:bodyPr lIns="100785" tIns="50393" rIns="100785" bIns="50393">
+            <a:spAutoFit/>
+          </a:bodyPr>
+          <a:lstStyle/>
+          <a:p>
+            <a:pPr>
+              <a:spcBef>
+                <a:spcPct val="50000"/>
+              </a:spcBef>
+            </a:pPr>
+            <a:r>
+              <a:rPr lang="en-US" sz="2600" b="1" dirty="0">
+                <a:solidFill>
+                  <a:schemeClr val="tx1"/>
+                </a:solidFill>
+              </a:rPr>
+              <a:t>Meeting this requirement can be demonstrated on the ground through the successful completion of a Day in the Life Test.</a:t>
+            </a:r>
+          </a:p>
+          <a:p>
+            <a:pPr>
+              <a:spcBef>
+                <a:spcPct val="50000"/>
+              </a:spcBef>
+            </a:pPr>
+            <a:endParaRPr lang="en-US" sz="2600" b="1" dirty="0">
+              <a:solidFill>
+                <a:schemeClr val="tx1"/>
+              </a:solidFill>
+            </a:endParaRPr>
           </a:p>
         </p:txBody>
       </p:sp>
@@ -35852,38 +35798,637 @@
   <p:clrMapOvr>
     <a:masterClrMapping/>
   </p:clrMapOvr>
-  <p:transition spd="med"/>
-  <p:timing>
-    <p:tnLst>
-      <p:par>
-        <p:cTn id="1" dur="indefinite" restart="never" nodeType="tmRoot">
-          <p:childTnLst>
-            <p:seq concurrent="1" nextAc="seek">
-              <p:cTn id="2" dur="indefinite" nodeType="mainSeq"/>
-              <p:prevCondLst>
-                <p:cond evt="onPrev" delay="0">
-                  <p:tgtEl>
-                    <p:sldTgt/>
-                  </p:tgtEl>
-                </p:cond>
-              </p:prevCondLst>
-              <p:nextCondLst>
-                <p:cond evt="onNext" delay="0">
-                  <p:tgtEl>
-                    <p:sldTgt/>
-                  </p:tgtEl>
-                </p:cond>
-              </p:nextCondLst>
-            </p:seq>
-          </p:childTnLst>
-        </p:cTn>
-      </p:par>
-    </p:tnLst>
-  </p:timing>
 </p:sld>
 </file>
 
 <file path=ppt/slides/slide41.xml><?xml version="1.0" encoding="utf-8"?>
+<p:sld xmlns:a="http://schemas.openxmlformats.org/drawingml/2006/main" xmlns:r="http://schemas.openxmlformats.org/officeDocument/2006/relationships" xmlns:p="http://schemas.openxmlformats.org/presentationml/2006/main">
+  <p:cSld>
+    <p:spTree>
+      <p:nvGrpSpPr>
+        <p:cNvPr id="1" name=""/>
+        <p:cNvGrpSpPr/>
+        <p:nvPr/>
+      </p:nvGrpSpPr>
+      <p:grpSpPr>
+        <a:xfrm>
+          <a:off x="0" y="0"/>
+          <a:ext cx="0" cy="0"/>
+          <a:chOff x="0" y="0"/>
+          <a:chExt cx="0" cy="0"/>
+        </a:xfrm>
+      </p:grpSpPr>
+      <p:sp>
+        <p:nvSpPr>
+          <p:cNvPr id="23570" name="Rectangle 18"/>
+          <p:cNvSpPr>
+            <a:spLocks noGrp="1" noChangeArrowheads="1"/>
+          </p:cNvSpPr>
+          <p:nvPr>
+            <p:ph type="title"/>
+          </p:nvPr>
+        </p:nvSpPr>
+        <p:spPr/>
+        <p:txBody>
+          <a:bodyPr/>
+          <a:lstStyle/>
+          <a:p>
+            <a:endParaRPr lang="en-US" dirty="0"/>
+          </a:p>
+        </p:txBody>
+      </p:sp>
+      <p:graphicFrame>
+        <p:nvGraphicFramePr>
+          <p:cNvPr id="23576" name="Group 24"/>
+          <p:cNvGraphicFramePr>
+            <a:graphicFrameLocks noGrp="1"/>
+          </p:cNvGraphicFramePr>
+          <p:nvPr>
+            <p:ph idx="1"/>
+          </p:nvPr>
+        </p:nvGraphicFramePr>
+        <p:xfrm>
+          <a:off x="618331" y="581025"/>
+          <a:ext cx="9068276" cy="2209828"/>
+        </p:xfrm>
+        <a:graphic>
+          <a:graphicData uri="http://schemas.openxmlformats.org/drawingml/2006/table">
+            <a:tbl>
+              <a:tblPr/>
+              <a:tblGrid>
+                <a:gridCol w="3619738"/>
+                <a:gridCol w="5448538"/>
+              </a:tblGrid>
+              <a:tr h="597295">
+                <a:tc>
+                  <a:txBody>
+                    <a:bodyPr/>
+                    <a:lstStyle/>
+                    <a:p>
+                      <a:pPr marL="0" marR="0" lvl="0" indent="0" algn="l" defTabSz="914400" rtl="0" eaLnBrk="1" fontAlgn="base" latinLnBrk="0" hangingPunct="1">
+                        <a:lnSpc>
+                          <a:spcPct val="100000"/>
+                        </a:lnSpc>
+                        <a:spcBef>
+                          <a:spcPct val="0"/>
+                        </a:spcBef>
+                        <a:spcAft>
+                          <a:spcPct val="0"/>
+                        </a:spcAft>
+                        <a:buClrTx/>
+                        <a:buSzTx/>
+                        <a:buFontTx/>
+                        <a:buNone/>
+                        <a:tabLst/>
+                      </a:pPr>
+                      <a:r>
+                        <a:rPr kumimoji="0" lang="en-US" sz="2000" b="0" i="0" u="none" strike="noStrike" cap="none" normalizeH="0" baseline="0" dirty="0" smtClean="0">
+                          <a:ln>
+                            <a:noFill/>
+                          </a:ln>
+                          <a:solidFill>
+                            <a:schemeClr val="bg1"/>
+                          </a:solidFill>
+                          <a:effectLst/>
+                          <a:latin typeface="Arial" pitchFamily="34" charset="0"/>
+                          <a:cs typeface="Arial" pitchFamily="34" charset="0"/>
+                        </a:rPr>
+                        <a:t> RVM Requirement Number</a:t>
+                      </a:r>
+                    </a:p>
+                  </a:txBody>
+                  <a:tcPr marL="100759" marR="100759" marT="50419" marB="50419" anchor="ctr" horzOverflow="overflow">
+                    <a:lnL w="12700" cap="flat" cmpd="sng" algn="ctr">
+                      <a:solidFill>
+                        <a:schemeClr val="tx1"/>
+                      </a:solidFill>
+                      <a:prstDash val="solid"/>
+                      <a:round/>
+                      <a:headEnd type="none" w="med" len="med"/>
+                      <a:tailEnd type="none" w="med" len="med"/>
+                    </a:lnL>
+                    <a:lnR w="12700" cap="flat" cmpd="sng" algn="ctr">
+                      <a:solidFill>
+                        <a:schemeClr val="tx1"/>
+                      </a:solidFill>
+                      <a:prstDash val="solid"/>
+                      <a:round/>
+                      <a:headEnd type="none" w="med" len="med"/>
+                      <a:tailEnd type="none" w="med" len="med"/>
+                    </a:lnR>
+                    <a:lnT w="12700" cap="flat" cmpd="sng" algn="ctr">
+                      <a:solidFill>
+                        <a:schemeClr val="tx1"/>
+                      </a:solidFill>
+                      <a:prstDash val="solid"/>
+                      <a:round/>
+                      <a:headEnd type="none" w="med" len="med"/>
+                      <a:tailEnd type="none" w="med" len="med"/>
+                    </a:lnT>
+                    <a:lnB w="12700" cap="flat" cmpd="sng" algn="ctr">
+                      <a:solidFill>
+                        <a:schemeClr val="tx1"/>
+                      </a:solidFill>
+                      <a:prstDash val="solid"/>
+                      <a:round/>
+                      <a:headEnd type="none" w="med" len="med"/>
+                      <a:tailEnd type="none" w="med" len="med"/>
+                    </a:lnB>
+                    <a:lnTlToBr>
+                      <a:noFill/>
+                    </a:lnTlToBr>
+                    <a:lnBlToTr>
+                      <a:noFill/>
+                    </a:lnBlToTr>
+                    <a:solidFill>
+                      <a:srgbClr val="0070C0"/>
+                    </a:solidFill>
+                  </a:tcPr>
+                </a:tc>
+                <a:tc>
+                  <a:txBody>
+                    <a:bodyPr/>
+                    <a:lstStyle/>
+                    <a:p>
+                      <a:pPr marL="0" marR="0" lvl="0" indent="0" algn="l" defTabSz="914400" rtl="0" eaLnBrk="1" fontAlgn="base" latinLnBrk="0" hangingPunct="1">
+                        <a:lnSpc>
+                          <a:spcPct val="100000"/>
+                        </a:lnSpc>
+                        <a:spcBef>
+                          <a:spcPct val="0"/>
+                        </a:spcBef>
+                        <a:spcAft>
+                          <a:spcPct val="0"/>
+                        </a:spcAft>
+                        <a:buClrTx/>
+                        <a:buSzTx/>
+                        <a:buFontTx/>
+                        <a:buNone/>
+                        <a:tabLst/>
+                      </a:pPr>
+                      <a:r>
+                        <a:rPr kumimoji="0" lang="en-US" sz="2000" b="1" i="0" u="none" strike="noStrike" cap="none" normalizeH="0" baseline="0" dirty="0" smtClean="0">
+                          <a:ln>
+                            <a:noFill/>
+                          </a:ln>
+                          <a:solidFill>
+                            <a:schemeClr val="tx1"/>
+                          </a:solidFill>
+                          <a:effectLst/>
+                          <a:latin typeface="Arial" pitchFamily="34" charset="0"/>
+                          <a:cs typeface="Arial" pitchFamily="34" charset="0"/>
+                        </a:rPr>
+                        <a:t>RCL.PLE.MOP2</a:t>
+                      </a:r>
+                    </a:p>
+                  </a:txBody>
+                  <a:tcPr marL="100759" marR="100759" marT="50419" marB="50419" anchor="ctr" horzOverflow="overflow">
+                    <a:lnL w="12700" cap="flat" cmpd="sng" algn="ctr">
+                      <a:solidFill>
+                        <a:schemeClr val="tx1"/>
+                      </a:solidFill>
+                      <a:prstDash val="solid"/>
+                      <a:round/>
+                      <a:headEnd type="none" w="med" len="med"/>
+                      <a:tailEnd type="none" w="med" len="med"/>
+                    </a:lnL>
+                    <a:lnR w="12700" cap="flat" cmpd="sng" algn="ctr">
+                      <a:solidFill>
+                        <a:schemeClr val="tx1"/>
+                      </a:solidFill>
+                      <a:prstDash val="solid"/>
+                      <a:round/>
+                      <a:headEnd type="none" w="med" len="med"/>
+                      <a:tailEnd type="none" w="med" len="med"/>
+                    </a:lnR>
+                    <a:lnT w="12700" cap="flat" cmpd="sng" algn="ctr">
+                      <a:solidFill>
+                        <a:schemeClr val="tx1"/>
+                      </a:solidFill>
+                      <a:prstDash val="solid"/>
+                      <a:round/>
+                      <a:headEnd type="none" w="med" len="med"/>
+                      <a:tailEnd type="none" w="med" len="med"/>
+                    </a:lnT>
+                    <a:lnB w="12700" cap="flat" cmpd="sng" algn="ctr">
+                      <a:solidFill>
+                        <a:schemeClr val="tx1"/>
+                      </a:solidFill>
+                      <a:prstDash val="solid"/>
+                      <a:round/>
+                      <a:headEnd type="none" w="med" len="med"/>
+                      <a:tailEnd type="none" w="med" len="med"/>
+                    </a:lnB>
+                    <a:lnTlToBr>
+                      <a:noFill/>
+                    </a:lnTlToBr>
+                    <a:lnBlToTr>
+                      <a:noFill/>
+                    </a:lnBlToTr>
+                    <a:noFill/>
+                  </a:tcPr>
+                </a:tc>
+              </a:tr>
+              <a:tr h="593569">
+                <a:tc>
+                  <a:txBody>
+                    <a:bodyPr/>
+                    <a:lstStyle/>
+                    <a:p>
+                      <a:pPr marL="0" marR="0" lvl="0" indent="0" algn="l" defTabSz="914400" rtl="0" eaLnBrk="1" fontAlgn="base" latinLnBrk="0" hangingPunct="1">
+                        <a:lnSpc>
+                          <a:spcPct val="100000"/>
+                        </a:lnSpc>
+                        <a:spcBef>
+                          <a:spcPct val="0"/>
+                        </a:spcBef>
+                        <a:spcAft>
+                          <a:spcPct val="0"/>
+                        </a:spcAft>
+                        <a:buClrTx/>
+                        <a:buSzTx/>
+                        <a:buFontTx/>
+                        <a:buNone/>
+                        <a:tabLst/>
+                      </a:pPr>
+                      <a:r>
+                        <a:rPr kumimoji="0" lang="en-US" sz="2000" b="0" i="0" u="none" strike="noStrike" cap="none" normalizeH="0" baseline="0" dirty="0" smtClean="0">
+                          <a:ln>
+                            <a:noFill/>
+                          </a:ln>
+                          <a:solidFill>
+                            <a:schemeClr val="bg1"/>
+                          </a:solidFill>
+                          <a:effectLst/>
+                          <a:latin typeface="Arial" pitchFamily="34" charset="0"/>
+                          <a:cs typeface="Arial" pitchFamily="34" charset="0"/>
+                        </a:rPr>
+                        <a:t>RVM Requirement Wording</a:t>
+                      </a:r>
+                    </a:p>
+                  </a:txBody>
+                  <a:tcPr marL="100759" marR="100759" marT="50419" marB="50419" anchor="ctr" horzOverflow="overflow">
+                    <a:lnL w="12700" cap="flat" cmpd="sng" algn="ctr">
+                      <a:solidFill>
+                        <a:schemeClr val="tx1"/>
+                      </a:solidFill>
+                      <a:prstDash val="solid"/>
+                      <a:round/>
+                      <a:headEnd type="none" w="med" len="med"/>
+                      <a:tailEnd type="none" w="med" len="med"/>
+                    </a:lnL>
+                    <a:lnR w="12700" cap="flat" cmpd="sng" algn="ctr">
+                      <a:solidFill>
+                        <a:schemeClr val="tx1"/>
+                      </a:solidFill>
+                      <a:prstDash val="solid"/>
+                      <a:round/>
+                      <a:headEnd type="none" w="med" len="med"/>
+                      <a:tailEnd type="none" w="med" len="med"/>
+                    </a:lnR>
+                    <a:lnT w="12700" cap="flat" cmpd="sng" algn="ctr">
+                      <a:solidFill>
+                        <a:schemeClr val="tx1"/>
+                      </a:solidFill>
+                      <a:prstDash val="solid"/>
+                      <a:round/>
+                      <a:headEnd type="none" w="med" len="med"/>
+                      <a:tailEnd type="none" w="med" len="med"/>
+                    </a:lnT>
+                    <a:lnB w="12700" cap="flat" cmpd="sng" algn="ctr">
+                      <a:solidFill>
+                        <a:schemeClr val="tx1"/>
+                      </a:solidFill>
+                      <a:prstDash val="solid"/>
+                      <a:round/>
+                      <a:headEnd type="none" w="med" len="med"/>
+                      <a:tailEnd type="none" w="med" len="med"/>
+                    </a:lnB>
+                    <a:lnTlToBr>
+                      <a:noFill/>
+                    </a:lnTlToBr>
+                    <a:lnBlToTr>
+                      <a:noFill/>
+                    </a:lnBlToTr>
+                    <a:solidFill>
+                      <a:srgbClr val="0070C0"/>
+                    </a:solidFill>
+                  </a:tcPr>
+                </a:tc>
+                <a:tc>
+                  <a:txBody>
+                    <a:bodyPr/>
+                    <a:lstStyle/>
+                    <a:p>
+                      <a:pPr marL="533400" marR="0" lvl="0" indent="-533400" algn="l" defTabSz="914400" rtl="0" eaLnBrk="1" fontAlgn="base" latinLnBrk="0" hangingPunct="1">
+                        <a:lnSpc>
+                          <a:spcPct val="100000"/>
+                        </a:lnSpc>
+                        <a:spcBef>
+                          <a:spcPct val="0"/>
+                        </a:spcBef>
+                        <a:spcAft>
+                          <a:spcPct val="0"/>
+                        </a:spcAft>
+                        <a:buClrTx/>
+                        <a:buSzTx/>
+                        <a:buFontTx/>
+                        <a:buNone/>
+                        <a:tabLst/>
+                      </a:pPr>
+                      <a:r>
+                        <a:rPr kumimoji="0" lang="en-US" sz="2000" b="1" i="1" u="none" strike="noStrike" cap="none" normalizeH="0" baseline="0" dirty="0" smtClean="0">
+                          <a:ln>
+                            <a:noFill/>
+                          </a:ln>
+                          <a:solidFill>
+                            <a:schemeClr val="tx1"/>
+                          </a:solidFill>
+                          <a:effectLst/>
+                          <a:latin typeface="Arial" pitchFamily="34" charset="0"/>
+                          <a:cs typeface="Arial" pitchFamily="34" charset="0"/>
+                        </a:rPr>
+                        <a:t>“The CubeSat System Shall not Release Deployables Until Ejection +45 Minutes”</a:t>
+                      </a:r>
+                    </a:p>
+                  </a:txBody>
+                  <a:tcPr marL="100759" marR="100759" marT="50419" marB="50419" anchor="ctr" horzOverflow="overflow">
+                    <a:lnL w="12700" cap="flat" cmpd="sng" algn="ctr">
+                      <a:solidFill>
+                        <a:schemeClr val="tx1"/>
+                      </a:solidFill>
+                      <a:prstDash val="solid"/>
+                      <a:round/>
+                      <a:headEnd type="none" w="med" len="med"/>
+                      <a:tailEnd type="none" w="med" len="med"/>
+                    </a:lnL>
+                    <a:lnR w="12700" cap="flat" cmpd="sng" algn="ctr">
+                      <a:solidFill>
+                        <a:schemeClr val="tx1"/>
+                      </a:solidFill>
+                      <a:prstDash val="solid"/>
+                      <a:round/>
+                      <a:headEnd type="none" w="med" len="med"/>
+                      <a:tailEnd type="none" w="med" len="med"/>
+                    </a:lnR>
+                    <a:lnT w="12700" cap="flat" cmpd="sng" algn="ctr">
+                      <a:solidFill>
+                        <a:schemeClr val="tx1"/>
+                      </a:solidFill>
+                      <a:prstDash val="solid"/>
+                      <a:round/>
+                      <a:headEnd type="none" w="med" len="med"/>
+                      <a:tailEnd type="none" w="med" len="med"/>
+                    </a:lnT>
+                    <a:lnB w="12700" cap="flat" cmpd="sng" algn="ctr">
+                      <a:solidFill>
+                        <a:schemeClr val="tx1"/>
+                      </a:solidFill>
+                      <a:prstDash val="solid"/>
+                      <a:round/>
+                      <a:headEnd type="none" w="med" len="med"/>
+                      <a:tailEnd type="none" w="med" len="med"/>
+                    </a:lnB>
+                    <a:lnTlToBr>
+                      <a:noFill/>
+                    </a:lnTlToBr>
+                    <a:lnBlToTr>
+                      <a:noFill/>
+                    </a:lnBlToTr>
+                    <a:noFill/>
+                  </a:tcPr>
+                </a:tc>
+              </a:tr>
+              <a:tr h="597295">
+                <a:tc>
+                  <a:txBody>
+                    <a:bodyPr/>
+                    <a:lstStyle/>
+                    <a:p>
+                      <a:pPr marL="0" marR="0" lvl="0" indent="0" algn="l" defTabSz="914400" rtl="0" eaLnBrk="1" fontAlgn="base" latinLnBrk="0" hangingPunct="1">
+                        <a:lnSpc>
+                          <a:spcPct val="100000"/>
+                        </a:lnSpc>
+                        <a:spcBef>
+                          <a:spcPct val="0"/>
+                        </a:spcBef>
+                        <a:spcAft>
+                          <a:spcPct val="0"/>
+                        </a:spcAft>
+                        <a:buClrTx/>
+                        <a:buSzTx/>
+                        <a:buFontTx/>
+                        <a:buNone/>
+                        <a:tabLst/>
+                      </a:pPr>
+                      <a:r>
+                        <a:rPr kumimoji="0" lang="en-US" sz="2000" b="0" i="0" u="none" strike="noStrike" cap="none" normalizeH="0" baseline="0" dirty="0" smtClean="0">
+                          <a:ln>
+                            <a:noFill/>
+                          </a:ln>
+                          <a:solidFill>
+                            <a:schemeClr val="bg1"/>
+                          </a:solidFill>
+                          <a:effectLst/>
+                          <a:latin typeface="Arial" pitchFamily="34" charset="0"/>
+                          <a:cs typeface="Arial" pitchFamily="34" charset="0"/>
+                        </a:rPr>
+                        <a:t>Validation Method</a:t>
+                      </a:r>
+                    </a:p>
+                  </a:txBody>
+                  <a:tcPr marL="100759" marR="100759" marT="50419" marB="50419" anchor="ctr" horzOverflow="overflow">
+                    <a:lnL w="12700" cap="flat" cmpd="sng" algn="ctr">
+                      <a:solidFill>
+                        <a:schemeClr val="tx1"/>
+                      </a:solidFill>
+                      <a:prstDash val="solid"/>
+                      <a:round/>
+                      <a:headEnd type="none" w="med" len="med"/>
+                      <a:tailEnd type="none" w="med" len="med"/>
+                    </a:lnL>
+                    <a:lnR w="12700" cap="flat" cmpd="sng" algn="ctr">
+                      <a:solidFill>
+                        <a:schemeClr val="tx1"/>
+                      </a:solidFill>
+                      <a:prstDash val="solid"/>
+                      <a:round/>
+                      <a:headEnd type="none" w="med" len="med"/>
+                      <a:tailEnd type="none" w="med" len="med"/>
+                    </a:lnR>
+                    <a:lnT w="12700" cap="flat" cmpd="sng" algn="ctr">
+                      <a:solidFill>
+                        <a:schemeClr val="tx1"/>
+                      </a:solidFill>
+                      <a:prstDash val="solid"/>
+                      <a:round/>
+                      <a:headEnd type="none" w="med" len="med"/>
+                      <a:tailEnd type="none" w="med" len="med"/>
+                    </a:lnT>
+                    <a:lnB w="12700" cap="flat" cmpd="sng" algn="ctr">
+                      <a:solidFill>
+                        <a:schemeClr val="tx1"/>
+                      </a:solidFill>
+                      <a:prstDash val="solid"/>
+                      <a:round/>
+                      <a:headEnd type="none" w="med" len="med"/>
+                      <a:tailEnd type="none" w="med" len="med"/>
+                    </a:lnB>
+                    <a:lnTlToBr>
+                      <a:noFill/>
+                    </a:lnTlToBr>
+                    <a:lnBlToTr>
+                      <a:noFill/>
+                    </a:lnBlToTr>
+                    <a:solidFill>
+                      <a:srgbClr val="0070C0"/>
+                    </a:solidFill>
+                  </a:tcPr>
+                </a:tc>
+                <a:tc>
+                  <a:txBody>
+                    <a:bodyPr/>
+                    <a:lstStyle/>
+                    <a:p>
+                      <a:pPr marL="0" marR="0" lvl="0" indent="0" algn="l" defTabSz="914400" rtl="0" eaLnBrk="1" fontAlgn="base" latinLnBrk="0" hangingPunct="1">
+                        <a:lnSpc>
+                          <a:spcPct val="100000"/>
+                        </a:lnSpc>
+                        <a:spcBef>
+                          <a:spcPct val="0"/>
+                        </a:spcBef>
+                        <a:spcAft>
+                          <a:spcPct val="0"/>
+                        </a:spcAft>
+                        <a:buClrTx/>
+                        <a:buSzTx/>
+                        <a:buFontTx/>
+                        <a:buNone/>
+                        <a:tabLst/>
+                      </a:pPr>
+                      <a:r>
+                        <a:rPr kumimoji="0" lang="en-US" sz="2000" b="1" i="0" u="none" strike="noStrike" cap="none" normalizeH="0" baseline="0" dirty="0" smtClean="0">
+                          <a:ln>
+                            <a:noFill/>
+                          </a:ln>
+                          <a:solidFill>
+                            <a:schemeClr val="tx1"/>
+                          </a:solidFill>
+                          <a:effectLst/>
+                          <a:latin typeface="Arial" pitchFamily="34" charset="0"/>
+                          <a:cs typeface="Arial" pitchFamily="34" charset="0"/>
+                        </a:rPr>
+                        <a:t>Demo</a:t>
+                      </a:r>
+                    </a:p>
+                  </a:txBody>
+                  <a:tcPr marL="100759" marR="100759" marT="50419" marB="50419" anchor="ctr" horzOverflow="overflow">
+                    <a:lnL w="12700" cap="flat" cmpd="sng" algn="ctr">
+                      <a:solidFill>
+                        <a:schemeClr val="tx1"/>
+                      </a:solidFill>
+                      <a:prstDash val="solid"/>
+                      <a:round/>
+                      <a:headEnd type="none" w="med" len="med"/>
+                      <a:tailEnd type="none" w="med" len="med"/>
+                    </a:lnL>
+                    <a:lnR w="12700" cap="flat" cmpd="sng" algn="ctr">
+                      <a:solidFill>
+                        <a:schemeClr val="tx1"/>
+                      </a:solidFill>
+                      <a:prstDash val="solid"/>
+                      <a:round/>
+                      <a:headEnd type="none" w="med" len="med"/>
+                      <a:tailEnd type="none" w="med" len="med"/>
+                    </a:lnR>
+                    <a:lnT w="12700" cap="flat" cmpd="sng" algn="ctr">
+                      <a:solidFill>
+                        <a:schemeClr val="tx1"/>
+                      </a:solidFill>
+                      <a:prstDash val="solid"/>
+                      <a:round/>
+                      <a:headEnd type="none" w="med" len="med"/>
+                      <a:tailEnd type="none" w="med" len="med"/>
+                    </a:lnT>
+                    <a:lnB w="12700" cap="flat" cmpd="sng" algn="ctr">
+                      <a:solidFill>
+                        <a:schemeClr val="tx1"/>
+                      </a:solidFill>
+                      <a:prstDash val="solid"/>
+                      <a:round/>
+                      <a:headEnd type="none" w="med" len="med"/>
+                      <a:tailEnd type="none" w="med" len="med"/>
+                    </a:lnB>
+                    <a:lnTlToBr>
+                      <a:noFill/>
+                    </a:lnTlToBr>
+                    <a:lnBlToTr>
+                      <a:noFill/>
+                    </a:lnBlToTr>
+                    <a:noFill/>
+                  </a:tcPr>
+                </a:tc>
+              </a:tr>
+            </a:tbl>
+          </a:graphicData>
+        </a:graphic>
+      </p:graphicFrame>
+      <p:sp>
+        <p:nvSpPr>
+          <p:cNvPr id="23577" name="Text Box 25"/>
+          <p:cNvSpPr txBox="1">
+            <a:spLocks noChangeArrowheads="1"/>
+          </p:cNvSpPr>
+          <p:nvPr/>
+        </p:nvSpPr>
+        <p:spPr bwMode="auto">
+          <a:xfrm>
+            <a:off x="618331" y="3019425"/>
+            <a:ext cx="9068277" cy="1218038"/>
+          </a:xfrm>
+          <a:prstGeom prst="rect">
+            <a:avLst/>
+          </a:prstGeom>
+          <a:noFill/>
+          <a:ln w="9525">
+            <a:noFill/>
+            <a:miter lim="800000"/>
+            <a:headEnd/>
+            <a:tailEnd/>
+          </a:ln>
+          <a:effectLst/>
+        </p:spPr>
+        <p:txBody>
+          <a:bodyPr lIns="100785" tIns="50393" rIns="100785" bIns="50393">
+            <a:spAutoFit/>
+          </a:bodyPr>
+          <a:lstStyle/>
+          <a:p>
+            <a:pPr>
+              <a:spcBef>
+                <a:spcPct val="50000"/>
+              </a:spcBef>
+            </a:pPr>
+            <a:r>
+              <a:rPr lang="en-US" sz="2600" b="1" dirty="0">
+                <a:solidFill>
+                  <a:schemeClr val="tx1"/>
+                </a:solidFill>
+              </a:rPr>
+              <a:t>Meeting this requirement can be demonstrated on the ground through the successful completion of a Day in the Life Test.</a:t>
+            </a:r>
+          </a:p>
+        </p:txBody>
+      </p:sp>
+    </p:spTree>
+  </p:cSld>
+  <p:clrMapOvr>
+    <a:masterClrMapping/>
+  </p:clrMapOvr>
+</p:sld>
+</file>
+
+<file path=ppt/slides/slide42.xml><?xml version="1.0" encoding="utf-8"?>
 <p:sld xmlns:a="http://schemas.openxmlformats.org/drawingml/2006/main" xmlns:r="http://schemas.openxmlformats.org/officeDocument/2006/relationships" xmlns:p="http://schemas.openxmlformats.org/presentationml/2006/main">
   <p:cSld>
     <p:spTree>
@@ -36375,506 +36920,6 @@
                 </a:solidFill>
               </a:rPr>
               <a:t>This allows for post-maneuver verification of relative distances, roll rates, and fuel burn over the course of the mission.</a:t>
-            </a:r>
-          </a:p>
-        </p:txBody>
-      </p:sp>
-    </p:spTree>
-    <p:extLst>
-      <p:ext uri="{BB962C8B-B14F-4D97-AF65-F5344CB8AC3E}">
-        <p14:creationId xmlns:p14="http://schemas.microsoft.com/office/powerpoint/2010/main" xmlns="" val="2711901525"/>
-      </p:ext>
-    </p:extLst>
-  </p:cSld>
-  <p:clrMapOvr>
-    <a:masterClrMapping/>
-  </p:clrMapOvr>
-  <p:timing>
-    <p:tnLst>
-      <p:par>
-        <p:cTn id="1" dur="indefinite" restart="never" nodeType="tmRoot"/>
-      </p:par>
-    </p:tnLst>
-  </p:timing>
-</p:sld>
-</file>
-
-<file path=ppt/slides/slide42.xml><?xml version="1.0" encoding="utf-8"?>
-<p:sld xmlns:a="http://schemas.openxmlformats.org/drawingml/2006/main" xmlns:r="http://schemas.openxmlformats.org/officeDocument/2006/relationships" xmlns:p="http://schemas.openxmlformats.org/presentationml/2006/main">
-  <p:cSld>
-    <p:spTree>
-      <p:nvGrpSpPr>
-        <p:cNvPr id="1" name=""/>
-        <p:cNvGrpSpPr/>
-        <p:nvPr/>
-      </p:nvGrpSpPr>
-      <p:grpSpPr>
-        <a:xfrm>
-          <a:off x="0" y="0"/>
-          <a:ext cx="0" cy="0"/>
-          <a:chOff x="0" y="0"/>
-          <a:chExt cx="0" cy="0"/>
-        </a:xfrm>
-      </p:grpSpPr>
-      <p:graphicFrame>
-        <p:nvGraphicFramePr>
-          <p:cNvPr id="4" name="Content Placeholder 3"/>
-          <p:cNvGraphicFramePr>
-            <a:graphicFrameLocks noGrp="1"/>
-          </p:cNvGraphicFramePr>
-          <p:nvPr>
-            <p:ph idx="1"/>
-            <p:extLst>
-              <p:ext uri="{D42A27DB-BD31-4B8C-83A1-F6EECF244321}">
-                <p14:modId xmlns:p14="http://schemas.microsoft.com/office/powerpoint/2010/main" xmlns="" val="1483644448"/>
-              </p:ext>
-            </p:extLst>
-          </p:nvPr>
-        </p:nvGraphicFramePr>
-        <p:xfrm>
-          <a:off x="618331" y="657225"/>
-          <a:ext cx="9068277" cy="1833146"/>
-        </p:xfrm>
-        <a:graphic>
-          <a:graphicData uri="http://schemas.openxmlformats.org/drawingml/2006/table">
-            <a:tbl>
-              <a:tblPr firstRow="1" bandRow="1">
-                <a:tableStyleId>{5C22544A-7EE6-4342-B048-85BDC9FD1C3A}</a:tableStyleId>
-              </a:tblPr>
-              <a:tblGrid>
-                <a:gridCol w="3526552"/>
-                <a:gridCol w="5541725"/>
-              </a:tblGrid>
-              <a:tr h="408954">
-                <a:tc>
-                  <a:txBody>
-                    <a:bodyPr/>
-                    <a:lstStyle/>
-                    <a:p>
-                      <a:r>
-                        <a:rPr lang="en-US" sz="2000" b="0" dirty="0" smtClean="0">
-                          <a:solidFill>
-                            <a:schemeClr val="bg1"/>
-                          </a:solidFill>
-                        </a:rPr>
-                        <a:t> RVM Requirement Number</a:t>
-                      </a:r>
-                      <a:endParaRPr lang="en-US" sz="2000" b="0" dirty="0">
-                        <a:solidFill>
-                          <a:schemeClr val="bg1"/>
-                        </a:solidFill>
-                      </a:endParaRPr>
-                    </a:p>
-                  </a:txBody>
-                  <a:tcPr marL="100759" marR="100759" marT="50419" marB="50419" anchor="ctr">
-                    <a:lnL w="12700" cap="flat" cmpd="sng" algn="ctr">
-                      <a:solidFill>
-                        <a:schemeClr val="tx1"/>
-                      </a:solidFill>
-                      <a:prstDash val="solid"/>
-                      <a:round/>
-                      <a:headEnd type="none" w="med" len="med"/>
-                      <a:tailEnd type="none" w="med" len="med"/>
-                    </a:lnL>
-                    <a:lnR w="12700" cap="flat" cmpd="sng" algn="ctr">
-                      <a:solidFill>
-                        <a:schemeClr val="tx1"/>
-                      </a:solidFill>
-                      <a:prstDash val="solid"/>
-                      <a:round/>
-                      <a:headEnd type="none" w="med" len="med"/>
-                      <a:tailEnd type="none" w="med" len="med"/>
-                    </a:lnR>
-                    <a:lnT w="12700" cap="flat" cmpd="sng" algn="ctr">
-                      <a:solidFill>
-                        <a:schemeClr val="tx1"/>
-                      </a:solidFill>
-                      <a:prstDash val="solid"/>
-                      <a:round/>
-                      <a:headEnd type="none" w="med" len="med"/>
-                      <a:tailEnd type="none" w="med" len="med"/>
-                    </a:lnT>
-                    <a:lnB w="12700" cap="flat" cmpd="sng" algn="ctr">
-                      <a:solidFill>
-                        <a:schemeClr val="tx1"/>
-                      </a:solidFill>
-                      <a:prstDash val="solid"/>
-                      <a:round/>
-                      <a:headEnd type="none" w="med" len="med"/>
-                      <a:tailEnd type="none" w="med" len="med"/>
-                    </a:lnB>
-                    <a:solidFill>
-                      <a:srgbClr val="0070C0"/>
-                    </a:solidFill>
-                  </a:tcPr>
-                </a:tc>
-                <a:tc>
-                  <a:txBody>
-                    <a:bodyPr/>
-                    <a:lstStyle/>
-                    <a:p>
-                      <a:r>
-                        <a:rPr lang="en-US" sz="2000" b="1" dirty="0" smtClean="0">
-                          <a:solidFill>
-                            <a:schemeClr val="tx1"/>
-                          </a:solidFill>
-                        </a:rPr>
-                        <a:t>RCL.PLE.MOP4</a:t>
-                      </a:r>
-                      <a:endParaRPr lang="en-US" sz="2000" b="1" dirty="0">
-                        <a:solidFill>
-                          <a:schemeClr val="tx1"/>
-                        </a:solidFill>
-                      </a:endParaRPr>
-                    </a:p>
-                  </a:txBody>
-                  <a:tcPr marL="100759" marR="100759" marT="50419" marB="50419">
-                    <a:lnL w="12700" cap="flat" cmpd="sng" algn="ctr">
-                      <a:solidFill>
-                        <a:schemeClr val="tx1"/>
-                      </a:solidFill>
-                      <a:prstDash val="solid"/>
-                      <a:round/>
-                      <a:headEnd type="none" w="med" len="med"/>
-                      <a:tailEnd type="none" w="med" len="med"/>
-                    </a:lnL>
-                    <a:lnR w="12700" cap="flat" cmpd="sng" algn="ctr">
-                      <a:solidFill>
-                        <a:schemeClr val="tx1"/>
-                      </a:solidFill>
-                      <a:prstDash val="solid"/>
-                      <a:round/>
-                      <a:headEnd type="none" w="med" len="med"/>
-                      <a:tailEnd type="none" w="med" len="med"/>
-                    </a:lnR>
-                    <a:lnT w="12700" cap="flat" cmpd="sng" algn="ctr">
-                      <a:solidFill>
-                        <a:schemeClr val="tx1"/>
-                      </a:solidFill>
-                      <a:prstDash val="solid"/>
-                      <a:round/>
-                      <a:headEnd type="none" w="med" len="med"/>
-                      <a:tailEnd type="none" w="med" len="med"/>
-                    </a:lnT>
-                    <a:lnB w="12700" cap="flat" cmpd="sng" algn="ctr">
-                      <a:solidFill>
-                        <a:schemeClr val="tx1"/>
-                      </a:solidFill>
-                      <a:prstDash val="solid"/>
-                      <a:round/>
-                      <a:headEnd type="none" w="med" len="med"/>
-                      <a:tailEnd type="none" w="med" len="med"/>
-                    </a:lnB>
-                    <a:noFill/>
-                  </a:tcPr>
-                </a:tc>
-              </a:tr>
-              <a:tr h="1008380">
-                <a:tc>
-                  <a:txBody>
-                    <a:bodyPr/>
-                    <a:lstStyle/>
-                    <a:p>
-                      <a:r>
-                        <a:rPr lang="en-US" sz="2000" b="0" dirty="0" smtClean="0">
-                          <a:solidFill>
-                            <a:schemeClr val="bg1"/>
-                          </a:solidFill>
-                        </a:rPr>
-                        <a:t>RVM </a:t>
-                      </a:r>
-                      <a:r>
-                        <a:rPr lang="en-US" sz="2000" b="0" baseline="0" dirty="0" smtClean="0">
-                          <a:solidFill>
-                            <a:schemeClr val="bg1"/>
-                          </a:solidFill>
-                        </a:rPr>
-                        <a:t>Requirement Wording</a:t>
-                      </a:r>
-                      <a:endParaRPr lang="en-US" sz="2000" b="0" dirty="0">
-                        <a:solidFill>
-                          <a:schemeClr val="bg1"/>
-                        </a:solidFill>
-                      </a:endParaRPr>
-                    </a:p>
-                  </a:txBody>
-                  <a:tcPr marL="100759" marR="100759" marT="50419" marB="50419" anchor="ctr">
-                    <a:lnL w="12700" cap="flat" cmpd="sng" algn="ctr">
-                      <a:solidFill>
-                        <a:schemeClr val="tx1"/>
-                      </a:solidFill>
-                      <a:prstDash val="solid"/>
-                      <a:round/>
-                      <a:headEnd type="none" w="med" len="med"/>
-                      <a:tailEnd type="none" w="med" len="med"/>
-                    </a:lnL>
-                    <a:lnR w="12700" cap="flat" cmpd="sng" algn="ctr">
-                      <a:solidFill>
-                        <a:schemeClr val="tx1"/>
-                      </a:solidFill>
-                      <a:prstDash val="solid"/>
-                      <a:round/>
-                      <a:headEnd type="none" w="med" len="med"/>
-                      <a:tailEnd type="none" w="med" len="med"/>
-                    </a:lnR>
-                    <a:lnT w="12700" cap="flat" cmpd="sng" algn="ctr">
-                      <a:solidFill>
-                        <a:schemeClr val="tx1"/>
-                      </a:solidFill>
-                      <a:prstDash val="solid"/>
-                      <a:round/>
-                      <a:headEnd type="none" w="med" len="med"/>
-                      <a:tailEnd type="none" w="med" len="med"/>
-                    </a:lnT>
-                    <a:lnB w="12700" cap="flat" cmpd="sng" algn="ctr">
-                      <a:solidFill>
-                        <a:schemeClr val="tx1"/>
-                      </a:solidFill>
-                      <a:prstDash val="solid"/>
-                      <a:round/>
-                      <a:headEnd type="none" w="med" len="med"/>
-                      <a:tailEnd type="none" w="med" len="med"/>
-                    </a:lnB>
-                    <a:solidFill>
-                      <a:srgbClr val="0070C0"/>
-                    </a:solidFill>
-                  </a:tcPr>
-                </a:tc>
-                <a:tc>
-                  <a:txBody>
-                    <a:bodyPr/>
-                    <a:lstStyle/>
-                    <a:p>
-                      <a:r>
-                        <a:rPr lang="en-US" sz="2000" b="1" i="1" dirty="0" smtClean="0">
-                          <a:solidFill>
-                            <a:schemeClr val="tx1"/>
-                          </a:solidFill>
-                        </a:rPr>
-                        <a:t>“The</a:t>
-                      </a:r>
-                      <a:r>
-                        <a:rPr lang="en-US" sz="2000" b="1" i="1" baseline="0" dirty="0" smtClean="0">
-                          <a:solidFill>
-                            <a:schemeClr val="tx1"/>
-                          </a:solidFill>
-                        </a:rPr>
-                        <a:t> CubeSat System Shall Pass a Health Check Administered from the SSRL Ground Station</a:t>
-                      </a:r>
-                      <a:r>
-                        <a:rPr lang="en-US" sz="2000" b="1" i="1" dirty="0" smtClean="0">
-                          <a:solidFill>
-                            <a:schemeClr val="tx1"/>
-                          </a:solidFill>
-                        </a:rPr>
-                        <a:t>”</a:t>
-                      </a:r>
-                      <a:endParaRPr lang="en-US" sz="2000" b="1" i="1" dirty="0">
-                        <a:solidFill>
-                          <a:schemeClr val="tx1"/>
-                        </a:solidFill>
-                      </a:endParaRPr>
-                    </a:p>
-                  </a:txBody>
-                  <a:tcPr marL="100759" marR="100759" marT="50419" marB="50419">
-                    <a:lnL w="12700" cap="flat" cmpd="sng" algn="ctr">
-                      <a:solidFill>
-                        <a:schemeClr val="tx1"/>
-                      </a:solidFill>
-                      <a:prstDash val="solid"/>
-                      <a:round/>
-                      <a:headEnd type="none" w="med" len="med"/>
-                      <a:tailEnd type="none" w="med" len="med"/>
-                    </a:lnL>
-                    <a:lnR w="12700" cap="flat" cmpd="sng" algn="ctr">
-                      <a:solidFill>
-                        <a:schemeClr val="tx1"/>
-                      </a:solidFill>
-                      <a:prstDash val="solid"/>
-                      <a:round/>
-                      <a:headEnd type="none" w="med" len="med"/>
-                      <a:tailEnd type="none" w="med" len="med"/>
-                    </a:lnR>
-                    <a:lnT w="12700" cap="flat" cmpd="sng" algn="ctr">
-                      <a:solidFill>
-                        <a:schemeClr val="tx1"/>
-                      </a:solidFill>
-                      <a:prstDash val="solid"/>
-                      <a:round/>
-                      <a:headEnd type="none" w="med" len="med"/>
-                      <a:tailEnd type="none" w="med" len="med"/>
-                    </a:lnT>
-                    <a:lnB w="12700" cap="flat" cmpd="sng" algn="ctr">
-                      <a:solidFill>
-                        <a:schemeClr val="tx1"/>
-                      </a:solidFill>
-                      <a:prstDash val="solid"/>
-                      <a:round/>
-                      <a:headEnd type="none" w="med" len="med"/>
-                      <a:tailEnd type="none" w="med" len="med"/>
-                    </a:lnB>
-                    <a:noFill/>
-                  </a:tcPr>
-                </a:tc>
-              </a:tr>
-              <a:tr h="408954">
-                <a:tc>
-                  <a:txBody>
-                    <a:bodyPr/>
-                    <a:lstStyle/>
-                    <a:p>
-                      <a:r>
-                        <a:rPr lang="en-US" sz="2000" b="0" dirty="0" smtClean="0">
-                          <a:solidFill>
-                            <a:schemeClr val="bg1"/>
-                          </a:solidFill>
-                        </a:rPr>
-                        <a:t>Validation Method</a:t>
-                      </a:r>
-                      <a:endParaRPr lang="en-US" sz="2000" b="0" dirty="0">
-                        <a:solidFill>
-                          <a:schemeClr val="bg1"/>
-                        </a:solidFill>
-                      </a:endParaRPr>
-                    </a:p>
-                  </a:txBody>
-                  <a:tcPr marL="100759" marR="100759" marT="50419" marB="50419" anchor="ctr">
-                    <a:lnL w="12700" cap="flat" cmpd="sng" algn="ctr">
-                      <a:solidFill>
-                        <a:schemeClr val="tx1"/>
-                      </a:solidFill>
-                      <a:prstDash val="solid"/>
-                      <a:round/>
-                      <a:headEnd type="none" w="med" len="med"/>
-                      <a:tailEnd type="none" w="med" len="med"/>
-                    </a:lnL>
-                    <a:lnR w="12700" cap="flat" cmpd="sng" algn="ctr">
-                      <a:solidFill>
-                        <a:schemeClr val="tx1"/>
-                      </a:solidFill>
-                      <a:prstDash val="solid"/>
-                      <a:round/>
-                      <a:headEnd type="none" w="med" len="med"/>
-                      <a:tailEnd type="none" w="med" len="med"/>
-                    </a:lnR>
-                    <a:lnT w="12700" cap="flat" cmpd="sng" algn="ctr">
-                      <a:solidFill>
-                        <a:schemeClr val="tx1"/>
-                      </a:solidFill>
-                      <a:prstDash val="solid"/>
-                      <a:round/>
-                      <a:headEnd type="none" w="med" len="med"/>
-                      <a:tailEnd type="none" w="med" len="med"/>
-                    </a:lnT>
-                    <a:lnB w="12700" cap="flat" cmpd="sng" algn="ctr">
-                      <a:solidFill>
-                        <a:schemeClr val="tx1"/>
-                      </a:solidFill>
-                      <a:prstDash val="solid"/>
-                      <a:round/>
-                      <a:headEnd type="none" w="med" len="med"/>
-                      <a:tailEnd type="none" w="med" len="med"/>
-                    </a:lnB>
-                    <a:solidFill>
-                      <a:srgbClr val="0070C0"/>
-                    </a:solidFill>
-                  </a:tcPr>
-                </a:tc>
-                <a:tc>
-                  <a:txBody>
-                    <a:bodyPr/>
-                    <a:lstStyle/>
-                    <a:p>
-                      <a:r>
-                        <a:rPr lang="en-US" sz="2000" b="1" i="0" dirty="0" smtClean="0">
-                          <a:solidFill>
-                            <a:schemeClr val="tx1"/>
-                          </a:solidFill>
-                        </a:rPr>
-                        <a:t>Analyze</a:t>
-                      </a:r>
-                      <a:endParaRPr lang="en-US" sz="2000" b="1" i="0" dirty="0">
-                        <a:solidFill>
-                          <a:schemeClr val="tx1"/>
-                        </a:solidFill>
-                      </a:endParaRPr>
-                    </a:p>
-                  </a:txBody>
-                  <a:tcPr marL="100759" marR="100759" marT="50419" marB="50419">
-                    <a:lnL w="12700" cap="flat" cmpd="sng" algn="ctr">
-                      <a:solidFill>
-                        <a:schemeClr val="tx1"/>
-                      </a:solidFill>
-                      <a:prstDash val="solid"/>
-                      <a:round/>
-                      <a:headEnd type="none" w="med" len="med"/>
-                      <a:tailEnd type="none" w="med" len="med"/>
-                    </a:lnL>
-                    <a:lnR w="12700" cap="flat" cmpd="sng" algn="ctr">
-                      <a:solidFill>
-                        <a:schemeClr val="tx1"/>
-                      </a:solidFill>
-                      <a:prstDash val="solid"/>
-                      <a:round/>
-                      <a:headEnd type="none" w="med" len="med"/>
-                      <a:tailEnd type="none" w="med" len="med"/>
-                    </a:lnR>
-                    <a:lnT w="12700" cap="flat" cmpd="sng" algn="ctr">
-                      <a:solidFill>
-                        <a:schemeClr val="tx1"/>
-                      </a:solidFill>
-                      <a:prstDash val="solid"/>
-                      <a:round/>
-                      <a:headEnd type="none" w="med" len="med"/>
-                      <a:tailEnd type="none" w="med" len="med"/>
-                    </a:lnT>
-                    <a:lnB w="12700" cap="flat" cmpd="sng" algn="ctr">
-                      <a:solidFill>
-                        <a:schemeClr val="tx1"/>
-                      </a:solidFill>
-                      <a:prstDash val="solid"/>
-                      <a:round/>
-                      <a:headEnd type="none" w="med" len="med"/>
-                      <a:tailEnd type="none" w="med" len="med"/>
-                    </a:lnB>
-                    <a:noFill/>
-                  </a:tcPr>
-                </a:tc>
-              </a:tr>
-            </a:tbl>
-          </a:graphicData>
-        </a:graphic>
-      </p:graphicFrame>
-      <p:sp>
-        <p:nvSpPr>
-          <p:cNvPr id="5" name="TextBox 4"/>
-          <p:cNvSpPr txBox="1"/>
-          <p:nvPr/>
-        </p:nvSpPr>
-        <p:spPr>
-          <a:xfrm>
-            <a:off x="542131" y="2714625"/>
-            <a:ext cx="9152242" cy="1590126"/>
-          </a:xfrm>
-          <a:prstGeom prst="rect">
-            <a:avLst/>
-          </a:prstGeom>
-          <a:noFill/>
-        </p:spPr>
-        <p:txBody>
-          <a:bodyPr wrap="square" lIns="100785" tIns="50393" rIns="100785" bIns="50393" rtlCol="0">
-            <a:spAutoFit/>
-          </a:bodyPr>
-          <a:lstStyle/>
-          <a:p>
-            <a:pPr algn="just"/>
-            <a:r>
-              <a:rPr lang="en-US" sz="2600" b="1" dirty="0" smtClean="0">
-                <a:solidFill>
-                  <a:schemeClr val="tx1"/>
-                </a:solidFill>
-              </a:rPr>
-              <a:t>A health check consists of verifying that each subsystem of Jade or Turquoise has successfully survived delivery, integration, transportation, and launch before leading in to their actual missions.  </a:t>
             </a:r>
           </a:p>
         </p:txBody>
@@ -37019,6 +37064,506 @@
                             <a:schemeClr val="tx1"/>
                           </a:solidFill>
                         </a:rPr>
+                        <a:t>RCL.PLE.MOP4</a:t>
+                      </a:r>
+                      <a:endParaRPr lang="en-US" sz="2000" b="1" dirty="0">
+                        <a:solidFill>
+                          <a:schemeClr val="tx1"/>
+                        </a:solidFill>
+                      </a:endParaRPr>
+                    </a:p>
+                  </a:txBody>
+                  <a:tcPr marL="100759" marR="100759" marT="50419" marB="50419">
+                    <a:lnL w="12700" cap="flat" cmpd="sng" algn="ctr">
+                      <a:solidFill>
+                        <a:schemeClr val="tx1"/>
+                      </a:solidFill>
+                      <a:prstDash val="solid"/>
+                      <a:round/>
+                      <a:headEnd type="none" w="med" len="med"/>
+                      <a:tailEnd type="none" w="med" len="med"/>
+                    </a:lnL>
+                    <a:lnR w="12700" cap="flat" cmpd="sng" algn="ctr">
+                      <a:solidFill>
+                        <a:schemeClr val="tx1"/>
+                      </a:solidFill>
+                      <a:prstDash val="solid"/>
+                      <a:round/>
+                      <a:headEnd type="none" w="med" len="med"/>
+                      <a:tailEnd type="none" w="med" len="med"/>
+                    </a:lnR>
+                    <a:lnT w="12700" cap="flat" cmpd="sng" algn="ctr">
+                      <a:solidFill>
+                        <a:schemeClr val="tx1"/>
+                      </a:solidFill>
+                      <a:prstDash val="solid"/>
+                      <a:round/>
+                      <a:headEnd type="none" w="med" len="med"/>
+                      <a:tailEnd type="none" w="med" len="med"/>
+                    </a:lnT>
+                    <a:lnB w="12700" cap="flat" cmpd="sng" algn="ctr">
+                      <a:solidFill>
+                        <a:schemeClr val="tx1"/>
+                      </a:solidFill>
+                      <a:prstDash val="solid"/>
+                      <a:round/>
+                      <a:headEnd type="none" w="med" len="med"/>
+                      <a:tailEnd type="none" w="med" len="med"/>
+                    </a:lnB>
+                    <a:noFill/>
+                  </a:tcPr>
+                </a:tc>
+              </a:tr>
+              <a:tr h="1008380">
+                <a:tc>
+                  <a:txBody>
+                    <a:bodyPr/>
+                    <a:lstStyle/>
+                    <a:p>
+                      <a:r>
+                        <a:rPr lang="en-US" sz="2000" b="0" dirty="0" smtClean="0">
+                          <a:solidFill>
+                            <a:schemeClr val="bg1"/>
+                          </a:solidFill>
+                        </a:rPr>
+                        <a:t>RVM </a:t>
+                      </a:r>
+                      <a:r>
+                        <a:rPr lang="en-US" sz="2000" b="0" baseline="0" dirty="0" smtClean="0">
+                          <a:solidFill>
+                            <a:schemeClr val="bg1"/>
+                          </a:solidFill>
+                        </a:rPr>
+                        <a:t>Requirement Wording</a:t>
+                      </a:r>
+                      <a:endParaRPr lang="en-US" sz="2000" b="0" dirty="0">
+                        <a:solidFill>
+                          <a:schemeClr val="bg1"/>
+                        </a:solidFill>
+                      </a:endParaRPr>
+                    </a:p>
+                  </a:txBody>
+                  <a:tcPr marL="100759" marR="100759" marT="50419" marB="50419" anchor="ctr">
+                    <a:lnL w="12700" cap="flat" cmpd="sng" algn="ctr">
+                      <a:solidFill>
+                        <a:schemeClr val="tx1"/>
+                      </a:solidFill>
+                      <a:prstDash val="solid"/>
+                      <a:round/>
+                      <a:headEnd type="none" w="med" len="med"/>
+                      <a:tailEnd type="none" w="med" len="med"/>
+                    </a:lnL>
+                    <a:lnR w="12700" cap="flat" cmpd="sng" algn="ctr">
+                      <a:solidFill>
+                        <a:schemeClr val="tx1"/>
+                      </a:solidFill>
+                      <a:prstDash val="solid"/>
+                      <a:round/>
+                      <a:headEnd type="none" w="med" len="med"/>
+                      <a:tailEnd type="none" w="med" len="med"/>
+                    </a:lnR>
+                    <a:lnT w="12700" cap="flat" cmpd="sng" algn="ctr">
+                      <a:solidFill>
+                        <a:schemeClr val="tx1"/>
+                      </a:solidFill>
+                      <a:prstDash val="solid"/>
+                      <a:round/>
+                      <a:headEnd type="none" w="med" len="med"/>
+                      <a:tailEnd type="none" w="med" len="med"/>
+                    </a:lnT>
+                    <a:lnB w="12700" cap="flat" cmpd="sng" algn="ctr">
+                      <a:solidFill>
+                        <a:schemeClr val="tx1"/>
+                      </a:solidFill>
+                      <a:prstDash val="solid"/>
+                      <a:round/>
+                      <a:headEnd type="none" w="med" len="med"/>
+                      <a:tailEnd type="none" w="med" len="med"/>
+                    </a:lnB>
+                    <a:solidFill>
+                      <a:srgbClr val="0070C0"/>
+                    </a:solidFill>
+                  </a:tcPr>
+                </a:tc>
+                <a:tc>
+                  <a:txBody>
+                    <a:bodyPr/>
+                    <a:lstStyle/>
+                    <a:p>
+                      <a:r>
+                        <a:rPr lang="en-US" sz="2000" b="1" i="1" dirty="0" smtClean="0">
+                          <a:solidFill>
+                            <a:schemeClr val="tx1"/>
+                          </a:solidFill>
+                        </a:rPr>
+                        <a:t>“The</a:t>
+                      </a:r>
+                      <a:r>
+                        <a:rPr lang="en-US" sz="2000" b="1" i="1" baseline="0" dirty="0" smtClean="0">
+                          <a:solidFill>
+                            <a:schemeClr val="tx1"/>
+                          </a:solidFill>
+                        </a:rPr>
+                        <a:t> CubeSat System Shall Pass a Health Check Administered from the SSRL Ground Station</a:t>
+                      </a:r>
+                      <a:r>
+                        <a:rPr lang="en-US" sz="2000" b="1" i="1" dirty="0" smtClean="0">
+                          <a:solidFill>
+                            <a:schemeClr val="tx1"/>
+                          </a:solidFill>
+                        </a:rPr>
+                        <a:t>”</a:t>
+                      </a:r>
+                      <a:endParaRPr lang="en-US" sz="2000" b="1" i="1" dirty="0">
+                        <a:solidFill>
+                          <a:schemeClr val="tx1"/>
+                        </a:solidFill>
+                      </a:endParaRPr>
+                    </a:p>
+                  </a:txBody>
+                  <a:tcPr marL="100759" marR="100759" marT="50419" marB="50419">
+                    <a:lnL w="12700" cap="flat" cmpd="sng" algn="ctr">
+                      <a:solidFill>
+                        <a:schemeClr val="tx1"/>
+                      </a:solidFill>
+                      <a:prstDash val="solid"/>
+                      <a:round/>
+                      <a:headEnd type="none" w="med" len="med"/>
+                      <a:tailEnd type="none" w="med" len="med"/>
+                    </a:lnL>
+                    <a:lnR w="12700" cap="flat" cmpd="sng" algn="ctr">
+                      <a:solidFill>
+                        <a:schemeClr val="tx1"/>
+                      </a:solidFill>
+                      <a:prstDash val="solid"/>
+                      <a:round/>
+                      <a:headEnd type="none" w="med" len="med"/>
+                      <a:tailEnd type="none" w="med" len="med"/>
+                    </a:lnR>
+                    <a:lnT w="12700" cap="flat" cmpd="sng" algn="ctr">
+                      <a:solidFill>
+                        <a:schemeClr val="tx1"/>
+                      </a:solidFill>
+                      <a:prstDash val="solid"/>
+                      <a:round/>
+                      <a:headEnd type="none" w="med" len="med"/>
+                      <a:tailEnd type="none" w="med" len="med"/>
+                    </a:lnT>
+                    <a:lnB w="12700" cap="flat" cmpd="sng" algn="ctr">
+                      <a:solidFill>
+                        <a:schemeClr val="tx1"/>
+                      </a:solidFill>
+                      <a:prstDash val="solid"/>
+                      <a:round/>
+                      <a:headEnd type="none" w="med" len="med"/>
+                      <a:tailEnd type="none" w="med" len="med"/>
+                    </a:lnB>
+                    <a:noFill/>
+                  </a:tcPr>
+                </a:tc>
+              </a:tr>
+              <a:tr h="408954">
+                <a:tc>
+                  <a:txBody>
+                    <a:bodyPr/>
+                    <a:lstStyle/>
+                    <a:p>
+                      <a:r>
+                        <a:rPr lang="en-US" sz="2000" b="0" dirty="0" smtClean="0">
+                          <a:solidFill>
+                            <a:schemeClr val="bg1"/>
+                          </a:solidFill>
+                        </a:rPr>
+                        <a:t>Validation Method</a:t>
+                      </a:r>
+                      <a:endParaRPr lang="en-US" sz="2000" b="0" dirty="0">
+                        <a:solidFill>
+                          <a:schemeClr val="bg1"/>
+                        </a:solidFill>
+                      </a:endParaRPr>
+                    </a:p>
+                  </a:txBody>
+                  <a:tcPr marL="100759" marR="100759" marT="50419" marB="50419" anchor="ctr">
+                    <a:lnL w="12700" cap="flat" cmpd="sng" algn="ctr">
+                      <a:solidFill>
+                        <a:schemeClr val="tx1"/>
+                      </a:solidFill>
+                      <a:prstDash val="solid"/>
+                      <a:round/>
+                      <a:headEnd type="none" w="med" len="med"/>
+                      <a:tailEnd type="none" w="med" len="med"/>
+                    </a:lnL>
+                    <a:lnR w="12700" cap="flat" cmpd="sng" algn="ctr">
+                      <a:solidFill>
+                        <a:schemeClr val="tx1"/>
+                      </a:solidFill>
+                      <a:prstDash val="solid"/>
+                      <a:round/>
+                      <a:headEnd type="none" w="med" len="med"/>
+                      <a:tailEnd type="none" w="med" len="med"/>
+                    </a:lnR>
+                    <a:lnT w="12700" cap="flat" cmpd="sng" algn="ctr">
+                      <a:solidFill>
+                        <a:schemeClr val="tx1"/>
+                      </a:solidFill>
+                      <a:prstDash val="solid"/>
+                      <a:round/>
+                      <a:headEnd type="none" w="med" len="med"/>
+                      <a:tailEnd type="none" w="med" len="med"/>
+                    </a:lnT>
+                    <a:lnB w="12700" cap="flat" cmpd="sng" algn="ctr">
+                      <a:solidFill>
+                        <a:schemeClr val="tx1"/>
+                      </a:solidFill>
+                      <a:prstDash val="solid"/>
+                      <a:round/>
+                      <a:headEnd type="none" w="med" len="med"/>
+                      <a:tailEnd type="none" w="med" len="med"/>
+                    </a:lnB>
+                    <a:solidFill>
+                      <a:srgbClr val="0070C0"/>
+                    </a:solidFill>
+                  </a:tcPr>
+                </a:tc>
+                <a:tc>
+                  <a:txBody>
+                    <a:bodyPr/>
+                    <a:lstStyle/>
+                    <a:p>
+                      <a:r>
+                        <a:rPr lang="en-US" sz="2000" b="1" i="0" dirty="0" smtClean="0">
+                          <a:solidFill>
+                            <a:schemeClr val="tx1"/>
+                          </a:solidFill>
+                        </a:rPr>
+                        <a:t>Analyze</a:t>
+                      </a:r>
+                      <a:endParaRPr lang="en-US" sz="2000" b="1" i="0" dirty="0">
+                        <a:solidFill>
+                          <a:schemeClr val="tx1"/>
+                        </a:solidFill>
+                      </a:endParaRPr>
+                    </a:p>
+                  </a:txBody>
+                  <a:tcPr marL="100759" marR="100759" marT="50419" marB="50419">
+                    <a:lnL w="12700" cap="flat" cmpd="sng" algn="ctr">
+                      <a:solidFill>
+                        <a:schemeClr val="tx1"/>
+                      </a:solidFill>
+                      <a:prstDash val="solid"/>
+                      <a:round/>
+                      <a:headEnd type="none" w="med" len="med"/>
+                      <a:tailEnd type="none" w="med" len="med"/>
+                    </a:lnL>
+                    <a:lnR w="12700" cap="flat" cmpd="sng" algn="ctr">
+                      <a:solidFill>
+                        <a:schemeClr val="tx1"/>
+                      </a:solidFill>
+                      <a:prstDash val="solid"/>
+                      <a:round/>
+                      <a:headEnd type="none" w="med" len="med"/>
+                      <a:tailEnd type="none" w="med" len="med"/>
+                    </a:lnR>
+                    <a:lnT w="12700" cap="flat" cmpd="sng" algn="ctr">
+                      <a:solidFill>
+                        <a:schemeClr val="tx1"/>
+                      </a:solidFill>
+                      <a:prstDash val="solid"/>
+                      <a:round/>
+                      <a:headEnd type="none" w="med" len="med"/>
+                      <a:tailEnd type="none" w="med" len="med"/>
+                    </a:lnT>
+                    <a:lnB w="12700" cap="flat" cmpd="sng" algn="ctr">
+                      <a:solidFill>
+                        <a:schemeClr val="tx1"/>
+                      </a:solidFill>
+                      <a:prstDash val="solid"/>
+                      <a:round/>
+                      <a:headEnd type="none" w="med" len="med"/>
+                      <a:tailEnd type="none" w="med" len="med"/>
+                    </a:lnB>
+                    <a:noFill/>
+                  </a:tcPr>
+                </a:tc>
+              </a:tr>
+            </a:tbl>
+          </a:graphicData>
+        </a:graphic>
+      </p:graphicFrame>
+      <p:sp>
+        <p:nvSpPr>
+          <p:cNvPr id="5" name="TextBox 4"/>
+          <p:cNvSpPr txBox="1"/>
+          <p:nvPr/>
+        </p:nvSpPr>
+        <p:spPr>
+          <a:xfrm>
+            <a:off x="542131" y="2714625"/>
+            <a:ext cx="9152242" cy="1590126"/>
+          </a:xfrm>
+          <a:prstGeom prst="rect">
+            <a:avLst/>
+          </a:prstGeom>
+          <a:noFill/>
+        </p:spPr>
+        <p:txBody>
+          <a:bodyPr wrap="square" lIns="100785" tIns="50393" rIns="100785" bIns="50393" rtlCol="0">
+            <a:spAutoFit/>
+          </a:bodyPr>
+          <a:lstStyle/>
+          <a:p>
+            <a:pPr algn="just"/>
+            <a:r>
+              <a:rPr lang="en-US" sz="2600" b="1" dirty="0" smtClean="0">
+                <a:solidFill>
+                  <a:schemeClr val="tx1"/>
+                </a:solidFill>
+              </a:rPr>
+              <a:t>A health check consists of verifying that each subsystem of Jade or Turquoise has successfully survived delivery, integration, transportation, and launch before leading in to their actual missions.  </a:t>
+            </a:r>
+          </a:p>
+        </p:txBody>
+      </p:sp>
+    </p:spTree>
+    <p:extLst>
+      <p:ext uri="{BB962C8B-B14F-4D97-AF65-F5344CB8AC3E}">
+        <p14:creationId xmlns:p14="http://schemas.microsoft.com/office/powerpoint/2010/main" xmlns="" val="2711901525"/>
+      </p:ext>
+    </p:extLst>
+  </p:cSld>
+  <p:clrMapOvr>
+    <a:masterClrMapping/>
+  </p:clrMapOvr>
+  <p:timing>
+    <p:tnLst>
+      <p:par>
+        <p:cTn id="1" dur="indefinite" restart="never" nodeType="tmRoot"/>
+      </p:par>
+    </p:tnLst>
+  </p:timing>
+</p:sld>
+</file>
+
+<file path=ppt/slides/slide44.xml><?xml version="1.0" encoding="utf-8"?>
+<p:sld xmlns:a="http://schemas.openxmlformats.org/drawingml/2006/main" xmlns:r="http://schemas.openxmlformats.org/officeDocument/2006/relationships" xmlns:p="http://schemas.openxmlformats.org/presentationml/2006/main">
+  <p:cSld>
+    <p:spTree>
+      <p:nvGrpSpPr>
+        <p:cNvPr id="1" name=""/>
+        <p:cNvGrpSpPr/>
+        <p:nvPr/>
+      </p:nvGrpSpPr>
+      <p:grpSpPr>
+        <a:xfrm>
+          <a:off x="0" y="0"/>
+          <a:ext cx="0" cy="0"/>
+          <a:chOff x="0" y="0"/>
+          <a:chExt cx="0" cy="0"/>
+        </a:xfrm>
+      </p:grpSpPr>
+      <p:graphicFrame>
+        <p:nvGraphicFramePr>
+          <p:cNvPr id="4" name="Content Placeholder 3"/>
+          <p:cNvGraphicFramePr>
+            <a:graphicFrameLocks noGrp="1"/>
+          </p:cNvGraphicFramePr>
+          <p:nvPr>
+            <p:ph idx="1"/>
+            <p:extLst>
+              <p:ext uri="{D42A27DB-BD31-4B8C-83A1-F6EECF244321}">
+                <p14:modId xmlns:p14="http://schemas.microsoft.com/office/powerpoint/2010/main" xmlns="" val="1483644448"/>
+              </p:ext>
+            </p:extLst>
+          </p:nvPr>
+        </p:nvGraphicFramePr>
+        <p:xfrm>
+          <a:off x="618331" y="657225"/>
+          <a:ext cx="9068277" cy="1833146"/>
+        </p:xfrm>
+        <a:graphic>
+          <a:graphicData uri="http://schemas.openxmlformats.org/drawingml/2006/table">
+            <a:tbl>
+              <a:tblPr firstRow="1" bandRow="1">
+                <a:tableStyleId>{5C22544A-7EE6-4342-B048-85BDC9FD1C3A}</a:tableStyleId>
+              </a:tblPr>
+              <a:tblGrid>
+                <a:gridCol w="3526552"/>
+                <a:gridCol w="5541725"/>
+              </a:tblGrid>
+              <a:tr h="408954">
+                <a:tc>
+                  <a:txBody>
+                    <a:bodyPr/>
+                    <a:lstStyle/>
+                    <a:p>
+                      <a:r>
+                        <a:rPr lang="en-US" sz="2000" b="0" dirty="0" smtClean="0">
+                          <a:solidFill>
+                            <a:schemeClr val="bg1"/>
+                          </a:solidFill>
+                        </a:rPr>
+                        <a:t> RVM Requirement Number</a:t>
+                      </a:r>
+                      <a:endParaRPr lang="en-US" sz="2000" b="0" dirty="0">
+                        <a:solidFill>
+                          <a:schemeClr val="bg1"/>
+                        </a:solidFill>
+                      </a:endParaRPr>
+                    </a:p>
+                  </a:txBody>
+                  <a:tcPr marL="100759" marR="100759" marT="50419" marB="50419" anchor="ctr">
+                    <a:lnL w="12700" cap="flat" cmpd="sng" algn="ctr">
+                      <a:solidFill>
+                        <a:schemeClr val="tx1"/>
+                      </a:solidFill>
+                      <a:prstDash val="solid"/>
+                      <a:round/>
+                      <a:headEnd type="none" w="med" len="med"/>
+                      <a:tailEnd type="none" w="med" len="med"/>
+                    </a:lnL>
+                    <a:lnR w="12700" cap="flat" cmpd="sng" algn="ctr">
+                      <a:solidFill>
+                        <a:schemeClr val="tx1"/>
+                      </a:solidFill>
+                      <a:prstDash val="solid"/>
+                      <a:round/>
+                      <a:headEnd type="none" w="med" len="med"/>
+                      <a:tailEnd type="none" w="med" len="med"/>
+                    </a:lnR>
+                    <a:lnT w="12700" cap="flat" cmpd="sng" algn="ctr">
+                      <a:solidFill>
+                        <a:schemeClr val="tx1"/>
+                      </a:solidFill>
+                      <a:prstDash val="solid"/>
+                      <a:round/>
+                      <a:headEnd type="none" w="med" len="med"/>
+                      <a:tailEnd type="none" w="med" len="med"/>
+                    </a:lnT>
+                    <a:lnB w="12700" cap="flat" cmpd="sng" algn="ctr">
+                      <a:solidFill>
+                        <a:schemeClr val="tx1"/>
+                      </a:solidFill>
+                      <a:prstDash val="solid"/>
+                      <a:round/>
+                      <a:headEnd type="none" w="med" len="med"/>
+                      <a:tailEnd type="none" w="med" len="med"/>
+                    </a:lnB>
+                    <a:solidFill>
+                      <a:srgbClr val="0070C0"/>
+                    </a:solidFill>
+                  </a:tcPr>
+                </a:tc>
+                <a:tc>
+                  <a:txBody>
+                    <a:bodyPr/>
+                    <a:lstStyle/>
+                    <a:p>
+                      <a:r>
+                        <a:rPr lang="en-US" sz="2000" b="1" dirty="0" smtClean="0">
+                          <a:solidFill>
+                            <a:schemeClr val="tx1"/>
+                          </a:solidFill>
+                        </a:rPr>
                         <a:t>RCL.SS.MOP1</a:t>
                       </a:r>
                       <a:endParaRPr lang="en-US" sz="2000" b="1" dirty="0">
@@ -37461,7 +38006,7 @@
 </p:sld>
 </file>
 
-<file path=ppt/slides/slide44.xml><?xml version="1.0" encoding="utf-8"?>
+<file path=ppt/slides/slide45.xml><?xml version="1.0" encoding="utf-8"?>
 <p:sld xmlns:a="http://schemas.openxmlformats.org/drawingml/2006/main" xmlns:r="http://schemas.openxmlformats.org/officeDocument/2006/relationships" xmlns:p="http://schemas.openxmlformats.org/presentationml/2006/main">
   <p:cSld>
     <p:spTree>
@@ -38107,7 +38652,7 @@
 </p:sld>
 </file>
 
-<file path=ppt/slides/slide45.xml><?xml version="1.0" encoding="utf-8"?>
+<file path=ppt/slides/slide46.xml><?xml version="1.0" encoding="utf-8"?>
 <p:sld xmlns:a="http://schemas.openxmlformats.org/drawingml/2006/main" xmlns:r="http://schemas.openxmlformats.org/officeDocument/2006/relationships" xmlns:p="http://schemas.openxmlformats.org/presentationml/2006/main">
   <p:cSld>
     <p:spTree>
@@ -38620,7 +39165,7 @@
 </p:sld>
 </file>
 
-<file path=ppt/slides/slide46.xml><?xml version="1.0" encoding="utf-8"?>
+<file path=ppt/slides/slide47.xml><?xml version="1.0" encoding="utf-8"?>
 <p:sld xmlns:a="http://schemas.openxmlformats.org/drawingml/2006/main" xmlns:r="http://schemas.openxmlformats.org/officeDocument/2006/relationships" xmlns:p="http://schemas.openxmlformats.org/presentationml/2006/main">
   <p:cSld>
     <p:spTree>
@@ -39133,7 +39678,7 @@
 </p:sld>
 </file>
 
-<file path=ppt/slides/slide47.xml><?xml version="1.0" encoding="utf-8"?>
+<file path=ppt/slides/slide48.xml><?xml version="1.0" encoding="utf-8"?>
 <p:sld xmlns:a="http://schemas.openxmlformats.org/drawingml/2006/main" xmlns:r="http://schemas.openxmlformats.org/officeDocument/2006/relationships" xmlns:p="http://schemas.openxmlformats.org/presentationml/2006/main">
   <p:cSld>
     <p:spTree>
@@ -39678,7 +40223,7 @@
 </p:sld>
 </file>
 
-<file path=ppt/slides/slide48.xml><?xml version="1.0" encoding="utf-8"?>
+<file path=ppt/slides/slide49.xml><?xml version="1.0" encoding="utf-8"?>
 <p:sld xmlns:a="http://schemas.openxmlformats.org/drawingml/2006/main" xmlns:r="http://schemas.openxmlformats.org/officeDocument/2006/relationships" xmlns:p="http://schemas.openxmlformats.org/presentationml/2006/main">
   <p:cSld>
     <p:spTree>
@@ -40194,551 +40739,6 @@
                 </a:solidFill>
               </a:rPr>
               <a:t>executed.</a:t>
-            </a:r>
-            <a:endParaRPr lang="en-US" sz="2600" b="1" dirty="0" smtClean="0">
-              <a:solidFill>
-                <a:schemeClr val="tx1"/>
-              </a:solidFill>
-            </a:endParaRPr>
-          </a:p>
-        </p:txBody>
-      </p:sp>
-    </p:spTree>
-    <p:extLst>
-      <p:ext uri="{BB962C8B-B14F-4D97-AF65-F5344CB8AC3E}">
-        <p14:creationId xmlns:p14="http://schemas.microsoft.com/office/powerpoint/2010/main" xmlns="" val="2711901525"/>
-      </p:ext>
-    </p:extLst>
-  </p:cSld>
-  <p:clrMapOvr>
-    <a:masterClrMapping/>
-  </p:clrMapOvr>
-  <p:timing>
-    <p:tnLst>
-      <p:par>
-        <p:cTn id="1" dur="indefinite" restart="never" nodeType="tmRoot"/>
-      </p:par>
-    </p:tnLst>
-  </p:timing>
-</p:sld>
-</file>
-
-<file path=ppt/slides/slide49.xml><?xml version="1.0" encoding="utf-8"?>
-<p:sld xmlns:a="http://schemas.openxmlformats.org/drawingml/2006/main" xmlns:r="http://schemas.openxmlformats.org/officeDocument/2006/relationships" xmlns:p="http://schemas.openxmlformats.org/presentationml/2006/main">
-  <p:cSld>
-    <p:spTree>
-      <p:nvGrpSpPr>
-        <p:cNvPr id="1" name=""/>
-        <p:cNvGrpSpPr/>
-        <p:nvPr/>
-      </p:nvGrpSpPr>
-      <p:grpSpPr>
-        <a:xfrm>
-          <a:off x="0" y="0"/>
-          <a:ext cx="0" cy="0"/>
-          <a:chOff x="0" y="0"/>
-          <a:chExt cx="0" cy="0"/>
-        </a:xfrm>
-      </p:grpSpPr>
-      <p:graphicFrame>
-        <p:nvGraphicFramePr>
-          <p:cNvPr id="4" name="Content Placeholder 3"/>
-          <p:cNvGraphicFramePr>
-            <a:graphicFrameLocks noGrp="1"/>
-          </p:cNvGraphicFramePr>
-          <p:nvPr>
-            <p:ph idx="1"/>
-            <p:extLst>
-              <p:ext uri="{D42A27DB-BD31-4B8C-83A1-F6EECF244321}">
-                <p14:modId xmlns:p14="http://schemas.microsoft.com/office/powerpoint/2010/main" xmlns="" val="1483644448"/>
-              </p:ext>
-            </p:extLst>
-          </p:nvPr>
-        </p:nvGraphicFramePr>
-        <p:xfrm>
-          <a:off x="618331" y="581025"/>
-          <a:ext cx="9068277" cy="2137946"/>
-        </p:xfrm>
-        <a:graphic>
-          <a:graphicData uri="http://schemas.openxmlformats.org/drawingml/2006/table">
-            <a:tbl>
-              <a:tblPr firstRow="1" bandRow="1">
-                <a:tableStyleId>{5C22544A-7EE6-4342-B048-85BDC9FD1C3A}</a:tableStyleId>
-              </a:tblPr>
-              <a:tblGrid>
-                <a:gridCol w="3526552"/>
-                <a:gridCol w="5541725"/>
-              </a:tblGrid>
-              <a:tr h="408954">
-                <a:tc>
-                  <a:txBody>
-                    <a:bodyPr/>
-                    <a:lstStyle/>
-                    <a:p>
-                      <a:r>
-                        <a:rPr lang="en-US" sz="2000" b="0" dirty="0" smtClean="0">
-                          <a:solidFill>
-                            <a:schemeClr val="bg1"/>
-                          </a:solidFill>
-                        </a:rPr>
-                        <a:t> RVM Requirement Number</a:t>
-                      </a:r>
-                      <a:endParaRPr lang="en-US" sz="2000" b="0" dirty="0">
-                        <a:solidFill>
-                          <a:schemeClr val="bg1"/>
-                        </a:solidFill>
-                      </a:endParaRPr>
-                    </a:p>
-                  </a:txBody>
-                  <a:tcPr marL="100759" marR="100759" marT="50419" marB="50419" anchor="ctr">
-                    <a:lnL w="12700" cap="flat" cmpd="sng" algn="ctr">
-                      <a:solidFill>
-                        <a:schemeClr val="tx1"/>
-                      </a:solidFill>
-                      <a:prstDash val="solid"/>
-                      <a:round/>
-                      <a:headEnd type="none" w="med" len="med"/>
-                      <a:tailEnd type="none" w="med" len="med"/>
-                    </a:lnL>
-                    <a:lnR w="12700" cap="flat" cmpd="sng" algn="ctr">
-                      <a:solidFill>
-                        <a:schemeClr val="tx1"/>
-                      </a:solidFill>
-                      <a:prstDash val="solid"/>
-                      <a:round/>
-                      <a:headEnd type="none" w="med" len="med"/>
-                      <a:tailEnd type="none" w="med" len="med"/>
-                    </a:lnR>
-                    <a:lnT w="12700" cap="flat" cmpd="sng" algn="ctr">
-                      <a:solidFill>
-                        <a:schemeClr val="tx1"/>
-                      </a:solidFill>
-                      <a:prstDash val="solid"/>
-                      <a:round/>
-                      <a:headEnd type="none" w="med" len="med"/>
-                      <a:tailEnd type="none" w="med" len="med"/>
-                    </a:lnT>
-                    <a:lnB w="12700" cap="flat" cmpd="sng" algn="ctr">
-                      <a:solidFill>
-                        <a:schemeClr val="tx1"/>
-                      </a:solidFill>
-                      <a:prstDash val="solid"/>
-                      <a:round/>
-                      <a:headEnd type="none" w="med" len="med"/>
-                      <a:tailEnd type="none" w="med" len="med"/>
-                    </a:lnB>
-                    <a:solidFill>
-                      <a:srgbClr val="0070C0"/>
-                    </a:solidFill>
-                  </a:tcPr>
-                </a:tc>
-                <a:tc>
-                  <a:txBody>
-                    <a:bodyPr/>
-                    <a:lstStyle/>
-                    <a:p>
-                      <a:r>
-                        <a:rPr lang="en-US" sz="2000" b="1" dirty="0" smtClean="0">
-                          <a:solidFill>
-                            <a:schemeClr val="tx1"/>
-                          </a:solidFill>
-                        </a:rPr>
-                        <a:t>RCL.RDZ.MOP1</a:t>
-                      </a:r>
-                      <a:endParaRPr lang="en-US" sz="2000" b="1" dirty="0">
-                        <a:solidFill>
-                          <a:schemeClr val="tx1"/>
-                        </a:solidFill>
-                      </a:endParaRPr>
-                    </a:p>
-                  </a:txBody>
-                  <a:tcPr marL="100759" marR="100759" marT="50419" marB="50419">
-                    <a:lnL w="12700" cap="flat" cmpd="sng" algn="ctr">
-                      <a:solidFill>
-                        <a:schemeClr val="tx1"/>
-                      </a:solidFill>
-                      <a:prstDash val="solid"/>
-                      <a:round/>
-                      <a:headEnd type="none" w="med" len="med"/>
-                      <a:tailEnd type="none" w="med" len="med"/>
-                    </a:lnL>
-                    <a:lnR w="12700" cap="flat" cmpd="sng" algn="ctr">
-                      <a:solidFill>
-                        <a:schemeClr val="tx1"/>
-                      </a:solidFill>
-                      <a:prstDash val="solid"/>
-                      <a:round/>
-                      <a:headEnd type="none" w="med" len="med"/>
-                      <a:tailEnd type="none" w="med" len="med"/>
-                    </a:lnR>
-                    <a:lnT w="12700" cap="flat" cmpd="sng" algn="ctr">
-                      <a:solidFill>
-                        <a:schemeClr val="tx1"/>
-                      </a:solidFill>
-                      <a:prstDash val="solid"/>
-                      <a:round/>
-                      <a:headEnd type="none" w="med" len="med"/>
-                      <a:tailEnd type="none" w="med" len="med"/>
-                    </a:lnT>
-                    <a:lnB w="12700" cap="flat" cmpd="sng" algn="ctr">
-                      <a:solidFill>
-                        <a:schemeClr val="tx1"/>
-                      </a:solidFill>
-                      <a:prstDash val="solid"/>
-                      <a:round/>
-                      <a:headEnd type="none" w="med" len="med"/>
-                      <a:tailEnd type="none" w="med" len="med"/>
-                    </a:lnB>
-                    <a:noFill/>
-                  </a:tcPr>
-                </a:tc>
-              </a:tr>
-              <a:tr h="1310894">
-                <a:tc>
-                  <a:txBody>
-                    <a:bodyPr/>
-                    <a:lstStyle/>
-                    <a:p>
-                      <a:r>
-                        <a:rPr lang="en-US" sz="2000" b="0" dirty="0" smtClean="0">
-                          <a:solidFill>
-                            <a:schemeClr val="bg1"/>
-                          </a:solidFill>
-                        </a:rPr>
-                        <a:t>RVM </a:t>
-                      </a:r>
-                      <a:r>
-                        <a:rPr lang="en-US" sz="2000" b="0" baseline="0" dirty="0" smtClean="0">
-                          <a:solidFill>
-                            <a:schemeClr val="bg1"/>
-                          </a:solidFill>
-                        </a:rPr>
-                        <a:t>Requirement Wording</a:t>
-                      </a:r>
-                      <a:endParaRPr lang="en-US" sz="2000" b="0" dirty="0">
-                        <a:solidFill>
-                          <a:schemeClr val="bg1"/>
-                        </a:solidFill>
-                      </a:endParaRPr>
-                    </a:p>
-                  </a:txBody>
-                  <a:tcPr marL="100759" marR="100759" marT="50419" marB="50419" anchor="ctr">
-                    <a:lnL w="12700" cap="flat" cmpd="sng" algn="ctr">
-                      <a:solidFill>
-                        <a:schemeClr val="tx1"/>
-                      </a:solidFill>
-                      <a:prstDash val="solid"/>
-                      <a:round/>
-                      <a:headEnd type="none" w="med" len="med"/>
-                      <a:tailEnd type="none" w="med" len="med"/>
-                    </a:lnL>
-                    <a:lnR w="12700" cap="flat" cmpd="sng" algn="ctr">
-                      <a:solidFill>
-                        <a:schemeClr val="tx1"/>
-                      </a:solidFill>
-                      <a:prstDash val="solid"/>
-                      <a:round/>
-                      <a:headEnd type="none" w="med" len="med"/>
-                      <a:tailEnd type="none" w="med" len="med"/>
-                    </a:lnR>
-                    <a:lnT w="12700" cap="flat" cmpd="sng" algn="ctr">
-                      <a:solidFill>
-                        <a:schemeClr val="tx1"/>
-                      </a:solidFill>
-                      <a:prstDash val="solid"/>
-                      <a:round/>
-                      <a:headEnd type="none" w="med" len="med"/>
-                      <a:tailEnd type="none" w="med" len="med"/>
-                    </a:lnT>
-                    <a:lnB w="12700" cap="flat" cmpd="sng" algn="ctr">
-                      <a:solidFill>
-                        <a:schemeClr val="tx1"/>
-                      </a:solidFill>
-                      <a:prstDash val="solid"/>
-                      <a:round/>
-                      <a:headEnd type="none" w="med" len="med"/>
-                      <a:tailEnd type="none" w="med" len="med"/>
-                    </a:lnB>
-                    <a:solidFill>
-                      <a:srgbClr val="0070C0"/>
-                    </a:solidFill>
-                  </a:tcPr>
-                </a:tc>
-                <a:tc>
-                  <a:txBody>
-                    <a:bodyPr/>
-                    <a:lstStyle/>
-                    <a:p>
-                      <a:r>
-                        <a:rPr lang="en-US" sz="2000" b="1" i="1" dirty="0" smtClean="0">
-                          <a:solidFill>
-                            <a:schemeClr val="tx1"/>
-                          </a:solidFill>
-                        </a:rPr>
-                        <a:t>“Jade and Turquoise Shall be Able to Perform a Rendezvous by Decreasing the Relative Displacement Between Each Other to Within 50 meters for at Least</a:t>
-                      </a:r>
-                      <a:r>
-                        <a:rPr lang="en-US" sz="2000" b="1" i="1" baseline="0" dirty="0" smtClean="0">
-                          <a:solidFill>
-                            <a:schemeClr val="tx1"/>
-                          </a:solidFill>
-                        </a:rPr>
-                        <a:t> 5 Orbits</a:t>
-                      </a:r>
-                      <a:r>
-                        <a:rPr lang="en-US" sz="2000" b="1" i="1" dirty="0" smtClean="0">
-                          <a:solidFill>
-                            <a:schemeClr val="tx1"/>
-                          </a:solidFill>
-                        </a:rPr>
-                        <a:t>”</a:t>
-                      </a:r>
-                      <a:endParaRPr lang="en-US" sz="2000" b="1" i="1" dirty="0">
-                        <a:solidFill>
-                          <a:schemeClr val="tx1"/>
-                        </a:solidFill>
-                      </a:endParaRPr>
-                    </a:p>
-                  </a:txBody>
-                  <a:tcPr marL="100759" marR="100759" marT="50419" marB="50419">
-                    <a:lnL w="12700" cap="flat" cmpd="sng" algn="ctr">
-                      <a:solidFill>
-                        <a:schemeClr val="tx1"/>
-                      </a:solidFill>
-                      <a:prstDash val="solid"/>
-                      <a:round/>
-                      <a:headEnd type="none" w="med" len="med"/>
-                      <a:tailEnd type="none" w="med" len="med"/>
-                    </a:lnL>
-                    <a:lnR w="12700" cap="flat" cmpd="sng" algn="ctr">
-                      <a:solidFill>
-                        <a:schemeClr val="tx1"/>
-                      </a:solidFill>
-                      <a:prstDash val="solid"/>
-                      <a:round/>
-                      <a:headEnd type="none" w="med" len="med"/>
-                      <a:tailEnd type="none" w="med" len="med"/>
-                    </a:lnR>
-                    <a:lnT w="12700" cap="flat" cmpd="sng" algn="ctr">
-                      <a:solidFill>
-                        <a:schemeClr val="tx1"/>
-                      </a:solidFill>
-                      <a:prstDash val="solid"/>
-                      <a:round/>
-                      <a:headEnd type="none" w="med" len="med"/>
-                      <a:tailEnd type="none" w="med" len="med"/>
-                    </a:lnT>
-                    <a:lnB w="12700" cap="flat" cmpd="sng" algn="ctr">
-                      <a:solidFill>
-                        <a:schemeClr val="tx1"/>
-                      </a:solidFill>
-                      <a:prstDash val="solid"/>
-                      <a:round/>
-                      <a:headEnd type="none" w="med" len="med"/>
-                      <a:tailEnd type="none" w="med" len="med"/>
-                    </a:lnB>
-                    <a:noFill/>
-                  </a:tcPr>
-                </a:tc>
-              </a:tr>
-              <a:tr h="408954">
-                <a:tc>
-                  <a:txBody>
-                    <a:bodyPr/>
-                    <a:lstStyle/>
-                    <a:p>
-                      <a:r>
-                        <a:rPr lang="en-US" sz="2000" b="0" dirty="0" smtClean="0">
-                          <a:solidFill>
-                            <a:schemeClr val="bg1"/>
-                          </a:solidFill>
-                        </a:rPr>
-                        <a:t>Validation Method</a:t>
-                      </a:r>
-                      <a:endParaRPr lang="en-US" sz="2000" b="0" dirty="0">
-                        <a:solidFill>
-                          <a:schemeClr val="bg1"/>
-                        </a:solidFill>
-                      </a:endParaRPr>
-                    </a:p>
-                  </a:txBody>
-                  <a:tcPr marL="100759" marR="100759" marT="50419" marB="50419" anchor="ctr">
-                    <a:lnL w="12700" cap="flat" cmpd="sng" algn="ctr">
-                      <a:solidFill>
-                        <a:schemeClr val="tx1"/>
-                      </a:solidFill>
-                      <a:prstDash val="solid"/>
-                      <a:round/>
-                      <a:headEnd type="none" w="med" len="med"/>
-                      <a:tailEnd type="none" w="med" len="med"/>
-                    </a:lnL>
-                    <a:lnR w="12700" cap="flat" cmpd="sng" algn="ctr">
-                      <a:solidFill>
-                        <a:schemeClr val="tx1"/>
-                      </a:solidFill>
-                      <a:prstDash val="solid"/>
-                      <a:round/>
-                      <a:headEnd type="none" w="med" len="med"/>
-                      <a:tailEnd type="none" w="med" len="med"/>
-                    </a:lnR>
-                    <a:lnT w="12700" cap="flat" cmpd="sng" algn="ctr">
-                      <a:solidFill>
-                        <a:schemeClr val="tx1"/>
-                      </a:solidFill>
-                      <a:prstDash val="solid"/>
-                      <a:round/>
-                      <a:headEnd type="none" w="med" len="med"/>
-                      <a:tailEnd type="none" w="med" len="med"/>
-                    </a:lnT>
-                    <a:lnB w="12700" cap="flat" cmpd="sng" algn="ctr">
-                      <a:solidFill>
-                        <a:schemeClr val="tx1"/>
-                      </a:solidFill>
-                      <a:prstDash val="solid"/>
-                      <a:round/>
-                      <a:headEnd type="none" w="med" len="med"/>
-                      <a:tailEnd type="none" w="med" len="med"/>
-                    </a:lnB>
-                    <a:solidFill>
-                      <a:srgbClr val="0070C0"/>
-                    </a:solidFill>
-                  </a:tcPr>
-                </a:tc>
-                <a:tc>
-                  <a:txBody>
-                    <a:bodyPr/>
-                    <a:lstStyle/>
-                    <a:p>
-                      <a:r>
-                        <a:rPr lang="en-US" sz="2000" b="1" i="0" dirty="0" smtClean="0">
-                          <a:solidFill>
-                            <a:schemeClr val="tx1"/>
-                          </a:solidFill>
-                        </a:rPr>
-                        <a:t>Analyze</a:t>
-                      </a:r>
-                      <a:endParaRPr lang="en-US" sz="2000" b="1" i="0" dirty="0">
-                        <a:solidFill>
-                          <a:schemeClr val="tx1"/>
-                        </a:solidFill>
-                      </a:endParaRPr>
-                    </a:p>
-                  </a:txBody>
-                  <a:tcPr marL="100759" marR="100759" marT="50419" marB="50419">
-                    <a:lnL w="12700" cap="flat" cmpd="sng" algn="ctr">
-                      <a:solidFill>
-                        <a:schemeClr val="tx1"/>
-                      </a:solidFill>
-                      <a:prstDash val="solid"/>
-                      <a:round/>
-                      <a:headEnd type="none" w="med" len="med"/>
-                      <a:tailEnd type="none" w="med" len="med"/>
-                    </a:lnL>
-                    <a:lnR w="12700" cap="flat" cmpd="sng" algn="ctr">
-                      <a:solidFill>
-                        <a:schemeClr val="tx1"/>
-                      </a:solidFill>
-                      <a:prstDash val="solid"/>
-                      <a:round/>
-                      <a:headEnd type="none" w="med" len="med"/>
-                      <a:tailEnd type="none" w="med" len="med"/>
-                    </a:lnR>
-                    <a:lnT w="12700" cap="flat" cmpd="sng" algn="ctr">
-                      <a:solidFill>
-                        <a:schemeClr val="tx1"/>
-                      </a:solidFill>
-                      <a:prstDash val="solid"/>
-                      <a:round/>
-                      <a:headEnd type="none" w="med" len="med"/>
-                      <a:tailEnd type="none" w="med" len="med"/>
-                    </a:lnT>
-                    <a:lnB w="12700" cap="flat" cmpd="sng" algn="ctr">
-                      <a:solidFill>
-                        <a:schemeClr val="tx1"/>
-                      </a:solidFill>
-                      <a:prstDash val="solid"/>
-                      <a:round/>
-                      <a:headEnd type="none" w="med" len="med"/>
-                      <a:tailEnd type="none" w="med" len="med"/>
-                    </a:lnB>
-                    <a:noFill/>
-                  </a:tcPr>
-                </a:tc>
-              </a:tr>
-            </a:tbl>
-          </a:graphicData>
-        </a:graphic>
-      </p:graphicFrame>
-      <p:sp>
-        <p:nvSpPr>
-          <p:cNvPr id="5" name="TextBox 4"/>
-          <p:cNvSpPr txBox="1"/>
-          <p:nvPr/>
-        </p:nvSpPr>
-        <p:spPr>
-          <a:xfrm>
-            <a:off x="465931" y="2867025"/>
-            <a:ext cx="9152242" cy="2706394"/>
-          </a:xfrm>
-          <a:prstGeom prst="rect">
-            <a:avLst/>
-          </a:prstGeom>
-          <a:noFill/>
-        </p:spPr>
-        <p:txBody>
-          <a:bodyPr wrap="square" lIns="100785" tIns="50393" rIns="100785" bIns="50393" rtlCol="0">
-            <a:spAutoFit/>
-          </a:bodyPr>
-          <a:lstStyle/>
-          <a:p>
-            <a:pPr algn="just"/>
-            <a:r>
-              <a:rPr lang="en-US" sz="2600" b="1" dirty="0" smtClean="0">
-                <a:solidFill>
-                  <a:schemeClr val="tx1"/>
-                </a:solidFill>
-              </a:rPr>
-              <a:t>This requirement comes directly from the Team Bravo RFP and is a key factor in meeting the mission success criteria of the proposed </a:t>
-            </a:r>
-            <a:r>
-              <a:rPr lang="en-US" sz="2600" b="1" dirty="0" smtClean="0">
-                <a:solidFill>
-                  <a:schemeClr val="tx1"/>
-                </a:solidFill>
-              </a:rPr>
-              <a:t>mission.</a:t>
-            </a:r>
-            <a:endParaRPr lang="en-US" sz="2600" b="1" dirty="0" smtClean="0">
-              <a:solidFill>
-                <a:schemeClr val="tx1"/>
-              </a:solidFill>
-            </a:endParaRPr>
-          </a:p>
-          <a:p>
-            <a:pPr algn="just"/>
-            <a:endParaRPr lang="en-US" sz="2600" b="1" dirty="0" smtClean="0">
-              <a:solidFill>
-                <a:schemeClr val="tx1"/>
-              </a:solidFill>
-            </a:endParaRPr>
-          </a:p>
-          <a:p>
-            <a:pPr algn="just"/>
-            <a:r>
-              <a:rPr lang="en-US" sz="2600" b="1" dirty="0" smtClean="0">
-                <a:solidFill>
-                  <a:schemeClr val="tx1"/>
-                </a:solidFill>
-              </a:rPr>
-              <a:t>This process would be executed at the completion of the “Escape” Maneuver, with verification of its completion coming after it has already </a:t>
-            </a:r>
-            <a:r>
-              <a:rPr lang="en-US" sz="2600" b="1" dirty="0" smtClean="0">
-                <a:solidFill>
-                  <a:schemeClr val="tx1"/>
-                </a:solidFill>
-              </a:rPr>
-              <a:t>occurred.</a:t>
             </a:r>
             <a:endParaRPr lang="en-US" sz="2600" b="1" dirty="0" smtClean="0">
               <a:solidFill>
@@ -41926,6 +41926,551 @@
           <a:chExt cx="0" cy="0"/>
         </a:xfrm>
       </p:grpSpPr>
+      <p:graphicFrame>
+        <p:nvGraphicFramePr>
+          <p:cNvPr id="4" name="Content Placeholder 3"/>
+          <p:cNvGraphicFramePr>
+            <a:graphicFrameLocks noGrp="1"/>
+          </p:cNvGraphicFramePr>
+          <p:nvPr>
+            <p:ph idx="1"/>
+            <p:extLst>
+              <p:ext uri="{D42A27DB-BD31-4B8C-83A1-F6EECF244321}">
+                <p14:modId xmlns:p14="http://schemas.microsoft.com/office/powerpoint/2010/main" xmlns="" val="1483644448"/>
+              </p:ext>
+            </p:extLst>
+          </p:nvPr>
+        </p:nvGraphicFramePr>
+        <p:xfrm>
+          <a:off x="618331" y="581025"/>
+          <a:ext cx="9068277" cy="2137946"/>
+        </p:xfrm>
+        <a:graphic>
+          <a:graphicData uri="http://schemas.openxmlformats.org/drawingml/2006/table">
+            <a:tbl>
+              <a:tblPr firstRow="1" bandRow="1">
+                <a:tableStyleId>{5C22544A-7EE6-4342-B048-85BDC9FD1C3A}</a:tableStyleId>
+              </a:tblPr>
+              <a:tblGrid>
+                <a:gridCol w="3526552"/>
+                <a:gridCol w="5541725"/>
+              </a:tblGrid>
+              <a:tr h="408954">
+                <a:tc>
+                  <a:txBody>
+                    <a:bodyPr/>
+                    <a:lstStyle/>
+                    <a:p>
+                      <a:r>
+                        <a:rPr lang="en-US" sz="2000" b="0" dirty="0" smtClean="0">
+                          <a:solidFill>
+                            <a:schemeClr val="bg1"/>
+                          </a:solidFill>
+                        </a:rPr>
+                        <a:t> RVM Requirement Number</a:t>
+                      </a:r>
+                      <a:endParaRPr lang="en-US" sz="2000" b="0" dirty="0">
+                        <a:solidFill>
+                          <a:schemeClr val="bg1"/>
+                        </a:solidFill>
+                      </a:endParaRPr>
+                    </a:p>
+                  </a:txBody>
+                  <a:tcPr marL="100759" marR="100759" marT="50419" marB="50419" anchor="ctr">
+                    <a:lnL w="12700" cap="flat" cmpd="sng" algn="ctr">
+                      <a:solidFill>
+                        <a:schemeClr val="tx1"/>
+                      </a:solidFill>
+                      <a:prstDash val="solid"/>
+                      <a:round/>
+                      <a:headEnd type="none" w="med" len="med"/>
+                      <a:tailEnd type="none" w="med" len="med"/>
+                    </a:lnL>
+                    <a:lnR w="12700" cap="flat" cmpd="sng" algn="ctr">
+                      <a:solidFill>
+                        <a:schemeClr val="tx1"/>
+                      </a:solidFill>
+                      <a:prstDash val="solid"/>
+                      <a:round/>
+                      <a:headEnd type="none" w="med" len="med"/>
+                      <a:tailEnd type="none" w="med" len="med"/>
+                    </a:lnR>
+                    <a:lnT w="12700" cap="flat" cmpd="sng" algn="ctr">
+                      <a:solidFill>
+                        <a:schemeClr val="tx1"/>
+                      </a:solidFill>
+                      <a:prstDash val="solid"/>
+                      <a:round/>
+                      <a:headEnd type="none" w="med" len="med"/>
+                      <a:tailEnd type="none" w="med" len="med"/>
+                    </a:lnT>
+                    <a:lnB w="12700" cap="flat" cmpd="sng" algn="ctr">
+                      <a:solidFill>
+                        <a:schemeClr val="tx1"/>
+                      </a:solidFill>
+                      <a:prstDash val="solid"/>
+                      <a:round/>
+                      <a:headEnd type="none" w="med" len="med"/>
+                      <a:tailEnd type="none" w="med" len="med"/>
+                    </a:lnB>
+                    <a:solidFill>
+                      <a:srgbClr val="0070C0"/>
+                    </a:solidFill>
+                  </a:tcPr>
+                </a:tc>
+                <a:tc>
+                  <a:txBody>
+                    <a:bodyPr/>
+                    <a:lstStyle/>
+                    <a:p>
+                      <a:r>
+                        <a:rPr lang="en-US" sz="2000" b="1" dirty="0" smtClean="0">
+                          <a:solidFill>
+                            <a:schemeClr val="tx1"/>
+                          </a:solidFill>
+                        </a:rPr>
+                        <a:t>RCL.RDZ.MOP1</a:t>
+                      </a:r>
+                      <a:endParaRPr lang="en-US" sz="2000" b="1" dirty="0">
+                        <a:solidFill>
+                          <a:schemeClr val="tx1"/>
+                        </a:solidFill>
+                      </a:endParaRPr>
+                    </a:p>
+                  </a:txBody>
+                  <a:tcPr marL="100759" marR="100759" marT="50419" marB="50419">
+                    <a:lnL w="12700" cap="flat" cmpd="sng" algn="ctr">
+                      <a:solidFill>
+                        <a:schemeClr val="tx1"/>
+                      </a:solidFill>
+                      <a:prstDash val="solid"/>
+                      <a:round/>
+                      <a:headEnd type="none" w="med" len="med"/>
+                      <a:tailEnd type="none" w="med" len="med"/>
+                    </a:lnL>
+                    <a:lnR w="12700" cap="flat" cmpd="sng" algn="ctr">
+                      <a:solidFill>
+                        <a:schemeClr val="tx1"/>
+                      </a:solidFill>
+                      <a:prstDash val="solid"/>
+                      <a:round/>
+                      <a:headEnd type="none" w="med" len="med"/>
+                      <a:tailEnd type="none" w="med" len="med"/>
+                    </a:lnR>
+                    <a:lnT w="12700" cap="flat" cmpd="sng" algn="ctr">
+                      <a:solidFill>
+                        <a:schemeClr val="tx1"/>
+                      </a:solidFill>
+                      <a:prstDash val="solid"/>
+                      <a:round/>
+                      <a:headEnd type="none" w="med" len="med"/>
+                      <a:tailEnd type="none" w="med" len="med"/>
+                    </a:lnT>
+                    <a:lnB w="12700" cap="flat" cmpd="sng" algn="ctr">
+                      <a:solidFill>
+                        <a:schemeClr val="tx1"/>
+                      </a:solidFill>
+                      <a:prstDash val="solid"/>
+                      <a:round/>
+                      <a:headEnd type="none" w="med" len="med"/>
+                      <a:tailEnd type="none" w="med" len="med"/>
+                    </a:lnB>
+                    <a:noFill/>
+                  </a:tcPr>
+                </a:tc>
+              </a:tr>
+              <a:tr h="1310894">
+                <a:tc>
+                  <a:txBody>
+                    <a:bodyPr/>
+                    <a:lstStyle/>
+                    <a:p>
+                      <a:r>
+                        <a:rPr lang="en-US" sz="2000" b="0" dirty="0" smtClean="0">
+                          <a:solidFill>
+                            <a:schemeClr val="bg1"/>
+                          </a:solidFill>
+                        </a:rPr>
+                        <a:t>RVM </a:t>
+                      </a:r>
+                      <a:r>
+                        <a:rPr lang="en-US" sz="2000" b="0" baseline="0" dirty="0" smtClean="0">
+                          <a:solidFill>
+                            <a:schemeClr val="bg1"/>
+                          </a:solidFill>
+                        </a:rPr>
+                        <a:t>Requirement Wording</a:t>
+                      </a:r>
+                      <a:endParaRPr lang="en-US" sz="2000" b="0" dirty="0">
+                        <a:solidFill>
+                          <a:schemeClr val="bg1"/>
+                        </a:solidFill>
+                      </a:endParaRPr>
+                    </a:p>
+                  </a:txBody>
+                  <a:tcPr marL="100759" marR="100759" marT="50419" marB="50419" anchor="ctr">
+                    <a:lnL w="12700" cap="flat" cmpd="sng" algn="ctr">
+                      <a:solidFill>
+                        <a:schemeClr val="tx1"/>
+                      </a:solidFill>
+                      <a:prstDash val="solid"/>
+                      <a:round/>
+                      <a:headEnd type="none" w="med" len="med"/>
+                      <a:tailEnd type="none" w="med" len="med"/>
+                    </a:lnL>
+                    <a:lnR w="12700" cap="flat" cmpd="sng" algn="ctr">
+                      <a:solidFill>
+                        <a:schemeClr val="tx1"/>
+                      </a:solidFill>
+                      <a:prstDash val="solid"/>
+                      <a:round/>
+                      <a:headEnd type="none" w="med" len="med"/>
+                      <a:tailEnd type="none" w="med" len="med"/>
+                    </a:lnR>
+                    <a:lnT w="12700" cap="flat" cmpd="sng" algn="ctr">
+                      <a:solidFill>
+                        <a:schemeClr val="tx1"/>
+                      </a:solidFill>
+                      <a:prstDash val="solid"/>
+                      <a:round/>
+                      <a:headEnd type="none" w="med" len="med"/>
+                      <a:tailEnd type="none" w="med" len="med"/>
+                    </a:lnT>
+                    <a:lnB w="12700" cap="flat" cmpd="sng" algn="ctr">
+                      <a:solidFill>
+                        <a:schemeClr val="tx1"/>
+                      </a:solidFill>
+                      <a:prstDash val="solid"/>
+                      <a:round/>
+                      <a:headEnd type="none" w="med" len="med"/>
+                      <a:tailEnd type="none" w="med" len="med"/>
+                    </a:lnB>
+                    <a:solidFill>
+                      <a:srgbClr val="0070C0"/>
+                    </a:solidFill>
+                  </a:tcPr>
+                </a:tc>
+                <a:tc>
+                  <a:txBody>
+                    <a:bodyPr/>
+                    <a:lstStyle/>
+                    <a:p>
+                      <a:r>
+                        <a:rPr lang="en-US" sz="2000" b="1" i="1" dirty="0" smtClean="0">
+                          <a:solidFill>
+                            <a:schemeClr val="tx1"/>
+                          </a:solidFill>
+                        </a:rPr>
+                        <a:t>“Jade and Turquoise Shall be Able to Perform a Rendezvous by Decreasing the Relative Displacement Between Each Other to Within 50 meters for at Least</a:t>
+                      </a:r>
+                      <a:r>
+                        <a:rPr lang="en-US" sz="2000" b="1" i="1" baseline="0" dirty="0" smtClean="0">
+                          <a:solidFill>
+                            <a:schemeClr val="tx1"/>
+                          </a:solidFill>
+                        </a:rPr>
+                        <a:t> 5 Orbits</a:t>
+                      </a:r>
+                      <a:r>
+                        <a:rPr lang="en-US" sz="2000" b="1" i="1" dirty="0" smtClean="0">
+                          <a:solidFill>
+                            <a:schemeClr val="tx1"/>
+                          </a:solidFill>
+                        </a:rPr>
+                        <a:t>”</a:t>
+                      </a:r>
+                      <a:endParaRPr lang="en-US" sz="2000" b="1" i="1" dirty="0">
+                        <a:solidFill>
+                          <a:schemeClr val="tx1"/>
+                        </a:solidFill>
+                      </a:endParaRPr>
+                    </a:p>
+                  </a:txBody>
+                  <a:tcPr marL="100759" marR="100759" marT="50419" marB="50419">
+                    <a:lnL w="12700" cap="flat" cmpd="sng" algn="ctr">
+                      <a:solidFill>
+                        <a:schemeClr val="tx1"/>
+                      </a:solidFill>
+                      <a:prstDash val="solid"/>
+                      <a:round/>
+                      <a:headEnd type="none" w="med" len="med"/>
+                      <a:tailEnd type="none" w="med" len="med"/>
+                    </a:lnL>
+                    <a:lnR w="12700" cap="flat" cmpd="sng" algn="ctr">
+                      <a:solidFill>
+                        <a:schemeClr val="tx1"/>
+                      </a:solidFill>
+                      <a:prstDash val="solid"/>
+                      <a:round/>
+                      <a:headEnd type="none" w="med" len="med"/>
+                      <a:tailEnd type="none" w="med" len="med"/>
+                    </a:lnR>
+                    <a:lnT w="12700" cap="flat" cmpd="sng" algn="ctr">
+                      <a:solidFill>
+                        <a:schemeClr val="tx1"/>
+                      </a:solidFill>
+                      <a:prstDash val="solid"/>
+                      <a:round/>
+                      <a:headEnd type="none" w="med" len="med"/>
+                      <a:tailEnd type="none" w="med" len="med"/>
+                    </a:lnT>
+                    <a:lnB w="12700" cap="flat" cmpd="sng" algn="ctr">
+                      <a:solidFill>
+                        <a:schemeClr val="tx1"/>
+                      </a:solidFill>
+                      <a:prstDash val="solid"/>
+                      <a:round/>
+                      <a:headEnd type="none" w="med" len="med"/>
+                      <a:tailEnd type="none" w="med" len="med"/>
+                    </a:lnB>
+                    <a:noFill/>
+                  </a:tcPr>
+                </a:tc>
+              </a:tr>
+              <a:tr h="408954">
+                <a:tc>
+                  <a:txBody>
+                    <a:bodyPr/>
+                    <a:lstStyle/>
+                    <a:p>
+                      <a:r>
+                        <a:rPr lang="en-US" sz="2000" b="0" dirty="0" smtClean="0">
+                          <a:solidFill>
+                            <a:schemeClr val="bg1"/>
+                          </a:solidFill>
+                        </a:rPr>
+                        <a:t>Validation Method</a:t>
+                      </a:r>
+                      <a:endParaRPr lang="en-US" sz="2000" b="0" dirty="0">
+                        <a:solidFill>
+                          <a:schemeClr val="bg1"/>
+                        </a:solidFill>
+                      </a:endParaRPr>
+                    </a:p>
+                  </a:txBody>
+                  <a:tcPr marL="100759" marR="100759" marT="50419" marB="50419" anchor="ctr">
+                    <a:lnL w="12700" cap="flat" cmpd="sng" algn="ctr">
+                      <a:solidFill>
+                        <a:schemeClr val="tx1"/>
+                      </a:solidFill>
+                      <a:prstDash val="solid"/>
+                      <a:round/>
+                      <a:headEnd type="none" w="med" len="med"/>
+                      <a:tailEnd type="none" w="med" len="med"/>
+                    </a:lnL>
+                    <a:lnR w="12700" cap="flat" cmpd="sng" algn="ctr">
+                      <a:solidFill>
+                        <a:schemeClr val="tx1"/>
+                      </a:solidFill>
+                      <a:prstDash val="solid"/>
+                      <a:round/>
+                      <a:headEnd type="none" w="med" len="med"/>
+                      <a:tailEnd type="none" w="med" len="med"/>
+                    </a:lnR>
+                    <a:lnT w="12700" cap="flat" cmpd="sng" algn="ctr">
+                      <a:solidFill>
+                        <a:schemeClr val="tx1"/>
+                      </a:solidFill>
+                      <a:prstDash val="solid"/>
+                      <a:round/>
+                      <a:headEnd type="none" w="med" len="med"/>
+                      <a:tailEnd type="none" w="med" len="med"/>
+                    </a:lnT>
+                    <a:lnB w="12700" cap="flat" cmpd="sng" algn="ctr">
+                      <a:solidFill>
+                        <a:schemeClr val="tx1"/>
+                      </a:solidFill>
+                      <a:prstDash val="solid"/>
+                      <a:round/>
+                      <a:headEnd type="none" w="med" len="med"/>
+                      <a:tailEnd type="none" w="med" len="med"/>
+                    </a:lnB>
+                    <a:solidFill>
+                      <a:srgbClr val="0070C0"/>
+                    </a:solidFill>
+                  </a:tcPr>
+                </a:tc>
+                <a:tc>
+                  <a:txBody>
+                    <a:bodyPr/>
+                    <a:lstStyle/>
+                    <a:p>
+                      <a:r>
+                        <a:rPr lang="en-US" sz="2000" b="1" i="0" dirty="0" smtClean="0">
+                          <a:solidFill>
+                            <a:schemeClr val="tx1"/>
+                          </a:solidFill>
+                        </a:rPr>
+                        <a:t>Analyze</a:t>
+                      </a:r>
+                      <a:endParaRPr lang="en-US" sz="2000" b="1" i="0" dirty="0">
+                        <a:solidFill>
+                          <a:schemeClr val="tx1"/>
+                        </a:solidFill>
+                      </a:endParaRPr>
+                    </a:p>
+                  </a:txBody>
+                  <a:tcPr marL="100759" marR="100759" marT="50419" marB="50419">
+                    <a:lnL w="12700" cap="flat" cmpd="sng" algn="ctr">
+                      <a:solidFill>
+                        <a:schemeClr val="tx1"/>
+                      </a:solidFill>
+                      <a:prstDash val="solid"/>
+                      <a:round/>
+                      <a:headEnd type="none" w="med" len="med"/>
+                      <a:tailEnd type="none" w="med" len="med"/>
+                    </a:lnL>
+                    <a:lnR w="12700" cap="flat" cmpd="sng" algn="ctr">
+                      <a:solidFill>
+                        <a:schemeClr val="tx1"/>
+                      </a:solidFill>
+                      <a:prstDash val="solid"/>
+                      <a:round/>
+                      <a:headEnd type="none" w="med" len="med"/>
+                      <a:tailEnd type="none" w="med" len="med"/>
+                    </a:lnR>
+                    <a:lnT w="12700" cap="flat" cmpd="sng" algn="ctr">
+                      <a:solidFill>
+                        <a:schemeClr val="tx1"/>
+                      </a:solidFill>
+                      <a:prstDash val="solid"/>
+                      <a:round/>
+                      <a:headEnd type="none" w="med" len="med"/>
+                      <a:tailEnd type="none" w="med" len="med"/>
+                    </a:lnT>
+                    <a:lnB w="12700" cap="flat" cmpd="sng" algn="ctr">
+                      <a:solidFill>
+                        <a:schemeClr val="tx1"/>
+                      </a:solidFill>
+                      <a:prstDash val="solid"/>
+                      <a:round/>
+                      <a:headEnd type="none" w="med" len="med"/>
+                      <a:tailEnd type="none" w="med" len="med"/>
+                    </a:lnB>
+                    <a:noFill/>
+                  </a:tcPr>
+                </a:tc>
+              </a:tr>
+            </a:tbl>
+          </a:graphicData>
+        </a:graphic>
+      </p:graphicFrame>
+      <p:sp>
+        <p:nvSpPr>
+          <p:cNvPr id="5" name="TextBox 4"/>
+          <p:cNvSpPr txBox="1"/>
+          <p:nvPr/>
+        </p:nvSpPr>
+        <p:spPr>
+          <a:xfrm>
+            <a:off x="465931" y="2867025"/>
+            <a:ext cx="9152242" cy="2706394"/>
+          </a:xfrm>
+          <a:prstGeom prst="rect">
+            <a:avLst/>
+          </a:prstGeom>
+          <a:noFill/>
+        </p:spPr>
+        <p:txBody>
+          <a:bodyPr wrap="square" lIns="100785" tIns="50393" rIns="100785" bIns="50393" rtlCol="0">
+            <a:spAutoFit/>
+          </a:bodyPr>
+          <a:lstStyle/>
+          <a:p>
+            <a:pPr algn="just"/>
+            <a:r>
+              <a:rPr lang="en-US" sz="2600" b="1" dirty="0" smtClean="0">
+                <a:solidFill>
+                  <a:schemeClr val="tx1"/>
+                </a:solidFill>
+              </a:rPr>
+              <a:t>This requirement comes directly from the Team Bravo RFP and is a key factor in meeting the mission success criteria of the proposed </a:t>
+            </a:r>
+            <a:r>
+              <a:rPr lang="en-US" sz="2600" b="1" dirty="0" smtClean="0">
+                <a:solidFill>
+                  <a:schemeClr val="tx1"/>
+                </a:solidFill>
+              </a:rPr>
+              <a:t>mission.</a:t>
+            </a:r>
+            <a:endParaRPr lang="en-US" sz="2600" b="1" dirty="0" smtClean="0">
+              <a:solidFill>
+                <a:schemeClr val="tx1"/>
+              </a:solidFill>
+            </a:endParaRPr>
+          </a:p>
+          <a:p>
+            <a:pPr algn="just"/>
+            <a:endParaRPr lang="en-US" sz="2600" b="1" dirty="0" smtClean="0">
+              <a:solidFill>
+                <a:schemeClr val="tx1"/>
+              </a:solidFill>
+            </a:endParaRPr>
+          </a:p>
+          <a:p>
+            <a:pPr algn="just"/>
+            <a:r>
+              <a:rPr lang="en-US" sz="2600" b="1" dirty="0" smtClean="0">
+                <a:solidFill>
+                  <a:schemeClr val="tx1"/>
+                </a:solidFill>
+              </a:rPr>
+              <a:t>This process would be executed at the completion of the “Escape” Maneuver, with verification of its completion coming after it has already </a:t>
+            </a:r>
+            <a:r>
+              <a:rPr lang="en-US" sz="2600" b="1" dirty="0" smtClean="0">
+                <a:solidFill>
+                  <a:schemeClr val="tx1"/>
+                </a:solidFill>
+              </a:rPr>
+              <a:t>occurred.</a:t>
+            </a:r>
+            <a:endParaRPr lang="en-US" sz="2600" b="1" dirty="0" smtClean="0">
+              <a:solidFill>
+                <a:schemeClr val="tx1"/>
+              </a:solidFill>
+            </a:endParaRPr>
+          </a:p>
+        </p:txBody>
+      </p:sp>
+    </p:spTree>
+    <p:extLst>
+      <p:ext uri="{BB962C8B-B14F-4D97-AF65-F5344CB8AC3E}">
+        <p14:creationId xmlns:p14="http://schemas.microsoft.com/office/powerpoint/2010/main" xmlns="" val="2711901525"/>
+      </p:ext>
+    </p:extLst>
+  </p:cSld>
+  <p:clrMapOvr>
+    <a:masterClrMapping/>
+  </p:clrMapOvr>
+  <p:timing>
+    <p:tnLst>
+      <p:par>
+        <p:cTn id="1" dur="indefinite" restart="never" nodeType="tmRoot"/>
+      </p:par>
+    </p:tnLst>
+  </p:timing>
+</p:sld>
+</file>
+
+<file path=ppt/slides/slide51.xml><?xml version="1.0" encoding="utf-8"?>
+<p:sld xmlns:a="http://schemas.openxmlformats.org/drawingml/2006/main" xmlns:r="http://schemas.openxmlformats.org/officeDocument/2006/relationships" xmlns:p="http://schemas.openxmlformats.org/presentationml/2006/main">
+  <p:cSld>
+    <p:spTree>
+      <p:nvGrpSpPr>
+        <p:cNvPr id="1" name=""/>
+        <p:cNvGrpSpPr/>
+        <p:nvPr/>
+      </p:nvGrpSpPr>
+      <p:grpSpPr>
+        <a:xfrm>
+          <a:off x="0" y="0"/>
+          <a:ext cx="0" cy="0"/>
+          <a:chOff x="0" y="0"/>
+          <a:chExt cx="0" cy="0"/>
+        </a:xfrm>
+      </p:grpSpPr>
       <p:sp>
         <p:nvSpPr>
           <p:cNvPr id="58370" name="Slide Number Placeholder 5"/>
@@ -42147,7 +42692,7 @@
                 <a:latin typeface="Times New Roman" pitchFamily="16" charset="0"/>
               </a:rPr>
               <a:pPr eaLnBrk="1"/>
-              <a:t>50</a:t>
+              <a:t>51</a:t>
             </a:fld>
             <a:endParaRPr lang="en-US" altLang="en-US">
               <a:solidFill>
@@ -42283,7 +42828,7 @@
 </p:sld>
 </file>
 
-<file path=ppt/slides/slide51.xml><?xml version="1.0" encoding="utf-8"?>
+<file path=ppt/slides/slide52.xml><?xml version="1.0" encoding="utf-8"?>
 <p:sld xmlns:a="http://schemas.openxmlformats.org/drawingml/2006/main" xmlns:r="http://schemas.openxmlformats.org/officeDocument/2006/relationships" xmlns:p="http://schemas.openxmlformats.org/presentationml/2006/main">
   <p:cSld>
     <p:spTree>
@@ -42521,7 +43066,7 @@
                 <a:latin typeface="Times New Roman" pitchFamily="16" charset="0"/>
               </a:rPr>
               <a:pPr eaLnBrk="1"/>
-              <a:t>51</a:t>
+              <a:t>52</a:t>
             </a:fld>
             <a:endParaRPr lang="en-US" altLang="en-US">
               <a:solidFill>

</xml_diff>

<commit_message>
JK, this one is final (it has slide numbers)
</commit_message>
<xml_diff>
--- a/CMQA/Presentations/SRR Presentation.pptx
+++ b/CMQA/Presentations/SRR Presentation.pptx
@@ -12605,233 +12605,30 @@
       </p:pic>
       <p:sp>
         <p:nvSpPr>
-          <p:cNvPr id="7175" name="Slide Number Placeholder 1"/>
+          <p:cNvPr id="8" name="Slide Number Placeholder 7"/>
           <p:cNvSpPr>
             <a:spLocks noGrp="1"/>
           </p:cNvSpPr>
           <p:nvPr>
-            <p:ph type="sldNum" sz="quarter" idx="12"/>
+            <p:ph type="sldNum" idx="12"/>
           </p:nvPr>
         </p:nvSpPr>
-        <p:spPr>
-          <a:noFill/>
-          <a:extLst>
-            <a:ext uri="{91240B29-F687-4F45-9708-019B960494DF}">
-              <a14:hiddenLine xmlns:a14="http://schemas.microsoft.com/office/drawing/2010/main" xmlns="" w="9525">
-                <a:solidFill>
-                  <a:srgbClr val="808080"/>
-                </a:solidFill>
-                <a:round/>
-                <a:headEnd/>
-                <a:tailEnd/>
-              </a14:hiddenLine>
-            </a:ext>
-          </a:extLst>
-        </p:spPr>
+        <p:spPr/>
         <p:txBody>
           <a:bodyPr/>
-          <a:lstStyle>
-            <a:lvl1pPr eaLnBrk="0">
-              <a:tabLst>
-                <a:tab pos="723900" algn="l"/>
-                <a:tab pos="1447800" algn="l"/>
-                <a:tab pos="2171700" algn="l"/>
-              </a:tabLst>
-              <a:defRPr>
-                <a:solidFill>
-                  <a:schemeClr val="bg1"/>
-                </a:solidFill>
-                <a:latin typeface="Arial" charset="0"/>
-                <a:ea typeface="Microsoft YaHei" charset="-122"/>
-              </a:defRPr>
-            </a:lvl1pPr>
-            <a:lvl2pPr eaLnBrk="0">
-              <a:tabLst>
-                <a:tab pos="723900" algn="l"/>
-                <a:tab pos="1447800" algn="l"/>
-                <a:tab pos="2171700" algn="l"/>
-              </a:tabLst>
-              <a:defRPr>
-                <a:solidFill>
-                  <a:schemeClr val="bg1"/>
-                </a:solidFill>
-                <a:latin typeface="Arial" charset="0"/>
-                <a:ea typeface="Microsoft YaHei" charset="-122"/>
-              </a:defRPr>
-            </a:lvl2pPr>
-            <a:lvl3pPr eaLnBrk="0">
-              <a:tabLst>
-                <a:tab pos="723900" algn="l"/>
-                <a:tab pos="1447800" algn="l"/>
-                <a:tab pos="2171700" algn="l"/>
-              </a:tabLst>
-              <a:defRPr>
-                <a:solidFill>
-                  <a:schemeClr val="bg1"/>
-                </a:solidFill>
-                <a:latin typeface="Arial" charset="0"/>
-                <a:ea typeface="Microsoft YaHei" charset="-122"/>
-              </a:defRPr>
-            </a:lvl3pPr>
-            <a:lvl4pPr eaLnBrk="0">
-              <a:tabLst>
-                <a:tab pos="723900" algn="l"/>
-                <a:tab pos="1447800" algn="l"/>
-                <a:tab pos="2171700" algn="l"/>
-              </a:tabLst>
-              <a:defRPr>
-                <a:solidFill>
-                  <a:schemeClr val="bg1"/>
-                </a:solidFill>
-                <a:latin typeface="Arial" charset="0"/>
-                <a:ea typeface="Microsoft YaHei" charset="-122"/>
-              </a:defRPr>
-            </a:lvl4pPr>
-            <a:lvl5pPr eaLnBrk="0">
-              <a:tabLst>
-                <a:tab pos="723900" algn="l"/>
-                <a:tab pos="1447800" algn="l"/>
-                <a:tab pos="2171700" algn="l"/>
-              </a:tabLst>
-              <a:defRPr>
-                <a:solidFill>
-                  <a:schemeClr val="bg1"/>
-                </a:solidFill>
-                <a:latin typeface="Arial" charset="0"/>
-                <a:ea typeface="Microsoft YaHei" charset="-122"/>
-              </a:defRPr>
-            </a:lvl5pPr>
-            <a:lvl6pPr marL="2514600" indent="-228600" defTabSz="457200" eaLnBrk="0" fontAlgn="base" hangingPunct="0">
-              <a:lnSpc>
-                <a:spcPct val="93000"/>
-              </a:lnSpc>
-              <a:spcBef>
-                <a:spcPct val="0"/>
-              </a:spcBef>
-              <a:spcAft>
-                <a:spcPct val="0"/>
-              </a:spcAft>
-              <a:buClr>
-                <a:srgbClr val="000000"/>
-              </a:buClr>
-              <a:buSzPct val="100000"/>
-              <a:buFont typeface="Times New Roman" pitchFamily="16" charset="0"/>
-              <a:tabLst>
-                <a:tab pos="723900" algn="l"/>
-                <a:tab pos="1447800" algn="l"/>
-                <a:tab pos="2171700" algn="l"/>
-              </a:tabLst>
-              <a:defRPr>
-                <a:solidFill>
-                  <a:schemeClr val="bg1"/>
-                </a:solidFill>
-                <a:latin typeface="Arial" charset="0"/>
-                <a:ea typeface="Microsoft YaHei" charset="-122"/>
-              </a:defRPr>
-            </a:lvl6pPr>
-            <a:lvl7pPr marL="2971800" indent="-228600" defTabSz="457200" eaLnBrk="0" fontAlgn="base" hangingPunct="0">
-              <a:lnSpc>
-                <a:spcPct val="93000"/>
-              </a:lnSpc>
-              <a:spcBef>
-                <a:spcPct val="0"/>
-              </a:spcBef>
-              <a:spcAft>
-                <a:spcPct val="0"/>
-              </a:spcAft>
-              <a:buClr>
-                <a:srgbClr val="000000"/>
-              </a:buClr>
-              <a:buSzPct val="100000"/>
-              <a:buFont typeface="Times New Roman" pitchFamily="16" charset="0"/>
-              <a:tabLst>
-                <a:tab pos="723900" algn="l"/>
-                <a:tab pos="1447800" algn="l"/>
-                <a:tab pos="2171700" algn="l"/>
-              </a:tabLst>
-              <a:defRPr>
-                <a:solidFill>
-                  <a:schemeClr val="bg1"/>
-                </a:solidFill>
-                <a:latin typeface="Arial" charset="0"/>
-                <a:ea typeface="Microsoft YaHei" charset="-122"/>
-              </a:defRPr>
-            </a:lvl7pPr>
-            <a:lvl8pPr marL="3429000" indent="-228600" defTabSz="457200" eaLnBrk="0" fontAlgn="base" hangingPunct="0">
-              <a:lnSpc>
-                <a:spcPct val="93000"/>
-              </a:lnSpc>
-              <a:spcBef>
-                <a:spcPct val="0"/>
-              </a:spcBef>
-              <a:spcAft>
-                <a:spcPct val="0"/>
-              </a:spcAft>
-              <a:buClr>
-                <a:srgbClr val="000000"/>
-              </a:buClr>
-              <a:buSzPct val="100000"/>
-              <a:buFont typeface="Times New Roman" pitchFamily="16" charset="0"/>
-              <a:tabLst>
-                <a:tab pos="723900" algn="l"/>
-                <a:tab pos="1447800" algn="l"/>
-                <a:tab pos="2171700" algn="l"/>
-              </a:tabLst>
-              <a:defRPr>
-                <a:solidFill>
-                  <a:schemeClr val="bg1"/>
-                </a:solidFill>
-                <a:latin typeface="Arial" charset="0"/>
-                <a:ea typeface="Microsoft YaHei" charset="-122"/>
-              </a:defRPr>
-            </a:lvl8pPr>
-            <a:lvl9pPr marL="3886200" indent="-228600" defTabSz="457200" eaLnBrk="0" fontAlgn="base" hangingPunct="0">
-              <a:lnSpc>
-                <a:spcPct val="93000"/>
-              </a:lnSpc>
-              <a:spcBef>
-                <a:spcPct val="0"/>
-              </a:spcBef>
-              <a:spcAft>
-                <a:spcPct val="0"/>
-              </a:spcAft>
-              <a:buClr>
-                <a:srgbClr val="000000"/>
-              </a:buClr>
-              <a:buSzPct val="100000"/>
-              <a:buFont typeface="Times New Roman" pitchFamily="16" charset="0"/>
-              <a:tabLst>
-                <a:tab pos="723900" algn="l"/>
-                <a:tab pos="1447800" algn="l"/>
-                <a:tab pos="2171700" algn="l"/>
-              </a:tabLst>
-              <a:defRPr>
-                <a:solidFill>
-                  <a:schemeClr val="bg1"/>
-                </a:solidFill>
-                <a:latin typeface="Arial" charset="0"/>
-                <a:ea typeface="Microsoft YaHei" charset="-122"/>
-              </a:defRPr>
-            </a:lvl9pPr>
-          </a:lstStyle>
+          <a:lstStyle/>
           <a:p>
-            <a:pPr eaLnBrk="1"/>
-            <a:fld id="{1D81E474-CF4D-4E5F-9AE3-310CEEB508F0}" type="slidenum">
-              <a:rPr lang="en-US" altLang="en-US" smtClean="0">
-                <a:solidFill>
-                  <a:srgbClr val="FFFFFF"/>
-                </a:solidFill>
-                <a:latin typeface="Times New Roman" pitchFamily="16" charset="0"/>
-              </a:rPr>
-              <a:pPr eaLnBrk="1"/>
+            <a:pPr>
+              <a:defRPr/>
+            </a:pPr>
+            <a:fld id="{E55F156C-F0B7-45BC-A5A9-F8C99B9FDB7D}" type="slidenum">
+              <a:rPr lang="en-US" altLang="en-US" smtClean="0"/>
+              <a:pPr>
+                <a:defRPr/>
+              </a:pPr>
               <a:t>1</a:t>
             </a:fld>
-            <a:endParaRPr lang="en-US" altLang="en-US" smtClean="0">
-              <a:solidFill>
-                <a:srgbClr val="FFFFFF"/>
-              </a:solidFill>
-              <a:latin typeface="Times New Roman" pitchFamily="16" charset="0"/>
-            </a:endParaRPr>
+            <a:endParaRPr lang="en-US" altLang="en-US" dirty="0"/>
           </a:p>
         </p:txBody>
       </p:sp>
@@ -12982,35 +12779,6 @@
           </a:p>
         </p:txBody>
       </p:sp>
-      <p:sp>
-        <p:nvSpPr>
-          <p:cNvPr id="4" name="Slide Number Placeholder 3"/>
-          <p:cNvSpPr>
-            <a:spLocks noGrp="1"/>
-          </p:cNvSpPr>
-          <p:nvPr>
-            <p:ph type="sldNum" idx="12"/>
-          </p:nvPr>
-        </p:nvSpPr>
-        <p:spPr/>
-        <p:txBody>
-          <a:bodyPr/>
-          <a:lstStyle/>
-          <a:p>
-            <a:pPr>
-              <a:defRPr/>
-            </a:pPr>
-            <a:fld id="{8C6E2802-7AC4-44BB-B0A5-E12803E0614A}" type="slidenum">
-              <a:rPr lang="en-US" altLang="en-US" smtClean="0"/>
-              <a:pPr>
-                <a:defRPr/>
-              </a:pPr>
-              <a:t>10</a:t>
-            </a:fld>
-            <a:endParaRPr lang="en-US" altLang="en-US" dirty="0"/>
-          </a:p>
-        </p:txBody>
-      </p:sp>
       <p:graphicFrame>
         <p:nvGraphicFramePr>
           <p:cNvPr id="5" name="Table 4"/>
@@ -13978,6 +13746,35 @@
           </a:graphicData>
         </a:graphic>
       </p:graphicFrame>
+      <p:sp>
+        <p:nvSpPr>
+          <p:cNvPr id="6" name="Slide Number Placeholder 5"/>
+          <p:cNvSpPr>
+            <a:spLocks noGrp="1"/>
+          </p:cNvSpPr>
+          <p:nvPr>
+            <p:ph type="sldNum" idx="12"/>
+          </p:nvPr>
+        </p:nvSpPr>
+        <p:spPr/>
+        <p:txBody>
+          <a:bodyPr/>
+          <a:lstStyle/>
+          <a:p>
+            <a:pPr>
+              <a:defRPr/>
+            </a:pPr>
+            <a:fld id="{8C6E2802-7AC4-44BB-B0A5-E12803E0614A}" type="slidenum">
+              <a:rPr lang="en-US" altLang="en-US" smtClean="0"/>
+              <a:pPr>
+                <a:defRPr/>
+              </a:pPr>
+              <a:t>10</a:t>
+            </a:fld>
+            <a:endParaRPr lang="en-US" altLang="en-US" dirty="0"/>
+          </a:p>
+        </p:txBody>
+      </p:sp>
     </p:spTree>
   </p:cSld>
   <p:clrMapOvr>
@@ -14537,7 +14334,7 @@
       </p:sp>
       <p:sp>
         <p:nvSpPr>
-          <p:cNvPr id="8" name="Slide Number Placeholder 7"/>
+          <p:cNvPr id="9" name="Slide Number Placeholder 8"/>
           <p:cNvSpPr>
             <a:spLocks noGrp="1"/>
           </p:cNvSpPr>
@@ -15124,7 +14921,7 @@
       </p:sp>
       <p:sp>
         <p:nvSpPr>
-          <p:cNvPr id="8" name="Slide Number Placeholder 7"/>
+          <p:cNvPr id="9" name="Slide Number Placeholder 8"/>
           <p:cNvSpPr>
             <a:spLocks noGrp="1"/>
           </p:cNvSpPr>
@@ -15719,7 +15516,7 @@
       </p:sp>
       <p:sp>
         <p:nvSpPr>
-          <p:cNvPr id="8" name="Slide Number Placeholder 7"/>
+          <p:cNvPr id="9" name="Slide Number Placeholder 8"/>
           <p:cNvSpPr>
             <a:spLocks noGrp="1"/>
           </p:cNvSpPr>
@@ -16322,7 +16119,7 @@
       </p:sp>
       <p:sp>
         <p:nvSpPr>
-          <p:cNvPr id="8" name="Slide Number Placeholder 7"/>
+          <p:cNvPr id="9" name="Slide Number Placeholder 8"/>
           <p:cNvSpPr>
             <a:spLocks noGrp="1"/>
           </p:cNvSpPr>
@@ -16917,7 +16714,7 @@
       </p:sp>
       <p:sp>
         <p:nvSpPr>
-          <p:cNvPr id="8" name="Slide Number Placeholder 7"/>
+          <p:cNvPr id="9" name="Slide Number Placeholder 8"/>
           <p:cNvSpPr>
             <a:spLocks noGrp="1"/>
           </p:cNvSpPr>
@@ -17520,7 +17317,7 @@
       </p:sp>
       <p:sp>
         <p:nvSpPr>
-          <p:cNvPr id="8" name="Slide Number Placeholder 7"/>
+          <p:cNvPr id="9" name="Slide Number Placeholder 8"/>
           <p:cNvSpPr>
             <a:spLocks noGrp="1"/>
           </p:cNvSpPr>
@@ -18091,7 +17888,7 @@
       </p:sp>
       <p:sp>
         <p:nvSpPr>
-          <p:cNvPr id="8" name="Slide Number Placeholder 7"/>
+          <p:cNvPr id="9" name="Slide Number Placeholder 8"/>
           <p:cNvSpPr>
             <a:spLocks noGrp="1"/>
           </p:cNvSpPr>
@@ -18931,7 +18728,7 @@
       </p:sp>
       <p:sp>
         <p:nvSpPr>
-          <p:cNvPr id="12" name="Slide Number Placeholder 11"/>
+          <p:cNvPr id="13" name="Slide Number Placeholder 12"/>
           <p:cNvSpPr>
             <a:spLocks noGrp="1"/>
           </p:cNvSpPr>
@@ -19560,6 +19357,35 @@
           </a:p>
         </p:txBody>
       </p:sp>
+      <p:sp>
+        <p:nvSpPr>
+          <p:cNvPr id="6" name="Slide Number Placeholder 5"/>
+          <p:cNvSpPr>
+            <a:spLocks noGrp="1"/>
+          </p:cNvSpPr>
+          <p:nvPr>
+            <p:ph type="sldNum" idx="12"/>
+          </p:nvPr>
+        </p:nvSpPr>
+        <p:spPr/>
+        <p:txBody>
+          <a:bodyPr/>
+          <a:lstStyle/>
+          <a:p>
+            <a:pPr>
+              <a:defRPr/>
+            </a:pPr>
+            <a:fld id="{8C6E2802-7AC4-44BB-B0A5-E12803E0614A}" type="slidenum">
+              <a:rPr lang="en-US" altLang="en-US" smtClean="0"/>
+              <a:pPr>
+                <a:defRPr/>
+              </a:pPr>
+              <a:t>19</a:t>
+            </a:fld>
+            <a:endParaRPr lang="en-US" altLang="en-US" dirty="0"/>
+          </a:p>
+        </p:txBody>
+      </p:sp>
     </p:spTree>
     <p:extLst>
       <p:ext uri="{BB962C8B-B14F-4D97-AF65-F5344CB8AC3E}">
@@ -19597,238 +19423,6 @@
           <a:chExt cx="0" cy="0"/>
         </a:xfrm>
       </p:grpSpPr>
-      <p:sp>
-        <p:nvSpPr>
-          <p:cNvPr id="8194" name="Slide Number Placeholder 5"/>
-          <p:cNvSpPr>
-            <a:spLocks noGrp="1"/>
-          </p:cNvSpPr>
-          <p:nvPr>
-            <p:ph type="sldNum" sz="quarter" idx="12"/>
-          </p:nvPr>
-        </p:nvSpPr>
-        <p:spPr>
-          <a:noFill/>
-          <a:extLst>
-            <a:ext uri="{91240B29-F687-4F45-9708-019B960494DF}">
-              <a14:hiddenLine xmlns:a14="http://schemas.microsoft.com/office/drawing/2010/main" xmlns="" w="9525">
-                <a:solidFill>
-                  <a:srgbClr val="808080"/>
-                </a:solidFill>
-                <a:round/>
-                <a:headEnd/>
-                <a:tailEnd/>
-              </a14:hiddenLine>
-            </a:ext>
-          </a:extLst>
-        </p:spPr>
-        <p:txBody>
-          <a:bodyPr/>
-          <a:lstStyle>
-            <a:lvl1pPr eaLnBrk="0">
-              <a:tabLst>
-                <a:tab pos="723900" algn="l"/>
-                <a:tab pos="1447800" algn="l"/>
-                <a:tab pos="2171700" algn="l"/>
-              </a:tabLst>
-              <a:defRPr>
-                <a:solidFill>
-                  <a:schemeClr val="bg1"/>
-                </a:solidFill>
-                <a:latin typeface="Arial" charset="0"/>
-                <a:ea typeface="Microsoft YaHei" charset="-122"/>
-              </a:defRPr>
-            </a:lvl1pPr>
-            <a:lvl2pPr eaLnBrk="0">
-              <a:tabLst>
-                <a:tab pos="723900" algn="l"/>
-                <a:tab pos="1447800" algn="l"/>
-                <a:tab pos="2171700" algn="l"/>
-              </a:tabLst>
-              <a:defRPr>
-                <a:solidFill>
-                  <a:schemeClr val="bg1"/>
-                </a:solidFill>
-                <a:latin typeface="Arial" charset="0"/>
-                <a:ea typeface="Microsoft YaHei" charset="-122"/>
-              </a:defRPr>
-            </a:lvl2pPr>
-            <a:lvl3pPr eaLnBrk="0">
-              <a:tabLst>
-                <a:tab pos="723900" algn="l"/>
-                <a:tab pos="1447800" algn="l"/>
-                <a:tab pos="2171700" algn="l"/>
-              </a:tabLst>
-              <a:defRPr>
-                <a:solidFill>
-                  <a:schemeClr val="bg1"/>
-                </a:solidFill>
-                <a:latin typeface="Arial" charset="0"/>
-                <a:ea typeface="Microsoft YaHei" charset="-122"/>
-              </a:defRPr>
-            </a:lvl3pPr>
-            <a:lvl4pPr eaLnBrk="0">
-              <a:tabLst>
-                <a:tab pos="723900" algn="l"/>
-                <a:tab pos="1447800" algn="l"/>
-                <a:tab pos="2171700" algn="l"/>
-              </a:tabLst>
-              <a:defRPr>
-                <a:solidFill>
-                  <a:schemeClr val="bg1"/>
-                </a:solidFill>
-                <a:latin typeface="Arial" charset="0"/>
-                <a:ea typeface="Microsoft YaHei" charset="-122"/>
-              </a:defRPr>
-            </a:lvl4pPr>
-            <a:lvl5pPr eaLnBrk="0">
-              <a:tabLst>
-                <a:tab pos="723900" algn="l"/>
-                <a:tab pos="1447800" algn="l"/>
-                <a:tab pos="2171700" algn="l"/>
-              </a:tabLst>
-              <a:defRPr>
-                <a:solidFill>
-                  <a:schemeClr val="bg1"/>
-                </a:solidFill>
-                <a:latin typeface="Arial" charset="0"/>
-                <a:ea typeface="Microsoft YaHei" charset="-122"/>
-              </a:defRPr>
-            </a:lvl5pPr>
-            <a:lvl6pPr marL="2514600" indent="-228600" defTabSz="457200" eaLnBrk="0" fontAlgn="base" hangingPunct="0">
-              <a:lnSpc>
-                <a:spcPct val="93000"/>
-              </a:lnSpc>
-              <a:spcBef>
-                <a:spcPct val="0"/>
-              </a:spcBef>
-              <a:spcAft>
-                <a:spcPct val="0"/>
-              </a:spcAft>
-              <a:buClr>
-                <a:srgbClr val="000000"/>
-              </a:buClr>
-              <a:buSzPct val="100000"/>
-              <a:buFont typeface="Times New Roman" pitchFamily="16" charset="0"/>
-              <a:tabLst>
-                <a:tab pos="723900" algn="l"/>
-                <a:tab pos="1447800" algn="l"/>
-                <a:tab pos="2171700" algn="l"/>
-              </a:tabLst>
-              <a:defRPr>
-                <a:solidFill>
-                  <a:schemeClr val="bg1"/>
-                </a:solidFill>
-                <a:latin typeface="Arial" charset="0"/>
-                <a:ea typeface="Microsoft YaHei" charset="-122"/>
-              </a:defRPr>
-            </a:lvl6pPr>
-            <a:lvl7pPr marL="2971800" indent="-228600" defTabSz="457200" eaLnBrk="0" fontAlgn="base" hangingPunct="0">
-              <a:lnSpc>
-                <a:spcPct val="93000"/>
-              </a:lnSpc>
-              <a:spcBef>
-                <a:spcPct val="0"/>
-              </a:spcBef>
-              <a:spcAft>
-                <a:spcPct val="0"/>
-              </a:spcAft>
-              <a:buClr>
-                <a:srgbClr val="000000"/>
-              </a:buClr>
-              <a:buSzPct val="100000"/>
-              <a:buFont typeface="Times New Roman" pitchFamily="16" charset="0"/>
-              <a:tabLst>
-                <a:tab pos="723900" algn="l"/>
-                <a:tab pos="1447800" algn="l"/>
-                <a:tab pos="2171700" algn="l"/>
-              </a:tabLst>
-              <a:defRPr>
-                <a:solidFill>
-                  <a:schemeClr val="bg1"/>
-                </a:solidFill>
-                <a:latin typeface="Arial" charset="0"/>
-                <a:ea typeface="Microsoft YaHei" charset="-122"/>
-              </a:defRPr>
-            </a:lvl7pPr>
-            <a:lvl8pPr marL="3429000" indent="-228600" defTabSz="457200" eaLnBrk="0" fontAlgn="base" hangingPunct="0">
-              <a:lnSpc>
-                <a:spcPct val="93000"/>
-              </a:lnSpc>
-              <a:spcBef>
-                <a:spcPct val="0"/>
-              </a:spcBef>
-              <a:spcAft>
-                <a:spcPct val="0"/>
-              </a:spcAft>
-              <a:buClr>
-                <a:srgbClr val="000000"/>
-              </a:buClr>
-              <a:buSzPct val="100000"/>
-              <a:buFont typeface="Times New Roman" pitchFamily="16" charset="0"/>
-              <a:tabLst>
-                <a:tab pos="723900" algn="l"/>
-                <a:tab pos="1447800" algn="l"/>
-                <a:tab pos="2171700" algn="l"/>
-              </a:tabLst>
-              <a:defRPr>
-                <a:solidFill>
-                  <a:schemeClr val="bg1"/>
-                </a:solidFill>
-                <a:latin typeface="Arial" charset="0"/>
-                <a:ea typeface="Microsoft YaHei" charset="-122"/>
-              </a:defRPr>
-            </a:lvl8pPr>
-            <a:lvl9pPr marL="3886200" indent="-228600" defTabSz="457200" eaLnBrk="0" fontAlgn="base" hangingPunct="0">
-              <a:lnSpc>
-                <a:spcPct val="93000"/>
-              </a:lnSpc>
-              <a:spcBef>
-                <a:spcPct val="0"/>
-              </a:spcBef>
-              <a:spcAft>
-                <a:spcPct val="0"/>
-              </a:spcAft>
-              <a:buClr>
-                <a:srgbClr val="000000"/>
-              </a:buClr>
-              <a:buSzPct val="100000"/>
-              <a:buFont typeface="Times New Roman" pitchFamily="16" charset="0"/>
-              <a:tabLst>
-                <a:tab pos="723900" algn="l"/>
-                <a:tab pos="1447800" algn="l"/>
-                <a:tab pos="2171700" algn="l"/>
-              </a:tabLst>
-              <a:defRPr>
-                <a:solidFill>
-                  <a:schemeClr val="bg1"/>
-                </a:solidFill>
-                <a:latin typeface="Arial" charset="0"/>
-                <a:ea typeface="Microsoft YaHei" charset="-122"/>
-              </a:defRPr>
-            </a:lvl9pPr>
-          </a:lstStyle>
-          <a:p>
-            <a:pPr eaLnBrk="1"/>
-            <a:fld id="{AE115C73-9D96-471C-845A-7CA50A1BB96D}" type="slidenum">
-              <a:rPr lang="en-US" altLang="en-US">
-                <a:solidFill>
-                  <a:srgbClr val="FFFFFF"/>
-                </a:solidFill>
-                <a:latin typeface="Times New Roman" pitchFamily="16" charset="0"/>
-              </a:rPr>
-              <a:pPr eaLnBrk="1"/>
-              <a:t>2</a:t>
-            </a:fld>
-            <a:endParaRPr lang="en-US" altLang="en-US">
-              <a:solidFill>
-                <a:srgbClr val="FFFFFF"/>
-              </a:solidFill>
-              <a:latin typeface="Times New Roman" pitchFamily="16" charset="0"/>
-            </a:endParaRPr>
-          </a:p>
-        </p:txBody>
-      </p:sp>
       <p:sp>
         <p:nvSpPr>
           <p:cNvPr id="8195" name="Rectangle 1"/>
@@ -20105,6 +19699,35 @@
           </a:p>
         </p:txBody>
       </p:sp>
+      <p:sp>
+        <p:nvSpPr>
+          <p:cNvPr id="5" name="Slide Number Placeholder 4"/>
+          <p:cNvSpPr>
+            <a:spLocks noGrp="1"/>
+          </p:cNvSpPr>
+          <p:nvPr>
+            <p:ph type="sldNum" idx="12"/>
+          </p:nvPr>
+        </p:nvSpPr>
+        <p:spPr/>
+        <p:txBody>
+          <a:bodyPr/>
+          <a:lstStyle/>
+          <a:p>
+            <a:pPr>
+              <a:defRPr/>
+            </a:pPr>
+            <a:fld id="{8C6E2802-7AC4-44BB-B0A5-E12803E0614A}" type="slidenum">
+              <a:rPr lang="en-US" altLang="en-US" smtClean="0"/>
+              <a:pPr>
+                <a:defRPr/>
+              </a:pPr>
+              <a:t>2</a:t>
+            </a:fld>
+            <a:endParaRPr lang="en-US" altLang="en-US" dirty="0"/>
+          </a:p>
+        </p:txBody>
+      </p:sp>
     </p:spTree>
   </p:cSld>
   <p:clrMapOvr>
@@ -20691,6 +20314,35 @@
           </a:p>
         </p:txBody>
       </p:sp>
+      <p:sp>
+        <p:nvSpPr>
+          <p:cNvPr id="6" name="Slide Number Placeholder 5"/>
+          <p:cNvSpPr>
+            <a:spLocks noGrp="1"/>
+          </p:cNvSpPr>
+          <p:nvPr>
+            <p:ph type="sldNum" idx="12"/>
+          </p:nvPr>
+        </p:nvSpPr>
+        <p:spPr/>
+        <p:txBody>
+          <a:bodyPr/>
+          <a:lstStyle/>
+          <a:p>
+            <a:pPr>
+              <a:defRPr/>
+            </a:pPr>
+            <a:fld id="{8C6E2802-7AC4-44BB-B0A5-E12803E0614A}" type="slidenum">
+              <a:rPr lang="en-US" altLang="en-US" smtClean="0"/>
+              <a:pPr>
+                <a:defRPr/>
+              </a:pPr>
+              <a:t>20</a:t>
+            </a:fld>
+            <a:endParaRPr lang="en-US" altLang="en-US" dirty="0"/>
+          </a:p>
+        </p:txBody>
+      </p:sp>
     </p:spTree>
     <p:extLst>
       <p:ext uri="{BB962C8B-B14F-4D97-AF65-F5344CB8AC3E}">
@@ -21310,6 +20962,35 @@
                 <a:schemeClr val="tx1"/>
               </a:solidFill>
             </a:endParaRPr>
+          </a:p>
+        </p:txBody>
+      </p:sp>
+      <p:sp>
+        <p:nvSpPr>
+          <p:cNvPr id="6" name="Slide Number Placeholder 5"/>
+          <p:cNvSpPr>
+            <a:spLocks noGrp="1"/>
+          </p:cNvSpPr>
+          <p:nvPr>
+            <p:ph type="sldNum" idx="12"/>
+          </p:nvPr>
+        </p:nvSpPr>
+        <p:spPr/>
+        <p:txBody>
+          <a:bodyPr/>
+          <a:lstStyle/>
+          <a:p>
+            <a:pPr>
+              <a:defRPr/>
+            </a:pPr>
+            <a:fld id="{8C6E2802-7AC4-44BB-B0A5-E12803E0614A}" type="slidenum">
+              <a:rPr lang="en-US" altLang="en-US" smtClean="0"/>
+              <a:pPr>
+                <a:defRPr/>
+              </a:pPr>
+              <a:t>21</a:t>
+            </a:fld>
+            <a:endParaRPr lang="en-US" altLang="en-US" dirty="0"/>
           </a:p>
         </p:txBody>
       </p:sp>
@@ -21951,6 +21632,35 @@
           </a:p>
         </p:txBody>
       </p:sp>
+      <p:sp>
+        <p:nvSpPr>
+          <p:cNvPr id="6" name="Slide Number Placeholder 5"/>
+          <p:cNvSpPr>
+            <a:spLocks noGrp="1"/>
+          </p:cNvSpPr>
+          <p:nvPr>
+            <p:ph type="sldNum" idx="12"/>
+          </p:nvPr>
+        </p:nvSpPr>
+        <p:spPr/>
+        <p:txBody>
+          <a:bodyPr/>
+          <a:lstStyle/>
+          <a:p>
+            <a:pPr>
+              <a:defRPr/>
+            </a:pPr>
+            <a:fld id="{8C6E2802-7AC4-44BB-B0A5-E12803E0614A}" type="slidenum">
+              <a:rPr lang="en-US" altLang="en-US" smtClean="0"/>
+              <a:pPr>
+                <a:defRPr/>
+              </a:pPr>
+              <a:t>22</a:t>
+            </a:fld>
+            <a:endParaRPr lang="en-US" altLang="en-US" dirty="0"/>
+          </a:p>
+        </p:txBody>
+      </p:sp>
     </p:spTree>
     <p:extLst>
       <p:ext uri="{BB962C8B-B14F-4D97-AF65-F5344CB8AC3E}">
@@ -22534,6 +22244,35 @@
                 <a:schemeClr val="tx1"/>
               </a:solidFill>
             </a:endParaRPr>
+          </a:p>
+        </p:txBody>
+      </p:sp>
+      <p:sp>
+        <p:nvSpPr>
+          <p:cNvPr id="6" name="Slide Number Placeholder 5"/>
+          <p:cNvSpPr>
+            <a:spLocks noGrp="1"/>
+          </p:cNvSpPr>
+          <p:nvPr>
+            <p:ph type="sldNum" idx="12"/>
+          </p:nvPr>
+        </p:nvSpPr>
+        <p:spPr/>
+        <p:txBody>
+          <a:bodyPr/>
+          <a:lstStyle/>
+          <a:p>
+            <a:pPr>
+              <a:defRPr/>
+            </a:pPr>
+            <a:fld id="{8C6E2802-7AC4-44BB-B0A5-E12803E0614A}" type="slidenum">
+              <a:rPr lang="en-US" altLang="en-US" smtClean="0"/>
+              <a:pPr>
+                <a:defRPr/>
+              </a:pPr>
+              <a:t>23</a:t>
+            </a:fld>
+            <a:endParaRPr lang="en-US" altLang="en-US" dirty="0"/>
           </a:p>
         </p:txBody>
       </p:sp>
@@ -23104,6 +22843,35 @@
                 <a:schemeClr val="tx1"/>
               </a:solidFill>
             </a:endParaRPr>
+          </a:p>
+        </p:txBody>
+      </p:sp>
+      <p:sp>
+        <p:nvSpPr>
+          <p:cNvPr id="6" name="Slide Number Placeholder 5"/>
+          <p:cNvSpPr>
+            <a:spLocks noGrp="1"/>
+          </p:cNvSpPr>
+          <p:nvPr>
+            <p:ph type="sldNum" idx="12"/>
+          </p:nvPr>
+        </p:nvSpPr>
+        <p:spPr/>
+        <p:txBody>
+          <a:bodyPr/>
+          <a:lstStyle/>
+          <a:p>
+            <a:pPr>
+              <a:defRPr/>
+            </a:pPr>
+            <a:fld id="{8C6E2802-7AC4-44BB-B0A5-E12803E0614A}" type="slidenum">
+              <a:rPr lang="en-US" altLang="en-US" smtClean="0"/>
+              <a:pPr>
+                <a:defRPr/>
+              </a:pPr>
+              <a:t>24</a:t>
+            </a:fld>
+            <a:endParaRPr lang="en-US" altLang="en-US" dirty="0"/>
           </a:p>
         </p:txBody>
       </p:sp>
@@ -23778,6 +23546,35 @@
           </a:prstGeom>
         </p:spPr>
       </p:pic>
+      <p:sp>
+        <p:nvSpPr>
+          <p:cNvPr id="6" name="Slide Number Placeholder 5"/>
+          <p:cNvSpPr>
+            <a:spLocks noGrp="1"/>
+          </p:cNvSpPr>
+          <p:nvPr>
+            <p:ph type="sldNum" idx="12"/>
+          </p:nvPr>
+        </p:nvSpPr>
+        <p:spPr/>
+        <p:txBody>
+          <a:bodyPr/>
+          <a:lstStyle/>
+          <a:p>
+            <a:pPr>
+              <a:defRPr/>
+            </a:pPr>
+            <a:fld id="{8C6E2802-7AC4-44BB-B0A5-E12803E0614A}" type="slidenum">
+              <a:rPr lang="en-US" altLang="en-US" smtClean="0"/>
+              <a:pPr>
+                <a:defRPr/>
+              </a:pPr>
+              <a:t>25</a:t>
+            </a:fld>
+            <a:endParaRPr lang="en-US" altLang="en-US" dirty="0"/>
+          </a:p>
+        </p:txBody>
+      </p:sp>
     </p:spTree>
     <p:extLst>
       <p:ext uri="{BB962C8B-B14F-4D97-AF65-F5344CB8AC3E}">
@@ -24329,6 +24126,35 @@
                 <a:schemeClr val="tx1"/>
               </a:solidFill>
             </a:endParaRPr>
+          </a:p>
+        </p:txBody>
+      </p:sp>
+      <p:sp>
+        <p:nvSpPr>
+          <p:cNvPr id="6" name="Slide Number Placeholder 5"/>
+          <p:cNvSpPr>
+            <a:spLocks noGrp="1"/>
+          </p:cNvSpPr>
+          <p:nvPr>
+            <p:ph type="sldNum" idx="12"/>
+          </p:nvPr>
+        </p:nvSpPr>
+        <p:spPr/>
+        <p:txBody>
+          <a:bodyPr/>
+          <a:lstStyle/>
+          <a:p>
+            <a:pPr>
+              <a:defRPr/>
+            </a:pPr>
+            <a:fld id="{8C6E2802-7AC4-44BB-B0A5-E12803E0614A}" type="slidenum">
+              <a:rPr lang="en-US" altLang="en-US" smtClean="0"/>
+              <a:pPr>
+                <a:defRPr/>
+              </a:pPr>
+              <a:t>26</a:t>
+            </a:fld>
+            <a:endParaRPr lang="en-US" altLang="en-US" dirty="0"/>
           </a:p>
         </p:txBody>
       </p:sp>
@@ -25413,7 +25239,7 @@
       </p:cxnSp>
       <p:sp>
         <p:nvSpPr>
-          <p:cNvPr id="25" name="Slide Number Placeholder 24"/>
+          <p:cNvPr id="26" name="Slide Number Placeholder 25"/>
           <p:cNvSpPr>
             <a:spLocks noGrp="1"/>
           </p:cNvSpPr>
@@ -26112,7 +25938,7 @@
       </p:sp>
       <p:sp>
         <p:nvSpPr>
-          <p:cNvPr id="6" name="Slide Number Placeholder 5"/>
+          <p:cNvPr id="7" name="Slide Number Placeholder 6"/>
           <p:cNvSpPr>
             <a:spLocks noGrp="1"/>
           </p:cNvSpPr>
@@ -26811,7 +26637,7 @@
       </p:sp>
       <p:sp>
         <p:nvSpPr>
-          <p:cNvPr id="6" name="Slide Number Placeholder 5"/>
+          <p:cNvPr id="7" name="Slide Number Placeholder 6"/>
           <p:cNvSpPr>
             <a:spLocks noGrp="1"/>
           </p:cNvSpPr>
@@ -26865,238 +26691,6 @@
           <a:chExt cx="0" cy="0"/>
         </a:xfrm>
       </p:grpSpPr>
-      <p:sp>
-        <p:nvSpPr>
-          <p:cNvPr id="9218" name="Slide Number Placeholder 5"/>
-          <p:cNvSpPr>
-            <a:spLocks noGrp="1"/>
-          </p:cNvSpPr>
-          <p:nvPr>
-            <p:ph type="sldNum" sz="quarter" idx="12"/>
-          </p:nvPr>
-        </p:nvSpPr>
-        <p:spPr>
-          <a:noFill/>
-          <a:extLst>
-            <a:ext uri="{91240B29-F687-4F45-9708-019B960494DF}">
-              <a14:hiddenLine xmlns:a14="http://schemas.microsoft.com/office/drawing/2010/main" xmlns="" w="9525">
-                <a:solidFill>
-                  <a:srgbClr val="808080"/>
-                </a:solidFill>
-                <a:round/>
-                <a:headEnd/>
-                <a:tailEnd/>
-              </a14:hiddenLine>
-            </a:ext>
-          </a:extLst>
-        </p:spPr>
-        <p:txBody>
-          <a:bodyPr/>
-          <a:lstStyle>
-            <a:lvl1pPr eaLnBrk="0">
-              <a:tabLst>
-                <a:tab pos="723900" algn="l"/>
-                <a:tab pos="1447800" algn="l"/>
-                <a:tab pos="2171700" algn="l"/>
-              </a:tabLst>
-              <a:defRPr>
-                <a:solidFill>
-                  <a:schemeClr val="bg1"/>
-                </a:solidFill>
-                <a:latin typeface="Arial" charset="0"/>
-                <a:ea typeface="Microsoft YaHei" charset="-122"/>
-              </a:defRPr>
-            </a:lvl1pPr>
-            <a:lvl2pPr eaLnBrk="0">
-              <a:tabLst>
-                <a:tab pos="723900" algn="l"/>
-                <a:tab pos="1447800" algn="l"/>
-                <a:tab pos="2171700" algn="l"/>
-              </a:tabLst>
-              <a:defRPr>
-                <a:solidFill>
-                  <a:schemeClr val="bg1"/>
-                </a:solidFill>
-                <a:latin typeface="Arial" charset="0"/>
-                <a:ea typeface="Microsoft YaHei" charset="-122"/>
-              </a:defRPr>
-            </a:lvl2pPr>
-            <a:lvl3pPr eaLnBrk="0">
-              <a:tabLst>
-                <a:tab pos="723900" algn="l"/>
-                <a:tab pos="1447800" algn="l"/>
-                <a:tab pos="2171700" algn="l"/>
-              </a:tabLst>
-              <a:defRPr>
-                <a:solidFill>
-                  <a:schemeClr val="bg1"/>
-                </a:solidFill>
-                <a:latin typeface="Arial" charset="0"/>
-                <a:ea typeface="Microsoft YaHei" charset="-122"/>
-              </a:defRPr>
-            </a:lvl3pPr>
-            <a:lvl4pPr eaLnBrk="0">
-              <a:tabLst>
-                <a:tab pos="723900" algn="l"/>
-                <a:tab pos="1447800" algn="l"/>
-                <a:tab pos="2171700" algn="l"/>
-              </a:tabLst>
-              <a:defRPr>
-                <a:solidFill>
-                  <a:schemeClr val="bg1"/>
-                </a:solidFill>
-                <a:latin typeface="Arial" charset="0"/>
-                <a:ea typeface="Microsoft YaHei" charset="-122"/>
-              </a:defRPr>
-            </a:lvl4pPr>
-            <a:lvl5pPr eaLnBrk="0">
-              <a:tabLst>
-                <a:tab pos="723900" algn="l"/>
-                <a:tab pos="1447800" algn="l"/>
-                <a:tab pos="2171700" algn="l"/>
-              </a:tabLst>
-              <a:defRPr>
-                <a:solidFill>
-                  <a:schemeClr val="bg1"/>
-                </a:solidFill>
-                <a:latin typeface="Arial" charset="0"/>
-                <a:ea typeface="Microsoft YaHei" charset="-122"/>
-              </a:defRPr>
-            </a:lvl5pPr>
-            <a:lvl6pPr marL="2514600" indent="-228600" defTabSz="457200" eaLnBrk="0" fontAlgn="base" hangingPunct="0">
-              <a:lnSpc>
-                <a:spcPct val="93000"/>
-              </a:lnSpc>
-              <a:spcBef>
-                <a:spcPct val="0"/>
-              </a:spcBef>
-              <a:spcAft>
-                <a:spcPct val="0"/>
-              </a:spcAft>
-              <a:buClr>
-                <a:srgbClr val="000000"/>
-              </a:buClr>
-              <a:buSzPct val="100000"/>
-              <a:buFont typeface="Times New Roman" pitchFamily="16" charset="0"/>
-              <a:tabLst>
-                <a:tab pos="723900" algn="l"/>
-                <a:tab pos="1447800" algn="l"/>
-                <a:tab pos="2171700" algn="l"/>
-              </a:tabLst>
-              <a:defRPr>
-                <a:solidFill>
-                  <a:schemeClr val="bg1"/>
-                </a:solidFill>
-                <a:latin typeface="Arial" charset="0"/>
-                <a:ea typeface="Microsoft YaHei" charset="-122"/>
-              </a:defRPr>
-            </a:lvl6pPr>
-            <a:lvl7pPr marL="2971800" indent="-228600" defTabSz="457200" eaLnBrk="0" fontAlgn="base" hangingPunct="0">
-              <a:lnSpc>
-                <a:spcPct val="93000"/>
-              </a:lnSpc>
-              <a:spcBef>
-                <a:spcPct val="0"/>
-              </a:spcBef>
-              <a:spcAft>
-                <a:spcPct val="0"/>
-              </a:spcAft>
-              <a:buClr>
-                <a:srgbClr val="000000"/>
-              </a:buClr>
-              <a:buSzPct val="100000"/>
-              <a:buFont typeface="Times New Roman" pitchFamily="16" charset="0"/>
-              <a:tabLst>
-                <a:tab pos="723900" algn="l"/>
-                <a:tab pos="1447800" algn="l"/>
-                <a:tab pos="2171700" algn="l"/>
-              </a:tabLst>
-              <a:defRPr>
-                <a:solidFill>
-                  <a:schemeClr val="bg1"/>
-                </a:solidFill>
-                <a:latin typeface="Arial" charset="0"/>
-                <a:ea typeface="Microsoft YaHei" charset="-122"/>
-              </a:defRPr>
-            </a:lvl7pPr>
-            <a:lvl8pPr marL="3429000" indent="-228600" defTabSz="457200" eaLnBrk="0" fontAlgn="base" hangingPunct="0">
-              <a:lnSpc>
-                <a:spcPct val="93000"/>
-              </a:lnSpc>
-              <a:spcBef>
-                <a:spcPct val="0"/>
-              </a:spcBef>
-              <a:spcAft>
-                <a:spcPct val="0"/>
-              </a:spcAft>
-              <a:buClr>
-                <a:srgbClr val="000000"/>
-              </a:buClr>
-              <a:buSzPct val="100000"/>
-              <a:buFont typeface="Times New Roman" pitchFamily="16" charset="0"/>
-              <a:tabLst>
-                <a:tab pos="723900" algn="l"/>
-                <a:tab pos="1447800" algn="l"/>
-                <a:tab pos="2171700" algn="l"/>
-              </a:tabLst>
-              <a:defRPr>
-                <a:solidFill>
-                  <a:schemeClr val="bg1"/>
-                </a:solidFill>
-                <a:latin typeface="Arial" charset="0"/>
-                <a:ea typeface="Microsoft YaHei" charset="-122"/>
-              </a:defRPr>
-            </a:lvl8pPr>
-            <a:lvl9pPr marL="3886200" indent="-228600" defTabSz="457200" eaLnBrk="0" fontAlgn="base" hangingPunct="0">
-              <a:lnSpc>
-                <a:spcPct val="93000"/>
-              </a:lnSpc>
-              <a:spcBef>
-                <a:spcPct val="0"/>
-              </a:spcBef>
-              <a:spcAft>
-                <a:spcPct val="0"/>
-              </a:spcAft>
-              <a:buClr>
-                <a:srgbClr val="000000"/>
-              </a:buClr>
-              <a:buSzPct val="100000"/>
-              <a:buFont typeface="Times New Roman" pitchFamily="16" charset="0"/>
-              <a:tabLst>
-                <a:tab pos="723900" algn="l"/>
-                <a:tab pos="1447800" algn="l"/>
-                <a:tab pos="2171700" algn="l"/>
-              </a:tabLst>
-              <a:defRPr>
-                <a:solidFill>
-                  <a:schemeClr val="bg1"/>
-                </a:solidFill>
-                <a:latin typeface="Arial" charset="0"/>
-                <a:ea typeface="Microsoft YaHei" charset="-122"/>
-              </a:defRPr>
-            </a:lvl9pPr>
-          </a:lstStyle>
-          <a:p>
-            <a:pPr eaLnBrk="1"/>
-            <a:fld id="{BC619A43-031F-4467-A696-2A57958842DB}" type="slidenum">
-              <a:rPr lang="en-US" altLang="en-US">
-                <a:solidFill>
-                  <a:srgbClr val="FFFFFF"/>
-                </a:solidFill>
-                <a:latin typeface="Times New Roman" pitchFamily="16" charset="0"/>
-              </a:rPr>
-              <a:pPr eaLnBrk="1"/>
-              <a:t>3</a:t>
-            </a:fld>
-            <a:endParaRPr lang="en-US" altLang="en-US">
-              <a:solidFill>
-                <a:srgbClr val="FFFFFF"/>
-              </a:solidFill>
-              <a:latin typeface="Times New Roman" pitchFamily="16" charset="0"/>
-            </a:endParaRPr>
-          </a:p>
-        </p:txBody>
-      </p:sp>
       <p:sp>
         <p:nvSpPr>
           <p:cNvPr id="9219" name="Rectangle 1"/>
@@ -27660,6 +27254,35 @@
           </a:extLst>
         </p:spPr>
       </p:pic>
+      <p:sp>
+        <p:nvSpPr>
+          <p:cNvPr id="8" name="Slide Number Placeholder 7"/>
+          <p:cNvSpPr>
+            <a:spLocks noGrp="1"/>
+          </p:cNvSpPr>
+          <p:nvPr>
+            <p:ph type="sldNum" idx="12"/>
+          </p:nvPr>
+        </p:nvSpPr>
+        <p:spPr/>
+        <p:txBody>
+          <a:bodyPr/>
+          <a:lstStyle/>
+          <a:p>
+            <a:pPr>
+              <a:defRPr/>
+            </a:pPr>
+            <a:fld id="{8C6E2802-7AC4-44BB-B0A5-E12803E0614A}" type="slidenum">
+              <a:rPr lang="en-US" altLang="en-US" smtClean="0"/>
+              <a:pPr>
+                <a:defRPr/>
+              </a:pPr>
+              <a:t>3</a:t>
+            </a:fld>
+            <a:endParaRPr lang="en-US" altLang="en-US" dirty="0"/>
+          </a:p>
+        </p:txBody>
+      </p:sp>
     </p:spTree>
   </p:cSld>
   <p:clrMapOvr>
@@ -28327,7 +27950,7 @@
       </p:sp>
       <p:sp>
         <p:nvSpPr>
-          <p:cNvPr id="5" name="Slide Number Placeholder 4"/>
+          <p:cNvPr id="6" name="Slide Number Placeholder 5"/>
           <p:cNvSpPr>
             <a:spLocks noGrp="1"/>
           </p:cNvSpPr>
@@ -29011,7 +28634,7 @@
       </p:sp>
       <p:sp>
         <p:nvSpPr>
-          <p:cNvPr id="5" name="Slide Number Placeholder 4"/>
+          <p:cNvPr id="6" name="Slide Number Placeholder 5"/>
           <p:cNvSpPr>
             <a:spLocks noGrp="1"/>
           </p:cNvSpPr>
@@ -29664,7 +29287,7 @@
       </p:sp>
       <p:sp>
         <p:nvSpPr>
-          <p:cNvPr id="5" name="Slide Number Placeholder 4"/>
+          <p:cNvPr id="6" name="Slide Number Placeholder 5"/>
           <p:cNvSpPr>
             <a:spLocks noGrp="1"/>
           </p:cNvSpPr>
@@ -30303,7 +29926,7 @@
       </p:sp>
       <p:sp>
         <p:nvSpPr>
-          <p:cNvPr id="5" name="Slide Number Placeholder 4"/>
+          <p:cNvPr id="6" name="Slide Number Placeholder 5"/>
           <p:cNvSpPr>
             <a:spLocks noGrp="1"/>
           </p:cNvSpPr>
@@ -30867,7 +30490,7 @@
       </p:sp>
       <p:sp>
         <p:nvSpPr>
-          <p:cNvPr id="6" name="Slide Number Placeholder 5"/>
+          <p:cNvPr id="7" name="Slide Number Placeholder 6"/>
           <p:cNvSpPr>
             <a:spLocks noGrp="1"/>
           </p:cNvSpPr>
@@ -31441,7 +31064,7 @@
       </p:sp>
       <p:sp>
         <p:nvSpPr>
-          <p:cNvPr id="6" name="Slide Number Placeholder 5"/>
+          <p:cNvPr id="7" name="Slide Number Placeholder 6"/>
           <p:cNvSpPr>
             <a:spLocks noGrp="1"/>
           </p:cNvSpPr>
@@ -32161,7 +31784,7 @@
       </p:sp>
       <p:sp>
         <p:nvSpPr>
-          <p:cNvPr id="7" name="Slide Number Placeholder 6"/>
+          <p:cNvPr id="8" name="Slide Number Placeholder 7"/>
           <p:cNvSpPr>
             <a:spLocks noGrp="1"/>
           </p:cNvSpPr>
@@ -32810,7 +32433,7 @@
       </p:sp>
       <p:sp>
         <p:nvSpPr>
-          <p:cNvPr id="5" name="Slide Number Placeholder 4"/>
+          <p:cNvPr id="6" name="Slide Number Placeholder 5"/>
           <p:cNvSpPr>
             <a:spLocks noGrp="1"/>
           </p:cNvSpPr>
@@ -33453,7 +33076,7 @@
       </p:sp>
       <p:sp>
         <p:nvSpPr>
-          <p:cNvPr id="7" name="Slide Number Placeholder 6"/>
+          <p:cNvPr id="8" name="Slide Number Placeholder 7"/>
           <p:cNvSpPr>
             <a:spLocks noGrp="1"/>
           </p:cNvSpPr>
@@ -34035,7 +33658,7 @@
       </p:sp>
       <p:sp>
         <p:nvSpPr>
-          <p:cNvPr id="6" name="Slide Number Placeholder 5"/>
+          <p:cNvPr id="7" name="Slide Number Placeholder 6"/>
           <p:cNvSpPr>
             <a:spLocks noGrp="1"/>
           </p:cNvSpPr>
@@ -34099,238 +33722,6 @@
           <a:chExt cx="0" cy="0"/>
         </a:xfrm>
       </p:grpSpPr>
-      <p:sp>
-        <p:nvSpPr>
-          <p:cNvPr id="10242" name="Slide Number Placeholder 5"/>
-          <p:cNvSpPr>
-            <a:spLocks noGrp="1"/>
-          </p:cNvSpPr>
-          <p:nvPr>
-            <p:ph type="sldNum" sz="quarter" idx="12"/>
-          </p:nvPr>
-        </p:nvSpPr>
-        <p:spPr>
-          <a:noFill/>
-          <a:extLst>
-            <a:ext uri="{91240B29-F687-4F45-9708-019B960494DF}">
-              <a14:hiddenLine xmlns:a14="http://schemas.microsoft.com/office/drawing/2010/main" xmlns="" w="9525">
-                <a:solidFill>
-                  <a:srgbClr val="808080"/>
-                </a:solidFill>
-                <a:round/>
-                <a:headEnd/>
-                <a:tailEnd/>
-              </a14:hiddenLine>
-            </a:ext>
-          </a:extLst>
-        </p:spPr>
-        <p:txBody>
-          <a:bodyPr/>
-          <a:lstStyle>
-            <a:lvl1pPr eaLnBrk="0">
-              <a:tabLst>
-                <a:tab pos="723900" algn="l"/>
-                <a:tab pos="1447800" algn="l"/>
-                <a:tab pos="2171700" algn="l"/>
-              </a:tabLst>
-              <a:defRPr>
-                <a:solidFill>
-                  <a:schemeClr val="bg1"/>
-                </a:solidFill>
-                <a:latin typeface="Arial" charset="0"/>
-                <a:ea typeface="Microsoft YaHei" charset="-122"/>
-              </a:defRPr>
-            </a:lvl1pPr>
-            <a:lvl2pPr eaLnBrk="0">
-              <a:tabLst>
-                <a:tab pos="723900" algn="l"/>
-                <a:tab pos="1447800" algn="l"/>
-                <a:tab pos="2171700" algn="l"/>
-              </a:tabLst>
-              <a:defRPr>
-                <a:solidFill>
-                  <a:schemeClr val="bg1"/>
-                </a:solidFill>
-                <a:latin typeface="Arial" charset="0"/>
-                <a:ea typeface="Microsoft YaHei" charset="-122"/>
-              </a:defRPr>
-            </a:lvl2pPr>
-            <a:lvl3pPr eaLnBrk="0">
-              <a:tabLst>
-                <a:tab pos="723900" algn="l"/>
-                <a:tab pos="1447800" algn="l"/>
-                <a:tab pos="2171700" algn="l"/>
-              </a:tabLst>
-              <a:defRPr>
-                <a:solidFill>
-                  <a:schemeClr val="bg1"/>
-                </a:solidFill>
-                <a:latin typeface="Arial" charset="0"/>
-                <a:ea typeface="Microsoft YaHei" charset="-122"/>
-              </a:defRPr>
-            </a:lvl3pPr>
-            <a:lvl4pPr eaLnBrk="0">
-              <a:tabLst>
-                <a:tab pos="723900" algn="l"/>
-                <a:tab pos="1447800" algn="l"/>
-                <a:tab pos="2171700" algn="l"/>
-              </a:tabLst>
-              <a:defRPr>
-                <a:solidFill>
-                  <a:schemeClr val="bg1"/>
-                </a:solidFill>
-                <a:latin typeface="Arial" charset="0"/>
-                <a:ea typeface="Microsoft YaHei" charset="-122"/>
-              </a:defRPr>
-            </a:lvl4pPr>
-            <a:lvl5pPr eaLnBrk="0">
-              <a:tabLst>
-                <a:tab pos="723900" algn="l"/>
-                <a:tab pos="1447800" algn="l"/>
-                <a:tab pos="2171700" algn="l"/>
-              </a:tabLst>
-              <a:defRPr>
-                <a:solidFill>
-                  <a:schemeClr val="bg1"/>
-                </a:solidFill>
-                <a:latin typeface="Arial" charset="0"/>
-                <a:ea typeface="Microsoft YaHei" charset="-122"/>
-              </a:defRPr>
-            </a:lvl5pPr>
-            <a:lvl6pPr marL="2514600" indent="-228600" defTabSz="457200" eaLnBrk="0" fontAlgn="base" hangingPunct="0">
-              <a:lnSpc>
-                <a:spcPct val="93000"/>
-              </a:lnSpc>
-              <a:spcBef>
-                <a:spcPct val="0"/>
-              </a:spcBef>
-              <a:spcAft>
-                <a:spcPct val="0"/>
-              </a:spcAft>
-              <a:buClr>
-                <a:srgbClr val="000000"/>
-              </a:buClr>
-              <a:buSzPct val="100000"/>
-              <a:buFont typeface="Times New Roman" pitchFamily="16" charset="0"/>
-              <a:tabLst>
-                <a:tab pos="723900" algn="l"/>
-                <a:tab pos="1447800" algn="l"/>
-                <a:tab pos="2171700" algn="l"/>
-              </a:tabLst>
-              <a:defRPr>
-                <a:solidFill>
-                  <a:schemeClr val="bg1"/>
-                </a:solidFill>
-                <a:latin typeface="Arial" charset="0"/>
-                <a:ea typeface="Microsoft YaHei" charset="-122"/>
-              </a:defRPr>
-            </a:lvl6pPr>
-            <a:lvl7pPr marL="2971800" indent="-228600" defTabSz="457200" eaLnBrk="0" fontAlgn="base" hangingPunct="0">
-              <a:lnSpc>
-                <a:spcPct val="93000"/>
-              </a:lnSpc>
-              <a:spcBef>
-                <a:spcPct val="0"/>
-              </a:spcBef>
-              <a:spcAft>
-                <a:spcPct val="0"/>
-              </a:spcAft>
-              <a:buClr>
-                <a:srgbClr val="000000"/>
-              </a:buClr>
-              <a:buSzPct val="100000"/>
-              <a:buFont typeface="Times New Roman" pitchFamily="16" charset="0"/>
-              <a:tabLst>
-                <a:tab pos="723900" algn="l"/>
-                <a:tab pos="1447800" algn="l"/>
-                <a:tab pos="2171700" algn="l"/>
-              </a:tabLst>
-              <a:defRPr>
-                <a:solidFill>
-                  <a:schemeClr val="bg1"/>
-                </a:solidFill>
-                <a:latin typeface="Arial" charset="0"/>
-                <a:ea typeface="Microsoft YaHei" charset="-122"/>
-              </a:defRPr>
-            </a:lvl7pPr>
-            <a:lvl8pPr marL="3429000" indent="-228600" defTabSz="457200" eaLnBrk="0" fontAlgn="base" hangingPunct="0">
-              <a:lnSpc>
-                <a:spcPct val="93000"/>
-              </a:lnSpc>
-              <a:spcBef>
-                <a:spcPct val="0"/>
-              </a:spcBef>
-              <a:spcAft>
-                <a:spcPct val="0"/>
-              </a:spcAft>
-              <a:buClr>
-                <a:srgbClr val="000000"/>
-              </a:buClr>
-              <a:buSzPct val="100000"/>
-              <a:buFont typeface="Times New Roman" pitchFamily="16" charset="0"/>
-              <a:tabLst>
-                <a:tab pos="723900" algn="l"/>
-                <a:tab pos="1447800" algn="l"/>
-                <a:tab pos="2171700" algn="l"/>
-              </a:tabLst>
-              <a:defRPr>
-                <a:solidFill>
-                  <a:schemeClr val="bg1"/>
-                </a:solidFill>
-                <a:latin typeface="Arial" charset="0"/>
-                <a:ea typeface="Microsoft YaHei" charset="-122"/>
-              </a:defRPr>
-            </a:lvl8pPr>
-            <a:lvl9pPr marL="3886200" indent="-228600" defTabSz="457200" eaLnBrk="0" fontAlgn="base" hangingPunct="0">
-              <a:lnSpc>
-                <a:spcPct val="93000"/>
-              </a:lnSpc>
-              <a:spcBef>
-                <a:spcPct val="0"/>
-              </a:spcBef>
-              <a:spcAft>
-                <a:spcPct val="0"/>
-              </a:spcAft>
-              <a:buClr>
-                <a:srgbClr val="000000"/>
-              </a:buClr>
-              <a:buSzPct val="100000"/>
-              <a:buFont typeface="Times New Roman" pitchFamily="16" charset="0"/>
-              <a:tabLst>
-                <a:tab pos="723900" algn="l"/>
-                <a:tab pos="1447800" algn="l"/>
-                <a:tab pos="2171700" algn="l"/>
-              </a:tabLst>
-              <a:defRPr>
-                <a:solidFill>
-                  <a:schemeClr val="bg1"/>
-                </a:solidFill>
-                <a:latin typeface="Arial" charset="0"/>
-                <a:ea typeface="Microsoft YaHei" charset="-122"/>
-              </a:defRPr>
-            </a:lvl9pPr>
-          </a:lstStyle>
-          <a:p>
-            <a:pPr eaLnBrk="1"/>
-            <a:fld id="{6D692C09-48A2-46CE-8006-ED2DEFA51259}" type="slidenum">
-              <a:rPr lang="en-US" altLang="en-US">
-                <a:solidFill>
-                  <a:srgbClr val="FFFFFF"/>
-                </a:solidFill>
-                <a:latin typeface="Times New Roman" pitchFamily="16" charset="0"/>
-              </a:rPr>
-              <a:pPr eaLnBrk="1"/>
-              <a:t>4</a:t>
-            </a:fld>
-            <a:endParaRPr lang="en-US" altLang="en-US">
-              <a:solidFill>
-                <a:srgbClr val="FFFFFF"/>
-              </a:solidFill>
-              <a:latin typeface="Times New Roman" pitchFamily="16" charset="0"/>
-            </a:endParaRPr>
-          </a:p>
-        </p:txBody>
-      </p:sp>
       <p:sp>
         <p:nvSpPr>
           <p:cNvPr id="10243" name="Rectangle 1"/>
@@ -35158,6 +34549,35 @@
           </a:p>
         </p:txBody>
       </p:sp>
+      <p:sp>
+        <p:nvSpPr>
+          <p:cNvPr id="6" name="Slide Number Placeholder 5"/>
+          <p:cNvSpPr>
+            <a:spLocks noGrp="1"/>
+          </p:cNvSpPr>
+          <p:nvPr>
+            <p:ph type="sldNum" idx="12"/>
+          </p:nvPr>
+        </p:nvSpPr>
+        <p:spPr/>
+        <p:txBody>
+          <a:bodyPr/>
+          <a:lstStyle/>
+          <a:p>
+            <a:pPr>
+              <a:defRPr/>
+            </a:pPr>
+            <a:fld id="{8C6E2802-7AC4-44BB-B0A5-E12803E0614A}" type="slidenum">
+              <a:rPr lang="en-US" altLang="en-US" smtClean="0"/>
+              <a:pPr>
+                <a:defRPr/>
+              </a:pPr>
+              <a:t>4</a:t>
+            </a:fld>
+            <a:endParaRPr lang="en-US" altLang="en-US" dirty="0"/>
+          </a:p>
+        </p:txBody>
+      </p:sp>
     </p:spTree>
   </p:cSld>
   <p:clrMapOvr>
@@ -35760,7 +35180,7 @@
       </p:sp>
       <p:sp>
         <p:nvSpPr>
-          <p:cNvPr id="6" name="Slide Number Placeholder 5"/>
+          <p:cNvPr id="7" name="Slide Number Placeholder 6"/>
           <p:cNvSpPr>
             <a:spLocks noGrp="1"/>
           </p:cNvSpPr>
@@ -36337,7 +35757,7 @@
       </p:sp>
       <p:sp>
         <p:nvSpPr>
-          <p:cNvPr id="6" name="Slide Number Placeholder 5"/>
+          <p:cNvPr id="7" name="Slide Number Placeholder 6"/>
           <p:cNvSpPr>
             <a:spLocks noGrp="1"/>
           </p:cNvSpPr>
@@ -36930,7 +36350,7 @@
       </p:sp>
       <p:sp>
         <p:nvSpPr>
-          <p:cNvPr id="6" name="Slide Number Placeholder 5"/>
+          <p:cNvPr id="7" name="Slide Number Placeholder 6"/>
           <p:cNvSpPr>
             <a:spLocks noGrp="1"/>
           </p:cNvSpPr>
@@ -37610,7 +37030,7 @@
       </p:sp>
       <p:sp>
         <p:nvSpPr>
-          <p:cNvPr id="5" name="Slide Number Placeholder 4"/>
+          <p:cNvPr id="6" name="Slide Number Placeholder 5"/>
           <p:cNvSpPr>
             <a:spLocks noGrp="1"/>
           </p:cNvSpPr>
@@ -38268,7 +37688,7 @@
       </p:sp>
       <p:sp>
         <p:nvSpPr>
-          <p:cNvPr id="5" name="Slide Number Placeholder 4"/>
+          <p:cNvPr id="6" name="Slide Number Placeholder 5"/>
           <p:cNvSpPr>
             <a:spLocks noGrp="1"/>
           </p:cNvSpPr>
@@ -38803,7 +38223,7 @@
       </p:sp>
       <p:sp>
         <p:nvSpPr>
-          <p:cNvPr id="6" name="Slide Number Placeholder 5"/>
+          <p:cNvPr id="7" name="Slide Number Placeholder 6"/>
           <p:cNvSpPr>
             <a:spLocks noGrp="1"/>
           </p:cNvSpPr>
@@ -39332,7 +38752,7 @@
       </p:sp>
       <p:sp>
         <p:nvSpPr>
-          <p:cNvPr id="6" name="Slide Number Placeholder 5"/>
+          <p:cNvPr id="7" name="Slide Number Placeholder 6"/>
           <p:cNvSpPr>
             <a:spLocks noGrp="1"/>
           </p:cNvSpPr>
@@ -39923,7 +39343,7 @@
       </p:sp>
       <p:sp>
         <p:nvSpPr>
-          <p:cNvPr id="6" name="Slide Number Placeholder 5"/>
+          <p:cNvPr id="7" name="Slide Number Placeholder 6"/>
           <p:cNvSpPr>
             <a:spLocks noGrp="1"/>
           </p:cNvSpPr>
@@ -40598,7 +40018,7 @@
       </p:sp>
       <p:sp>
         <p:nvSpPr>
-          <p:cNvPr id="9" name="Slide Number Placeholder 8"/>
+          <p:cNvPr id="10" name="Slide Number Placeholder 9"/>
           <p:cNvSpPr>
             <a:spLocks noGrp="1"/>
           </p:cNvSpPr>
@@ -41140,7 +40560,7 @@
       </p:sp>
       <p:sp>
         <p:nvSpPr>
-          <p:cNvPr id="6" name="Slide Number Placeholder 5"/>
+          <p:cNvPr id="7" name="Slide Number Placeholder 6"/>
           <p:cNvSpPr>
             <a:spLocks noGrp="1"/>
           </p:cNvSpPr>
@@ -41204,238 +40624,6 @@
           <a:chExt cx="0" cy="0"/>
         </a:xfrm>
       </p:grpSpPr>
-      <p:sp>
-        <p:nvSpPr>
-          <p:cNvPr id="11266" name="Slide Number Placeholder 5"/>
-          <p:cNvSpPr>
-            <a:spLocks noGrp="1"/>
-          </p:cNvSpPr>
-          <p:nvPr>
-            <p:ph type="sldNum" sz="quarter" idx="12"/>
-          </p:nvPr>
-        </p:nvSpPr>
-        <p:spPr>
-          <a:noFill/>
-          <a:extLst>
-            <a:ext uri="{91240B29-F687-4F45-9708-019B960494DF}">
-              <a14:hiddenLine xmlns:a14="http://schemas.microsoft.com/office/drawing/2010/main" xmlns="" w="9525">
-                <a:solidFill>
-                  <a:srgbClr val="808080"/>
-                </a:solidFill>
-                <a:round/>
-                <a:headEnd/>
-                <a:tailEnd/>
-              </a14:hiddenLine>
-            </a:ext>
-          </a:extLst>
-        </p:spPr>
-        <p:txBody>
-          <a:bodyPr/>
-          <a:lstStyle>
-            <a:lvl1pPr eaLnBrk="0">
-              <a:tabLst>
-                <a:tab pos="723900" algn="l"/>
-                <a:tab pos="1447800" algn="l"/>
-                <a:tab pos="2171700" algn="l"/>
-              </a:tabLst>
-              <a:defRPr>
-                <a:solidFill>
-                  <a:schemeClr val="bg1"/>
-                </a:solidFill>
-                <a:latin typeface="Arial" charset="0"/>
-                <a:ea typeface="Microsoft YaHei" charset="-122"/>
-              </a:defRPr>
-            </a:lvl1pPr>
-            <a:lvl2pPr eaLnBrk="0">
-              <a:tabLst>
-                <a:tab pos="723900" algn="l"/>
-                <a:tab pos="1447800" algn="l"/>
-                <a:tab pos="2171700" algn="l"/>
-              </a:tabLst>
-              <a:defRPr>
-                <a:solidFill>
-                  <a:schemeClr val="bg1"/>
-                </a:solidFill>
-                <a:latin typeface="Arial" charset="0"/>
-                <a:ea typeface="Microsoft YaHei" charset="-122"/>
-              </a:defRPr>
-            </a:lvl2pPr>
-            <a:lvl3pPr eaLnBrk="0">
-              <a:tabLst>
-                <a:tab pos="723900" algn="l"/>
-                <a:tab pos="1447800" algn="l"/>
-                <a:tab pos="2171700" algn="l"/>
-              </a:tabLst>
-              <a:defRPr>
-                <a:solidFill>
-                  <a:schemeClr val="bg1"/>
-                </a:solidFill>
-                <a:latin typeface="Arial" charset="0"/>
-                <a:ea typeface="Microsoft YaHei" charset="-122"/>
-              </a:defRPr>
-            </a:lvl3pPr>
-            <a:lvl4pPr eaLnBrk="0">
-              <a:tabLst>
-                <a:tab pos="723900" algn="l"/>
-                <a:tab pos="1447800" algn="l"/>
-                <a:tab pos="2171700" algn="l"/>
-              </a:tabLst>
-              <a:defRPr>
-                <a:solidFill>
-                  <a:schemeClr val="bg1"/>
-                </a:solidFill>
-                <a:latin typeface="Arial" charset="0"/>
-                <a:ea typeface="Microsoft YaHei" charset="-122"/>
-              </a:defRPr>
-            </a:lvl4pPr>
-            <a:lvl5pPr eaLnBrk="0">
-              <a:tabLst>
-                <a:tab pos="723900" algn="l"/>
-                <a:tab pos="1447800" algn="l"/>
-                <a:tab pos="2171700" algn="l"/>
-              </a:tabLst>
-              <a:defRPr>
-                <a:solidFill>
-                  <a:schemeClr val="bg1"/>
-                </a:solidFill>
-                <a:latin typeface="Arial" charset="0"/>
-                <a:ea typeface="Microsoft YaHei" charset="-122"/>
-              </a:defRPr>
-            </a:lvl5pPr>
-            <a:lvl6pPr marL="2514600" indent="-228600" defTabSz="457200" eaLnBrk="0" fontAlgn="base" hangingPunct="0">
-              <a:lnSpc>
-                <a:spcPct val="93000"/>
-              </a:lnSpc>
-              <a:spcBef>
-                <a:spcPct val="0"/>
-              </a:spcBef>
-              <a:spcAft>
-                <a:spcPct val="0"/>
-              </a:spcAft>
-              <a:buClr>
-                <a:srgbClr val="000000"/>
-              </a:buClr>
-              <a:buSzPct val="100000"/>
-              <a:buFont typeface="Times New Roman" pitchFamily="16" charset="0"/>
-              <a:tabLst>
-                <a:tab pos="723900" algn="l"/>
-                <a:tab pos="1447800" algn="l"/>
-                <a:tab pos="2171700" algn="l"/>
-              </a:tabLst>
-              <a:defRPr>
-                <a:solidFill>
-                  <a:schemeClr val="bg1"/>
-                </a:solidFill>
-                <a:latin typeface="Arial" charset="0"/>
-                <a:ea typeface="Microsoft YaHei" charset="-122"/>
-              </a:defRPr>
-            </a:lvl6pPr>
-            <a:lvl7pPr marL="2971800" indent="-228600" defTabSz="457200" eaLnBrk="0" fontAlgn="base" hangingPunct="0">
-              <a:lnSpc>
-                <a:spcPct val="93000"/>
-              </a:lnSpc>
-              <a:spcBef>
-                <a:spcPct val="0"/>
-              </a:spcBef>
-              <a:spcAft>
-                <a:spcPct val="0"/>
-              </a:spcAft>
-              <a:buClr>
-                <a:srgbClr val="000000"/>
-              </a:buClr>
-              <a:buSzPct val="100000"/>
-              <a:buFont typeface="Times New Roman" pitchFamily="16" charset="0"/>
-              <a:tabLst>
-                <a:tab pos="723900" algn="l"/>
-                <a:tab pos="1447800" algn="l"/>
-                <a:tab pos="2171700" algn="l"/>
-              </a:tabLst>
-              <a:defRPr>
-                <a:solidFill>
-                  <a:schemeClr val="bg1"/>
-                </a:solidFill>
-                <a:latin typeface="Arial" charset="0"/>
-                <a:ea typeface="Microsoft YaHei" charset="-122"/>
-              </a:defRPr>
-            </a:lvl7pPr>
-            <a:lvl8pPr marL="3429000" indent="-228600" defTabSz="457200" eaLnBrk="0" fontAlgn="base" hangingPunct="0">
-              <a:lnSpc>
-                <a:spcPct val="93000"/>
-              </a:lnSpc>
-              <a:spcBef>
-                <a:spcPct val="0"/>
-              </a:spcBef>
-              <a:spcAft>
-                <a:spcPct val="0"/>
-              </a:spcAft>
-              <a:buClr>
-                <a:srgbClr val="000000"/>
-              </a:buClr>
-              <a:buSzPct val="100000"/>
-              <a:buFont typeface="Times New Roman" pitchFamily="16" charset="0"/>
-              <a:tabLst>
-                <a:tab pos="723900" algn="l"/>
-                <a:tab pos="1447800" algn="l"/>
-                <a:tab pos="2171700" algn="l"/>
-              </a:tabLst>
-              <a:defRPr>
-                <a:solidFill>
-                  <a:schemeClr val="bg1"/>
-                </a:solidFill>
-                <a:latin typeface="Arial" charset="0"/>
-                <a:ea typeface="Microsoft YaHei" charset="-122"/>
-              </a:defRPr>
-            </a:lvl8pPr>
-            <a:lvl9pPr marL="3886200" indent="-228600" defTabSz="457200" eaLnBrk="0" fontAlgn="base" hangingPunct="0">
-              <a:lnSpc>
-                <a:spcPct val="93000"/>
-              </a:lnSpc>
-              <a:spcBef>
-                <a:spcPct val="0"/>
-              </a:spcBef>
-              <a:spcAft>
-                <a:spcPct val="0"/>
-              </a:spcAft>
-              <a:buClr>
-                <a:srgbClr val="000000"/>
-              </a:buClr>
-              <a:buSzPct val="100000"/>
-              <a:buFont typeface="Times New Roman" pitchFamily="16" charset="0"/>
-              <a:tabLst>
-                <a:tab pos="723900" algn="l"/>
-                <a:tab pos="1447800" algn="l"/>
-                <a:tab pos="2171700" algn="l"/>
-              </a:tabLst>
-              <a:defRPr>
-                <a:solidFill>
-                  <a:schemeClr val="bg1"/>
-                </a:solidFill>
-                <a:latin typeface="Arial" charset="0"/>
-                <a:ea typeface="Microsoft YaHei" charset="-122"/>
-              </a:defRPr>
-            </a:lvl9pPr>
-          </a:lstStyle>
-          <a:p>
-            <a:pPr eaLnBrk="1"/>
-            <a:fld id="{A26A75AA-36CE-432E-9957-A0772EB36601}" type="slidenum">
-              <a:rPr lang="en-US" altLang="en-US">
-                <a:solidFill>
-                  <a:srgbClr val="FFFFFF"/>
-                </a:solidFill>
-                <a:latin typeface="Times New Roman" pitchFamily="16" charset="0"/>
-              </a:rPr>
-              <a:pPr eaLnBrk="1"/>
-              <a:t>5</a:t>
-            </a:fld>
-            <a:endParaRPr lang="en-US" altLang="en-US">
-              <a:solidFill>
-                <a:srgbClr val="FFFFFF"/>
-              </a:solidFill>
-              <a:latin typeface="Times New Roman" pitchFamily="16" charset="0"/>
-            </a:endParaRPr>
-          </a:p>
-        </p:txBody>
-      </p:sp>
       <p:sp>
         <p:nvSpPr>
           <p:cNvPr id="11267" name="Rectangle 1"/>
@@ -42240,6 +41428,35 @@
           </a:p>
         </p:txBody>
       </p:sp>
+      <p:sp>
+        <p:nvSpPr>
+          <p:cNvPr id="6" name="Slide Number Placeholder 5"/>
+          <p:cNvSpPr>
+            <a:spLocks noGrp="1"/>
+          </p:cNvSpPr>
+          <p:nvPr>
+            <p:ph type="sldNum" idx="12"/>
+          </p:nvPr>
+        </p:nvSpPr>
+        <p:spPr/>
+        <p:txBody>
+          <a:bodyPr/>
+          <a:lstStyle/>
+          <a:p>
+            <a:pPr>
+              <a:defRPr/>
+            </a:pPr>
+            <a:fld id="{8C6E2802-7AC4-44BB-B0A5-E12803E0614A}" type="slidenum">
+              <a:rPr lang="en-US" altLang="en-US" smtClean="0"/>
+              <a:pPr>
+                <a:defRPr/>
+              </a:pPr>
+              <a:t>5</a:t>
+            </a:fld>
+            <a:endParaRPr lang="en-US" altLang="en-US" dirty="0"/>
+          </a:p>
+        </p:txBody>
+      </p:sp>
     </p:spTree>
   </p:cSld>
   <p:clrMapOvr>
@@ -42823,7 +42040,7 @@
       </p:sp>
       <p:sp>
         <p:nvSpPr>
-          <p:cNvPr id="6" name="Slide Number Placeholder 5"/>
+          <p:cNvPr id="7" name="Slide Number Placeholder 6"/>
           <p:cNvSpPr>
             <a:spLocks noGrp="1"/>
           </p:cNvSpPr>
@@ -43397,7 +42614,7 @@
       </p:sp>
       <p:sp>
         <p:nvSpPr>
-          <p:cNvPr id="6" name="Slide Number Placeholder 5"/>
+          <p:cNvPr id="7" name="Slide Number Placeholder 6"/>
           <p:cNvSpPr>
             <a:spLocks noGrp="1"/>
           </p:cNvSpPr>
@@ -43971,7 +43188,7 @@
       </p:sp>
       <p:sp>
         <p:nvSpPr>
-          <p:cNvPr id="6" name="Slide Number Placeholder 5"/>
+          <p:cNvPr id="7" name="Slide Number Placeholder 6"/>
           <p:cNvSpPr>
             <a:spLocks noGrp="1"/>
           </p:cNvSpPr>
@@ -44545,7 +43762,7 @@
       </p:sp>
       <p:sp>
         <p:nvSpPr>
-          <p:cNvPr id="6" name="Slide Number Placeholder 5"/>
+          <p:cNvPr id="7" name="Slide Number Placeholder 6"/>
           <p:cNvSpPr>
             <a:spLocks noGrp="1"/>
           </p:cNvSpPr>
@@ -44609,238 +43826,6 @@
           <a:chExt cx="0" cy="0"/>
         </a:xfrm>
       </p:grpSpPr>
-      <p:sp>
-        <p:nvSpPr>
-          <p:cNvPr id="59394" name="Slide Number Placeholder 5"/>
-          <p:cNvSpPr>
-            <a:spLocks noGrp="1"/>
-          </p:cNvSpPr>
-          <p:nvPr>
-            <p:ph type="sldNum" sz="quarter" idx="12"/>
-          </p:nvPr>
-        </p:nvSpPr>
-        <p:spPr>
-          <a:noFill/>
-          <a:extLst>
-            <a:ext uri="{91240B29-F687-4F45-9708-019B960494DF}">
-              <a14:hiddenLine xmlns:a14="http://schemas.microsoft.com/office/drawing/2010/main" xmlns="" w="9525">
-                <a:solidFill>
-                  <a:srgbClr val="808080"/>
-                </a:solidFill>
-                <a:round/>
-                <a:headEnd/>
-                <a:tailEnd/>
-              </a14:hiddenLine>
-            </a:ext>
-          </a:extLst>
-        </p:spPr>
-        <p:txBody>
-          <a:bodyPr/>
-          <a:lstStyle>
-            <a:lvl1pPr eaLnBrk="0">
-              <a:tabLst>
-                <a:tab pos="723900" algn="l"/>
-                <a:tab pos="1447800" algn="l"/>
-                <a:tab pos="2171700" algn="l"/>
-              </a:tabLst>
-              <a:defRPr>
-                <a:solidFill>
-                  <a:schemeClr val="bg1"/>
-                </a:solidFill>
-                <a:latin typeface="Arial" charset="0"/>
-                <a:ea typeface="Microsoft YaHei" charset="-122"/>
-              </a:defRPr>
-            </a:lvl1pPr>
-            <a:lvl2pPr eaLnBrk="0">
-              <a:tabLst>
-                <a:tab pos="723900" algn="l"/>
-                <a:tab pos="1447800" algn="l"/>
-                <a:tab pos="2171700" algn="l"/>
-              </a:tabLst>
-              <a:defRPr>
-                <a:solidFill>
-                  <a:schemeClr val="bg1"/>
-                </a:solidFill>
-                <a:latin typeface="Arial" charset="0"/>
-                <a:ea typeface="Microsoft YaHei" charset="-122"/>
-              </a:defRPr>
-            </a:lvl2pPr>
-            <a:lvl3pPr eaLnBrk="0">
-              <a:tabLst>
-                <a:tab pos="723900" algn="l"/>
-                <a:tab pos="1447800" algn="l"/>
-                <a:tab pos="2171700" algn="l"/>
-              </a:tabLst>
-              <a:defRPr>
-                <a:solidFill>
-                  <a:schemeClr val="bg1"/>
-                </a:solidFill>
-                <a:latin typeface="Arial" charset="0"/>
-                <a:ea typeface="Microsoft YaHei" charset="-122"/>
-              </a:defRPr>
-            </a:lvl3pPr>
-            <a:lvl4pPr eaLnBrk="0">
-              <a:tabLst>
-                <a:tab pos="723900" algn="l"/>
-                <a:tab pos="1447800" algn="l"/>
-                <a:tab pos="2171700" algn="l"/>
-              </a:tabLst>
-              <a:defRPr>
-                <a:solidFill>
-                  <a:schemeClr val="bg1"/>
-                </a:solidFill>
-                <a:latin typeface="Arial" charset="0"/>
-                <a:ea typeface="Microsoft YaHei" charset="-122"/>
-              </a:defRPr>
-            </a:lvl4pPr>
-            <a:lvl5pPr eaLnBrk="0">
-              <a:tabLst>
-                <a:tab pos="723900" algn="l"/>
-                <a:tab pos="1447800" algn="l"/>
-                <a:tab pos="2171700" algn="l"/>
-              </a:tabLst>
-              <a:defRPr>
-                <a:solidFill>
-                  <a:schemeClr val="bg1"/>
-                </a:solidFill>
-                <a:latin typeface="Arial" charset="0"/>
-                <a:ea typeface="Microsoft YaHei" charset="-122"/>
-              </a:defRPr>
-            </a:lvl5pPr>
-            <a:lvl6pPr marL="2514600" indent="-228600" defTabSz="457200" eaLnBrk="0" fontAlgn="base" hangingPunct="0">
-              <a:lnSpc>
-                <a:spcPct val="93000"/>
-              </a:lnSpc>
-              <a:spcBef>
-                <a:spcPct val="0"/>
-              </a:spcBef>
-              <a:spcAft>
-                <a:spcPct val="0"/>
-              </a:spcAft>
-              <a:buClr>
-                <a:srgbClr val="000000"/>
-              </a:buClr>
-              <a:buSzPct val="100000"/>
-              <a:buFont typeface="Times New Roman" pitchFamily="16" charset="0"/>
-              <a:tabLst>
-                <a:tab pos="723900" algn="l"/>
-                <a:tab pos="1447800" algn="l"/>
-                <a:tab pos="2171700" algn="l"/>
-              </a:tabLst>
-              <a:defRPr>
-                <a:solidFill>
-                  <a:schemeClr val="bg1"/>
-                </a:solidFill>
-                <a:latin typeface="Arial" charset="0"/>
-                <a:ea typeface="Microsoft YaHei" charset="-122"/>
-              </a:defRPr>
-            </a:lvl6pPr>
-            <a:lvl7pPr marL="2971800" indent="-228600" defTabSz="457200" eaLnBrk="0" fontAlgn="base" hangingPunct="0">
-              <a:lnSpc>
-                <a:spcPct val="93000"/>
-              </a:lnSpc>
-              <a:spcBef>
-                <a:spcPct val="0"/>
-              </a:spcBef>
-              <a:spcAft>
-                <a:spcPct val="0"/>
-              </a:spcAft>
-              <a:buClr>
-                <a:srgbClr val="000000"/>
-              </a:buClr>
-              <a:buSzPct val="100000"/>
-              <a:buFont typeface="Times New Roman" pitchFamily="16" charset="0"/>
-              <a:tabLst>
-                <a:tab pos="723900" algn="l"/>
-                <a:tab pos="1447800" algn="l"/>
-                <a:tab pos="2171700" algn="l"/>
-              </a:tabLst>
-              <a:defRPr>
-                <a:solidFill>
-                  <a:schemeClr val="bg1"/>
-                </a:solidFill>
-                <a:latin typeface="Arial" charset="0"/>
-                <a:ea typeface="Microsoft YaHei" charset="-122"/>
-              </a:defRPr>
-            </a:lvl7pPr>
-            <a:lvl8pPr marL="3429000" indent="-228600" defTabSz="457200" eaLnBrk="0" fontAlgn="base" hangingPunct="0">
-              <a:lnSpc>
-                <a:spcPct val="93000"/>
-              </a:lnSpc>
-              <a:spcBef>
-                <a:spcPct val="0"/>
-              </a:spcBef>
-              <a:spcAft>
-                <a:spcPct val="0"/>
-              </a:spcAft>
-              <a:buClr>
-                <a:srgbClr val="000000"/>
-              </a:buClr>
-              <a:buSzPct val="100000"/>
-              <a:buFont typeface="Times New Roman" pitchFamily="16" charset="0"/>
-              <a:tabLst>
-                <a:tab pos="723900" algn="l"/>
-                <a:tab pos="1447800" algn="l"/>
-                <a:tab pos="2171700" algn="l"/>
-              </a:tabLst>
-              <a:defRPr>
-                <a:solidFill>
-                  <a:schemeClr val="bg1"/>
-                </a:solidFill>
-                <a:latin typeface="Arial" charset="0"/>
-                <a:ea typeface="Microsoft YaHei" charset="-122"/>
-              </a:defRPr>
-            </a:lvl8pPr>
-            <a:lvl9pPr marL="3886200" indent="-228600" defTabSz="457200" eaLnBrk="0" fontAlgn="base" hangingPunct="0">
-              <a:lnSpc>
-                <a:spcPct val="93000"/>
-              </a:lnSpc>
-              <a:spcBef>
-                <a:spcPct val="0"/>
-              </a:spcBef>
-              <a:spcAft>
-                <a:spcPct val="0"/>
-              </a:spcAft>
-              <a:buClr>
-                <a:srgbClr val="000000"/>
-              </a:buClr>
-              <a:buSzPct val="100000"/>
-              <a:buFont typeface="Times New Roman" pitchFamily="16" charset="0"/>
-              <a:tabLst>
-                <a:tab pos="723900" algn="l"/>
-                <a:tab pos="1447800" algn="l"/>
-                <a:tab pos="2171700" algn="l"/>
-              </a:tabLst>
-              <a:defRPr>
-                <a:solidFill>
-                  <a:schemeClr val="bg1"/>
-                </a:solidFill>
-                <a:latin typeface="Arial" charset="0"/>
-                <a:ea typeface="Microsoft YaHei" charset="-122"/>
-              </a:defRPr>
-            </a:lvl9pPr>
-          </a:lstStyle>
-          <a:p>
-            <a:pPr eaLnBrk="1"/>
-            <a:fld id="{C2F45C50-959A-460C-9CF6-7EF95D6A3FB7}" type="slidenum">
-              <a:rPr lang="en-US" altLang="en-US">
-                <a:solidFill>
-                  <a:srgbClr val="FFFFFF"/>
-                </a:solidFill>
-                <a:latin typeface="Times New Roman" pitchFamily="16" charset="0"/>
-              </a:rPr>
-              <a:pPr eaLnBrk="1"/>
-              <a:t>54</a:t>
-            </a:fld>
-            <a:endParaRPr lang="en-US" altLang="en-US">
-              <a:solidFill>
-                <a:srgbClr val="FFFFFF"/>
-              </a:solidFill>
-              <a:latin typeface="Times New Roman" pitchFamily="16" charset="0"/>
-            </a:endParaRPr>
-          </a:p>
-        </p:txBody>
-      </p:sp>
       <p:sp>
         <p:nvSpPr>
           <p:cNvPr id="59395" name="Rectangle 1"/>
@@ -44968,6 +43953,35 @@
           </a:extLst>
         </p:spPr>
       </p:pic>
+      <p:sp>
+        <p:nvSpPr>
+          <p:cNvPr id="5" name="Slide Number Placeholder 4"/>
+          <p:cNvSpPr>
+            <a:spLocks noGrp="1"/>
+          </p:cNvSpPr>
+          <p:nvPr>
+            <p:ph type="sldNum" idx="12"/>
+          </p:nvPr>
+        </p:nvSpPr>
+        <p:spPr/>
+        <p:txBody>
+          <a:bodyPr/>
+          <a:lstStyle/>
+          <a:p>
+            <a:pPr>
+              <a:defRPr/>
+            </a:pPr>
+            <a:fld id="{8C6E2802-7AC4-44BB-B0A5-E12803E0614A}" type="slidenum">
+              <a:rPr lang="en-US" altLang="en-US" smtClean="0"/>
+              <a:pPr>
+                <a:defRPr/>
+              </a:pPr>
+              <a:t>54</a:t>
+            </a:fld>
+            <a:endParaRPr lang="en-US" altLang="en-US" dirty="0"/>
+          </a:p>
+        </p:txBody>
+      </p:sp>
     </p:spTree>
   </p:cSld>
   <p:clrMapOvr>
@@ -45021,238 +44035,6 @@
           <a:chExt cx="0" cy="0"/>
         </a:xfrm>
       </p:grpSpPr>
-      <p:sp>
-        <p:nvSpPr>
-          <p:cNvPr id="12290" name="Slide Number Placeholder 5"/>
-          <p:cNvSpPr>
-            <a:spLocks noGrp="1"/>
-          </p:cNvSpPr>
-          <p:nvPr>
-            <p:ph type="sldNum" sz="quarter" idx="12"/>
-          </p:nvPr>
-        </p:nvSpPr>
-        <p:spPr>
-          <a:noFill/>
-          <a:extLst>
-            <a:ext uri="{91240B29-F687-4F45-9708-019B960494DF}">
-              <a14:hiddenLine xmlns:a14="http://schemas.microsoft.com/office/drawing/2010/main" xmlns="" w="9525">
-                <a:solidFill>
-                  <a:srgbClr val="808080"/>
-                </a:solidFill>
-                <a:round/>
-                <a:headEnd/>
-                <a:tailEnd/>
-              </a14:hiddenLine>
-            </a:ext>
-          </a:extLst>
-        </p:spPr>
-        <p:txBody>
-          <a:bodyPr/>
-          <a:lstStyle>
-            <a:lvl1pPr eaLnBrk="0">
-              <a:tabLst>
-                <a:tab pos="723900" algn="l"/>
-                <a:tab pos="1447800" algn="l"/>
-                <a:tab pos="2171700" algn="l"/>
-              </a:tabLst>
-              <a:defRPr>
-                <a:solidFill>
-                  <a:schemeClr val="bg1"/>
-                </a:solidFill>
-                <a:latin typeface="Arial" charset="0"/>
-                <a:ea typeface="Microsoft YaHei" charset="-122"/>
-              </a:defRPr>
-            </a:lvl1pPr>
-            <a:lvl2pPr eaLnBrk="0">
-              <a:tabLst>
-                <a:tab pos="723900" algn="l"/>
-                <a:tab pos="1447800" algn="l"/>
-                <a:tab pos="2171700" algn="l"/>
-              </a:tabLst>
-              <a:defRPr>
-                <a:solidFill>
-                  <a:schemeClr val="bg1"/>
-                </a:solidFill>
-                <a:latin typeface="Arial" charset="0"/>
-                <a:ea typeface="Microsoft YaHei" charset="-122"/>
-              </a:defRPr>
-            </a:lvl2pPr>
-            <a:lvl3pPr eaLnBrk="0">
-              <a:tabLst>
-                <a:tab pos="723900" algn="l"/>
-                <a:tab pos="1447800" algn="l"/>
-                <a:tab pos="2171700" algn="l"/>
-              </a:tabLst>
-              <a:defRPr>
-                <a:solidFill>
-                  <a:schemeClr val="bg1"/>
-                </a:solidFill>
-                <a:latin typeface="Arial" charset="0"/>
-                <a:ea typeface="Microsoft YaHei" charset="-122"/>
-              </a:defRPr>
-            </a:lvl3pPr>
-            <a:lvl4pPr eaLnBrk="0">
-              <a:tabLst>
-                <a:tab pos="723900" algn="l"/>
-                <a:tab pos="1447800" algn="l"/>
-                <a:tab pos="2171700" algn="l"/>
-              </a:tabLst>
-              <a:defRPr>
-                <a:solidFill>
-                  <a:schemeClr val="bg1"/>
-                </a:solidFill>
-                <a:latin typeface="Arial" charset="0"/>
-                <a:ea typeface="Microsoft YaHei" charset="-122"/>
-              </a:defRPr>
-            </a:lvl4pPr>
-            <a:lvl5pPr eaLnBrk="0">
-              <a:tabLst>
-                <a:tab pos="723900" algn="l"/>
-                <a:tab pos="1447800" algn="l"/>
-                <a:tab pos="2171700" algn="l"/>
-              </a:tabLst>
-              <a:defRPr>
-                <a:solidFill>
-                  <a:schemeClr val="bg1"/>
-                </a:solidFill>
-                <a:latin typeface="Arial" charset="0"/>
-                <a:ea typeface="Microsoft YaHei" charset="-122"/>
-              </a:defRPr>
-            </a:lvl5pPr>
-            <a:lvl6pPr marL="2514600" indent="-228600" defTabSz="457200" eaLnBrk="0" fontAlgn="base" hangingPunct="0">
-              <a:lnSpc>
-                <a:spcPct val="93000"/>
-              </a:lnSpc>
-              <a:spcBef>
-                <a:spcPct val="0"/>
-              </a:spcBef>
-              <a:spcAft>
-                <a:spcPct val="0"/>
-              </a:spcAft>
-              <a:buClr>
-                <a:srgbClr val="000000"/>
-              </a:buClr>
-              <a:buSzPct val="100000"/>
-              <a:buFont typeface="Times New Roman" pitchFamily="16" charset="0"/>
-              <a:tabLst>
-                <a:tab pos="723900" algn="l"/>
-                <a:tab pos="1447800" algn="l"/>
-                <a:tab pos="2171700" algn="l"/>
-              </a:tabLst>
-              <a:defRPr>
-                <a:solidFill>
-                  <a:schemeClr val="bg1"/>
-                </a:solidFill>
-                <a:latin typeface="Arial" charset="0"/>
-                <a:ea typeface="Microsoft YaHei" charset="-122"/>
-              </a:defRPr>
-            </a:lvl6pPr>
-            <a:lvl7pPr marL="2971800" indent="-228600" defTabSz="457200" eaLnBrk="0" fontAlgn="base" hangingPunct="0">
-              <a:lnSpc>
-                <a:spcPct val="93000"/>
-              </a:lnSpc>
-              <a:spcBef>
-                <a:spcPct val="0"/>
-              </a:spcBef>
-              <a:spcAft>
-                <a:spcPct val="0"/>
-              </a:spcAft>
-              <a:buClr>
-                <a:srgbClr val="000000"/>
-              </a:buClr>
-              <a:buSzPct val="100000"/>
-              <a:buFont typeface="Times New Roman" pitchFamily="16" charset="0"/>
-              <a:tabLst>
-                <a:tab pos="723900" algn="l"/>
-                <a:tab pos="1447800" algn="l"/>
-                <a:tab pos="2171700" algn="l"/>
-              </a:tabLst>
-              <a:defRPr>
-                <a:solidFill>
-                  <a:schemeClr val="bg1"/>
-                </a:solidFill>
-                <a:latin typeface="Arial" charset="0"/>
-                <a:ea typeface="Microsoft YaHei" charset="-122"/>
-              </a:defRPr>
-            </a:lvl7pPr>
-            <a:lvl8pPr marL="3429000" indent="-228600" defTabSz="457200" eaLnBrk="0" fontAlgn="base" hangingPunct="0">
-              <a:lnSpc>
-                <a:spcPct val="93000"/>
-              </a:lnSpc>
-              <a:spcBef>
-                <a:spcPct val="0"/>
-              </a:spcBef>
-              <a:spcAft>
-                <a:spcPct val="0"/>
-              </a:spcAft>
-              <a:buClr>
-                <a:srgbClr val="000000"/>
-              </a:buClr>
-              <a:buSzPct val="100000"/>
-              <a:buFont typeface="Times New Roman" pitchFamily="16" charset="0"/>
-              <a:tabLst>
-                <a:tab pos="723900" algn="l"/>
-                <a:tab pos="1447800" algn="l"/>
-                <a:tab pos="2171700" algn="l"/>
-              </a:tabLst>
-              <a:defRPr>
-                <a:solidFill>
-                  <a:schemeClr val="bg1"/>
-                </a:solidFill>
-                <a:latin typeface="Arial" charset="0"/>
-                <a:ea typeface="Microsoft YaHei" charset="-122"/>
-              </a:defRPr>
-            </a:lvl8pPr>
-            <a:lvl9pPr marL="3886200" indent="-228600" defTabSz="457200" eaLnBrk="0" fontAlgn="base" hangingPunct="0">
-              <a:lnSpc>
-                <a:spcPct val="93000"/>
-              </a:lnSpc>
-              <a:spcBef>
-                <a:spcPct val="0"/>
-              </a:spcBef>
-              <a:spcAft>
-                <a:spcPct val="0"/>
-              </a:spcAft>
-              <a:buClr>
-                <a:srgbClr val="000000"/>
-              </a:buClr>
-              <a:buSzPct val="100000"/>
-              <a:buFont typeface="Times New Roman" pitchFamily="16" charset="0"/>
-              <a:tabLst>
-                <a:tab pos="723900" algn="l"/>
-                <a:tab pos="1447800" algn="l"/>
-                <a:tab pos="2171700" algn="l"/>
-              </a:tabLst>
-              <a:defRPr>
-                <a:solidFill>
-                  <a:schemeClr val="bg1"/>
-                </a:solidFill>
-                <a:latin typeface="Arial" charset="0"/>
-                <a:ea typeface="Microsoft YaHei" charset="-122"/>
-              </a:defRPr>
-            </a:lvl9pPr>
-          </a:lstStyle>
-          <a:p>
-            <a:pPr eaLnBrk="1"/>
-            <a:fld id="{85C6F0AE-4995-41EF-B6C3-D811A501CE91}" type="slidenum">
-              <a:rPr lang="en-US" altLang="en-US">
-                <a:solidFill>
-                  <a:srgbClr val="FFFFFF"/>
-                </a:solidFill>
-                <a:latin typeface="Times New Roman" pitchFamily="16" charset="0"/>
-              </a:rPr>
-              <a:pPr eaLnBrk="1"/>
-              <a:t>6</a:t>
-            </a:fld>
-            <a:endParaRPr lang="en-US" altLang="en-US">
-              <a:solidFill>
-                <a:srgbClr val="FFFFFF"/>
-              </a:solidFill>
-              <a:latin typeface="Times New Roman" pitchFamily="16" charset="0"/>
-            </a:endParaRPr>
-          </a:p>
-        </p:txBody>
-      </p:sp>
       <p:sp>
         <p:nvSpPr>
           <p:cNvPr id="12291" name="Rectangle 1"/>
@@ -46095,6 +44877,35 @@
           </a:p>
         </p:txBody>
       </p:sp>
+      <p:sp>
+        <p:nvSpPr>
+          <p:cNvPr id="6" name="Slide Number Placeholder 5"/>
+          <p:cNvSpPr>
+            <a:spLocks noGrp="1"/>
+          </p:cNvSpPr>
+          <p:nvPr>
+            <p:ph type="sldNum" idx="12"/>
+          </p:nvPr>
+        </p:nvSpPr>
+        <p:spPr/>
+        <p:txBody>
+          <a:bodyPr/>
+          <a:lstStyle/>
+          <a:p>
+            <a:pPr>
+              <a:defRPr/>
+            </a:pPr>
+            <a:fld id="{8C6E2802-7AC4-44BB-B0A5-E12803E0614A}" type="slidenum">
+              <a:rPr lang="en-US" altLang="en-US" smtClean="0"/>
+              <a:pPr>
+                <a:defRPr/>
+              </a:pPr>
+              <a:t>6</a:t>
+            </a:fld>
+            <a:endParaRPr lang="en-US" altLang="en-US" dirty="0"/>
+          </a:p>
+        </p:txBody>
+      </p:sp>
     </p:spTree>
   </p:cSld>
   <p:clrMapOvr>
@@ -46200,238 +45011,6 @@
           <a:chExt cx="0" cy="0"/>
         </a:xfrm>
       </p:grpSpPr>
-      <p:sp>
-        <p:nvSpPr>
-          <p:cNvPr id="13314" name="Slide Number Placeholder 5"/>
-          <p:cNvSpPr>
-            <a:spLocks noGrp="1"/>
-          </p:cNvSpPr>
-          <p:nvPr>
-            <p:ph type="sldNum" sz="quarter" idx="12"/>
-          </p:nvPr>
-        </p:nvSpPr>
-        <p:spPr>
-          <a:noFill/>
-          <a:extLst>
-            <a:ext uri="{91240B29-F687-4F45-9708-019B960494DF}">
-              <a14:hiddenLine xmlns:a14="http://schemas.microsoft.com/office/drawing/2010/main" xmlns="" w="9525">
-                <a:solidFill>
-                  <a:srgbClr val="808080"/>
-                </a:solidFill>
-                <a:round/>
-                <a:headEnd/>
-                <a:tailEnd/>
-              </a14:hiddenLine>
-            </a:ext>
-          </a:extLst>
-        </p:spPr>
-        <p:txBody>
-          <a:bodyPr/>
-          <a:lstStyle>
-            <a:lvl1pPr eaLnBrk="0">
-              <a:tabLst>
-                <a:tab pos="723900" algn="l"/>
-                <a:tab pos="1447800" algn="l"/>
-                <a:tab pos="2171700" algn="l"/>
-              </a:tabLst>
-              <a:defRPr>
-                <a:solidFill>
-                  <a:schemeClr val="bg1"/>
-                </a:solidFill>
-                <a:latin typeface="Arial" charset="0"/>
-                <a:ea typeface="Microsoft YaHei" charset="-122"/>
-              </a:defRPr>
-            </a:lvl1pPr>
-            <a:lvl2pPr eaLnBrk="0">
-              <a:tabLst>
-                <a:tab pos="723900" algn="l"/>
-                <a:tab pos="1447800" algn="l"/>
-                <a:tab pos="2171700" algn="l"/>
-              </a:tabLst>
-              <a:defRPr>
-                <a:solidFill>
-                  <a:schemeClr val="bg1"/>
-                </a:solidFill>
-                <a:latin typeface="Arial" charset="0"/>
-                <a:ea typeface="Microsoft YaHei" charset="-122"/>
-              </a:defRPr>
-            </a:lvl2pPr>
-            <a:lvl3pPr eaLnBrk="0">
-              <a:tabLst>
-                <a:tab pos="723900" algn="l"/>
-                <a:tab pos="1447800" algn="l"/>
-                <a:tab pos="2171700" algn="l"/>
-              </a:tabLst>
-              <a:defRPr>
-                <a:solidFill>
-                  <a:schemeClr val="bg1"/>
-                </a:solidFill>
-                <a:latin typeface="Arial" charset="0"/>
-                <a:ea typeface="Microsoft YaHei" charset="-122"/>
-              </a:defRPr>
-            </a:lvl3pPr>
-            <a:lvl4pPr eaLnBrk="0">
-              <a:tabLst>
-                <a:tab pos="723900" algn="l"/>
-                <a:tab pos="1447800" algn="l"/>
-                <a:tab pos="2171700" algn="l"/>
-              </a:tabLst>
-              <a:defRPr>
-                <a:solidFill>
-                  <a:schemeClr val="bg1"/>
-                </a:solidFill>
-                <a:latin typeface="Arial" charset="0"/>
-                <a:ea typeface="Microsoft YaHei" charset="-122"/>
-              </a:defRPr>
-            </a:lvl4pPr>
-            <a:lvl5pPr eaLnBrk="0">
-              <a:tabLst>
-                <a:tab pos="723900" algn="l"/>
-                <a:tab pos="1447800" algn="l"/>
-                <a:tab pos="2171700" algn="l"/>
-              </a:tabLst>
-              <a:defRPr>
-                <a:solidFill>
-                  <a:schemeClr val="bg1"/>
-                </a:solidFill>
-                <a:latin typeface="Arial" charset="0"/>
-                <a:ea typeface="Microsoft YaHei" charset="-122"/>
-              </a:defRPr>
-            </a:lvl5pPr>
-            <a:lvl6pPr marL="2514600" indent="-228600" defTabSz="457200" eaLnBrk="0" fontAlgn="base" hangingPunct="0">
-              <a:lnSpc>
-                <a:spcPct val="93000"/>
-              </a:lnSpc>
-              <a:spcBef>
-                <a:spcPct val="0"/>
-              </a:spcBef>
-              <a:spcAft>
-                <a:spcPct val="0"/>
-              </a:spcAft>
-              <a:buClr>
-                <a:srgbClr val="000000"/>
-              </a:buClr>
-              <a:buSzPct val="100000"/>
-              <a:buFont typeface="Times New Roman" pitchFamily="16" charset="0"/>
-              <a:tabLst>
-                <a:tab pos="723900" algn="l"/>
-                <a:tab pos="1447800" algn="l"/>
-                <a:tab pos="2171700" algn="l"/>
-              </a:tabLst>
-              <a:defRPr>
-                <a:solidFill>
-                  <a:schemeClr val="bg1"/>
-                </a:solidFill>
-                <a:latin typeface="Arial" charset="0"/>
-                <a:ea typeface="Microsoft YaHei" charset="-122"/>
-              </a:defRPr>
-            </a:lvl6pPr>
-            <a:lvl7pPr marL="2971800" indent="-228600" defTabSz="457200" eaLnBrk="0" fontAlgn="base" hangingPunct="0">
-              <a:lnSpc>
-                <a:spcPct val="93000"/>
-              </a:lnSpc>
-              <a:spcBef>
-                <a:spcPct val="0"/>
-              </a:spcBef>
-              <a:spcAft>
-                <a:spcPct val="0"/>
-              </a:spcAft>
-              <a:buClr>
-                <a:srgbClr val="000000"/>
-              </a:buClr>
-              <a:buSzPct val="100000"/>
-              <a:buFont typeface="Times New Roman" pitchFamily="16" charset="0"/>
-              <a:tabLst>
-                <a:tab pos="723900" algn="l"/>
-                <a:tab pos="1447800" algn="l"/>
-                <a:tab pos="2171700" algn="l"/>
-              </a:tabLst>
-              <a:defRPr>
-                <a:solidFill>
-                  <a:schemeClr val="bg1"/>
-                </a:solidFill>
-                <a:latin typeface="Arial" charset="0"/>
-                <a:ea typeface="Microsoft YaHei" charset="-122"/>
-              </a:defRPr>
-            </a:lvl7pPr>
-            <a:lvl8pPr marL="3429000" indent="-228600" defTabSz="457200" eaLnBrk="0" fontAlgn="base" hangingPunct="0">
-              <a:lnSpc>
-                <a:spcPct val="93000"/>
-              </a:lnSpc>
-              <a:spcBef>
-                <a:spcPct val="0"/>
-              </a:spcBef>
-              <a:spcAft>
-                <a:spcPct val="0"/>
-              </a:spcAft>
-              <a:buClr>
-                <a:srgbClr val="000000"/>
-              </a:buClr>
-              <a:buSzPct val="100000"/>
-              <a:buFont typeface="Times New Roman" pitchFamily="16" charset="0"/>
-              <a:tabLst>
-                <a:tab pos="723900" algn="l"/>
-                <a:tab pos="1447800" algn="l"/>
-                <a:tab pos="2171700" algn="l"/>
-              </a:tabLst>
-              <a:defRPr>
-                <a:solidFill>
-                  <a:schemeClr val="bg1"/>
-                </a:solidFill>
-                <a:latin typeface="Arial" charset="0"/>
-                <a:ea typeface="Microsoft YaHei" charset="-122"/>
-              </a:defRPr>
-            </a:lvl8pPr>
-            <a:lvl9pPr marL="3886200" indent="-228600" defTabSz="457200" eaLnBrk="0" fontAlgn="base" hangingPunct="0">
-              <a:lnSpc>
-                <a:spcPct val="93000"/>
-              </a:lnSpc>
-              <a:spcBef>
-                <a:spcPct val="0"/>
-              </a:spcBef>
-              <a:spcAft>
-                <a:spcPct val="0"/>
-              </a:spcAft>
-              <a:buClr>
-                <a:srgbClr val="000000"/>
-              </a:buClr>
-              <a:buSzPct val="100000"/>
-              <a:buFont typeface="Times New Roman" pitchFamily="16" charset="0"/>
-              <a:tabLst>
-                <a:tab pos="723900" algn="l"/>
-                <a:tab pos="1447800" algn="l"/>
-                <a:tab pos="2171700" algn="l"/>
-              </a:tabLst>
-              <a:defRPr>
-                <a:solidFill>
-                  <a:schemeClr val="bg1"/>
-                </a:solidFill>
-                <a:latin typeface="Arial" charset="0"/>
-                <a:ea typeface="Microsoft YaHei" charset="-122"/>
-              </a:defRPr>
-            </a:lvl9pPr>
-          </a:lstStyle>
-          <a:p>
-            <a:pPr eaLnBrk="1"/>
-            <a:fld id="{3043712C-C5B1-4104-88B5-88210B9E8C5E}" type="slidenum">
-              <a:rPr lang="en-US" altLang="en-US">
-                <a:solidFill>
-                  <a:srgbClr val="FFFFFF"/>
-                </a:solidFill>
-                <a:latin typeface="Times New Roman" pitchFamily="16" charset="0"/>
-              </a:rPr>
-              <a:pPr eaLnBrk="1"/>
-              <a:t>7</a:t>
-            </a:fld>
-            <a:endParaRPr lang="en-US" altLang="en-US">
-              <a:solidFill>
-                <a:srgbClr val="FFFFFF"/>
-              </a:solidFill>
-              <a:latin typeface="Times New Roman" pitchFamily="16" charset="0"/>
-            </a:endParaRPr>
-          </a:p>
-        </p:txBody>
-      </p:sp>
       <p:sp>
         <p:nvSpPr>
           <p:cNvPr id="13315" name="Rectangle 1"/>
@@ -46567,6 +45146,35 @@
           </a:extLst>
         </p:spPr>
       </p:pic>
+      <p:sp>
+        <p:nvSpPr>
+          <p:cNvPr id="5" name="Slide Number Placeholder 4"/>
+          <p:cNvSpPr>
+            <a:spLocks noGrp="1"/>
+          </p:cNvSpPr>
+          <p:nvPr>
+            <p:ph type="sldNum" idx="12"/>
+          </p:nvPr>
+        </p:nvSpPr>
+        <p:spPr/>
+        <p:txBody>
+          <a:bodyPr/>
+          <a:lstStyle/>
+          <a:p>
+            <a:pPr>
+              <a:defRPr/>
+            </a:pPr>
+            <a:fld id="{8C6E2802-7AC4-44BB-B0A5-E12803E0614A}" type="slidenum">
+              <a:rPr lang="en-US" altLang="en-US" smtClean="0"/>
+              <a:pPr>
+                <a:defRPr/>
+              </a:pPr>
+              <a:t>7</a:t>
+            </a:fld>
+            <a:endParaRPr lang="en-US" altLang="en-US" dirty="0"/>
+          </a:p>
+        </p:txBody>
+      </p:sp>
     </p:spTree>
   </p:cSld>
   <p:clrMapOvr>
@@ -46726,7 +45334,7 @@
       </p:sp>
       <p:sp>
         <p:nvSpPr>
-          <p:cNvPr id="4" name="Slide Number Placeholder 3"/>
+          <p:cNvPr id="5" name="Slide Number Placeholder 4"/>
           <p:cNvSpPr>
             <a:spLocks noGrp="1"/>
           </p:cNvSpPr>
@@ -46853,35 +45461,6 @@
           </a:p>
         </p:txBody>
       </p:sp>
-      <p:sp>
-        <p:nvSpPr>
-          <p:cNvPr id="4" name="Slide Number Placeholder 3"/>
-          <p:cNvSpPr>
-            <a:spLocks noGrp="1"/>
-          </p:cNvSpPr>
-          <p:nvPr>
-            <p:ph type="sldNum" idx="12"/>
-          </p:nvPr>
-        </p:nvSpPr>
-        <p:spPr/>
-        <p:txBody>
-          <a:bodyPr/>
-          <a:lstStyle/>
-          <a:p>
-            <a:pPr>
-              <a:defRPr/>
-            </a:pPr>
-            <a:fld id="{8C6E2802-7AC4-44BB-B0A5-E12803E0614A}" type="slidenum">
-              <a:rPr lang="en-US" altLang="en-US" smtClean="0"/>
-              <a:pPr>
-                <a:defRPr/>
-              </a:pPr>
-              <a:t>9</a:t>
-            </a:fld>
-            <a:endParaRPr lang="en-US" altLang="en-US" dirty="0"/>
-          </a:p>
-        </p:txBody>
-      </p:sp>
       <p:graphicFrame>
         <p:nvGraphicFramePr>
           <p:cNvPr id="5" name="Table 4"/>
@@ -48248,6 +46827,35 @@
                 <a:schemeClr val="tx1"/>
               </a:solidFill>
             </a:endParaRPr>
+          </a:p>
+        </p:txBody>
+      </p:sp>
+      <p:sp>
+        <p:nvSpPr>
+          <p:cNvPr id="7" name="Slide Number Placeholder 6"/>
+          <p:cNvSpPr>
+            <a:spLocks noGrp="1"/>
+          </p:cNvSpPr>
+          <p:nvPr>
+            <p:ph type="sldNum" idx="12"/>
+          </p:nvPr>
+        </p:nvSpPr>
+        <p:spPr/>
+        <p:txBody>
+          <a:bodyPr/>
+          <a:lstStyle/>
+          <a:p>
+            <a:pPr>
+              <a:defRPr/>
+            </a:pPr>
+            <a:fld id="{8C6E2802-7AC4-44BB-B0A5-E12803E0614A}" type="slidenum">
+              <a:rPr lang="en-US" altLang="en-US" smtClean="0"/>
+              <a:pPr>
+                <a:defRPr/>
+              </a:pPr>
+              <a:t>9</a:t>
+            </a:fld>
+            <a:endParaRPr lang="en-US" altLang="en-US" dirty="0"/>
           </a:p>
         </p:txBody>
       </p:sp>

</xml_diff>

<commit_message>
This is the final one finally, Tom
</commit_message>
<xml_diff>
--- a/CMQA/Presentations/SRR Presentation.pptx
+++ b/CMQA/Presentations/SRR Presentation.pptx
@@ -286,7 +286,7 @@
           <a:effectLst/>
           <a:extLst>
             <a:ext uri="{91240B29-F687-4F45-9708-019B960494DF}">
-              <a14:hiddenLine xmlns:a14="http://schemas.microsoft.com/office/drawing/2010/main" xmlns="" w="9360" cap="sq">
+              <a14:hiddenLine xmlns:a14="http://schemas.microsoft.com/office/drawing/2010/main" w="9360" cap="sq">
                 <a:solidFill>
                   <a:srgbClr val="000000"/>
                 </a:solidFill>
@@ -296,7 +296,7 @@
               </a14:hiddenLine>
             </a:ext>
             <a:ext uri="{AF507438-7753-43E0-B8FC-AC1667EBCBE1}">
-              <a14:hiddenEffects xmlns:a14="http://schemas.microsoft.com/office/drawing/2010/main" xmlns="">
+              <a14:hiddenEffects xmlns:a14="http://schemas.microsoft.com/office/drawing/2010/main">
                 <a:effectLst>
                   <a:outerShdw dist="35921" dir="2700000" algn="ctr" rotWithShape="0">
                     <a:srgbClr val="808080"/>
@@ -341,7 +341,7 @@
           <a:effectLst/>
           <a:extLst>
             <a:ext uri="{91240B29-F687-4F45-9708-019B960494DF}">
-              <a14:hiddenLine xmlns:a14="http://schemas.microsoft.com/office/drawing/2010/main" xmlns="" w="9525">
+              <a14:hiddenLine xmlns:a14="http://schemas.microsoft.com/office/drawing/2010/main" w="9525">
                 <a:solidFill>
                   <a:srgbClr val="808080"/>
                 </a:solidFill>
@@ -351,7 +351,7 @@
               </a14:hiddenLine>
             </a:ext>
             <a:ext uri="{AF507438-7753-43E0-B8FC-AC1667EBCBE1}">
-              <a14:hiddenEffects xmlns:a14="http://schemas.microsoft.com/office/drawing/2010/main" xmlns="">
+              <a14:hiddenEffects xmlns:a14="http://schemas.microsoft.com/office/drawing/2010/main">
                 <a:effectLst>
                   <a:outerShdw dist="35921" dir="2700000" algn="ctr" rotWithShape="0">
                     <a:srgbClr val="808080"/>
@@ -396,7 +396,7 @@
           <a:effectLst/>
           <a:extLst>
             <a:ext uri="{91240B29-F687-4F45-9708-019B960494DF}">
-              <a14:hiddenLine xmlns:a14="http://schemas.microsoft.com/office/drawing/2010/main" xmlns="" w="9525">
+              <a14:hiddenLine xmlns:a14="http://schemas.microsoft.com/office/drawing/2010/main" w="9525">
                 <a:solidFill>
                   <a:srgbClr val="808080"/>
                 </a:solidFill>
@@ -406,7 +406,7 @@
               </a14:hiddenLine>
             </a:ext>
             <a:ext uri="{AF507438-7753-43E0-B8FC-AC1667EBCBE1}">
-              <a14:hiddenEffects xmlns:a14="http://schemas.microsoft.com/office/drawing/2010/main" xmlns="">
+              <a14:hiddenEffects xmlns:a14="http://schemas.microsoft.com/office/drawing/2010/main">
                 <a:effectLst>
                   <a:outerShdw dist="35921" dir="2700000" algn="ctr" rotWithShape="0">
                     <a:srgbClr val="808080"/>
@@ -451,7 +451,7 @@
           <a:effectLst/>
           <a:extLst>
             <a:ext uri="{91240B29-F687-4F45-9708-019B960494DF}">
-              <a14:hiddenLine xmlns:a14="http://schemas.microsoft.com/office/drawing/2010/main" xmlns="" w="9525">
+              <a14:hiddenLine xmlns:a14="http://schemas.microsoft.com/office/drawing/2010/main" w="9525">
                 <a:solidFill>
                   <a:srgbClr val="808080"/>
                 </a:solidFill>
@@ -461,7 +461,7 @@
               </a14:hiddenLine>
             </a:ext>
             <a:ext uri="{AF507438-7753-43E0-B8FC-AC1667EBCBE1}">
-              <a14:hiddenEffects xmlns:a14="http://schemas.microsoft.com/office/drawing/2010/main" xmlns="">
+              <a14:hiddenEffects xmlns:a14="http://schemas.microsoft.com/office/drawing/2010/main">
                 <a:effectLst>
                   <a:outerShdw dist="35921" dir="2700000" algn="ctr" rotWithShape="0">
                     <a:srgbClr val="808080"/>
@@ -506,7 +506,7 @@
           <a:effectLst/>
           <a:extLst>
             <a:ext uri="{91240B29-F687-4F45-9708-019B960494DF}">
-              <a14:hiddenLine xmlns:a14="http://schemas.microsoft.com/office/drawing/2010/main" xmlns="" w="9525">
+              <a14:hiddenLine xmlns:a14="http://schemas.microsoft.com/office/drawing/2010/main" w="9525">
                 <a:solidFill>
                   <a:srgbClr val="808080"/>
                 </a:solidFill>
@@ -516,7 +516,7 @@
               </a14:hiddenLine>
             </a:ext>
             <a:ext uri="{AF507438-7753-43E0-B8FC-AC1667EBCBE1}">
-              <a14:hiddenEffects xmlns:a14="http://schemas.microsoft.com/office/drawing/2010/main" xmlns="">
+              <a14:hiddenEffects xmlns:a14="http://schemas.microsoft.com/office/drawing/2010/main">
                 <a:effectLst>
                   <a:outerShdw dist="35921" dir="2700000" algn="ctr" rotWithShape="0">
                     <a:srgbClr val="808080"/>
@@ -559,14 +559,14 @@
           <a:effectLst/>
           <a:extLst>
             <a:ext uri="{909E8E84-426E-40DD-AFC4-6F175D3DCCD1}">
-              <a14:hiddenFill xmlns:a14="http://schemas.microsoft.com/office/drawing/2010/main" xmlns="">
+              <a14:hiddenFill xmlns:a14="http://schemas.microsoft.com/office/drawing/2010/main">
                 <a:solidFill>
                   <a:srgbClr val="FFFFFF"/>
                 </a:solidFill>
               </a14:hiddenFill>
             </a:ext>
             <a:ext uri="{91240B29-F687-4F45-9708-019B960494DF}">
-              <a14:hiddenLine xmlns:a14="http://schemas.microsoft.com/office/drawing/2010/main" xmlns="" w="9525">
+              <a14:hiddenLine xmlns:a14="http://schemas.microsoft.com/office/drawing/2010/main" w="9525">
                 <a:solidFill>
                   <a:srgbClr val="808080"/>
                 </a:solidFill>
@@ -576,7 +576,7 @@
               </a14:hiddenLine>
             </a:ext>
             <a:ext uri="{AF507438-7753-43E0-B8FC-AC1667EBCBE1}">
-              <a14:hiddenEffects xmlns:a14="http://schemas.microsoft.com/office/drawing/2010/main" xmlns="">
+              <a14:hiddenEffects xmlns:a14="http://schemas.microsoft.com/office/drawing/2010/main">
                 <a:effectLst>
                   <a:outerShdw dist="35921" dir="2700000" algn="ctr" rotWithShape="0">
                     <a:schemeClr val="bg2"/>
@@ -612,14 +612,14 @@
           <a:effectLst/>
           <a:extLst>
             <a:ext uri="{909E8E84-426E-40DD-AFC4-6F175D3DCCD1}">
-              <a14:hiddenFill xmlns:a14="http://schemas.microsoft.com/office/drawing/2010/main" xmlns="">
+              <a14:hiddenFill xmlns:a14="http://schemas.microsoft.com/office/drawing/2010/main">
                 <a:solidFill>
                   <a:srgbClr val="FFFFFF"/>
                 </a:solidFill>
               </a14:hiddenFill>
             </a:ext>
             <a:ext uri="{91240B29-F687-4F45-9708-019B960494DF}">
-              <a14:hiddenLine xmlns:a14="http://schemas.microsoft.com/office/drawing/2010/main" xmlns="" w="9525" cap="flat">
+              <a14:hiddenLine xmlns:a14="http://schemas.microsoft.com/office/drawing/2010/main" w="9525" cap="flat">
                 <a:solidFill>
                   <a:srgbClr val="808080"/>
                 </a:solidFill>
@@ -629,7 +629,7 @@
               </a14:hiddenLine>
             </a:ext>
             <a:ext uri="{AF507438-7753-43E0-B8FC-AC1667EBCBE1}">
-              <a14:hiddenEffects xmlns:a14="http://schemas.microsoft.com/office/drawing/2010/main" xmlns="">
+              <a14:hiddenEffects xmlns:a14="http://schemas.microsoft.com/office/drawing/2010/main">
                 <a:effectLst>
                   <a:outerShdw dist="35921" dir="2700000" algn="ctr" rotWithShape="0">
                     <a:schemeClr val="bg2"/>
@@ -677,14 +677,14 @@
           <a:effectLst/>
           <a:extLst>
             <a:ext uri="{909E8E84-426E-40DD-AFC4-6F175D3DCCD1}">
-              <a14:hiddenFill xmlns:a14="http://schemas.microsoft.com/office/drawing/2010/main" xmlns="">
+              <a14:hiddenFill xmlns:a14="http://schemas.microsoft.com/office/drawing/2010/main">
                 <a:solidFill>
                   <a:srgbClr val="FFFFFF"/>
                 </a:solidFill>
               </a14:hiddenFill>
             </a:ext>
             <a:ext uri="{91240B29-F687-4F45-9708-019B960494DF}">
-              <a14:hiddenLine xmlns:a14="http://schemas.microsoft.com/office/drawing/2010/main" xmlns="" w="9525" cap="flat">
+              <a14:hiddenLine xmlns:a14="http://schemas.microsoft.com/office/drawing/2010/main" w="9525" cap="flat">
                 <a:solidFill>
                   <a:srgbClr val="808080"/>
                 </a:solidFill>
@@ -694,7 +694,7 @@
               </a14:hiddenLine>
             </a:ext>
             <a:ext uri="{AF507438-7753-43E0-B8FC-AC1667EBCBE1}">
-              <a14:hiddenEffects xmlns:a14="http://schemas.microsoft.com/office/drawing/2010/main" xmlns="">
+              <a14:hiddenEffects xmlns:a14="http://schemas.microsoft.com/office/drawing/2010/main">
                 <a:effectLst>
                   <a:outerShdw dist="35921" dir="2700000" algn="ctr" rotWithShape="0">
                     <a:schemeClr val="bg2"/>
@@ -765,14 +765,14 @@
           <a:effectLst/>
           <a:extLst>
             <a:ext uri="{909E8E84-426E-40DD-AFC4-6F175D3DCCD1}">
-              <a14:hiddenFill xmlns:a14="http://schemas.microsoft.com/office/drawing/2010/main" xmlns="">
+              <a14:hiddenFill xmlns:a14="http://schemas.microsoft.com/office/drawing/2010/main">
                 <a:solidFill>
                   <a:srgbClr val="FFFFFF"/>
                 </a:solidFill>
               </a14:hiddenFill>
             </a:ext>
             <a:ext uri="{91240B29-F687-4F45-9708-019B960494DF}">
-              <a14:hiddenLine xmlns:a14="http://schemas.microsoft.com/office/drawing/2010/main" xmlns="" w="9525" cap="flat">
+              <a14:hiddenLine xmlns:a14="http://schemas.microsoft.com/office/drawing/2010/main" w="9525" cap="flat">
                 <a:solidFill>
                   <a:srgbClr val="808080"/>
                 </a:solidFill>
@@ -782,7 +782,7 @@
               </a14:hiddenLine>
             </a:ext>
             <a:ext uri="{AF507438-7753-43E0-B8FC-AC1667EBCBE1}">
-              <a14:hiddenEffects xmlns:a14="http://schemas.microsoft.com/office/drawing/2010/main" xmlns="">
+              <a14:hiddenEffects xmlns:a14="http://schemas.microsoft.com/office/drawing/2010/main">
                 <a:effectLst>
                   <a:outerShdw dist="35921" dir="2700000" algn="ctr" rotWithShape="0">
                     <a:schemeClr val="bg2"/>
@@ -853,14 +853,14 @@
           <a:effectLst/>
           <a:extLst>
             <a:ext uri="{909E8E84-426E-40DD-AFC4-6F175D3DCCD1}">
-              <a14:hiddenFill xmlns:a14="http://schemas.microsoft.com/office/drawing/2010/main" xmlns="">
+              <a14:hiddenFill xmlns:a14="http://schemas.microsoft.com/office/drawing/2010/main">
                 <a:solidFill>
                   <a:srgbClr val="FFFFFF"/>
                 </a:solidFill>
               </a14:hiddenFill>
             </a:ext>
             <a:ext uri="{91240B29-F687-4F45-9708-019B960494DF}">
-              <a14:hiddenLine xmlns:a14="http://schemas.microsoft.com/office/drawing/2010/main" xmlns="" w="9525" cap="flat">
+              <a14:hiddenLine xmlns:a14="http://schemas.microsoft.com/office/drawing/2010/main" w="9525" cap="flat">
                 <a:solidFill>
                   <a:srgbClr val="808080"/>
                 </a:solidFill>
@@ -870,7 +870,7 @@
               </a14:hiddenLine>
             </a:ext>
             <a:ext uri="{AF507438-7753-43E0-B8FC-AC1667EBCBE1}">
-              <a14:hiddenEffects xmlns:a14="http://schemas.microsoft.com/office/drawing/2010/main" xmlns="">
+              <a14:hiddenEffects xmlns:a14="http://schemas.microsoft.com/office/drawing/2010/main">
                 <a:effectLst>
                   <a:outerShdw dist="35921" dir="2700000" algn="ctr" rotWithShape="0">
                     <a:schemeClr val="bg2"/>
@@ -941,14 +941,14 @@
           <a:effectLst/>
           <a:extLst>
             <a:ext uri="{909E8E84-426E-40DD-AFC4-6F175D3DCCD1}">
-              <a14:hiddenFill xmlns:a14="http://schemas.microsoft.com/office/drawing/2010/main" xmlns="">
+              <a14:hiddenFill xmlns:a14="http://schemas.microsoft.com/office/drawing/2010/main">
                 <a:solidFill>
                   <a:srgbClr val="FFFFFF"/>
                 </a:solidFill>
               </a14:hiddenFill>
             </a:ext>
             <a:ext uri="{91240B29-F687-4F45-9708-019B960494DF}">
-              <a14:hiddenLine xmlns:a14="http://schemas.microsoft.com/office/drawing/2010/main" xmlns="" w="9525" cap="flat">
+              <a14:hiddenLine xmlns:a14="http://schemas.microsoft.com/office/drawing/2010/main" w="9525" cap="flat">
                 <a:solidFill>
                   <a:srgbClr val="808080"/>
                 </a:solidFill>
@@ -958,7 +958,7 @@
               </a14:hiddenLine>
             </a:ext>
             <a:ext uri="{AF507438-7753-43E0-B8FC-AC1667EBCBE1}">
-              <a14:hiddenEffects xmlns:a14="http://schemas.microsoft.com/office/drawing/2010/main" xmlns="">
+              <a14:hiddenEffects xmlns:a14="http://schemas.microsoft.com/office/drawing/2010/main">
                 <a:effectLst>
                   <a:outerShdw dist="35921" dir="2700000" algn="ctr" rotWithShape="0">
                     <a:schemeClr val="bg2"/>
@@ -1014,7 +1014,7 @@
     </p:spTree>
     <p:extLst>
       <p:ext uri="{BB962C8B-B14F-4D97-AF65-F5344CB8AC3E}">
-        <p14:creationId xmlns:p14="http://schemas.microsoft.com/office/powerpoint/2010/main" xmlns="" val="997753400"/>
+        <p14:creationId xmlns:p14="http://schemas.microsoft.com/office/powerpoint/2010/main" val="997753400"/>
       </p:ext>
     </p:extLst>
   </p:cSld>
@@ -1208,7 +1208,7 @@
           <a:noFill/>
           <a:extLst>
             <a:ext uri="{91240B29-F687-4F45-9708-019B960494DF}">
-              <a14:hiddenLine xmlns:a14="http://schemas.microsoft.com/office/drawing/2010/main" xmlns="" w="9525">
+              <a14:hiddenLine xmlns:a14="http://schemas.microsoft.com/office/drawing/2010/main" w="9525">
                 <a:solidFill>
                   <a:srgbClr val="808080"/>
                 </a:solidFill>
@@ -1463,7 +1463,7 @@
           </a:ln>
           <a:extLst>
             <a:ext uri="{AF507438-7753-43E0-B8FC-AC1667EBCBE1}">
-              <a14:hiddenEffects xmlns:a14="http://schemas.microsoft.com/office/drawing/2010/main" xmlns="">
+              <a14:hiddenEffects xmlns:a14="http://schemas.microsoft.com/office/drawing/2010/main">
                 <a:effectLst>
                   <a:outerShdw dist="35921" dir="2700000" algn="ctr" rotWithShape="0">
                     <a:srgbClr val="808080"/>
@@ -1492,7 +1492,7 @@
           <a:noFill/>
           <a:extLst>
             <a:ext uri="{91240B29-F687-4F45-9708-019B960494DF}">
-              <a14:hiddenLine xmlns:a14="http://schemas.microsoft.com/office/drawing/2010/main" xmlns="" w="9525">
+              <a14:hiddenLine xmlns:a14="http://schemas.microsoft.com/office/drawing/2010/main" w="9525">
                 <a:solidFill>
                   <a:srgbClr val="808080"/>
                 </a:solidFill>
@@ -1502,7 +1502,7 @@
               </a14:hiddenLine>
             </a:ext>
             <a:ext uri="{AF507438-7753-43E0-B8FC-AC1667EBCBE1}">
-              <a14:hiddenEffects xmlns:a14="http://schemas.microsoft.com/office/drawing/2010/main" xmlns="">
+              <a14:hiddenEffects xmlns:a14="http://schemas.microsoft.com/office/drawing/2010/main">
                 <a:effectLst>
                   <a:outerShdw dist="35921" dir="2700000" algn="ctr" rotWithShape="0">
                     <a:srgbClr val="808080"/>
@@ -1567,7 +1567,7 @@
           <a:noFill/>
           <a:extLst>
             <a:ext uri="{91240B29-F687-4F45-9708-019B960494DF}">
-              <a14:hiddenLine xmlns:a14="http://schemas.microsoft.com/office/drawing/2010/main" xmlns="" w="9525">
+              <a14:hiddenLine xmlns:a14="http://schemas.microsoft.com/office/drawing/2010/main" w="9525">
                 <a:solidFill>
                   <a:srgbClr val="808080"/>
                 </a:solidFill>
@@ -1822,7 +1822,7 @@
           </a:ln>
           <a:extLst>
             <a:ext uri="{AF507438-7753-43E0-B8FC-AC1667EBCBE1}">
-              <a14:hiddenEffects xmlns:a14="http://schemas.microsoft.com/office/drawing/2010/main" xmlns="">
+              <a14:hiddenEffects xmlns:a14="http://schemas.microsoft.com/office/drawing/2010/main">
                 <a:effectLst>
                   <a:outerShdw dist="35921" dir="2700000" algn="ctr" rotWithShape="0">
                     <a:srgbClr val="808080"/>
@@ -1851,7 +1851,7 @@
           <a:noFill/>
           <a:extLst>
             <a:ext uri="{91240B29-F687-4F45-9708-019B960494DF}">
-              <a14:hiddenLine xmlns:a14="http://schemas.microsoft.com/office/drawing/2010/main" xmlns="" w="9525">
+              <a14:hiddenLine xmlns:a14="http://schemas.microsoft.com/office/drawing/2010/main" w="9525">
                 <a:solidFill>
                   <a:srgbClr val="808080"/>
                 </a:solidFill>
@@ -1861,7 +1861,7 @@
               </a14:hiddenLine>
             </a:ext>
             <a:ext uri="{AF507438-7753-43E0-B8FC-AC1667EBCBE1}">
-              <a14:hiddenEffects xmlns:a14="http://schemas.microsoft.com/office/drawing/2010/main" xmlns="">
+              <a14:hiddenEffects xmlns:a14="http://schemas.microsoft.com/office/drawing/2010/main">
                 <a:effectLst>
                   <a:outerShdw dist="35921" dir="2700000" algn="ctr" rotWithShape="0">
                     <a:srgbClr val="808080"/>
@@ -1926,7 +1926,7 @@
           <a:noFill/>
           <a:extLst>
             <a:ext uri="{91240B29-F687-4F45-9708-019B960494DF}">
-              <a14:hiddenLine xmlns:a14="http://schemas.microsoft.com/office/drawing/2010/main" xmlns="" w="9525">
+              <a14:hiddenLine xmlns:a14="http://schemas.microsoft.com/office/drawing/2010/main" w="9525">
                 <a:solidFill>
                   <a:srgbClr val="808080"/>
                 </a:solidFill>
@@ -2181,7 +2181,7 @@
           </a:ln>
           <a:extLst>
             <a:ext uri="{AF507438-7753-43E0-B8FC-AC1667EBCBE1}">
-              <a14:hiddenEffects xmlns:a14="http://schemas.microsoft.com/office/drawing/2010/main" xmlns="">
+              <a14:hiddenEffects xmlns:a14="http://schemas.microsoft.com/office/drawing/2010/main">
                 <a:effectLst>
                   <a:outerShdw dist="35921" dir="2700000" algn="ctr" rotWithShape="0">
                     <a:srgbClr val="808080"/>
@@ -2210,7 +2210,7 @@
           <a:noFill/>
           <a:extLst>
             <a:ext uri="{91240B29-F687-4F45-9708-019B960494DF}">
-              <a14:hiddenLine xmlns:a14="http://schemas.microsoft.com/office/drawing/2010/main" xmlns="" w="9525">
+              <a14:hiddenLine xmlns:a14="http://schemas.microsoft.com/office/drawing/2010/main" w="9525">
                 <a:solidFill>
                   <a:srgbClr val="808080"/>
                 </a:solidFill>
@@ -2220,7 +2220,7 @@
               </a14:hiddenLine>
             </a:ext>
             <a:ext uri="{AF507438-7753-43E0-B8FC-AC1667EBCBE1}">
-              <a14:hiddenEffects xmlns:a14="http://schemas.microsoft.com/office/drawing/2010/main" xmlns="">
+              <a14:hiddenEffects xmlns:a14="http://schemas.microsoft.com/office/drawing/2010/main">
                 <a:effectLst>
                   <a:outerShdw dist="35921" dir="2700000" algn="ctr" rotWithShape="0">
                     <a:srgbClr val="808080"/>
@@ -2285,7 +2285,7 @@
           <a:noFill/>
           <a:extLst>
             <a:ext uri="{91240B29-F687-4F45-9708-019B960494DF}">
-              <a14:hiddenLine xmlns:a14="http://schemas.microsoft.com/office/drawing/2010/main" xmlns="" w="9525">
+              <a14:hiddenLine xmlns:a14="http://schemas.microsoft.com/office/drawing/2010/main" w="9525">
                 <a:solidFill>
                   <a:srgbClr val="808080"/>
                 </a:solidFill>
@@ -2540,7 +2540,7 @@
           </a:ln>
           <a:extLst>
             <a:ext uri="{AF507438-7753-43E0-B8FC-AC1667EBCBE1}">
-              <a14:hiddenEffects xmlns:a14="http://schemas.microsoft.com/office/drawing/2010/main" xmlns="">
+              <a14:hiddenEffects xmlns:a14="http://schemas.microsoft.com/office/drawing/2010/main">
                 <a:effectLst>
                   <a:outerShdw dist="35921" dir="2700000" algn="ctr" rotWithShape="0">
                     <a:srgbClr val="808080"/>
@@ -2569,7 +2569,7 @@
           <a:noFill/>
           <a:extLst>
             <a:ext uri="{91240B29-F687-4F45-9708-019B960494DF}">
-              <a14:hiddenLine xmlns:a14="http://schemas.microsoft.com/office/drawing/2010/main" xmlns="" w="9525">
+              <a14:hiddenLine xmlns:a14="http://schemas.microsoft.com/office/drawing/2010/main" w="9525">
                 <a:solidFill>
                   <a:srgbClr val="808080"/>
                 </a:solidFill>
@@ -2579,7 +2579,7 @@
               </a14:hiddenLine>
             </a:ext>
             <a:ext uri="{AF507438-7753-43E0-B8FC-AC1667EBCBE1}">
-              <a14:hiddenEffects xmlns:a14="http://schemas.microsoft.com/office/drawing/2010/main" xmlns="">
+              <a14:hiddenEffects xmlns:a14="http://schemas.microsoft.com/office/drawing/2010/main">
                 <a:effectLst>
                   <a:outerShdw dist="35921" dir="2700000" algn="ctr" rotWithShape="0">
                     <a:srgbClr val="808080"/>
@@ -2644,7 +2644,7 @@
           <a:noFill/>
           <a:extLst>
             <a:ext uri="{91240B29-F687-4F45-9708-019B960494DF}">
-              <a14:hiddenLine xmlns:a14="http://schemas.microsoft.com/office/drawing/2010/main" xmlns="" w="9525">
+              <a14:hiddenLine xmlns:a14="http://schemas.microsoft.com/office/drawing/2010/main" w="9525">
                 <a:solidFill>
                   <a:srgbClr val="808080"/>
                 </a:solidFill>
@@ -2899,7 +2899,7 @@
           </a:ln>
           <a:extLst>
             <a:ext uri="{AF507438-7753-43E0-B8FC-AC1667EBCBE1}">
-              <a14:hiddenEffects xmlns:a14="http://schemas.microsoft.com/office/drawing/2010/main" xmlns="">
+              <a14:hiddenEffects xmlns:a14="http://schemas.microsoft.com/office/drawing/2010/main">
                 <a:effectLst>
                   <a:outerShdw dist="35921" dir="2700000" algn="ctr" rotWithShape="0">
                     <a:srgbClr val="808080"/>
@@ -2928,7 +2928,7 @@
           <a:noFill/>
           <a:extLst>
             <a:ext uri="{91240B29-F687-4F45-9708-019B960494DF}">
-              <a14:hiddenLine xmlns:a14="http://schemas.microsoft.com/office/drawing/2010/main" xmlns="" w="9525">
+              <a14:hiddenLine xmlns:a14="http://schemas.microsoft.com/office/drawing/2010/main" w="9525">
                 <a:solidFill>
                   <a:srgbClr val="808080"/>
                 </a:solidFill>
@@ -2938,7 +2938,7 @@
               </a14:hiddenLine>
             </a:ext>
             <a:ext uri="{AF507438-7753-43E0-B8FC-AC1667EBCBE1}">
-              <a14:hiddenEffects xmlns:a14="http://schemas.microsoft.com/office/drawing/2010/main" xmlns="">
+              <a14:hiddenEffects xmlns:a14="http://schemas.microsoft.com/office/drawing/2010/main">
                 <a:effectLst>
                   <a:outerShdw dist="35921" dir="2700000" algn="ctr" rotWithShape="0">
                     <a:srgbClr val="808080"/>
@@ -3003,7 +3003,7 @@
           <a:noFill/>
           <a:extLst>
             <a:ext uri="{91240B29-F687-4F45-9708-019B960494DF}">
-              <a14:hiddenLine xmlns:a14="http://schemas.microsoft.com/office/drawing/2010/main" xmlns="" w="9525">
+              <a14:hiddenLine xmlns:a14="http://schemas.microsoft.com/office/drawing/2010/main" w="9525">
                 <a:solidFill>
                   <a:srgbClr val="808080"/>
                 </a:solidFill>
@@ -3258,7 +3258,7 @@
           </a:ln>
           <a:extLst>
             <a:ext uri="{AF507438-7753-43E0-B8FC-AC1667EBCBE1}">
-              <a14:hiddenEffects xmlns:a14="http://schemas.microsoft.com/office/drawing/2010/main" xmlns="">
+              <a14:hiddenEffects xmlns:a14="http://schemas.microsoft.com/office/drawing/2010/main">
                 <a:effectLst>
                   <a:outerShdw dist="35921" dir="2700000" algn="ctr" rotWithShape="0">
                     <a:srgbClr val="808080"/>
@@ -3287,7 +3287,7 @@
           <a:noFill/>
           <a:extLst>
             <a:ext uri="{91240B29-F687-4F45-9708-019B960494DF}">
-              <a14:hiddenLine xmlns:a14="http://schemas.microsoft.com/office/drawing/2010/main" xmlns="" w="9525">
+              <a14:hiddenLine xmlns:a14="http://schemas.microsoft.com/office/drawing/2010/main" w="9525">
                 <a:solidFill>
                   <a:srgbClr val="808080"/>
                 </a:solidFill>
@@ -3297,7 +3297,7 @@
               </a14:hiddenLine>
             </a:ext>
             <a:ext uri="{AF507438-7753-43E0-B8FC-AC1667EBCBE1}">
-              <a14:hiddenEffects xmlns:a14="http://schemas.microsoft.com/office/drawing/2010/main" xmlns="">
+              <a14:hiddenEffects xmlns:a14="http://schemas.microsoft.com/office/drawing/2010/main">
                 <a:effectLst>
                   <a:outerShdw dist="35921" dir="2700000" algn="ctr" rotWithShape="0">
                     <a:srgbClr val="808080"/>
@@ -3362,7 +3362,7 @@
           <a:noFill/>
           <a:extLst>
             <a:ext uri="{91240B29-F687-4F45-9708-019B960494DF}">
-              <a14:hiddenLine xmlns:a14="http://schemas.microsoft.com/office/drawing/2010/main" xmlns="" w="9525">
+              <a14:hiddenLine xmlns:a14="http://schemas.microsoft.com/office/drawing/2010/main" w="9525">
                 <a:solidFill>
                   <a:srgbClr val="808080"/>
                 </a:solidFill>
@@ -3617,7 +3617,7 @@
           </a:ln>
           <a:extLst>
             <a:ext uri="{AF507438-7753-43E0-B8FC-AC1667EBCBE1}">
-              <a14:hiddenEffects xmlns:a14="http://schemas.microsoft.com/office/drawing/2010/main" xmlns="">
+              <a14:hiddenEffects xmlns:a14="http://schemas.microsoft.com/office/drawing/2010/main">
                 <a:effectLst>
                   <a:outerShdw dist="35921" dir="2700000" algn="ctr" rotWithShape="0">
                     <a:srgbClr val="808080"/>
@@ -3646,7 +3646,7 @@
           <a:noFill/>
           <a:extLst>
             <a:ext uri="{91240B29-F687-4F45-9708-019B960494DF}">
-              <a14:hiddenLine xmlns:a14="http://schemas.microsoft.com/office/drawing/2010/main" xmlns="" w="9525">
+              <a14:hiddenLine xmlns:a14="http://schemas.microsoft.com/office/drawing/2010/main" w="9525">
                 <a:solidFill>
                   <a:srgbClr val="808080"/>
                 </a:solidFill>
@@ -3656,7 +3656,7 @@
               </a14:hiddenLine>
             </a:ext>
             <a:ext uri="{AF507438-7753-43E0-B8FC-AC1667EBCBE1}">
-              <a14:hiddenEffects xmlns:a14="http://schemas.microsoft.com/office/drawing/2010/main" xmlns="">
+              <a14:hiddenEffects xmlns:a14="http://schemas.microsoft.com/office/drawing/2010/main">
                 <a:effectLst>
                   <a:outerShdw dist="35921" dir="2700000" algn="ctr" rotWithShape="0">
                     <a:srgbClr val="808080"/>
@@ -3813,7 +3813,7 @@
           <a:noFill/>
           <a:extLst>
             <a:ext uri="{91240B29-F687-4F45-9708-019B960494DF}">
-              <a14:hiddenLine xmlns:a14="http://schemas.microsoft.com/office/drawing/2010/main" xmlns="" w="9525">
+              <a14:hiddenLine xmlns:a14="http://schemas.microsoft.com/office/drawing/2010/main" w="9525">
                 <a:solidFill>
                   <a:srgbClr val="808080"/>
                 </a:solidFill>
@@ -4068,7 +4068,7 @@
           </a:ln>
           <a:extLst>
             <a:ext uri="{AF507438-7753-43E0-B8FC-AC1667EBCBE1}">
-              <a14:hiddenEffects xmlns:a14="http://schemas.microsoft.com/office/drawing/2010/main" xmlns="">
+              <a14:hiddenEffects xmlns:a14="http://schemas.microsoft.com/office/drawing/2010/main">
                 <a:effectLst>
                   <a:outerShdw dist="35921" dir="2700000" algn="ctr" rotWithShape="0">
                     <a:srgbClr val="808080"/>
@@ -4097,7 +4097,7 @@
           <a:noFill/>
           <a:extLst>
             <a:ext uri="{91240B29-F687-4F45-9708-019B960494DF}">
-              <a14:hiddenLine xmlns:a14="http://schemas.microsoft.com/office/drawing/2010/main" xmlns="" w="9525">
+              <a14:hiddenLine xmlns:a14="http://schemas.microsoft.com/office/drawing/2010/main" w="9525">
                 <a:solidFill>
                   <a:srgbClr val="808080"/>
                 </a:solidFill>
@@ -4107,7 +4107,7 @@
               </a14:hiddenLine>
             </a:ext>
             <a:ext uri="{AF507438-7753-43E0-B8FC-AC1667EBCBE1}">
-              <a14:hiddenEffects xmlns:a14="http://schemas.microsoft.com/office/drawing/2010/main" xmlns="">
+              <a14:hiddenEffects xmlns:a14="http://schemas.microsoft.com/office/drawing/2010/main">
                 <a:effectLst>
                   <a:outerShdw dist="35921" dir="2700000" algn="ctr" rotWithShape="0">
                     <a:srgbClr val="808080"/>
@@ -4337,13 +4337,20 @@
     </p:spTree>
     <p:extLst>
       <p:ext uri="{BB962C8B-B14F-4D97-AF65-F5344CB8AC3E}">
-        <p14:creationId xmlns:p14="http://schemas.microsoft.com/office/powerpoint/2010/main" xmlns="" val="1527002328"/>
+        <p14:creationId xmlns:p14="http://schemas.microsoft.com/office/powerpoint/2010/main" val="1527002328"/>
       </p:ext>
     </p:extLst>
   </p:cSld>
   <p:clrMapOvr>
     <a:masterClrMapping/>
   </p:clrMapOvr>
+  <p:timing>
+    <p:tnLst>
+      <p:par>
+        <p:cTn id="1" dur="indefinite" restart="never" nodeType="tmRoot"/>
+      </p:par>
+    </p:tnLst>
+  </p:timing>
 </p:sldLayout>
 </file>
 
@@ -4533,13 +4540,20 @@
     </p:spTree>
     <p:extLst>
       <p:ext uri="{BB962C8B-B14F-4D97-AF65-F5344CB8AC3E}">
-        <p14:creationId xmlns:p14="http://schemas.microsoft.com/office/powerpoint/2010/main" xmlns="" val="3759033353"/>
+        <p14:creationId xmlns:p14="http://schemas.microsoft.com/office/powerpoint/2010/main" val="3759033353"/>
       </p:ext>
     </p:extLst>
   </p:cSld>
   <p:clrMapOvr>
     <a:masterClrMapping/>
   </p:clrMapOvr>
+  <p:timing>
+    <p:tnLst>
+      <p:par>
+        <p:cTn id="1" dur="indefinite" restart="never" nodeType="tmRoot"/>
+      </p:par>
+    </p:tnLst>
+  </p:timing>
 </p:sldLayout>
 </file>
 
@@ -4739,13 +4753,20 @@
     </p:spTree>
     <p:extLst>
       <p:ext uri="{BB962C8B-B14F-4D97-AF65-F5344CB8AC3E}">
-        <p14:creationId xmlns:p14="http://schemas.microsoft.com/office/powerpoint/2010/main" xmlns="" val="1650216371"/>
+        <p14:creationId xmlns:p14="http://schemas.microsoft.com/office/powerpoint/2010/main" val="1650216371"/>
       </p:ext>
     </p:extLst>
   </p:cSld>
   <p:clrMapOvr>
     <a:masterClrMapping/>
   </p:clrMapOvr>
+  <p:timing>
+    <p:tnLst>
+      <p:par>
+        <p:cTn id="1" dur="indefinite" restart="never" nodeType="tmRoot"/>
+      </p:par>
+    </p:tnLst>
+  </p:timing>
 </p:sldLayout>
 </file>
 
@@ -4926,6 +4947,10 @@
           </p:nvPr>
         </p:nvSpPr>
         <p:spPr>
+          <a:xfrm>
+            <a:off x="7628731" y="7210425"/>
+            <a:ext cx="2338387" cy="511175"/>
+          </a:xfrm>
           <a:ln/>
         </p:spPr>
         <p:txBody>
@@ -4953,13 +4978,20 @@
     </p:spTree>
     <p:extLst>
       <p:ext uri="{BB962C8B-B14F-4D97-AF65-F5344CB8AC3E}">
-        <p14:creationId xmlns:p14="http://schemas.microsoft.com/office/powerpoint/2010/main" xmlns="" val="1111713304"/>
+        <p14:creationId xmlns:p14="http://schemas.microsoft.com/office/powerpoint/2010/main" val="1111713304"/>
       </p:ext>
     </p:extLst>
   </p:cSld>
   <p:clrMapOvr>
     <a:masterClrMapping/>
   </p:clrMapOvr>
+  <p:timing>
+    <p:tnLst>
+      <p:par>
+        <p:cTn id="1" dur="indefinite" restart="never" nodeType="tmRoot"/>
+      </p:par>
+    </p:tnLst>
+  </p:timing>
 </p:sldLayout>
 </file>
 
@@ -5148,13 +5180,20 @@
     </p:spTree>
     <p:extLst>
       <p:ext uri="{BB962C8B-B14F-4D97-AF65-F5344CB8AC3E}">
-        <p14:creationId xmlns:p14="http://schemas.microsoft.com/office/powerpoint/2010/main" xmlns="" val="4046879936"/>
+        <p14:creationId xmlns:p14="http://schemas.microsoft.com/office/powerpoint/2010/main" val="4046879936"/>
       </p:ext>
     </p:extLst>
   </p:cSld>
   <p:clrMapOvr>
     <a:masterClrMapping/>
   </p:clrMapOvr>
+  <p:timing>
+    <p:tnLst>
+      <p:par>
+        <p:cTn id="1" dur="indefinite" restart="never" nodeType="tmRoot"/>
+      </p:par>
+    </p:tnLst>
+  </p:timing>
 </p:sldLayout>
 </file>
 
@@ -5370,13 +5409,20 @@
     </p:spTree>
     <p:extLst>
       <p:ext uri="{BB962C8B-B14F-4D97-AF65-F5344CB8AC3E}">
-        <p14:creationId xmlns:p14="http://schemas.microsoft.com/office/powerpoint/2010/main" xmlns="" val="2327671922"/>
+        <p14:creationId xmlns:p14="http://schemas.microsoft.com/office/powerpoint/2010/main" val="2327671922"/>
       </p:ext>
     </p:extLst>
   </p:cSld>
   <p:clrMapOvr>
     <a:masterClrMapping/>
   </p:clrMapOvr>
+  <p:timing>
+    <p:tnLst>
+      <p:par>
+        <p:cTn id="1" dur="indefinite" restart="never" nodeType="tmRoot"/>
+      </p:par>
+    </p:tnLst>
+  </p:timing>
 </p:sldLayout>
 </file>
 
@@ -5688,13 +5734,20 @@
     </p:spTree>
     <p:extLst>
       <p:ext uri="{BB962C8B-B14F-4D97-AF65-F5344CB8AC3E}">
-        <p14:creationId xmlns:p14="http://schemas.microsoft.com/office/powerpoint/2010/main" xmlns="" val="64048058"/>
+        <p14:creationId xmlns:p14="http://schemas.microsoft.com/office/powerpoint/2010/main" val="64048058"/>
       </p:ext>
     </p:extLst>
   </p:cSld>
   <p:clrMapOvr>
     <a:masterClrMapping/>
   </p:clrMapOvr>
+  <p:timing>
+    <p:tnLst>
+      <p:par>
+        <p:cTn id="1" dur="indefinite" restart="never" nodeType="tmRoot"/>
+      </p:par>
+    </p:tnLst>
+  </p:timing>
 </p:sldLayout>
 </file>
 
@@ -6145,13 +6198,20 @@
     </p:spTree>
     <p:extLst>
       <p:ext uri="{BB962C8B-B14F-4D97-AF65-F5344CB8AC3E}">
-        <p14:creationId xmlns:p14="http://schemas.microsoft.com/office/powerpoint/2010/main" xmlns="" val="3863681305"/>
+        <p14:creationId xmlns:p14="http://schemas.microsoft.com/office/powerpoint/2010/main" val="3863681305"/>
       </p:ext>
     </p:extLst>
   </p:cSld>
   <p:clrMapOvr>
     <a:masterClrMapping/>
   </p:clrMapOvr>
+  <p:timing>
+    <p:tnLst>
+      <p:par>
+        <p:cTn id="1" dur="indefinite" restart="never" nodeType="tmRoot"/>
+      </p:par>
+    </p:tnLst>
+  </p:timing>
 </p:sldLayout>
 </file>
 
@@ -6293,13 +6353,20 @@
     </p:spTree>
     <p:extLst>
       <p:ext uri="{BB962C8B-B14F-4D97-AF65-F5344CB8AC3E}">
-        <p14:creationId xmlns:p14="http://schemas.microsoft.com/office/powerpoint/2010/main" xmlns="" val="2796133607"/>
+        <p14:creationId xmlns:p14="http://schemas.microsoft.com/office/powerpoint/2010/main" val="2796133607"/>
       </p:ext>
     </p:extLst>
   </p:cSld>
   <p:clrMapOvr>
     <a:masterClrMapping/>
   </p:clrMapOvr>
+  <p:timing>
+    <p:tnLst>
+      <p:par>
+        <p:cTn id="1" dur="indefinite" restart="never" nodeType="tmRoot"/>
+      </p:par>
+    </p:tnLst>
+  </p:timing>
 </p:sldLayout>
 </file>
 
@@ -6413,13 +6480,20 @@
     </p:spTree>
     <p:extLst>
       <p:ext uri="{BB962C8B-B14F-4D97-AF65-F5344CB8AC3E}">
-        <p14:creationId xmlns:p14="http://schemas.microsoft.com/office/powerpoint/2010/main" xmlns="" val="2255053621"/>
+        <p14:creationId xmlns:p14="http://schemas.microsoft.com/office/powerpoint/2010/main" val="2255053621"/>
       </p:ext>
     </p:extLst>
   </p:cSld>
   <p:clrMapOvr>
     <a:masterClrMapping/>
   </p:clrMapOvr>
+  <p:timing>
+    <p:tnLst>
+      <p:par>
+        <p:cTn id="1" dur="indefinite" restart="never" nodeType="tmRoot"/>
+      </p:par>
+    </p:tnLst>
+  </p:timing>
 </p:sldLayout>
 </file>
 
@@ -6715,13 +6789,20 @@
     </p:spTree>
     <p:extLst>
       <p:ext uri="{BB962C8B-B14F-4D97-AF65-F5344CB8AC3E}">
-        <p14:creationId xmlns:p14="http://schemas.microsoft.com/office/powerpoint/2010/main" xmlns="" val="3532056314"/>
+        <p14:creationId xmlns:p14="http://schemas.microsoft.com/office/powerpoint/2010/main" val="3532056314"/>
       </p:ext>
     </p:extLst>
   </p:cSld>
   <p:clrMapOvr>
     <a:masterClrMapping/>
   </p:clrMapOvr>
+  <p:timing>
+    <p:tnLst>
+      <p:par>
+        <p:cTn id="1" dur="indefinite" restart="never" nodeType="tmRoot"/>
+      </p:par>
+    </p:tnLst>
+  </p:timing>
 </p:sldLayout>
 </file>
 
@@ -6911,13 +6992,20 @@
     </p:spTree>
     <p:extLst>
       <p:ext uri="{BB962C8B-B14F-4D97-AF65-F5344CB8AC3E}">
-        <p14:creationId xmlns:p14="http://schemas.microsoft.com/office/powerpoint/2010/main" xmlns="" val="1899162285"/>
+        <p14:creationId xmlns:p14="http://schemas.microsoft.com/office/powerpoint/2010/main" val="1899162285"/>
       </p:ext>
     </p:extLst>
   </p:cSld>
   <p:clrMapOvr>
     <a:masterClrMapping/>
   </p:clrMapOvr>
+  <p:timing>
+    <p:tnLst>
+      <p:par>
+        <p:cTn id="1" dur="indefinite" restart="never" nodeType="tmRoot"/>
+      </p:par>
+    </p:tnLst>
+  </p:timing>
 </p:sldLayout>
 </file>
 
@@ -7195,13 +7283,20 @@
     </p:spTree>
     <p:extLst>
       <p:ext uri="{BB962C8B-B14F-4D97-AF65-F5344CB8AC3E}">
-        <p14:creationId xmlns:p14="http://schemas.microsoft.com/office/powerpoint/2010/main" xmlns="" val="1477518013"/>
+        <p14:creationId xmlns:p14="http://schemas.microsoft.com/office/powerpoint/2010/main" val="1477518013"/>
       </p:ext>
     </p:extLst>
   </p:cSld>
   <p:clrMapOvr>
     <a:masterClrMapping/>
   </p:clrMapOvr>
+  <p:timing>
+    <p:tnLst>
+      <p:par>
+        <p:cTn id="1" dur="indefinite" restart="never" nodeType="tmRoot"/>
+      </p:par>
+    </p:tnLst>
+  </p:timing>
 </p:sldLayout>
 </file>
 
@@ -7390,13 +7485,20 @@
     </p:spTree>
     <p:extLst>
       <p:ext uri="{BB962C8B-B14F-4D97-AF65-F5344CB8AC3E}">
-        <p14:creationId xmlns:p14="http://schemas.microsoft.com/office/powerpoint/2010/main" xmlns="" val="2281252025"/>
+        <p14:creationId xmlns:p14="http://schemas.microsoft.com/office/powerpoint/2010/main" val="2281252025"/>
       </p:ext>
     </p:extLst>
   </p:cSld>
   <p:clrMapOvr>
     <a:masterClrMapping/>
   </p:clrMapOvr>
+  <p:timing>
+    <p:tnLst>
+      <p:par>
+        <p:cTn id="1" dur="indefinite" restart="never" nodeType="tmRoot"/>
+      </p:par>
+    </p:tnLst>
+  </p:timing>
 </p:sldLayout>
 </file>
 
@@ -7600,13 +7702,20 @@
     </p:spTree>
     <p:extLst>
       <p:ext uri="{BB962C8B-B14F-4D97-AF65-F5344CB8AC3E}">
-        <p14:creationId xmlns:p14="http://schemas.microsoft.com/office/powerpoint/2010/main" xmlns="" val="946456082"/>
+        <p14:creationId xmlns:p14="http://schemas.microsoft.com/office/powerpoint/2010/main" val="946456082"/>
       </p:ext>
     </p:extLst>
   </p:cSld>
   <p:clrMapOvr>
     <a:masterClrMapping/>
   </p:clrMapOvr>
+  <p:timing>
+    <p:tnLst>
+      <p:par>
+        <p:cTn id="1" dur="indefinite" restart="never" nodeType="tmRoot"/>
+      </p:par>
+    </p:tnLst>
+  </p:timing>
 </p:sldLayout>
 </file>
 
@@ -7747,7 +7856,7 @@
         </p:nvSpPr>
         <p:spPr>
           <a:xfrm>
-            <a:off x="7221035" y="6887095"/>
+            <a:off x="7628731" y="7210425"/>
             <a:ext cx="2351035" cy="525198"/>
           </a:xfrm>
         </p:spPr>
@@ -7773,6 +7882,13 @@
   <p:clrMapOvr>
     <a:masterClrMapping/>
   </p:clrMapOvr>
+  <p:timing>
+    <p:tnLst>
+      <p:par>
+        <p:cTn id="1" dur="indefinite" restart="never" nodeType="tmRoot"/>
+      </p:par>
+    </p:tnLst>
+  </p:timing>
 </p:sldLayout>
 </file>
 
@@ -7984,13 +8100,20 @@
     </p:spTree>
     <p:extLst>
       <p:ext uri="{BB962C8B-B14F-4D97-AF65-F5344CB8AC3E}">
-        <p14:creationId xmlns:p14="http://schemas.microsoft.com/office/powerpoint/2010/main" xmlns="" val="643765245"/>
+        <p14:creationId xmlns:p14="http://schemas.microsoft.com/office/powerpoint/2010/main" val="643765245"/>
       </p:ext>
     </p:extLst>
   </p:cSld>
   <p:clrMapOvr>
     <a:masterClrMapping/>
   </p:clrMapOvr>
+  <p:timing>
+    <p:tnLst>
+      <p:par>
+        <p:cTn id="1" dur="indefinite" restart="never" nodeType="tmRoot"/>
+      </p:par>
+    </p:tnLst>
+  </p:timing>
 </p:sldLayout>
 </file>
 
@@ -8298,13 +8421,20 @@
     </p:spTree>
     <p:extLst>
       <p:ext uri="{BB962C8B-B14F-4D97-AF65-F5344CB8AC3E}">
-        <p14:creationId xmlns:p14="http://schemas.microsoft.com/office/powerpoint/2010/main" xmlns="" val="284777947"/>
+        <p14:creationId xmlns:p14="http://schemas.microsoft.com/office/powerpoint/2010/main" val="284777947"/>
       </p:ext>
     </p:extLst>
   </p:cSld>
   <p:clrMapOvr>
     <a:masterClrMapping/>
   </p:clrMapOvr>
+  <p:timing>
+    <p:tnLst>
+      <p:par>
+        <p:cTn id="1" dur="indefinite" restart="never" nodeType="tmRoot"/>
+      </p:par>
+    </p:tnLst>
+  </p:timing>
 </p:sldLayout>
 </file>
 
@@ -8751,13 +8881,20 @@
     </p:spTree>
     <p:extLst>
       <p:ext uri="{BB962C8B-B14F-4D97-AF65-F5344CB8AC3E}">
-        <p14:creationId xmlns:p14="http://schemas.microsoft.com/office/powerpoint/2010/main" xmlns="" val="3505578002"/>
+        <p14:creationId xmlns:p14="http://schemas.microsoft.com/office/powerpoint/2010/main" val="3505578002"/>
       </p:ext>
     </p:extLst>
   </p:cSld>
   <p:clrMapOvr>
     <a:masterClrMapping/>
   </p:clrMapOvr>
+  <p:timing>
+    <p:tnLst>
+      <p:par>
+        <p:cTn id="1" dur="indefinite" restart="never" nodeType="tmRoot"/>
+      </p:par>
+    </p:tnLst>
+  </p:timing>
 </p:sldLayout>
 </file>
 
@@ -8895,13 +9032,20 @@
     </p:spTree>
     <p:extLst>
       <p:ext uri="{BB962C8B-B14F-4D97-AF65-F5344CB8AC3E}">
-        <p14:creationId xmlns:p14="http://schemas.microsoft.com/office/powerpoint/2010/main" xmlns="" val="3358246263"/>
+        <p14:creationId xmlns:p14="http://schemas.microsoft.com/office/powerpoint/2010/main" val="3358246263"/>
       </p:ext>
     </p:extLst>
   </p:cSld>
   <p:clrMapOvr>
     <a:masterClrMapping/>
   </p:clrMapOvr>
+  <p:timing>
+    <p:tnLst>
+      <p:par>
+        <p:cTn id="1" dur="indefinite" restart="never" nodeType="tmRoot"/>
+      </p:par>
+    </p:tnLst>
+  </p:timing>
 </p:sldLayout>
 </file>
 
@@ -9016,13 +9160,20 @@
     </p:spTree>
     <p:extLst>
       <p:ext uri="{BB962C8B-B14F-4D97-AF65-F5344CB8AC3E}">
-        <p14:creationId xmlns:p14="http://schemas.microsoft.com/office/powerpoint/2010/main" xmlns="" val="231955892"/>
+        <p14:creationId xmlns:p14="http://schemas.microsoft.com/office/powerpoint/2010/main" val="231955892"/>
       </p:ext>
     </p:extLst>
   </p:cSld>
   <p:clrMapOvr>
     <a:masterClrMapping/>
   </p:clrMapOvr>
+  <p:timing>
+    <p:tnLst>
+      <p:par>
+        <p:cTn id="1" dur="indefinite" restart="never" nodeType="tmRoot"/>
+      </p:par>
+    </p:tnLst>
+  </p:timing>
 </p:sldLayout>
 </file>
 
@@ -9319,13 +9470,20 @@
     </p:spTree>
     <p:extLst>
       <p:ext uri="{BB962C8B-B14F-4D97-AF65-F5344CB8AC3E}">
-        <p14:creationId xmlns:p14="http://schemas.microsoft.com/office/powerpoint/2010/main" xmlns="" val="1309085491"/>
+        <p14:creationId xmlns:p14="http://schemas.microsoft.com/office/powerpoint/2010/main" val="1309085491"/>
       </p:ext>
     </p:extLst>
   </p:cSld>
   <p:clrMapOvr>
     <a:masterClrMapping/>
   </p:clrMapOvr>
+  <p:timing>
+    <p:tnLst>
+      <p:par>
+        <p:cTn id="1" dur="indefinite" restart="never" nodeType="tmRoot"/>
+      </p:par>
+    </p:tnLst>
+  </p:timing>
 </p:sldLayout>
 </file>
 
@@ -9599,13 +9757,20 @@
     </p:spTree>
     <p:extLst>
       <p:ext uri="{BB962C8B-B14F-4D97-AF65-F5344CB8AC3E}">
-        <p14:creationId xmlns:p14="http://schemas.microsoft.com/office/powerpoint/2010/main" xmlns="" val="782263245"/>
+        <p14:creationId xmlns:p14="http://schemas.microsoft.com/office/powerpoint/2010/main" val="782263245"/>
       </p:ext>
     </p:extLst>
   </p:cSld>
   <p:clrMapOvr>
     <a:masterClrMapping/>
   </p:clrMapOvr>
+  <p:timing>
+    <p:tnLst>
+      <p:par>
+        <p:cTn id="1" dur="indefinite" restart="never" nodeType="tmRoot"/>
+      </p:par>
+    </p:tnLst>
+  </p:timing>
 </p:sldLayout>
 </file>
 
@@ -9663,14 +9828,14 @@
           <a:effectLst/>
           <a:extLst>
             <a:ext uri="{909E8E84-426E-40DD-AFC4-6F175D3DCCD1}">
-              <a14:hiddenFill xmlns:a14="http://schemas.microsoft.com/office/drawing/2010/main" xmlns="">
+              <a14:hiddenFill xmlns:a14="http://schemas.microsoft.com/office/drawing/2010/main">
                 <a:solidFill>
                   <a:srgbClr val="FFFFFF"/>
                 </a:solidFill>
               </a14:hiddenFill>
             </a:ext>
             <a:ext uri="{91240B29-F687-4F45-9708-019B960494DF}">
-              <a14:hiddenLine xmlns:a14="http://schemas.microsoft.com/office/drawing/2010/main" xmlns="" w="9525">
+              <a14:hiddenLine xmlns:a14="http://schemas.microsoft.com/office/drawing/2010/main" w="9525">
                 <a:solidFill>
                   <a:srgbClr val="808080"/>
                 </a:solidFill>
@@ -9680,7 +9845,7 @@
               </a14:hiddenLine>
             </a:ext>
             <a:ext uri="{AF507438-7753-43E0-B8FC-AC1667EBCBE1}">
-              <a14:hiddenEffects xmlns:a14="http://schemas.microsoft.com/office/drawing/2010/main" xmlns="">
+              <a14:hiddenEffects xmlns:a14="http://schemas.microsoft.com/office/drawing/2010/main">
                 <a:effectLst>
                   <a:outerShdw dist="35921" dir="2700000" algn="ctr" rotWithShape="0">
                     <a:schemeClr val="bg2"/>
@@ -9731,14 +9896,14 @@
           <a:effectLst/>
           <a:extLst>
             <a:ext uri="{909E8E84-426E-40DD-AFC4-6F175D3DCCD1}">
-              <a14:hiddenFill xmlns:a14="http://schemas.microsoft.com/office/drawing/2010/main" xmlns="">
+              <a14:hiddenFill xmlns:a14="http://schemas.microsoft.com/office/drawing/2010/main">
                 <a:solidFill>
                   <a:srgbClr val="FFFFFF"/>
                 </a:solidFill>
               </a14:hiddenFill>
             </a:ext>
             <a:ext uri="{91240B29-F687-4F45-9708-019B960494DF}">
-              <a14:hiddenLine xmlns:a14="http://schemas.microsoft.com/office/drawing/2010/main" xmlns="" w="9525">
+              <a14:hiddenLine xmlns:a14="http://schemas.microsoft.com/office/drawing/2010/main" w="9525">
                 <a:solidFill>
                   <a:srgbClr val="808080"/>
                 </a:solidFill>
@@ -9748,7 +9913,7 @@
               </a14:hiddenLine>
             </a:ext>
             <a:ext uri="{AF507438-7753-43E0-B8FC-AC1667EBCBE1}">
-              <a14:hiddenEffects xmlns:a14="http://schemas.microsoft.com/office/drawing/2010/main" xmlns="">
+              <a14:hiddenEffects xmlns:a14="http://schemas.microsoft.com/office/drawing/2010/main">
                 <a:effectLst>
                   <a:outerShdw dist="35921" dir="2700000" algn="ctr" rotWithShape="0">
                     <a:schemeClr val="bg2"/>
@@ -9855,14 +10020,14 @@
           <a:effectLst/>
           <a:extLst>
             <a:ext uri="{909E8E84-426E-40DD-AFC4-6F175D3DCCD1}">
-              <a14:hiddenFill xmlns:a14="http://schemas.microsoft.com/office/drawing/2010/main" xmlns="">
+              <a14:hiddenFill xmlns:a14="http://schemas.microsoft.com/office/drawing/2010/main">
                 <a:solidFill>
                   <a:srgbClr val="FFFFFF"/>
                 </a:solidFill>
               </a14:hiddenFill>
             </a:ext>
             <a:ext uri="{91240B29-F687-4F45-9708-019B960494DF}">
-              <a14:hiddenLine xmlns:a14="http://schemas.microsoft.com/office/drawing/2010/main" xmlns="" w="9525" cap="flat">
+              <a14:hiddenLine xmlns:a14="http://schemas.microsoft.com/office/drawing/2010/main" w="9525" cap="flat">
                 <a:solidFill>
                   <a:srgbClr val="808080"/>
                 </a:solidFill>
@@ -9872,7 +10037,7 @@
               </a14:hiddenLine>
             </a:ext>
             <a:ext uri="{AF507438-7753-43E0-B8FC-AC1667EBCBE1}">
-              <a14:hiddenEffects xmlns:a14="http://schemas.microsoft.com/office/drawing/2010/main" xmlns="">
+              <a14:hiddenEffects xmlns:a14="http://schemas.microsoft.com/office/drawing/2010/main">
                 <a:effectLst>
                   <a:outerShdw dist="35921" dir="2700000" algn="ctr" rotWithShape="0">
                     <a:schemeClr val="bg2"/>
@@ -9956,14 +10121,14 @@
           <a:effectLst/>
           <a:extLst>
             <a:ext uri="{909E8E84-426E-40DD-AFC4-6F175D3DCCD1}">
-              <a14:hiddenFill xmlns:a14="http://schemas.microsoft.com/office/drawing/2010/main" xmlns="">
+              <a14:hiddenFill xmlns:a14="http://schemas.microsoft.com/office/drawing/2010/main">
                 <a:solidFill>
                   <a:srgbClr val="FFFFFF"/>
                 </a:solidFill>
               </a14:hiddenFill>
             </a:ext>
             <a:ext uri="{91240B29-F687-4F45-9708-019B960494DF}">
-              <a14:hiddenLine xmlns:a14="http://schemas.microsoft.com/office/drawing/2010/main" xmlns="" w="9525" cap="flat">
+              <a14:hiddenLine xmlns:a14="http://schemas.microsoft.com/office/drawing/2010/main" w="9525" cap="flat">
                 <a:solidFill>
                   <a:srgbClr val="808080"/>
                 </a:solidFill>
@@ -9973,7 +10138,7 @@
               </a14:hiddenLine>
             </a:ext>
             <a:ext uri="{AF507438-7753-43E0-B8FC-AC1667EBCBE1}">
-              <a14:hiddenEffects xmlns:a14="http://schemas.microsoft.com/office/drawing/2010/main" xmlns="">
+              <a14:hiddenEffects xmlns:a14="http://schemas.microsoft.com/office/drawing/2010/main">
                 <a:effectLst>
                   <a:outerShdw dist="35921" dir="2700000" algn="ctr" rotWithShape="0">
                     <a:schemeClr val="bg2"/>
@@ -10044,8 +10209,8 @@
         </p:nvSpPr>
         <p:spPr bwMode="auto">
           <a:xfrm>
-            <a:off x="7224713" y="6888163"/>
-            <a:ext cx="2336800" cy="509587"/>
+            <a:off x="7552531" y="7225393"/>
+            <a:ext cx="2336800" cy="352425"/>
           </a:xfrm>
           <a:prstGeom prst="rect">
             <a:avLst/>
@@ -10057,14 +10222,14 @@
           <a:effectLst/>
           <a:extLst>
             <a:ext uri="{909E8E84-426E-40DD-AFC4-6F175D3DCCD1}">
-              <a14:hiddenFill xmlns:a14="http://schemas.microsoft.com/office/drawing/2010/main" xmlns="">
+              <a14:hiddenFill xmlns:a14="http://schemas.microsoft.com/office/drawing/2010/main">
                 <a:solidFill>
                   <a:srgbClr val="FFFFFF"/>
                 </a:solidFill>
               </a14:hiddenFill>
             </a:ext>
             <a:ext uri="{91240B29-F687-4F45-9708-019B960494DF}">
-              <a14:hiddenLine xmlns:a14="http://schemas.microsoft.com/office/drawing/2010/main" xmlns="" w="9525" cap="flat">
+              <a14:hiddenLine xmlns:a14="http://schemas.microsoft.com/office/drawing/2010/main" w="9525" cap="flat">
                 <a:solidFill>
                   <a:srgbClr val="808080"/>
                 </a:solidFill>
@@ -10074,7 +10239,7 @@
               </a14:hiddenLine>
             </a:ext>
             <a:ext uri="{AF507438-7753-43E0-B8FC-AC1667EBCBE1}">
-              <a14:hiddenEffects xmlns:a14="http://schemas.microsoft.com/office/drawing/2010/main" xmlns="">
+              <a14:hiddenEffects xmlns:a14="http://schemas.microsoft.com/office/drawing/2010/main">
                 <a:effectLst>
                   <a:outerShdw dist="35921" dir="2700000" algn="ctr" rotWithShape="0">
                     <a:schemeClr val="bg2"/>
@@ -10091,7 +10256,7 @@
             </a:prstTxWarp>
           </a:bodyPr>
           <a:lstStyle>
-            <a:lvl1pPr>
+            <a:lvl1pPr algn="r">
               <a:buClrTx/>
               <a:buFontTx/>
               <a:buNone/>
@@ -10120,7 +10285,7 @@
               </a:tabLst>
               <a:defRPr>
                 <a:solidFill>
-                  <a:srgbClr val="000000"/>
+                  <a:schemeClr val="bg1"/>
                 </a:solidFill>
               </a:defRPr>
             </a:lvl1pPr>
@@ -10130,13 +10295,13 @@
               <a:defRPr/>
             </a:pPr>
             <a:fld id="{82ABD104-78CE-4BAA-A18C-5992E7C78B3B}" type="slidenum">
-              <a:rPr lang="en-US" altLang="en-US"/>
+              <a:rPr lang="en-US" altLang="en-US" smtClean="0"/>
               <a:pPr>
                 <a:defRPr/>
               </a:pPr>
               <a:t>‹#›</a:t>
             </a:fld>
-            <a:endParaRPr lang="en-US" altLang="en-US"/>
+            <a:endParaRPr lang="en-US" altLang="en-US" dirty="0"/>
           </a:p>
         </p:txBody>
       </p:sp>
@@ -10156,6 +10321,13 @@
     <p:sldLayoutId id="2147483710" r:id="rId10"/>
     <p:sldLayoutId id="2147483711" r:id="rId11"/>
   </p:sldLayoutIdLst>
+  <p:timing>
+    <p:tnLst>
+      <p:par>
+        <p:cTn id="1" dur="indefinite" restart="never" nodeType="tmRoot"/>
+      </p:par>
+    </p:tnLst>
+  </p:timing>
   <p:hf hdr="0" ftr="0" dt="0"/>
   <p:txStyles>
     <p:titleStyle>
@@ -10731,14 +10903,14 @@
           <a:effectLst/>
           <a:extLst>
             <a:ext uri="{909E8E84-426E-40DD-AFC4-6F175D3DCCD1}">
-              <a14:hiddenFill xmlns:a14="http://schemas.microsoft.com/office/drawing/2010/main" xmlns="">
+              <a14:hiddenFill xmlns:a14="http://schemas.microsoft.com/office/drawing/2010/main">
                 <a:solidFill>
                   <a:srgbClr val="FFFFFF"/>
                 </a:solidFill>
               </a14:hiddenFill>
             </a:ext>
             <a:ext uri="{91240B29-F687-4F45-9708-019B960494DF}">
-              <a14:hiddenLine xmlns:a14="http://schemas.microsoft.com/office/drawing/2010/main" xmlns="" w="9525">
+              <a14:hiddenLine xmlns:a14="http://schemas.microsoft.com/office/drawing/2010/main" w="9525">
                 <a:solidFill>
                   <a:srgbClr val="808080"/>
                 </a:solidFill>
@@ -10748,7 +10920,7 @@
               </a14:hiddenLine>
             </a:ext>
             <a:ext uri="{AF507438-7753-43E0-B8FC-AC1667EBCBE1}">
-              <a14:hiddenEffects xmlns:a14="http://schemas.microsoft.com/office/drawing/2010/main" xmlns="">
+              <a14:hiddenEffects xmlns:a14="http://schemas.microsoft.com/office/drawing/2010/main">
                 <a:effectLst>
                   <a:outerShdw dist="35921" dir="2700000" algn="ctr" rotWithShape="0">
                     <a:schemeClr val="bg2"/>
@@ -10799,14 +10971,14 @@
           <a:effectLst/>
           <a:extLst>
             <a:ext uri="{909E8E84-426E-40DD-AFC4-6F175D3DCCD1}">
-              <a14:hiddenFill xmlns:a14="http://schemas.microsoft.com/office/drawing/2010/main" xmlns="">
+              <a14:hiddenFill xmlns:a14="http://schemas.microsoft.com/office/drawing/2010/main">
                 <a:solidFill>
                   <a:srgbClr val="FFFFFF"/>
                 </a:solidFill>
               </a14:hiddenFill>
             </a:ext>
             <a:ext uri="{91240B29-F687-4F45-9708-019B960494DF}">
-              <a14:hiddenLine xmlns:a14="http://schemas.microsoft.com/office/drawing/2010/main" xmlns="" w="9525">
+              <a14:hiddenLine xmlns:a14="http://schemas.microsoft.com/office/drawing/2010/main" w="9525">
                 <a:solidFill>
                   <a:srgbClr val="808080"/>
                 </a:solidFill>
@@ -10816,7 +10988,7 @@
               </a14:hiddenLine>
             </a:ext>
             <a:ext uri="{AF507438-7753-43E0-B8FC-AC1667EBCBE1}">
-              <a14:hiddenEffects xmlns:a14="http://schemas.microsoft.com/office/drawing/2010/main" xmlns="">
+              <a14:hiddenEffects xmlns:a14="http://schemas.microsoft.com/office/drawing/2010/main">
                 <a:effectLst>
                   <a:outerShdw dist="35921" dir="2700000" algn="ctr" rotWithShape="0">
                     <a:schemeClr val="bg2"/>
@@ -10923,14 +11095,14 @@
           <a:effectLst/>
           <a:extLst>
             <a:ext uri="{909E8E84-426E-40DD-AFC4-6F175D3DCCD1}">
-              <a14:hiddenFill xmlns:a14="http://schemas.microsoft.com/office/drawing/2010/main" xmlns="">
+              <a14:hiddenFill xmlns:a14="http://schemas.microsoft.com/office/drawing/2010/main">
                 <a:solidFill>
                   <a:srgbClr val="FFFFFF"/>
                 </a:solidFill>
               </a14:hiddenFill>
             </a:ext>
             <a:ext uri="{91240B29-F687-4F45-9708-019B960494DF}">
-              <a14:hiddenLine xmlns:a14="http://schemas.microsoft.com/office/drawing/2010/main" xmlns="" w="9525" cap="flat">
+              <a14:hiddenLine xmlns:a14="http://schemas.microsoft.com/office/drawing/2010/main" w="9525" cap="flat">
                 <a:solidFill>
                   <a:srgbClr val="808080"/>
                 </a:solidFill>
@@ -10940,7 +11112,7 @@
               </a14:hiddenLine>
             </a:ext>
             <a:ext uri="{AF507438-7753-43E0-B8FC-AC1667EBCBE1}">
-              <a14:hiddenEffects xmlns:a14="http://schemas.microsoft.com/office/drawing/2010/main" xmlns="">
+              <a14:hiddenEffects xmlns:a14="http://schemas.microsoft.com/office/drawing/2010/main">
                 <a:effectLst>
                   <a:outerShdw dist="35921" dir="2700000" algn="ctr" rotWithShape="0">
                     <a:schemeClr val="bg2"/>
@@ -11010,14 +11182,14 @@
           <a:effectLst/>
           <a:extLst>
             <a:ext uri="{909E8E84-426E-40DD-AFC4-6F175D3DCCD1}">
-              <a14:hiddenFill xmlns:a14="http://schemas.microsoft.com/office/drawing/2010/main" xmlns="">
+              <a14:hiddenFill xmlns:a14="http://schemas.microsoft.com/office/drawing/2010/main">
                 <a:solidFill>
                   <a:srgbClr val="FFFFFF"/>
                 </a:solidFill>
               </a14:hiddenFill>
             </a:ext>
             <a:ext uri="{91240B29-F687-4F45-9708-019B960494DF}">
-              <a14:hiddenLine xmlns:a14="http://schemas.microsoft.com/office/drawing/2010/main" xmlns="" w="9525" cap="flat">
+              <a14:hiddenLine xmlns:a14="http://schemas.microsoft.com/office/drawing/2010/main" w="9525" cap="flat">
                 <a:solidFill>
                   <a:srgbClr val="808080"/>
                 </a:solidFill>
@@ -11027,7 +11199,7 @@
               </a14:hiddenLine>
             </a:ext>
             <a:ext uri="{AF507438-7753-43E0-B8FC-AC1667EBCBE1}">
-              <a14:hiddenEffects xmlns:a14="http://schemas.microsoft.com/office/drawing/2010/main" xmlns="">
+              <a14:hiddenEffects xmlns:a14="http://schemas.microsoft.com/office/drawing/2010/main">
                 <a:effectLst>
                   <a:outerShdw dist="35921" dir="2700000" algn="ctr" rotWithShape="0">
                     <a:schemeClr val="bg2"/>
@@ -11085,7 +11257,7 @@
         </p:nvSpPr>
         <p:spPr bwMode="auto">
           <a:xfrm>
-            <a:off x="7224713" y="6888163"/>
+            <a:off x="7552531" y="7307262"/>
             <a:ext cx="2338387" cy="511175"/>
           </a:xfrm>
           <a:prstGeom prst="rect">
@@ -11098,14 +11270,14 @@
           <a:effectLst/>
           <a:extLst>
             <a:ext uri="{909E8E84-426E-40DD-AFC4-6F175D3DCCD1}">
-              <a14:hiddenFill xmlns:a14="http://schemas.microsoft.com/office/drawing/2010/main" xmlns="">
+              <a14:hiddenFill xmlns:a14="http://schemas.microsoft.com/office/drawing/2010/main">
                 <a:solidFill>
                   <a:srgbClr val="FFFFFF"/>
                 </a:solidFill>
               </a14:hiddenFill>
             </a:ext>
             <a:ext uri="{91240B29-F687-4F45-9708-019B960494DF}">
-              <a14:hiddenLine xmlns:a14="http://schemas.microsoft.com/office/drawing/2010/main" xmlns="" w="9525" cap="flat">
+              <a14:hiddenLine xmlns:a14="http://schemas.microsoft.com/office/drawing/2010/main" w="9525" cap="flat">
                 <a:solidFill>
                   <a:srgbClr val="808080"/>
                 </a:solidFill>
@@ -11115,7 +11287,7 @@
               </a14:hiddenLine>
             </a:ext>
             <a:ext uri="{AF507438-7753-43E0-B8FC-AC1667EBCBE1}">
-              <a14:hiddenEffects xmlns:a14="http://schemas.microsoft.com/office/drawing/2010/main" xmlns="">
+              <a14:hiddenEffects xmlns:a14="http://schemas.microsoft.com/office/drawing/2010/main">
                 <a:effectLst>
                   <a:outerShdw dist="35921" dir="2700000" algn="ctr" rotWithShape="0">
                     <a:schemeClr val="bg2"/>
@@ -11184,6 +11356,13 @@
     <p:sldLayoutId id="2147483718" r:id="rId11"/>
     <p:sldLayoutId id="2147483723" r:id="rId12"/>
   </p:sldLayoutIdLst>
+  <p:timing>
+    <p:tnLst>
+      <p:par>
+        <p:cTn id="1" dur="indefinite" restart="never" nodeType="tmRoot"/>
+      </p:par>
+    </p:tnLst>
+  </p:timing>
   <p:hf hdr="0" ftr="0" dt="0"/>
   <p:txStyles>
     <p:titleStyle>
@@ -11734,7 +11913,7 @@
           <a:blip r:embed="rId3" cstate="print">
             <a:extLst>
               <a:ext uri="{28A0092B-C50C-407E-A947-70E740481C1C}">
-                <a14:useLocalDpi xmlns:a14="http://schemas.microsoft.com/office/drawing/2010/main" xmlns="" val="0"/>
+                <a14:useLocalDpi xmlns:a14="http://schemas.microsoft.com/office/drawing/2010/main" val="0"/>
               </a:ext>
             </a:extLst>
           </a:blip>
@@ -11758,7 +11937,7 @@
           <a:effectLst/>
           <a:extLst>
             <a:ext uri="{909E8E84-426E-40DD-AFC4-6F175D3DCCD1}">
-              <a14:hiddenFill xmlns:a14="http://schemas.microsoft.com/office/drawing/2010/main" xmlns="">
+              <a14:hiddenFill xmlns:a14="http://schemas.microsoft.com/office/drawing/2010/main">
                 <a:blipFill dpi="0" rotWithShape="0">
                   <a:blip/>
                   <a:srcRect/>
@@ -11769,7 +11948,7 @@
               </a14:hiddenFill>
             </a:ext>
             <a:ext uri="{91240B29-F687-4F45-9708-019B960494DF}">
-              <a14:hiddenLine xmlns:a14="http://schemas.microsoft.com/office/drawing/2010/main" xmlns="" w="9525">
+              <a14:hiddenLine xmlns:a14="http://schemas.microsoft.com/office/drawing/2010/main" w="9525">
                 <a:solidFill>
                   <a:srgbClr val="808080"/>
                 </a:solidFill>
@@ -11779,7 +11958,7 @@
               </a14:hiddenLine>
             </a:ext>
             <a:ext uri="{AF507438-7753-43E0-B8FC-AC1667EBCBE1}">
-              <a14:hiddenEffects xmlns:a14="http://schemas.microsoft.com/office/drawing/2010/main" xmlns="">
+              <a14:hiddenEffects xmlns:a14="http://schemas.microsoft.com/office/drawing/2010/main">
                 <a:effectLst>
                   <a:outerShdw dist="35921" dir="2700000" algn="ctr" rotWithShape="0">
                     <a:srgbClr val="808080"/>
@@ -11813,14 +11992,14 @@
           <a:effectLst/>
           <a:extLst>
             <a:ext uri="{909E8E84-426E-40DD-AFC4-6F175D3DCCD1}">
-              <a14:hiddenFill xmlns:a14="http://schemas.microsoft.com/office/drawing/2010/main" xmlns="">
+              <a14:hiddenFill xmlns:a14="http://schemas.microsoft.com/office/drawing/2010/main">
                 <a:solidFill>
                   <a:srgbClr val="FFFFFF"/>
                 </a:solidFill>
               </a14:hiddenFill>
             </a:ext>
             <a:ext uri="{91240B29-F687-4F45-9708-019B960494DF}">
-              <a14:hiddenLine xmlns:a14="http://schemas.microsoft.com/office/drawing/2010/main" xmlns="" w="9525">
+              <a14:hiddenLine xmlns:a14="http://schemas.microsoft.com/office/drawing/2010/main" w="9525">
                 <a:solidFill>
                   <a:srgbClr val="808080"/>
                 </a:solidFill>
@@ -11830,7 +12009,7 @@
               </a14:hiddenLine>
             </a:ext>
             <a:ext uri="{AF507438-7753-43E0-B8FC-AC1667EBCBE1}">
-              <a14:hiddenEffects xmlns:a14="http://schemas.microsoft.com/office/drawing/2010/main" xmlns="">
+              <a14:hiddenEffects xmlns:a14="http://schemas.microsoft.com/office/drawing/2010/main">
                 <a:effectLst>
                   <a:outerShdw dist="35921" dir="2700000" algn="ctr" rotWithShape="0">
                     <a:srgbClr val="808080"/>
@@ -12411,7 +12590,7 @@
           <a:blip r:embed="rId4" cstate="print">
             <a:extLst>
               <a:ext uri="{28A0092B-C50C-407E-A947-70E740481C1C}">
-                <a14:useLocalDpi xmlns:a14="http://schemas.microsoft.com/office/drawing/2010/main" xmlns="" val="0"/>
+                <a14:useLocalDpi xmlns:a14="http://schemas.microsoft.com/office/drawing/2010/main" val="0"/>
               </a:ext>
             </a:extLst>
           </a:blip>
@@ -12435,7 +12614,7 @@
           <a:effectLst/>
           <a:extLst>
             <a:ext uri="{909E8E84-426E-40DD-AFC4-6F175D3DCCD1}">
-              <a14:hiddenFill xmlns:a14="http://schemas.microsoft.com/office/drawing/2010/main" xmlns="">
+              <a14:hiddenFill xmlns:a14="http://schemas.microsoft.com/office/drawing/2010/main">
                 <a:blipFill dpi="0" rotWithShape="0">
                   <a:blip/>
                   <a:srcRect/>
@@ -12446,7 +12625,7 @@
               </a14:hiddenFill>
             </a:ext>
             <a:ext uri="{91240B29-F687-4F45-9708-019B960494DF}">
-              <a14:hiddenLine xmlns:a14="http://schemas.microsoft.com/office/drawing/2010/main" xmlns="" w="9525">
+              <a14:hiddenLine xmlns:a14="http://schemas.microsoft.com/office/drawing/2010/main" w="9525">
                 <a:solidFill>
                   <a:srgbClr val="808080"/>
                 </a:solidFill>
@@ -12456,7 +12635,7 @@
               </a14:hiddenLine>
             </a:ext>
             <a:ext uri="{AF507438-7753-43E0-B8FC-AC1667EBCBE1}">
-              <a14:hiddenEffects xmlns:a14="http://schemas.microsoft.com/office/drawing/2010/main" xmlns="">
+              <a14:hiddenEffects xmlns:a14="http://schemas.microsoft.com/office/drawing/2010/main">
                 <a:effectLst>
                   <a:outerShdw dist="35921" dir="2700000" algn="ctr" rotWithShape="0">
                     <a:srgbClr val="808080"/>
@@ -12479,7 +12658,7 @@
           <a:blip r:embed="rId5" cstate="print">
             <a:extLst>
               <a:ext uri="{28A0092B-C50C-407E-A947-70E740481C1C}">
-                <a14:useLocalDpi xmlns:a14="http://schemas.microsoft.com/office/drawing/2010/main" xmlns="" val="0"/>
+                <a14:useLocalDpi xmlns:a14="http://schemas.microsoft.com/office/drawing/2010/main" val="0"/>
               </a:ext>
             </a:extLst>
           </a:blip>
@@ -12503,7 +12682,7 @@
           <a:effectLst/>
           <a:extLst>
             <a:ext uri="{909E8E84-426E-40DD-AFC4-6F175D3DCCD1}">
-              <a14:hiddenFill xmlns:a14="http://schemas.microsoft.com/office/drawing/2010/main" xmlns="">
+              <a14:hiddenFill xmlns:a14="http://schemas.microsoft.com/office/drawing/2010/main">
                 <a:blipFill dpi="0" rotWithShape="0">
                   <a:blip/>
                   <a:srcRect/>
@@ -12514,7 +12693,7 @@
               </a14:hiddenFill>
             </a:ext>
             <a:ext uri="{91240B29-F687-4F45-9708-019B960494DF}">
-              <a14:hiddenLine xmlns:a14="http://schemas.microsoft.com/office/drawing/2010/main" xmlns="" w="9525">
+              <a14:hiddenLine xmlns:a14="http://schemas.microsoft.com/office/drawing/2010/main" w="9525">
                 <a:solidFill>
                   <a:srgbClr val="808080"/>
                 </a:solidFill>
@@ -12524,7 +12703,7 @@
               </a14:hiddenLine>
             </a:ext>
             <a:ext uri="{AF507438-7753-43E0-B8FC-AC1667EBCBE1}">
-              <a14:hiddenEffects xmlns:a14="http://schemas.microsoft.com/office/drawing/2010/main" xmlns="">
+              <a14:hiddenEffects xmlns:a14="http://schemas.microsoft.com/office/drawing/2010/main">
                 <a:effectLst>
                   <a:outerShdw dist="35921" dir="2700000" algn="ctr" rotWithShape="0">
                     <a:srgbClr val="808080"/>
@@ -12547,7 +12726,7 @@
           <a:blip r:embed="rId6" cstate="print">
             <a:extLst>
               <a:ext uri="{28A0092B-C50C-407E-A947-70E740481C1C}">
-                <a14:useLocalDpi xmlns:a14="http://schemas.microsoft.com/office/drawing/2010/main" xmlns="" val="0"/>
+                <a14:useLocalDpi xmlns:a14="http://schemas.microsoft.com/office/drawing/2010/main" val="0"/>
               </a:ext>
             </a:extLst>
           </a:blip>
@@ -12571,7 +12750,7 @@
           <a:effectLst/>
           <a:extLst>
             <a:ext uri="{909E8E84-426E-40DD-AFC4-6F175D3DCCD1}">
-              <a14:hiddenFill xmlns:a14="http://schemas.microsoft.com/office/drawing/2010/main" xmlns="">
+              <a14:hiddenFill xmlns:a14="http://schemas.microsoft.com/office/drawing/2010/main">
                 <a:blipFill dpi="0" rotWithShape="0">
                   <a:blip/>
                   <a:srcRect/>
@@ -12582,7 +12761,7 @@
               </a14:hiddenFill>
             </a:ext>
             <a:ext uri="{91240B29-F687-4F45-9708-019B960494DF}">
-              <a14:hiddenLine xmlns:a14="http://schemas.microsoft.com/office/drawing/2010/main" xmlns="" w="9525">
+              <a14:hiddenLine xmlns:a14="http://schemas.microsoft.com/office/drawing/2010/main" w="9525">
                 <a:solidFill>
                   <a:srgbClr val="808080"/>
                 </a:solidFill>
@@ -12592,7 +12771,7 @@
               </a14:hiddenLine>
             </a:ext>
             <a:ext uri="{AF507438-7753-43E0-B8FC-AC1667EBCBE1}">
-              <a14:hiddenEffects xmlns:a14="http://schemas.microsoft.com/office/drawing/2010/main" xmlns="">
+              <a14:hiddenEffects xmlns:a14="http://schemas.microsoft.com/office/drawing/2010/main">
                 <a:effectLst>
                   <a:outerShdw dist="35921" dir="2700000" algn="ctr" rotWithShape="0">
                     <a:srgbClr val="808080"/>
@@ -12749,11 +12928,6 @@
               </a:rPr>
               <a:t>In the course of creating the RVM, it became increasingly difficult to refer to each separate sub-satellite of the Rascal mission in a meaningful manner.</a:t>
             </a:r>
-            <a:endParaRPr lang="en-US" dirty="0" smtClean="0">
-              <a:solidFill>
-                <a:schemeClr val="tx1"/>
-              </a:solidFill>
-            </a:endParaRPr>
           </a:p>
           <a:p>
             <a:pPr lvl="1">
@@ -12768,11 +12942,6 @@
               </a:rPr>
               <a:t>Hence, a list of potential sub-satellite names were developed, as shown:</a:t>
             </a:r>
-            <a:endParaRPr lang="en-US" sz="2400" dirty="0" smtClean="0">
-              <a:solidFill>
-                <a:schemeClr val="tx1"/>
-              </a:solidFill>
-            </a:endParaRPr>
           </a:p>
           <a:p>
             <a:endParaRPr lang="en-US" dirty="0"/>
@@ -13780,6 +13949,13 @@
   <p:clrMapOvr>
     <a:masterClrMapping/>
   </p:clrMapOvr>
+  <p:timing>
+    <p:tnLst>
+      <p:par>
+        <p:cTn id="1" dur="indefinite" restart="never" nodeType="tmRoot"/>
+      </p:par>
+    </p:tnLst>
+  </p:timing>
 </p:sld>
 </file>
 
@@ -13835,7 +14011,7 @@
             <p:ph idx="1"/>
             <p:extLst>
               <p:ext uri="{D42A27DB-BD31-4B8C-83A1-F6EECF244321}">
-                <p14:modId xmlns:p14="http://schemas.microsoft.com/office/powerpoint/2010/main" xmlns="" val="3439178081"/>
+                <p14:modId xmlns:p14="http://schemas.microsoft.com/office/powerpoint/2010/main" val="3439178081"/>
               </p:ext>
             </p:extLst>
           </p:nvPr>
@@ -14060,39 +14236,7 @@
                             <a:schemeClr val="tx1"/>
                           </a:solidFill>
                         </a:rPr>
-                        <a:t>“The </a:t>
-                      </a:r>
-                      <a:r>
-                        <a:rPr lang="en-US" sz="2000" b="1" i="1" dirty="0" smtClean="0">
-                          <a:solidFill>
-                            <a:schemeClr val="tx1"/>
-                          </a:solidFill>
-                        </a:rPr>
-                        <a:t>total </a:t>
-                      </a:r>
-                      <a:r>
-                        <a:rPr lang="en-US" sz="2000" b="1" i="1" dirty="0" smtClean="0">
-                          <a:solidFill>
-                            <a:schemeClr val="tx1"/>
-                          </a:solidFill>
-                        </a:rPr>
-                        <a:t>CubeSat system </a:t>
-                      </a:r>
-                      <a:r>
-                        <a:rPr lang="en-US" sz="2000" b="1" i="1" dirty="0" smtClean="0">
-                          <a:solidFill>
-                            <a:schemeClr val="tx1"/>
-                          </a:solidFill>
-                        </a:rPr>
-                        <a:t>volume shall not exceed </a:t>
-                      </a:r>
-                      <a:r>
-                        <a:rPr lang="en-US" sz="2000" b="1" i="1" dirty="0" smtClean="0">
-                          <a:solidFill>
-                            <a:schemeClr val="tx1"/>
-                          </a:solidFill>
-                        </a:rPr>
-                        <a:t>6U”</a:t>
+                        <a:t>“The total CubeSat system volume shall not exceed 6U”</a:t>
                       </a:r>
                       <a:endParaRPr lang="en-US" sz="2000" b="1" i="1" dirty="0">
                         <a:solidFill>
@@ -14364,7 +14508,7 @@
     </p:spTree>
     <p:extLst>
       <p:ext uri="{BB962C8B-B14F-4D97-AF65-F5344CB8AC3E}">
-        <p14:creationId xmlns:p14="http://schemas.microsoft.com/office/powerpoint/2010/main" xmlns="" val="2711901525"/>
+        <p14:creationId xmlns:p14="http://schemas.microsoft.com/office/powerpoint/2010/main" val="2711901525"/>
       </p:ext>
     </p:extLst>
   </p:cSld>
@@ -14438,7 +14582,7 @@
             <p:ph idx="1"/>
             <p:extLst>
               <p:ext uri="{D42A27DB-BD31-4B8C-83A1-F6EECF244321}">
-                <p14:modId xmlns:p14="http://schemas.microsoft.com/office/powerpoint/2010/main" xmlns="" val="3603819765"/>
+                <p14:modId xmlns:p14="http://schemas.microsoft.com/office/powerpoint/2010/main" val="3603819765"/>
               </p:ext>
             </p:extLst>
           </p:nvPr>
@@ -14663,15 +14807,7 @@
                             <a:schemeClr val="tx1"/>
                           </a:solidFill>
                         </a:rPr>
-                        <a:t>“The </a:t>
-                      </a:r>
-                      <a:r>
-                        <a:rPr lang="en-US" sz="2000" b="1" i="1" dirty="0" smtClean="0">
-                          <a:solidFill>
-                            <a:schemeClr val="tx1"/>
-                          </a:solidFill>
-                        </a:rPr>
-                        <a:t>total CubeSat</a:t>
+                        <a:t>“The total CubeSat</a:t>
                       </a:r>
                       <a:r>
                         <a:rPr lang="en-US" sz="2000" b="1" i="1" baseline="0" dirty="0" smtClean="0">
@@ -14679,31 +14815,7 @@
                             <a:schemeClr val="tx1"/>
                           </a:solidFill>
                         </a:rPr>
-                        <a:t> </a:t>
-                      </a:r>
-                      <a:r>
-                        <a:rPr lang="en-US" sz="2000" b="1" i="1" baseline="0" dirty="0" smtClean="0">
-                          <a:solidFill>
-                            <a:schemeClr val="tx1"/>
-                          </a:solidFill>
-                        </a:rPr>
-                        <a:t> system mass </a:t>
-                      </a:r>
-                      <a:r>
-                        <a:rPr lang="en-US" sz="2000" b="1" i="1" baseline="0" dirty="0" smtClean="0">
-                          <a:solidFill>
-                            <a:schemeClr val="tx1"/>
-                          </a:solidFill>
-                        </a:rPr>
-                        <a:t>shall not exceed 8.0 </a:t>
-                      </a:r>
-                      <a:r>
-                        <a:rPr lang="en-US" sz="2000" b="1" i="1" baseline="0" dirty="0" smtClean="0">
-                          <a:solidFill>
-                            <a:schemeClr val="tx1"/>
-                          </a:solidFill>
-                        </a:rPr>
-                        <a:t>kg”</a:t>
+                        <a:t>  system mass shall not exceed 8.0 kg”</a:t>
                       </a:r>
                       <a:endParaRPr lang="en-US" sz="2000" b="1" i="1" dirty="0">
                         <a:solidFill>
@@ -14951,7 +15063,7 @@
     </p:spTree>
     <p:extLst>
       <p:ext uri="{BB962C8B-B14F-4D97-AF65-F5344CB8AC3E}">
-        <p14:creationId xmlns:p14="http://schemas.microsoft.com/office/powerpoint/2010/main" xmlns="" val="3723488692"/>
+        <p14:creationId xmlns:p14="http://schemas.microsoft.com/office/powerpoint/2010/main" val="3723488692"/>
       </p:ext>
     </p:extLst>
   </p:cSld>
@@ -15025,7 +15137,7 @@
             <p:ph idx="1"/>
             <p:extLst>
               <p:ext uri="{D42A27DB-BD31-4B8C-83A1-F6EECF244321}">
-                <p14:modId xmlns:p14="http://schemas.microsoft.com/office/powerpoint/2010/main" xmlns="" val="1053268969"/>
+                <p14:modId xmlns:p14="http://schemas.microsoft.com/office/powerpoint/2010/main" val="1053268969"/>
               </p:ext>
             </p:extLst>
           </p:nvPr>
@@ -15258,23 +15370,7 @@
                             <a:schemeClr val="tx1"/>
                           </a:solidFill>
                         </a:rPr>
-                        <a:t>All </a:t>
-                      </a:r>
-                      <a:r>
-                        <a:rPr lang="en-US" sz="2000" b="1" i="1" dirty="0" smtClean="0">
-                          <a:solidFill>
-                            <a:schemeClr val="tx1"/>
-                          </a:solidFill>
-                        </a:rPr>
-                        <a:t>materials used in the </a:t>
-                      </a:r>
-                      <a:r>
-                        <a:rPr lang="en-US" sz="2000" b="1" i="1" dirty="0" smtClean="0">
-                          <a:solidFill>
-                            <a:schemeClr val="tx1"/>
-                          </a:solidFill>
-                        </a:rPr>
-                        <a:t>CubeSa</a:t>
+                        <a:t>All materials used in the CubeSa</a:t>
                       </a:r>
                       <a:r>
                         <a:rPr lang="en-US" sz="2000" b="1" i="1" baseline="0" dirty="0" smtClean="0">
@@ -15282,23 +15378,7 @@
                             <a:schemeClr val="tx1"/>
                           </a:solidFill>
                         </a:rPr>
-                        <a:t>t system </a:t>
-                      </a:r>
-                      <a:r>
-                        <a:rPr lang="en-US" sz="2000" b="1" i="1" baseline="0" dirty="0" smtClean="0">
-                          <a:solidFill>
-                            <a:schemeClr val="tx1"/>
-                          </a:solidFill>
-                        </a:rPr>
-                        <a:t>shall have a Total Mass Loss of less than 1.0 </a:t>
-                      </a:r>
-                      <a:r>
-                        <a:rPr lang="en-US" sz="2000" b="1" i="1" baseline="0" dirty="0" smtClean="0">
-                          <a:solidFill>
-                            <a:schemeClr val="tx1"/>
-                          </a:solidFill>
-                        </a:rPr>
-                        <a:t>%”</a:t>
+                        <a:t>t system shall have a Total Mass Loss of less than 1.0 %”</a:t>
                       </a:r>
                       <a:endParaRPr lang="en-US" sz="2000" b="1" i="1" dirty="0">
                         <a:solidFill>
@@ -15546,7 +15626,7 @@
     </p:spTree>
     <p:extLst>
       <p:ext uri="{BB962C8B-B14F-4D97-AF65-F5344CB8AC3E}">
-        <p14:creationId xmlns:p14="http://schemas.microsoft.com/office/powerpoint/2010/main" xmlns="" val="3834814454"/>
+        <p14:creationId xmlns:p14="http://schemas.microsoft.com/office/powerpoint/2010/main" val="3834814454"/>
       </p:ext>
     </p:extLst>
   </p:cSld>
@@ -15620,7 +15700,7 @@
             <p:ph idx="1"/>
             <p:extLst>
               <p:ext uri="{D42A27DB-BD31-4B8C-83A1-F6EECF244321}">
-                <p14:modId xmlns:p14="http://schemas.microsoft.com/office/powerpoint/2010/main" xmlns="" val="3435413979"/>
+                <p14:modId xmlns:p14="http://schemas.microsoft.com/office/powerpoint/2010/main" val="3435413979"/>
               </p:ext>
             </p:extLst>
           </p:nvPr>
@@ -15715,11 +15795,6 @@
                         </a:rPr>
                         <a:t>RCL.PL.STR4</a:t>
                       </a:r>
-                      <a:endParaRPr lang="en-US" sz="2000" b="1" dirty="0" smtClean="0">
-                        <a:solidFill>
-                          <a:schemeClr val="tx1"/>
-                        </a:solidFill>
-                      </a:endParaRPr>
                     </a:p>
                   </a:txBody>
                   <a:tcPr marL="100759" marR="100759" marT="50419" marB="50419">
@@ -15853,15 +15928,7 @@
                             <a:schemeClr val="tx1"/>
                           </a:solidFill>
                         </a:rPr>
-                        <a:t>All </a:t>
-                      </a:r>
-                      <a:r>
-                        <a:rPr lang="en-US" sz="2000" b="1" i="1" dirty="0" smtClean="0">
-                          <a:solidFill>
-                            <a:schemeClr val="tx1"/>
-                          </a:solidFill>
-                        </a:rPr>
-                        <a:t>materials used in the</a:t>
+                        <a:t>All materials used in the</a:t>
                       </a:r>
                       <a:r>
                         <a:rPr lang="en-US" sz="2000" b="1" i="1" baseline="0" dirty="0" smtClean="0">
@@ -15869,31 +15936,7 @@
                             <a:schemeClr val="tx1"/>
                           </a:solidFill>
                         </a:rPr>
-                        <a:t> </a:t>
-                      </a:r>
-                      <a:r>
-                        <a:rPr lang="en-US" sz="2000" b="1" i="1" baseline="0" dirty="0" smtClean="0">
-                          <a:solidFill>
-                            <a:schemeClr val="tx1"/>
-                          </a:solidFill>
-                        </a:rPr>
-                        <a:t>CubeSat system </a:t>
-                      </a:r>
-                      <a:r>
-                        <a:rPr lang="en-US" sz="2000" b="1" i="1" baseline="0" dirty="0" smtClean="0">
-                          <a:solidFill>
-                            <a:schemeClr val="tx1"/>
-                          </a:solidFill>
-                        </a:rPr>
-                        <a:t>shall have a Collected Volatile Condensable Material of less than 0.1 </a:t>
-                      </a:r>
-                      <a:r>
-                        <a:rPr lang="en-US" sz="2000" b="1" i="1" baseline="0" dirty="0" smtClean="0">
-                          <a:solidFill>
-                            <a:schemeClr val="tx1"/>
-                          </a:solidFill>
-                        </a:rPr>
-                        <a:t>%”</a:t>
+                        <a:t> CubeSat system shall have a Collected Volatile Condensable Material of less than 0.1 %”</a:t>
                       </a:r>
                       <a:endParaRPr lang="en-US" sz="2000" b="1" i="1" dirty="0">
                         <a:solidFill>
@@ -16149,7 +16192,7 @@
     </p:spTree>
     <p:extLst>
       <p:ext uri="{BB962C8B-B14F-4D97-AF65-F5344CB8AC3E}">
-        <p14:creationId xmlns:p14="http://schemas.microsoft.com/office/powerpoint/2010/main" xmlns="" val="1268200640"/>
+        <p14:creationId xmlns:p14="http://schemas.microsoft.com/office/powerpoint/2010/main" val="1268200640"/>
       </p:ext>
     </p:extLst>
   </p:cSld>
@@ -16223,7 +16266,7 @@
             <p:ph idx="1"/>
             <p:extLst>
               <p:ext uri="{D42A27DB-BD31-4B8C-83A1-F6EECF244321}">
-                <p14:modId xmlns:p14="http://schemas.microsoft.com/office/powerpoint/2010/main" xmlns="" val="2692413085"/>
+                <p14:modId xmlns:p14="http://schemas.microsoft.com/office/powerpoint/2010/main" val="2692413085"/>
               </p:ext>
             </p:extLst>
           </p:nvPr>
@@ -16456,31 +16499,7 @@
                             <a:schemeClr val="tx1"/>
                           </a:solidFill>
                         </a:rPr>
-                        <a:t>The </a:t>
-                      </a:r>
-                      <a:r>
-                        <a:rPr lang="en-US" sz="2000" b="1" i="1" dirty="0" smtClean="0">
-                          <a:solidFill>
-                            <a:schemeClr val="tx1"/>
-                          </a:solidFill>
-                        </a:rPr>
-                        <a:t>CubeSat </a:t>
-                      </a:r>
-                      <a:r>
-                        <a:rPr lang="en-US" sz="2000" b="1" i="1" dirty="0" smtClean="0">
-                          <a:solidFill>
-                            <a:schemeClr val="tx1"/>
-                          </a:solidFill>
-                        </a:rPr>
-                        <a:t> system must </a:t>
-                      </a:r>
-                      <a:r>
-                        <a:rPr lang="en-US" sz="2000" b="1" i="1" dirty="0" smtClean="0">
-                          <a:solidFill>
-                            <a:schemeClr val="tx1"/>
-                          </a:solidFill>
-                        </a:rPr>
-                        <a:t>be</a:t>
+                        <a:t>The CubeSat  system must be</a:t>
                       </a:r>
                       <a:r>
                         <a:rPr lang="en-US" sz="2000" b="1" i="1" baseline="0" dirty="0" smtClean="0">
@@ -16488,15 +16507,7 @@
                             <a:schemeClr val="tx1"/>
                           </a:solidFill>
                         </a:rPr>
-                        <a:t> in orbit for at least 6 </a:t>
-                      </a:r>
-                      <a:r>
-                        <a:rPr lang="en-US" sz="2000" b="1" i="1" baseline="0" dirty="0" smtClean="0">
-                          <a:solidFill>
-                            <a:schemeClr val="tx1"/>
-                          </a:solidFill>
-                        </a:rPr>
-                        <a:t>months”</a:t>
+                        <a:t> in orbit for at least 6 months”</a:t>
                       </a:r>
                       <a:endParaRPr lang="en-US" sz="2000" b="1" i="1" dirty="0">
                         <a:solidFill>
@@ -16744,7 +16755,7 @@
     </p:spTree>
     <p:extLst>
       <p:ext uri="{BB962C8B-B14F-4D97-AF65-F5344CB8AC3E}">
-        <p14:creationId xmlns:p14="http://schemas.microsoft.com/office/powerpoint/2010/main" xmlns="" val="813934142"/>
+        <p14:creationId xmlns:p14="http://schemas.microsoft.com/office/powerpoint/2010/main" val="813934142"/>
       </p:ext>
     </p:extLst>
   </p:cSld>
@@ -16818,7 +16829,7 @@
             <p:ph idx="1"/>
             <p:extLst>
               <p:ext uri="{D42A27DB-BD31-4B8C-83A1-F6EECF244321}">
-                <p14:modId xmlns:p14="http://schemas.microsoft.com/office/powerpoint/2010/main" xmlns="" val="1897762007"/>
+                <p14:modId xmlns:p14="http://schemas.microsoft.com/office/powerpoint/2010/main" val="1897762007"/>
               </p:ext>
             </p:extLst>
           </p:nvPr>
@@ -17051,23 +17062,7 @@
                             <a:schemeClr val="tx1"/>
                           </a:solidFill>
                         </a:rPr>
-                        <a:t>The </a:t>
-                      </a:r>
-                      <a:r>
-                        <a:rPr lang="en-US" sz="2000" b="1" i="1" dirty="0" smtClean="0">
-                          <a:solidFill>
-                            <a:schemeClr val="tx1"/>
-                          </a:solidFill>
-                        </a:rPr>
-                        <a:t>CubeSat </a:t>
-                      </a:r>
-                      <a:r>
-                        <a:rPr lang="en-US" sz="2000" b="1" i="1" dirty="0" smtClean="0">
-                          <a:solidFill>
-                            <a:schemeClr val="tx1"/>
-                          </a:solidFill>
-                        </a:rPr>
-                        <a:t> system</a:t>
+                        <a:t>The CubeSat  system</a:t>
                       </a:r>
                       <a:r>
                         <a:rPr lang="en-US" sz="2000" b="1" i="1" baseline="0" dirty="0" smtClean="0">
@@ -17083,23 +17078,7 @@
                             <a:schemeClr val="tx1"/>
                           </a:solidFill>
                         </a:rPr>
-                        <a:t>must </a:t>
-                      </a:r>
-                      <a:r>
-                        <a:rPr lang="en-US" sz="2000" b="1" i="1" dirty="0" smtClean="0">
-                          <a:solidFill>
-                            <a:schemeClr val="tx1"/>
-                          </a:solidFill>
-                        </a:rPr>
-                        <a:t>deorbit within 25 years of being </a:t>
-                      </a:r>
-                      <a:r>
-                        <a:rPr lang="en-US" sz="2000" b="1" i="1" dirty="0" smtClean="0">
-                          <a:solidFill>
-                            <a:schemeClr val="tx1"/>
-                          </a:solidFill>
-                        </a:rPr>
-                        <a:t>launched”</a:t>
+                        <a:t>must deorbit within 25 years of being launched”</a:t>
                       </a:r>
                       <a:endParaRPr lang="en-US" sz="2000" b="1" i="1" dirty="0">
                         <a:solidFill>
@@ -17347,7 +17326,7 @@
     </p:spTree>
     <p:extLst>
       <p:ext uri="{BB962C8B-B14F-4D97-AF65-F5344CB8AC3E}">
-        <p14:creationId xmlns:p14="http://schemas.microsoft.com/office/powerpoint/2010/main" xmlns="" val="3919620384"/>
+        <p14:creationId xmlns:p14="http://schemas.microsoft.com/office/powerpoint/2010/main" val="3919620384"/>
       </p:ext>
     </p:extLst>
   </p:cSld>
@@ -17421,7 +17400,7 @@
             <p:ph idx="1"/>
             <p:extLst>
               <p:ext uri="{D42A27DB-BD31-4B8C-83A1-F6EECF244321}">
-                <p14:modId xmlns:p14="http://schemas.microsoft.com/office/powerpoint/2010/main" xmlns="" val="4177955595"/>
+                <p14:modId xmlns:p14="http://schemas.microsoft.com/office/powerpoint/2010/main" val="4177955595"/>
               </p:ext>
             </p:extLst>
           </p:nvPr>
@@ -17654,23 +17633,7 @@
                             <a:schemeClr val="tx1"/>
                           </a:solidFill>
                         </a:rPr>
-                        <a:t>The </a:t>
-                      </a:r>
-                      <a:r>
-                        <a:rPr lang="en-US" sz="2000" b="1" i="1" dirty="0" smtClean="0">
-                          <a:solidFill>
-                            <a:schemeClr val="tx1"/>
-                          </a:solidFill>
-                        </a:rPr>
-                        <a:t>CubeSat system shall be conjoined prior to launch vehicle </a:t>
-                      </a:r>
-                      <a:r>
-                        <a:rPr lang="en-US" sz="2000" b="1" i="1" dirty="0" smtClean="0">
-                          <a:solidFill>
-                            <a:schemeClr val="tx1"/>
-                          </a:solidFill>
-                        </a:rPr>
-                        <a:t>integration”</a:t>
+                        <a:t>The CubeSat system shall be conjoined prior to launch vehicle integration”</a:t>
                       </a:r>
                       <a:endParaRPr lang="en-US" sz="2000" b="1" i="1" dirty="0">
                         <a:solidFill>
@@ -17918,7 +17881,7 @@
     </p:spTree>
     <p:extLst>
       <p:ext uri="{BB962C8B-B14F-4D97-AF65-F5344CB8AC3E}">
-        <p14:creationId xmlns:p14="http://schemas.microsoft.com/office/powerpoint/2010/main" xmlns="" val="1783788165"/>
+        <p14:creationId xmlns:p14="http://schemas.microsoft.com/office/powerpoint/2010/main" val="1783788165"/>
       </p:ext>
     </p:extLst>
   </p:cSld>
@@ -17992,7 +17955,7 @@
             <p:ph idx="1"/>
             <p:extLst>
               <p:ext uri="{D42A27DB-BD31-4B8C-83A1-F6EECF244321}">
-                <p14:modId xmlns:p14="http://schemas.microsoft.com/office/powerpoint/2010/main" xmlns="" val="2890384289"/>
+                <p14:modId xmlns:p14="http://schemas.microsoft.com/office/powerpoint/2010/main" val="2890384289"/>
               </p:ext>
             </p:extLst>
           </p:nvPr>
@@ -18225,15 +18188,7 @@
                             <a:schemeClr val="tx1"/>
                           </a:solidFill>
                         </a:rPr>
-                        <a:t>The </a:t>
-                      </a:r>
-                      <a:r>
-                        <a:rPr lang="en-US" sz="2000" b="1" i="1" dirty="0" smtClean="0">
-                          <a:solidFill>
-                            <a:schemeClr val="tx1"/>
-                          </a:solidFill>
-                        </a:rPr>
-                        <a:t>CubeSat shall incorporate a Remove</a:t>
+                        <a:t>The CubeSat shall incorporate a Remove</a:t>
                       </a:r>
                       <a:r>
                         <a:rPr lang="en-US" sz="2000" b="1" i="1" baseline="0" dirty="0" smtClean="0">
@@ -18241,15 +18196,7 @@
                             <a:schemeClr val="tx1"/>
                           </a:solidFill>
                         </a:rPr>
-                        <a:t> Before Flight </a:t>
-                      </a:r>
-                      <a:r>
-                        <a:rPr lang="en-US" sz="2000" b="1" i="1" baseline="0" dirty="0" smtClean="0">
-                          <a:solidFill>
-                            <a:schemeClr val="tx1"/>
-                          </a:solidFill>
-                        </a:rPr>
-                        <a:t>pin”</a:t>
+                        <a:t> Before Flight pin”</a:t>
                       </a:r>
                       <a:endParaRPr lang="en-US" sz="2000" b="1" i="1" dirty="0">
                         <a:solidFill>
@@ -18522,7 +18469,7 @@
           <a:effectLst/>
           <a:extLst>
             <a:ext uri="{AF507438-7753-43E0-B8FC-AC1667EBCBE1}">
-              <a14:hiddenEffects xmlns:a14="http://schemas.microsoft.com/office/drawing/2010/main" xmlns="">
+              <a14:hiddenEffects xmlns:a14="http://schemas.microsoft.com/office/drawing/2010/main">
                 <a:effectLst>
                   <a:outerShdw dist="35921" dir="2700000" algn="ctr" rotWithShape="0">
                     <a:schemeClr val="bg2"/>
@@ -18599,7 +18546,7 @@
           <a:effectLst/>
           <a:extLst>
             <a:ext uri="{AF507438-7753-43E0-B8FC-AC1667EBCBE1}">
-              <a14:hiddenEffects xmlns:a14="http://schemas.microsoft.com/office/drawing/2010/main" xmlns="">
+              <a14:hiddenEffects xmlns:a14="http://schemas.microsoft.com/office/drawing/2010/main">
                 <a:effectLst>
                   <a:outerShdw dist="35921" dir="2700000" algn="ctr" rotWithShape="0">
                     <a:schemeClr val="bg2"/>
@@ -18676,7 +18623,7 @@
           <a:effectLst/>
           <a:extLst>
             <a:ext uri="{AF507438-7753-43E0-B8FC-AC1667EBCBE1}">
-              <a14:hiddenEffects xmlns:a14="http://schemas.microsoft.com/office/drawing/2010/main" xmlns="">
+              <a14:hiddenEffects xmlns:a14="http://schemas.microsoft.com/office/drawing/2010/main">
                 <a:effectLst>
                   <a:outerShdw dist="35921" dir="2700000" algn="ctr" rotWithShape="0">
                     <a:schemeClr val="bg2"/>
@@ -18758,7 +18705,7 @@
     </p:spTree>
     <p:extLst>
       <p:ext uri="{BB962C8B-B14F-4D97-AF65-F5344CB8AC3E}">
-        <p14:creationId xmlns:p14="http://schemas.microsoft.com/office/powerpoint/2010/main" xmlns="" val="3869352076"/>
+        <p14:creationId xmlns:p14="http://schemas.microsoft.com/office/powerpoint/2010/main" val="3869352076"/>
       </p:ext>
     </p:extLst>
   </p:cSld>
@@ -18827,7 +18774,7 @@
             <p:ph idx="1"/>
             <p:extLst>
               <p:ext uri="{D42A27DB-BD31-4B8C-83A1-F6EECF244321}">
-                <p14:modId xmlns:p14="http://schemas.microsoft.com/office/powerpoint/2010/main" xmlns="" val="1935047002"/>
+                <p14:modId xmlns:p14="http://schemas.microsoft.com/office/powerpoint/2010/main" val="1935047002"/>
               </p:ext>
             </p:extLst>
           </p:nvPr>
@@ -19389,7 +19336,7 @@
     </p:spTree>
     <p:extLst>
       <p:ext uri="{BB962C8B-B14F-4D97-AF65-F5344CB8AC3E}">
-        <p14:creationId xmlns:p14="http://schemas.microsoft.com/office/powerpoint/2010/main" xmlns="" val="1176561572"/>
+        <p14:creationId xmlns:p14="http://schemas.microsoft.com/office/powerpoint/2010/main" val="1176561572"/>
       </p:ext>
     </p:extLst>
   </p:cSld>
@@ -19816,7 +19763,7 @@
             <p:ph idx="1"/>
             <p:extLst>
               <p:ext uri="{D42A27DB-BD31-4B8C-83A1-F6EECF244321}">
-                <p14:modId xmlns:p14="http://schemas.microsoft.com/office/powerpoint/2010/main" xmlns="" val="1451874093"/>
+                <p14:modId xmlns:p14="http://schemas.microsoft.com/office/powerpoint/2010/main" val="1451874093"/>
               </p:ext>
             </p:extLst>
           </p:nvPr>
@@ -20296,15 +20243,7 @@
                   <a:schemeClr val="tx1"/>
                 </a:solidFill>
               </a:rPr>
-              <a:t>that there be no extension beyond 6.5 mm normal to any surface of the </a:t>
-            </a:r>
-            <a:r>
-              <a:rPr lang="en-US" sz="2600" b="1" dirty="0" smtClean="0">
-                <a:solidFill>
-                  <a:schemeClr val="tx1"/>
-                </a:solidFill>
-              </a:rPr>
-              <a:t>CubeSat prevents the CubeSat from getting stuck in the deployer.</a:t>
+              <a:t>that there be no extension beyond 6.5 mm normal to any surface of the CubeSat prevents the CubeSat from getting stuck in the deployer.</a:t>
             </a:r>
             <a:endParaRPr lang="en-US" sz="2600" b="1" dirty="0">
               <a:solidFill>
@@ -20346,7 +20285,7 @@
     </p:spTree>
     <p:extLst>
       <p:ext uri="{BB962C8B-B14F-4D97-AF65-F5344CB8AC3E}">
-        <p14:creationId xmlns:p14="http://schemas.microsoft.com/office/powerpoint/2010/main" xmlns="" val="4024384513"/>
+        <p14:creationId xmlns:p14="http://schemas.microsoft.com/office/powerpoint/2010/main" val="4024384513"/>
       </p:ext>
     </p:extLst>
   </p:cSld>
@@ -20415,7 +20354,7 @@
             <p:ph idx="1"/>
             <p:extLst>
               <p:ext uri="{D42A27DB-BD31-4B8C-83A1-F6EECF244321}">
-                <p14:modId xmlns:p14="http://schemas.microsoft.com/office/powerpoint/2010/main" xmlns="" val="4054883764"/>
+                <p14:modId xmlns:p14="http://schemas.microsoft.com/office/powerpoint/2010/main" val="4054883764"/>
               </p:ext>
             </p:extLst>
           </p:nvPr>
@@ -20931,31 +20870,7 @@
                   <a:schemeClr val="tx1"/>
                 </a:solidFill>
               </a:rPr>
-              <a:t> within the </a:t>
-            </a:r>
-            <a:r>
-              <a:rPr lang="en-US" sz="2600" b="1" dirty="0" smtClean="0">
-                <a:solidFill>
-                  <a:schemeClr val="tx1"/>
-                </a:solidFill>
-              </a:rPr>
-              <a:t>deployer, </a:t>
-            </a:r>
-            <a:r>
-              <a:rPr lang="en-US" sz="2600" b="1" dirty="0" smtClean="0">
-                <a:solidFill>
-                  <a:schemeClr val="tx1"/>
-                </a:solidFill>
-              </a:rPr>
-              <a:t>and the need for a smooth exit from the launch vehicle, no component may extend any further than 6.5 mm normal to any surface of the </a:t>
-            </a:r>
-            <a:r>
-              <a:rPr lang="en-US" sz="2600" b="1" dirty="0" smtClean="0">
-                <a:solidFill>
-                  <a:schemeClr val="tx1"/>
-                </a:solidFill>
-              </a:rPr>
-              <a:t>CubeSat System.</a:t>
+              <a:t> within the deployer, and the need for a smooth exit from the launch vehicle, no component may extend any further than 6.5 mm normal to any surface of the CubeSat System.</a:t>
             </a:r>
             <a:endParaRPr lang="en-US" sz="2600" b="1" dirty="0">
               <a:solidFill>
@@ -20997,7 +20912,7 @@
     </p:spTree>
     <p:extLst>
       <p:ext uri="{BB962C8B-B14F-4D97-AF65-F5344CB8AC3E}">
-        <p14:creationId xmlns:p14="http://schemas.microsoft.com/office/powerpoint/2010/main" xmlns="" val="3044123568"/>
+        <p14:creationId xmlns:p14="http://schemas.microsoft.com/office/powerpoint/2010/main" val="3044123568"/>
       </p:ext>
     </p:extLst>
   </p:cSld>
@@ -21066,7 +20981,7 @@
             <p:ph idx="1"/>
             <p:extLst>
               <p:ext uri="{D42A27DB-BD31-4B8C-83A1-F6EECF244321}">
-                <p14:modId xmlns:p14="http://schemas.microsoft.com/office/powerpoint/2010/main" xmlns="" val="1683880331"/>
+                <p14:modId xmlns:p14="http://schemas.microsoft.com/office/powerpoint/2010/main" val="1683880331"/>
               </p:ext>
             </p:extLst>
           </p:nvPr>
@@ -21664,7 +21579,7 @@
     </p:spTree>
     <p:extLst>
       <p:ext uri="{BB962C8B-B14F-4D97-AF65-F5344CB8AC3E}">
-        <p14:creationId xmlns:p14="http://schemas.microsoft.com/office/powerpoint/2010/main" xmlns="" val="1280492138"/>
+        <p14:creationId xmlns:p14="http://schemas.microsoft.com/office/powerpoint/2010/main" val="1280492138"/>
       </p:ext>
     </p:extLst>
   </p:cSld>
@@ -21733,7 +21648,7 @@
             <p:ph idx="1"/>
             <p:extLst>
               <p:ext uri="{D42A27DB-BD31-4B8C-83A1-F6EECF244321}">
-                <p14:modId xmlns:p14="http://schemas.microsoft.com/office/powerpoint/2010/main" xmlns="" val="3896250188"/>
+                <p14:modId xmlns:p14="http://schemas.microsoft.com/office/powerpoint/2010/main" val="3896250188"/>
               </p:ext>
             </p:extLst>
           </p:nvPr>
@@ -22221,23 +22136,7 @@
                   <a:schemeClr val="tx1"/>
                 </a:solidFill>
               </a:rPr>
-              <a:t>The positioning of the center of gravity close to the geometric center for the easier manipulation of the </a:t>
-            </a:r>
-            <a:r>
-              <a:rPr lang="en-US" sz="2600" b="1" dirty="0" smtClean="0">
-                <a:solidFill>
-                  <a:schemeClr val="tx1"/>
-                </a:solidFill>
-              </a:rPr>
-              <a:t>CubeSat system </a:t>
-            </a:r>
-            <a:r>
-              <a:rPr lang="en-US" sz="2600" b="1" dirty="0" smtClean="0">
-                <a:solidFill>
-                  <a:schemeClr val="tx1"/>
-                </a:solidFill>
-              </a:rPr>
-              <a:t>from any point.</a:t>
+              <a:t>The positioning of the center of gravity close to the geometric center for the easier manipulation of the CubeSat system from any point.</a:t>
             </a:r>
             <a:endParaRPr lang="en-US" sz="2600" b="1" dirty="0">
               <a:solidFill>
@@ -22279,7 +22178,7 @@
     </p:spTree>
     <p:extLst>
       <p:ext uri="{BB962C8B-B14F-4D97-AF65-F5344CB8AC3E}">
-        <p14:creationId xmlns:p14="http://schemas.microsoft.com/office/powerpoint/2010/main" xmlns="" val="1519208509"/>
+        <p14:creationId xmlns:p14="http://schemas.microsoft.com/office/powerpoint/2010/main" val="1519208509"/>
       </p:ext>
     </p:extLst>
   </p:cSld>
@@ -22348,7 +22247,7 @@
             <p:ph idx="1"/>
             <p:extLst>
               <p:ext uri="{D42A27DB-BD31-4B8C-83A1-F6EECF244321}">
-                <p14:modId xmlns:p14="http://schemas.microsoft.com/office/powerpoint/2010/main" xmlns="" val="657005942"/>
+                <p14:modId xmlns:p14="http://schemas.microsoft.com/office/powerpoint/2010/main" val="657005942"/>
               </p:ext>
             </p:extLst>
           </p:nvPr>
@@ -22812,31 +22711,7 @@
                   <a:schemeClr val="tx1"/>
                 </a:solidFill>
               </a:rPr>
-              <a:t>Jade is sub satellite 1 and Turquoise is sub satellite 2 of </a:t>
-            </a:r>
-            <a:r>
-              <a:rPr lang="en-US" sz="2600" b="1" dirty="0" smtClean="0">
-                <a:solidFill>
-                  <a:schemeClr val="tx1"/>
-                </a:solidFill>
-              </a:rPr>
-              <a:t>the CubeSat system, and </a:t>
-            </a:r>
-            <a:r>
-              <a:rPr lang="en-US" sz="2600" b="1" dirty="0" smtClean="0">
-                <a:solidFill>
-                  <a:schemeClr val="tx1"/>
-                </a:solidFill>
-              </a:rPr>
-              <a:t>having the centers of gravity of each of the cubes close to their geometric centers makes for more </a:t>
-            </a:r>
-            <a:r>
-              <a:rPr lang="en-US" sz="2600" b="1" dirty="0" smtClean="0">
-                <a:solidFill>
-                  <a:schemeClr val="tx1"/>
-                </a:solidFill>
-              </a:rPr>
-              <a:t>coordinated and easy to calculate orbital maneuvers.</a:t>
+              <a:t>Jade is sub satellite 1 and Turquoise is sub satellite 2 of the CubeSat system, and having the centers of gravity of each of the cubes close to their geometric centers makes for more coordinated and easy to calculate orbital maneuvers.</a:t>
             </a:r>
             <a:endParaRPr lang="en-US" sz="2600" b="1" dirty="0">
               <a:solidFill>
@@ -22878,7 +22753,7 @@
     </p:spTree>
     <p:extLst>
       <p:ext uri="{BB962C8B-B14F-4D97-AF65-F5344CB8AC3E}">
-        <p14:creationId xmlns:p14="http://schemas.microsoft.com/office/powerpoint/2010/main" xmlns="" val="217802737"/>
+        <p14:creationId xmlns:p14="http://schemas.microsoft.com/office/powerpoint/2010/main" val="217802737"/>
       </p:ext>
     </p:extLst>
   </p:cSld>
@@ -22947,7 +22822,7 @@
             <p:ph idx="1"/>
             <p:extLst>
               <p:ext uri="{D42A27DB-BD31-4B8C-83A1-F6EECF244321}">
-                <p14:modId xmlns:p14="http://schemas.microsoft.com/office/powerpoint/2010/main" xmlns="" val="3016634820"/>
+                <p14:modId xmlns:p14="http://schemas.microsoft.com/office/powerpoint/2010/main" val="3016634820"/>
               </p:ext>
             </p:extLst>
           </p:nvPr>
@@ -23435,79 +23310,7 @@
                   <a:schemeClr val="tx1"/>
                 </a:solidFill>
               </a:rPr>
-              <a:t>Defined orientations are crucial in any space mission. </a:t>
-            </a:r>
-            <a:r>
-              <a:rPr lang="en-US" sz="2600" b="1" dirty="0" smtClean="0">
-                <a:solidFill>
-                  <a:schemeClr val="tx1"/>
-                </a:solidFill>
-              </a:rPr>
-              <a:t>Knowing that the </a:t>
-            </a:r>
-            <a:r>
-              <a:rPr lang="en-US" sz="2600" b="1" dirty="0" smtClean="0">
-                <a:solidFill>
-                  <a:schemeClr val="tx1"/>
-                </a:solidFill>
-              </a:rPr>
-              <a:t>Z- </a:t>
-            </a:r>
-            <a:r>
-              <a:rPr lang="en-US" sz="2600" b="1" dirty="0" smtClean="0">
-                <a:solidFill>
-                  <a:schemeClr val="tx1"/>
-                </a:solidFill>
-              </a:rPr>
-              <a:t>surface is inserted into the </a:t>
-            </a:r>
-            <a:r>
-              <a:rPr lang="en-US" sz="2600" b="1" dirty="0" smtClean="0">
-                <a:solidFill>
-                  <a:schemeClr val="tx1"/>
-                </a:solidFill>
-              </a:rPr>
-              <a:t>deployer </a:t>
-            </a:r>
-            <a:r>
-              <a:rPr lang="en-US" sz="2600" b="1" dirty="0" smtClean="0">
-                <a:solidFill>
-                  <a:schemeClr val="tx1"/>
-                </a:solidFill>
-              </a:rPr>
-              <a:t>first, that the railings are along the </a:t>
-            </a:r>
-            <a:r>
-              <a:rPr lang="en-US" sz="2600" b="1" dirty="0" smtClean="0">
-                <a:solidFill>
-                  <a:schemeClr val="tx1"/>
-                </a:solidFill>
-              </a:rPr>
-              <a:t>Y  </a:t>
-            </a:r>
-            <a:r>
-              <a:rPr lang="en-US" sz="2600" b="1" dirty="0" smtClean="0">
-                <a:solidFill>
-                  <a:schemeClr val="tx1"/>
-                </a:solidFill>
-              </a:rPr>
-              <a:t>face, and the deployment switch is on the </a:t>
-            </a:r>
-            <a:r>
-              <a:rPr lang="en-US" sz="2600" b="1" dirty="0" smtClean="0">
-                <a:solidFill>
-                  <a:schemeClr val="tx1"/>
-                </a:solidFill>
-              </a:rPr>
-              <a:t>Z- </a:t>
-            </a:r>
-            <a:r>
-              <a:rPr lang="en-US" sz="2600" b="1" dirty="0" smtClean="0">
-                <a:solidFill>
-                  <a:schemeClr val="tx1"/>
-                </a:solidFill>
-              </a:rPr>
-              <a:t>surface leaves no ambiguity. </a:t>
+              <a:t>Defined orientations are crucial in any space mission. Knowing that the Z- surface is inserted into the deployer first, that the railings are along the Y  face, and the deployment switch is on the Z- surface leaves no ambiguity. </a:t>
             </a:r>
             <a:endParaRPr lang="en-US" sz="2600" b="1" dirty="0">
               <a:solidFill>
@@ -23529,7 +23332,7 @@
           <a:blip r:embed="rId2" cstate="print">
             <a:extLst>
               <a:ext uri="{28A0092B-C50C-407E-A947-70E740481C1C}">
-                <a14:useLocalDpi xmlns:a14="http://schemas.microsoft.com/office/drawing/2010/main" xmlns="" val="0"/>
+                <a14:useLocalDpi xmlns:a14="http://schemas.microsoft.com/office/drawing/2010/main" val="0"/>
               </a:ext>
             </a:extLst>
           </a:blip>
@@ -23578,7 +23381,7 @@
     </p:spTree>
     <p:extLst>
       <p:ext uri="{BB962C8B-B14F-4D97-AF65-F5344CB8AC3E}">
-        <p14:creationId xmlns:p14="http://schemas.microsoft.com/office/powerpoint/2010/main" xmlns="" val="2711901525"/>
+        <p14:creationId xmlns:p14="http://schemas.microsoft.com/office/powerpoint/2010/main" val="2711901525"/>
       </p:ext>
     </p:extLst>
   </p:cSld>
@@ -23647,7 +23450,7 @@
             <p:ph idx="1"/>
             <p:extLst>
               <p:ext uri="{D42A27DB-BD31-4B8C-83A1-F6EECF244321}">
-                <p14:modId xmlns:p14="http://schemas.microsoft.com/office/powerpoint/2010/main" xmlns="" val="470907272"/>
+                <p14:modId xmlns:p14="http://schemas.microsoft.com/office/powerpoint/2010/main" val="470907272"/>
               </p:ext>
             </p:extLst>
           </p:nvPr>
@@ -24111,15 +23914,7 @@
                   <a:schemeClr val="tx1"/>
                 </a:solidFill>
               </a:rPr>
-              <a:t>Knowing the x, y, and z orientation </a:t>
-            </a:r>
-            <a:r>
-              <a:rPr lang="en-US" sz="2600" b="1" dirty="0" smtClean="0">
-                <a:solidFill>
-                  <a:schemeClr val="tx1"/>
-                </a:solidFill>
-              </a:rPr>
-              <a:t>of Jade and Turquoise allows for consistency between their orientation both apart and together, leading to fewer misunderstandings between the two</a:t>
+              <a:t>Knowing the x, y, and z orientation of Jade and Turquoise allows for consistency between their orientation both apart and together, leading to fewer misunderstandings between the two</a:t>
             </a:r>
             <a:endParaRPr lang="en-US" sz="2600" b="1" dirty="0">
               <a:solidFill>
@@ -24161,7 +23956,7 @@
     </p:spTree>
     <p:extLst>
       <p:ext uri="{BB962C8B-B14F-4D97-AF65-F5344CB8AC3E}">
-        <p14:creationId xmlns:p14="http://schemas.microsoft.com/office/powerpoint/2010/main" xmlns="" val="1069814880"/>
+        <p14:creationId xmlns:p14="http://schemas.microsoft.com/office/powerpoint/2010/main" val="1069814880"/>
       </p:ext>
     </p:extLst>
   </p:cSld>
@@ -24788,7 +24583,7 @@
           <a:effectLst/>
           <a:extLst>
             <a:ext uri="{AF507438-7753-43E0-B8FC-AC1667EBCBE1}">
-              <a14:hiddenEffects xmlns:a14="http://schemas.microsoft.com/office/drawing/2010/main" xmlns="">
+              <a14:hiddenEffects xmlns:a14="http://schemas.microsoft.com/office/drawing/2010/main">
                 <a:effectLst>
                   <a:outerShdw dist="35921" dir="2700000" algn="ctr" rotWithShape="0">
                     <a:schemeClr val="bg2"/>
@@ -24865,7 +24660,7 @@
           <a:effectLst/>
           <a:extLst>
             <a:ext uri="{AF507438-7753-43E0-B8FC-AC1667EBCBE1}">
-              <a14:hiddenEffects xmlns:a14="http://schemas.microsoft.com/office/drawing/2010/main" xmlns="">
+              <a14:hiddenEffects xmlns:a14="http://schemas.microsoft.com/office/drawing/2010/main">
                 <a:effectLst>
                   <a:outerShdw dist="35921" dir="2700000" algn="ctr" rotWithShape="0">
                     <a:schemeClr val="bg2"/>
@@ -24942,7 +24737,7 @@
           <a:effectLst/>
           <a:extLst>
             <a:ext uri="{AF507438-7753-43E0-B8FC-AC1667EBCBE1}">
-              <a14:hiddenEffects xmlns:a14="http://schemas.microsoft.com/office/drawing/2010/main" xmlns="">
+              <a14:hiddenEffects xmlns:a14="http://schemas.microsoft.com/office/drawing/2010/main">
                 <a:effectLst>
                   <a:outerShdw dist="35921" dir="2700000" algn="ctr" rotWithShape="0">
                     <a:schemeClr val="bg2"/>
@@ -25019,7 +24814,7 @@
           <a:effectLst/>
           <a:extLst>
             <a:ext uri="{AF507438-7753-43E0-B8FC-AC1667EBCBE1}">
-              <a14:hiddenEffects xmlns:a14="http://schemas.microsoft.com/office/drawing/2010/main" xmlns="">
+              <a14:hiddenEffects xmlns:a14="http://schemas.microsoft.com/office/drawing/2010/main">
                 <a:effectLst>
                   <a:outerShdw dist="35921" dir="2700000" algn="ctr" rotWithShape="0">
                     <a:schemeClr val="bg2"/>
@@ -25100,7 +24895,7 @@
           <a:effectLst/>
           <a:extLst>
             <a:ext uri="{AF507438-7753-43E0-B8FC-AC1667EBCBE1}">
-              <a14:hiddenEffects xmlns:a14="http://schemas.microsoft.com/office/drawing/2010/main" xmlns="">
+              <a14:hiddenEffects xmlns:a14="http://schemas.microsoft.com/office/drawing/2010/main">
                 <a:effectLst>
                   <a:outerShdw dist="35921" dir="2700000" algn="ctr" rotWithShape="0">
                     <a:schemeClr val="bg2"/>
@@ -25142,7 +24937,7 @@
           <a:effectLst/>
           <a:extLst>
             <a:ext uri="{AF507438-7753-43E0-B8FC-AC1667EBCBE1}">
-              <a14:hiddenEffects xmlns:a14="http://schemas.microsoft.com/office/drawing/2010/main" xmlns="">
+              <a14:hiddenEffects xmlns:a14="http://schemas.microsoft.com/office/drawing/2010/main">
                 <a:effectLst>
                   <a:outerShdw dist="35921" dir="2700000" algn="ctr" rotWithShape="0">
                     <a:schemeClr val="bg2"/>
@@ -25184,7 +24979,7 @@
           <a:effectLst/>
           <a:extLst>
             <a:ext uri="{AF507438-7753-43E0-B8FC-AC1667EBCBE1}">
-              <a14:hiddenEffects xmlns:a14="http://schemas.microsoft.com/office/drawing/2010/main" xmlns="">
+              <a14:hiddenEffects xmlns:a14="http://schemas.microsoft.com/office/drawing/2010/main">
                 <a:effectLst>
                   <a:outerShdw dist="35921" dir="2700000" algn="ctr" rotWithShape="0">
                     <a:schemeClr val="bg2"/>
@@ -25226,7 +25021,7 @@
           <a:effectLst/>
           <a:extLst>
             <a:ext uri="{AF507438-7753-43E0-B8FC-AC1667EBCBE1}">
-              <a14:hiddenEffects xmlns:a14="http://schemas.microsoft.com/office/drawing/2010/main" xmlns="">
+              <a14:hiddenEffects xmlns:a14="http://schemas.microsoft.com/office/drawing/2010/main">
                 <a:effectLst>
                   <a:outerShdw dist="35921" dir="2700000" algn="ctr" rotWithShape="0">
                     <a:schemeClr val="bg2"/>
@@ -25886,7 +25681,7 @@
           <a:effectLst/>
           <a:extLst>
             <a:ext uri="{AF507438-7753-43E0-B8FC-AC1667EBCBE1}">
-              <a14:hiddenEffects xmlns:a14="http://schemas.microsoft.com/office/drawing/2010/main" xmlns="">
+              <a14:hiddenEffects xmlns:a14="http://schemas.microsoft.com/office/drawing/2010/main">
                 <a:effectLst>
                   <a:outerShdw dist="35921" dir="2700000" algn="ctr" rotWithShape="0">
                     <a:schemeClr val="bg2"/>
@@ -26585,7 +26380,7 @@
           <a:effectLst/>
           <a:extLst>
             <a:ext uri="{AF507438-7753-43E0-B8FC-AC1667EBCBE1}">
-              <a14:hiddenEffects xmlns:a14="http://schemas.microsoft.com/office/drawing/2010/main" xmlns="">
+              <a14:hiddenEffects xmlns:a14="http://schemas.microsoft.com/office/drawing/2010/main">
                 <a:effectLst>
                   <a:outerShdw dist="35921" dir="2700000" algn="ctr" rotWithShape="0">
                     <a:schemeClr val="bg2"/>
@@ -27062,7 +26857,7 @@
           <a:blip r:embed="rId3" cstate="print">
             <a:extLst>
               <a:ext uri="{28A0092B-C50C-407E-A947-70E740481C1C}">
-                <a14:useLocalDpi xmlns:a14="http://schemas.microsoft.com/office/drawing/2010/main" xmlns="" val="0"/>
+                <a14:useLocalDpi xmlns:a14="http://schemas.microsoft.com/office/drawing/2010/main" val="0"/>
               </a:ext>
             </a:extLst>
           </a:blip>
@@ -27086,7 +26881,7 @@
           <a:effectLst/>
           <a:extLst>
             <a:ext uri="{909E8E84-426E-40DD-AFC4-6F175D3DCCD1}">
-              <a14:hiddenFill xmlns:a14="http://schemas.microsoft.com/office/drawing/2010/main" xmlns="">
+              <a14:hiddenFill xmlns:a14="http://schemas.microsoft.com/office/drawing/2010/main">
                 <a:blipFill dpi="0" rotWithShape="0">
                   <a:blip/>
                   <a:srcRect l="36720" t="22469" r="33257" b="28795"/>
@@ -27097,7 +26892,7 @@
               </a14:hiddenFill>
             </a:ext>
             <a:ext uri="{91240B29-F687-4F45-9708-019B960494DF}">
-              <a14:hiddenLine xmlns:a14="http://schemas.microsoft.com/office/drawing/2010/main" xmlns="" w="9525">
+              <a14:hiddenLine xmlns:a14="http://schemas.microsoft.com/office/drawing/2010/main" w="9525">
                 <a:solidFill>
                   <a:srgbClr val="808080"/>
                 </a:solidFill>
@@ -27107,7 +26902,7 @@
               </a14:hiddenLine>
             </a:ext>
             <a:ext uri="{AF507438-7753-43E0-B8FC-AC1667EBCBE1}">
-              <a14:hiddenEffects xmlns:a14="http://schemas.microsoft.com/office/drawing/2010/main" xmlns="">
+              <a14:hiddenEffects xmlns:a14="http://schemas.microsoft.com/office/drawing/2010/main">
                 <a:effectLst>
                   <a:outerShdw dist="35921" dir="2700000" algn="ctr" rotWithShape="0">
                     <a:srgbClr val="808080"/>
@@ -27130,7 +26925,7 @@
           <a:blip r:embed="rId4" cstate="print">
             <a:extLst>
               <a:ext uri="{28A0092B-C50C-407E-A947-70E740481C1C}">
-                <a14:useLocalDpi xmlns:a14="http://schemas.microsoft.com/office/drawing/2010/main" xmlns="" val="0"/>
+                <a14:useLocalDpi xmlns:a14="http://schemas.microsoft.com/office/drawing/2010/main" val="0"/>
               </a:ext>
             </a:extLst>
           </a:blip>
@@ -27154,7 +26949,7 @@
           <a:effectLst/>
           <a:extLst>
             <a:ext uri="{909E8E84-426E-40DD-AFC4-6F175D3DCCD1}">
-              <a14:hiddenFill xmlns:a14="http://schemas.microsoft.com/office/drawing/2010/main" xmlns="">
+              <a14:hiddenFill xmlns:a14="http://schemas.microsoft.com/office/drawing/2010/main">
                 <a:blipFill dpi="0" rotWithShape="0">
                   <a:blip/>
                   <a:srcRect/>
@@ -27165,7 +26960,7 @@
               </a14:hiddenFill>
             </a:ext>
             <a:ext uri="{91240B29-F687-4F45-9708-019B960494DF}">
-              <a14:hiddenLine xmlns:a14="http://schemas.microsoft.com/office/drawing/2010/main" xmlns="" w="9525">
+              <a14:hiddenLine xmlns:a14="http://schemas.microsoft.com/office/drawing/2010/main" w="9525">
                 <a:solidFill>
                   <a:srgbClr val="808080"/>
                 </a:solidFill>
@@ -27175,7 +26970,7 @@
               </a14:hiddenLine>
             </a:ext>
             <a:ext uri="{AF507438-7753-43E0-B8FC-AC1667EBCBE1}">
-              <a14:hiddenEffects xmlns:a14="http://schemas.microsoft.com/office/drawing/2010/main" xmlns="">
+              <a14:hiddenEffects xmlns:a14="http://schemas.microsoft.com/office/drawing/2010/main">
                 <a:effectLst>
                   <a:outerShdw dist="35921" dir="2700000" algn="ctr" rotWithShape="0">
                     <a:srgbClr val="808080"/>
@@ -27198,7 +26993,7 @@
           <a:blip r:embed="rId5" cstate="print">
             <a:extLst>
               <a:ext uri="{28A0092B-C50C-407E-A947-70E740481C1C}">
-                <a14:useLocalDpi xmlns:a14="http://schemas.microsoft.com/office/drawing/2010/main" xmlns="" val="0"/>
+                <a14:useLocalDpi xmlns:a14="http://schemas.microsoft.com/office/drawing/2010/main" val="0"/>
               </a:ext>
             </a:extLst>
           </a:blip>
@@ -27222,7 +27017,7 @@
           <a:effectLst/>
           <a:extLst>
             <a:ext uri="{909E8E84-426E-40DD-AFC4-6F175D3DCCD1}">
-              <a14:hiddenFill xmlns:a14="http://schemas.microsoft.com/office/drawing/2010/main" xmlns="">
+              <a14:hiddenFill xmlns:a14="http://schemas.microsoft.com/office/drawing/2010/main">
                 <a:blipFill dpi="0" rotWithShape="0">
                   <a:blip/>
                   <a:srcRect/>
@@ -27233,7 +27028,7 @@
               </a14:hiddenFill>
             </a:ext>
             <a:ext uri="{91240B29-F687-4F45-9708-019B960494DF}">
-              <a14:hiddenLine xmlns:a14="http://schemas.microsoft.com/office/drawing/2010/main" xmlns="" w="9525">
+              <a14:hiddenLine xmlns:a14="http://schemas.microsoft.com/office/drawing/2010/main" w="9525">
                 <a:solidFill>
                   <a:srgbClr val="808080"/>
                 </a:solidFill>
@@ -27243,7 +27038,7 @@
               </a14:hiddenLine>
             </a:ext>
             <a:ext uri="{AF507438-7753-43E0-B8FC-AC1667EBCBE1}">
-              <a14:hiddenEffects xmlns:a14="http://schemas.microsoft.com/office/drawing/2010/main" xmlns="">
+              <a14:hiddenEffects xmlns:a14="http://schemas.microsoft.com/office/drawing/2010/main">
                 <a:effectLst>
                   <a:outerShdw dist="35921" dir="2700000" algn="ctr" rotWithShape="0">
                     <a:srgbClr val="808080"/>
@@ -30015,7 +29810,7 @@
             <p:ph idx="1"/>
             <p:extLst>
               <p:ext uri="{D42A27DB-BD31-4B8C-83A1-F6EECF244321}">
-                <p14:modId xmlns:p14="http://schemas.microsoft.com/office/powerpoint/2010/main" xmlns="" val="1757469292"/>
+                <p14:modId xmlns:p14="http://schemas.microsoft.com/office/powerpoint/2010/main" val="1757469292"/>
               </p:ext>
             </p:extLst>
           </p:nvPr>
@@ -30248,23 +30043,7 @@
                             <a:schemeClr val="tx1"/>
                           </a:solidFill>
                         </a:rPr>
-                        <a:t>All </a:t>
-                      </a:r>
-                      <a:r>
-                        <a:rPr lang="en-US" sz="2000" b="1" i="1" dirty="0" smtClean="0">
-                          <a:solidFill>
-                            <a:schemeClr val="tx1"/>
-                          </a:solidFill>
-                        </a:rPr>
-                        <a:t>CubeSat components shall be rated to withstand a temperature range of at least -20 ⁰C to 70 ⁰</a:t>
-                      </a:r>
-                      <a:r>
-                        <a:rPr lang="en-US" sz="2000" b="1" i="1" dirty="0" smtClean="0">
-                          <a:solidFill>
-                            <a:schemeClr val="tx1"/>
-                          </a:solidFill>
-                        </a:rPr>
-                        <a:t>C”</a:t>
+                        <a:t>All CubeSat components shall be rated to withstand a temperature range of at least -20 ⁰C to 70 ⁰C”</a:t>
                       </a:r>
                       <a:endParaRPr lang="en-US" sz="2000" b="1" i="1" dirty="0">
                         <a:solidFill>
@@ -30520,7 +30299,7 @@
     </p:spTree>
     <p:extLst>
       <p:ext uri="{BB962C8B-B14F-4D97-AF65-F5344CB8AC3E}">
-        <p14:creationId xmlns:p14="http://schemas.microsoft.com/office/powerpoint/2010/main" xmlns="" val="2711901525"/>
+        <p14:creationId xmlns:p14="http://schemas.microsoft.com/office/powerpoint/2010/main" val="2711901525"/>
       </p:ext>
     </p:extLst>
   </p:cSld>
@@ -30589,7 +30368,7 @@
             <p:ph idx="1"/>
             <p:extLst>
               <p:ext uri="{D42A27DB-BD31-4B8C-83A1-F6EECF244321}">
-                <p14:modId xmlns:p14="http://schemas.microsoft.com/office/powerpoint/2010/main" xmlns="" val="1567101371"/>
+                <p14:modId xmlns:p14="http://schemas.microsoft.com/office/powerpoint/2010/main" val="1567101371"/>
               </p:ext>
             </p:extLst>
           </p:nvPr>
@@ -30822,15 +30601,7 @@
                             <a:schemeClr val="tx1"/>
                           </a:solidFill>
                         </a:rPr>
-                        <a:t>Static </a:t>
-                      </a:r>
-                      <a:r>
-                        <a:rPr lang="en-US" sz="2000" b="1" i="1" dirty="0" smtClean="0">
-                          <a:solidFill>
-                            <a:schemeClr val="tx1"/>
-                          </a:solidFill>
-                        </a:rPr>
-                        <a:t>Thrust testing will be performed with the flight pressure vessel  prior to CubeSat integration at a pressure no greater than 1x10^-4 </a:t>
+                        <a:t>Static Thrust testing will be performed with the flight pressure vessel  prior to CubeSat integration at a pressure no greater than 1x10^-4 </a:t>
                       </a:r>
                       <a:r>
                         <a:rPr lang="en-US" sz="2000" b="1" i="1" dirty="0" err="1" smtClean="0">
@@ -31094,7 +30865,7 @@
     </p:spTree>
     <p:extLst>
       <p:ext uri="{BB962C8B-B14F-4D97-AF65-F5344CB8AC3E}">
-        <p14:creationId xmlns:p14="http://schemas.microsoft.com/office/powerpoint/2010/main" xmlns="" val="32129990"/>
+        <p14:creationId xmlns:p14="http://schemas.microsoft.com/office/powerpoint/2010/main" val="32129990"/>
       </p:ext>
     </p:extLst>
   </p:cSld>
@@ -31163,7 +30934,7 @@
             <p:ph idx="1"/>
             <p:extLst>
               <p:ext uri="{D42A27DB-BD31-4B8C-83A1-F6EECF244321}">
-                <p14:modId xmlns:p14="http://schemas.microsoft.com/office/powerpoint/2010/main" xmlns="" val="1825638766"/>
+                <p14:modId xmlns:p14="http://schemas.microsoft.com/office/powerpoint/2010/main" val="1825638766"/>
               </p:ext>
             </p:extLst>
           </p:nvPr>
@@ -31388,23 +31159,7 @@
                             <a:schemeClr val="tx1"/>
                           </a:solidFill>
                         </a:rPr>
-                        <a:t>“The </a:t>
-                      </a:r>
-                      <a:r>
-                        <a:rPr lang="en-US" sz="2000" b="1" i="1" dirty="0" smtClean="0">
-                          <a:solidFill>
-                            <a:schemeClr val="tx1"/>
-                          </a:solidFill>
-                        </a:rPr>
-                        <a:t>pressure vessel must pass thermal cycle testing between temperatures of -30 ⁰C and 70 ⁰C for a total of two cycles or 10 </a:t>
-                      </a:r>
-                      <a:r>
-                        <a:rPr lang="en-US" sz="2000" b="1" i="1" dirty="0" smtClean="0">
-                          <a:solidFill>
-                            <a:schemeClr val="tx1"/>
-                          </a:solidFill>
-                        </a:rPr>
-                        <a:t>hours”</a:t>
+                        <a:t>“The pressure vessel must pass thermal cycle testing between temperatures of -30 ⁰C and 70 ⁰C for a total of two cycles or 10 hours”</a:t>
                       </a:r>
                       <a:endParaRPr lang="en-US" sz="2000" b="1" i="1" dirty="0">
                         <a:solidFill>
@@ -31702,7 +31457,7 @@
           <a:blip r:embed="rId2" cstate="print">
             <a:extLst>
               <a:ext uri="{28A0092B-C50C-407E-A947-70E740481C1C}">
-                <a14:useLocalDpi xmlns:a14="http://schemas.microsoft.com/office/drawing/2010/main" xmlns="" val="0"/>
+                <a14:useLocalDpi xmlns:a14="http://schemas.microsoft.com/office/drawing/2010/main" val="0"/>
               </a:ext>
             </a:extLst>
           </a:blip>
@@ -31814,7 +31569,7 @@
     </p:spTree>
     <p:extLst>
       <p:ext uri="{BB962C8B-B14F-4D97-AF65-F5344CB8AC3E}">
-        <p14:creationId xmlns:p14="http://schemas.microsoft.com/office/powerpoint/2010/main" xmlns="" val="3710903375"/>
+        <p14:creationId xmlns:p14="http://schemas.microsoft.com/office/powerpoint/2010/main" val="3710903375"/>
       </p:ext>
     </p:extLst>
   </p:cSld>
@@ -32522,7 +32277,7 @@
             <p:ph idx="1"/>
             <p:extLst>
               <p:ext uri="{D42A27DB-BD31-4B8C-83A1-F6EECF244321}">
-                <p14:modId xmlns:p14="http://schemas.microsoft.com/office/powerpoint/2010/main" xmlns="" val="2796828356"/>
+                <p14:modId xmlns:p14="http://schemas.microsoft.com/office/powerpoint/2010/main" val="2796828356"/>
               </p:ext>
             </p:extLst>
           </p:nvPr>
@@ -32755,23 +32510,7 @@
                             <a:schemeClr val="tx1"/>
                           </a:solidFill>
                         </a:rPr>
-                        <a:t>CubeSat </a:t>
-                      </a:r>
-                      <a:r>
-                        <a:rPr lang="en-US" sz="2000" b="1" i="1" dirty="0" smtClean="0">
-                          <a:solidFill>
-                            <a:schemeClr val="tx1"/>
-                          </a:solidFill>
-                        </a:rPr>
-                        <a:t>must survive Random Vibration Testing relative to the NASA GEVS Qualification </a:t>
-                      </a:r>
-                      <a:r>
-                        <a:rPr lang="en-US" sz="2000" b="1" i="1" dirty="0" smtClean="0">
-                          <a:solidFill>
-                            <a:schemeClr val="tx1"/>
-                          </a:solidFill>
-                        </a:rPr>
-                        <a:t>Profile”</a:t>
+                        <a:t>CubeSat must survive Random Vibration Testing relative to the NASA GEVS Qualification Profile”</a:t>
                       </a:r>
                       <a:endParaRPr lang="en-US" sz="2000" b="1" i="1" dirty="0">
                         <a:solidFill>
@@ -33106,7 +32845,7 @@
     </p:spTree>
     <p:extLst>
       <p:ext uri="{BB962C8B-B14F-4D97-AF65-F5344CB8AC3E}">
-        <p14:creationId xmlns:p14="http://schemas.microsoft.com/office/powerpoint/2010/main" xmlns="" val="3473550979"/>
+        <p14:creationId xmlns:p14="http://schemas.microsoft.com/office/powerpoint/2010/main" val="3473550979"/>
       </p:ext>
     </p:extLst>
   </p:cSld>
@@ -33175,7 +32914,7 @@
             <p:ph idx="1"/>
             <p:extLst>
               <p:ext uri="{D42A27DB-BD31-4B8C-83A1-F6EECF244321}">
-                <p14:modId xmlns:p14="http://schemas.microsoft.com/office/powerpoint/2010/main" xmlns="" val="2184195338"/>
+                <p14:modId xmlns:p14="http://schemas.microsoft.com/office/powerpoint/2010/main" val="2184195338"/>
               </p:ext>
             </p:extLst>
           </p:nvPr>
@@ -33408,15 +33147,7 @@
                             <a:schemeClr val="tx1"/>
                           </a:solidFill>
                         </a:rPr>
-                        <a:t>CubeSat </a:t>
-                      </a:r>
-                      <a:r>
-                        <a:rPr lang="en-US" sz="2000" b="1" i="1" dirty="0" smtClean="0">
-                          <a:solidFill>
-                            <a:schemeClr val="tx1"/>
-                          </a:solidFill>
-                        </a:rPr>
-                        <a:t>shall be subjected to a temperature of</a:t>
+                        <a:t>CubeSat shall be subjected to a temperature of</a:t>
                       </a:r>
                       <a:r>
                         <a:rPr lang="en-US" sz="2000" b="1" i="1" baseline="0" dirty="0" smtClean="0">
@@ -33432,15 +33163,7 @@
                             <a:schemeClr val="tx1"/>
                           </a:solidFill>
                         </a:rPr>
-                        <a:t>60 ⁰C at a pressure of 1x10^-4 Torr for at least 6 </a:t>
-                      </a:r>
-                      <a:r>
-                        <a:rPr lang="en-US" sz="2000" b="1" i="1" dirty="0" smtClean="0">
-                          <a:solidFill>
-                            <a:schemeClr val="tx1"/>
-                          </a:solidFill>
-                        </a:rPr>
-                        <a:t>hours”</a:t>
+                        <a:t>60 ⁰C at a pressure of 1x10^-4 Torr for at least 6 hours”</a:t>
                       </a:r>
                       <a:endParaRPr lang="en-US" sz="2000" b="1" i="1" dirty="0">
                         <a:solidFill>
@@ -33688,7 +33411,7 @@
     </p:spTree>
     <p:extLst>
       <p:ext uri="{BB962C8B-B14F-4D97-AF65-F5344CB8AC3E}">
-        <p14:creationId xmlns:p14="http://schemas.microsoft.com/office/powerpoint/2010/main" xmlns="" val="2398931334"/>
+        <p14:creationId xmlns:p14="http://schemas.microsoft.com/office/powerpoint/2010/main" val="2398931334"/>
       </p:ext>
     </p:extLst>
   </p:cSld>
@@ -33842,11 +33565,6 @@
               </a:rPr>
               <a:t>Pros</a:t>
             </a:r>
-            <a:endParaRPr lang="en-US" altLang="en-US" dirty="0" smtClean="0">
-              <a:solidFill>
-                <a:srgbClr val="000000"/>
-              </a:solidFill>
-            </a:endParaRPr>
           </a:p>
           <a:p>
             <a:pPr marL="431800" lvl="1" indent="-215900" eaLnBrk="1">
@@ -33966,21 +33684,8 @@
                   <a:srgbClr val="000000"/>
                 </a:solidFill>
               </a:rPr>
-              <a:t>    </a:t>
+              <a:t>    Cons</a:t>
             </a:r>
-            <a:r>
-              <a:rPr lang="en-US" altLang="en-US" dirty="0" smtClean="0">
-                <a:solidFill>
-                  <a:srgbClr val="000000"/>
-                </a:solidFill>
-              </a:rPr>
-              <a:t>Cons</a:t>
-            </a:r>
-            <a:endParaRPr lang="en-US" altLang="en-US" dirty="0" smtClean="0">
-              <a:solidFill>
-                <a:srgbClr val="000000"/>
-              </a:solidFill>
-            </a:endParaRPr>
           </a:p>
           <a:p>
             <a:pPr marL="431800" lvl="1" indent="-215900" eaLnBrk="1">
@@ -34130,14 +33835,14 @@
           <a:effectLst/>
           <a:extLst>
             <a:ext uri="{909E8E84-426E-40DD-AFC4-6F175D3DCCD1}">
-              <a14:hiddenFill xmlns:a14="http://schemas.microsoft.com/office/drawing/2010/main" xmlns="">
+              <a14:hiddenFill xmlns:a14="http://schemas.microsoft.com/office/drawing/2010/main">
                 <a:solidFill>
                   <a:srgbClr val="FFFFFF"/>
                 </a:solidFill>
               </a14:hiddenFill>
             </a:ext>
             <a:ext uri="{91240B29-F687-4F45-9708-019B960494DF}">
-              <a14:hiddenLine xmlns:a14="http://schemas.microsoft.com/office/drawing/2010/main" xmlns="" w="9525">
+              <a14:hiddenLine xmlns:a14="http://schemas.microsoft.com/office/drawing/2010/main" w="9525">
                 <a:solidFill>
                   <a:srgbClr val="808080"/>
                 </a:solidFill>
@@ -34147,7 +33852,7 @@
               </a14:hiddenLine>
             </a:ext>
             <a:ext uri="{AF507438-7753-43E0-B8FC-AC1667EBCBE1}">
-              <a14:hiddenEffects xmlns:a14="http://schemas.microsoft.com/office/drawing/2010/main" xmlns="">
+              <a14:hiddenEffects xmlns:a14="http://schemas.microsoft.com/office/drawing/2010/main">
                 <a:effectLst>
                   <a:outerShdw dist="35921" dir="2700000" algn="ctr" rotWithShape="0">
                     <a:srgbClr val="808080"/>
@@ -34718,7 +34423,7 @@
             <p:ph idx="1"/>
             <p:extLst>
               <p:ext uri="{D42A27DB-BD31-4B8C-83A1-F6EECF244321}">
-                <p14:modId xmlns:p14="http://schemas.microsoft.com/office/powerpoint/2010/main" xmlns="" val="2151132394"/>
+                <p14:modId xmlns:p14="http://schemas.microsoft.com/office/powerpoint/2010/main" val="2151132394"/>
               </p:ext>
             </p:extLst>
           </p:nvPr>
@@ -34951,23 +34656,7 @@
                             <a:schemeClr val="tx1"/>
                           </a:solidFill>
                         </a:rPr>
-                        <a:t>Full </a:t>
-                      </a:r>
-                      <a:r>
-                        <a:rPr lang="en-US" sz="2000" b="1" i="1" dirty="0" smtClean="0">
-                          <a:solidFill>
-                            <a:schemeClr val="tx1"/>
-                          </a:solidFill>
-                        </a:rPr>
-                        <a:t>CubeSat System shall be able to execute all commands associated with its operation over </a:t>
-                      </a:r>
-                      <a:r>
-                        <a:rPr lang="en-US" sz="2000" b="1" i="1" dirty="0" smtClean="0">
-                          <a:solidFill>
-                            <a:schemeClr val="tx1"/>
-                          </a:solidFill>
-                        </a:rPr>
-                        <a:t>RF”</a:t>
+                        <a:t>Full CubeSat System shall be able to execute all commands associated with its operation over RF”</a:t>
                       </a:r>
                       <a:endParaRPr lang="en-US" sz="2000" b="1" i="1" dirty="0">
                         <a:solidFill>
@@ -35210,7 +34899,7 @@
     </p:spTree>
     <p:extLst>
       <p:ext uri="{BB962C8B-B14F-4D97-AF65-F5344CB8AC3E}">
-        <p14:creationId xmlns:p14="http://schemas.microsoft.com/office/powerpoint/2010/main" xmlns="" val="257547029"/>
+        <p14:creationId xmlns:p14="http://schemas.microsoft.com/office/powerpoint/2010/main" val="257547029"/>
       </p:ext>
     </p:extLst>
   </p:cSld>
@@ -35279,7 +34968,7 @@
             <p:ph idx="1"/>
             <p:extLst>
               <p:ext uri="{D42A27DB-BD31-4B8C-83A1-F6EECF244321}">
-                <p14:modId xmlns:p14="http://schemas.microsoft.com/office/powerpoint/2010/main" xmlns="" val="2845696522"/>
+                <p14:modId xmlns:p14="http://schemas.microsoft.com/office/powerpoint/2010/main" val="2845696522"/>
               </p:ext>
             </p:extLst>
           </p:nvPr>
@@ -35512,23 +35201,7 @@
                             <a:schemeClr val="tx1"/>
                           </a:solidFill>
                         </a:rPr>
-                        <a:t>Full </a:t>
-                      </a:r>
-                      <a:r>
-                        <a:rPr lang="en-US" sz="2000" b="1" i="1" dirty="0" smtClean="0">
-                          <a:solidFill>
-                            <a:schemeClr val="tx1"/>
-                          </a:solidFill>
-                        </a:rPr>
-                        <a:t>CubeSat System shall be able to close a link with the SSRL Ground Station from a distance of at least 200 </a:t>
-                      </a:r>
-                      <a:r>
-                        <a:rPr lang="en-US" sz="2000" b="1" i="1" dirty="0" smtClean="0">
-                          <a:solidFill>
-                            <a:schemeClr val="tx1"/>
-                          </a:solidFill>
-                        </a:rPr>
-                        <a:t>meters”</a:t>
+                        <a:t>Full CubeSat System shall be able to close a link with the SSRL Ground Station from a distance of at least 200 meters”</a:t>
                       </a:r>
                       <a:endParaRPr lang="en-US" sz="2000" b="1" i="1" dirty="0">
                         <a:solidFill>
@@ -35787,7 +35460,7 @@
     </p:spTree>
     <p:extLst>
       <p:ext uri="{BB962C8B-B14F-4D97-AF65-F5344CB8AC3E}">
-        <p14:creationId xmlns:p14="http://schemas.microsoft.com/office/powerpoint/2010/main" xmlns="" val="2948721205"/>
+        <p14:creationId xmlns:p14="http://schemas.microsoft.com/office/powerpoint/2010/main" val="2948721205"/>
       </p:ext>
     </p:extLst>
   </p:cSld>
@@ -35856,7 +35529,7 @@
             <p:ph idx="1"/>
             <p:extLst>
               <p:ext uri="{D42A27DB-BD31-4B8C-83A1-F6EECF244321}">
-                <p14:modId xmlns:p14="http://schemas.microsoft.com/office/powerpoint/2010/main" xmlns="" val="1552878453"/>
+                <p14:modId xmlns:p14="http://schemas.microsoft.com/office/powerpoint/2010/main" val="1552878453"/>
               </p:ext>
             </p:extLst>
           </p:nvPr>
@@ -36105,15 +35778,7 @@
                             <a:schemeClr val="tx1"/>
                           </a:solidFill>
                         </a:rPr>
-                        <a:t>full-functional </a:t>
-                      </a:r>
-                      <a:r>
-                        <a:rPr lang="en-US" sz="2000" b="1" i="1" smtClean="0">
-                          <a:solidFill>
-                            <a:schemeClr val="tx1"/>
-                          </a:solidFill>
-                        </a:rPr>
-                        <a:t>test”</a:t>
+                        <a:t>full-functional test”</a:t>
                       </a:r>
                       <a:endParaRPr lang="en-US" sz="2000" b="1" i="1" dirty="0">
                         <a:solidFill>
@@ -36380,7 +36045,7 @@
     </p:spTree>
     <p:extLst>
       <p:ext uri="{BB962C8B-B14F-4D97-AF65-F5344CB8AC3E}">
-        <p14:creationId xmlns:p14="http://schemas.microsoft.com/office/powerpoint/2010/main" xmlns="" val="1902469526"/>
+        <p14:creationId xmlns:p14="http://schemas.microsoft.com/office/powerpoint/2010/main" val="1902469526"/>
       </p:ext>
     </p:extLst>
   </p:cSld>
@@ -37752,7 +37417,7 @@
             <p:ph idx="1"/>
             <p:extLst>
               <p:ext uri="{D42A27DB-BD31-4B8C-83A1-F6EECF244321}">
-                <p14:modId xmlns:p14="http://schemas.microsoft.com/office/powerpoint/2010/main" xmlns="" val="1483644448"/>
+                <p14:modId xmlns:p14="http://schemas.microsoft.com/office/powerpoint/2010/main" val="1483644448"/>
               </p:ext>
             </p:extLst>
           </p:nvPr>
@@ -38253,7 +37918,7 @@
     </p:spTree>
     <p:extLst>
       <p:ext uri="{BB962C8B-B14F-4D97-AF65-F5344CB8AC3E}">
-        <p14:creationId xmlns:p14="http://schemas.microsoft.com/office/powerpoint/2010/main" xmlns="" val="2711901525"/>
+        <p14:creationId xmlns:p14="http://schemas.microsoft.com/office/powerpoint/2010/main" val="2711901525"/>
       </p:ext>
     </p:extLst>
   </p:cSld>
@@ -38297,7 +37962,7 @@
             <p:ph idx="1"/>
             <p:extLst>
               <p:ext uri="{D42A27DB-BD31-4B8C-83A1-F6EECF244321}">
-                <p14:modId xmlns:p14="http://schemas.microsoft.com/office/powerpoint/2010/main" xmlns="" val="1483644448"/>
+                <p14:modId xmlns:p14="http://schemas.microsoft.com/office/powerpoint/2010/main" val="1483644448"/>
               </p:ext>
             </p:extLst>
           </p:nvPr>
@@ -38782,7 +38447,7 @@
     </p:spTree>
     <p:extLst>
       <p:ext uri="{BB962C8B-B14F-4D97-AF65-F5344CB8AC3E}">
-        <p14:creationId xmlns:p14="http://schemas.microsoft.com/office/powerpoint/2010/main" xmlns="" val="2711901525"/>
+        <p14:creationId xmlns:p14="http://schemas.microsoft.com/office/powerpoint/2010/main" val="2711901525"/>
       </p:ext>
     </p:extLst>
   </p:cSld>
@@ -38826,7 +38491,7 @@
             <p:ph idx="1"/>
             <p:extLst>
               <p:ext uri="{D42A27DB-BD31-4B8C-83A1-F6EECF244321}">
-                <p14:modId xmlns:p14="http://schemas.microsoft.com/office/powerpoint/2010/main" xmlns="" val="1483644448"/>
+                <p14:modId xmlns:p14="http://schemas.microsoft.com/office/powerpoint/2010/main" val="1483644448"/>
               </p:ext>
             </p:extLst>
           </p:nvPr>
@@ -39373,7 +39038,7 @@
     </p:spTree>
     <p:extLst>
       <p:ext uri="{BB962C8B-B14F-4D97-AF65-F5344CB8AC3E}">
-        <p14:creationId xmlns:p14="http://schemas.microsoft.com/office/powerpoint/2010/main" xmlns="" val="2711901525"/>
+        <p14:creationId xmlns:p14="http://schemas.microsoft.com/office/powerpoint/2010/main" val="2711901525"/>
       </p:ext>
     </p:extLst>
   </p:cSld>
@@ -39417,7 +39082,7 @@
             <p:ph idx="1"/>
             <p:extLst>
               <p:ext uri="{D42A27DB-BD31-4B8C-83A1-F6EECF244321}">
-                <p14:modId xmlns:p14="http://schemas.microsoft.com/office/powerpoint/2010/main" xmlns="" val="1483644448"/>
+                <p14:modId xmlns:p14="http://schemas.microsoft.com/office/powerpoint/2010/main" val="1483644448"/>
               </p:ext>
             </p:extLst>
           </p:nvPr>
@@ -40048,7 +39713,7 @@
     </p:spTree>
     <p:extLst>
       <p:ext uri="{BB962C8B-B14F-4D97-AF65-F5344CB8AC3E}">
-        <p14:creationId xmlns:p14="http://schemas.microsoft.com/office/powerpoint/2010/main" xmlns="" val="2711901525"/>
+        <p14:creationId xmlns:p14="http://schemas.microsoft.com/office/powerpoint/2010/main" val="2711901525"/>
       </p:ext>
     </p:extLst>
   </p:cSld>
@@ -40092,7 +39757,7 @@
             <p:ph idx="1"/>
             <p:extLst>
               <p:ext uri="{D42A27DB-BD31-4B8C-83A1-F6EECF244321}">
-                <p14:modId xmlns:p14="http://schemas.microsoft.com/office/powerpoint/2010/main" xmlns="" val="1483644448"/>
+                <p14:modId xmlns:p14="http://schemas.microsoft.com/office/powerpoint/2010/main" val="1483644448"/>
               </p:ext>
             </p:extLst>
           </p:nvPr>
@@ -40540,21 +40205,8 @@
                   <a:schemeClr val="tx1"/>
                 </a:solidFill>
               </a:rPr>
-              <a:t>Based on slew rate data obtained from previous CubeSat missions, a CubeSat with a slew rate of less than 1 deg/s can be considered to have attained </a:t>
+              <a:t>Based on slew rate data obtained from previous CubeSat missions, a CubeSat with a slew rate of less than 1 deg/s can be considered to have attained stability.</a:t>
             </a:r>
-            <a:r>
-              <a:rPr lang="en-US" sz="2600" b="1" dirty="0" smtClean="0">
-                <a:solidFill>
-                  <a:schemeClr val="tx1"/>
-                </a:solidFill>
-              </a:rPr>
-              <a:t>stability.</a:t>
-            </a:r>
-            <a:endParaRPr lang="en-US" sz="2600" b="1" dirty="0" smtClean="0">
-              <a:solidFill>
-                <a:schemeClr val="tx1"/>
-              </a:solidFill>
-            </a:endParaRPr>
           </a:p>
         </p:txBody>
       </p:sp>
@@ -40590,7 +40242,7 @@
     </p:spTree>
     <p:extLst>
       <p:ext uri="{BB962C8B-B14F-4D97-AF65-F5344CB8AC3E}">
-        <p14:creationId xmlns:p14="http://schemas.microsoft.com/office/powerpoint/2010/main" xmlns="" val="2711901525"/>
+        <p14:creationId xmlns:p14="http://schemas.microsoft.com/office/powerpoint/2010/main" val="2711901525"/>
       </p:ext>
     </p:extLst>
   </p:cSld>
@@ -40738,15 +40390,7 @@
                   <a:srgbClr val="000000"/>
                 </a:solidFill>
               </a:rPr>
-              <a:t>   </a:t>
-            </a:r>
-            <a:r>
-              <a:rPr lang="en-US" altLang="en-US" dirty="0" smtClean="0">
-                <a:solidFill>
-                  <a:srgbClr val="000000"/>
-                </a:solidFill>
-              </a:rPr>
-              <a:t>Pros</a:t>
+              <a:t>   Pros</a:t>
             </a:r>
           </a:p>
           <a:p>
@@ -40867,21 +40511,8 @@
                   <a:srgbClr val="000000"/>
                 </a:solidFill>
               </a:rPr>
-              <a:t>   </a:t>
+              <a:t>   Cons</a:t>
             </a:r>
-            <a:r>
-              <a:rPr lang="en-US" altLang="en-US" dirty="0" smtClean="0">
-                <a:solidFill>
-                  <a:srgbClr val="000000"/>
-                </a:solidFill>
-              </a:rPr>
-              <a:t>Cons</a:t>
-            </a:r>
-            <a:endParaRPr lang="en-US" altLang="en-US" dirty="0" smtClean="0">
-              <a:solidFill>
-                <a:srgbClr val="000000"/>
-              </a:solidFill>
-            </a:endParaRPr>
           </a:p>
           <a:p>
             <a:pPr marL="431800" lvl="1" indent="-215900" eaLnBrk="1">
@@ -41031,14 +40662,14 @@
           <a:effectLst/>
           <a:extLst>
             <a:ext uri="{909E8E84-426E-40DD-AFC4-6F175D3DCCD1}">
-              <a14:hiddenFill xmlns:a14="http://schemas.microsoft.com/office/drawing/2010/main" xmlns="">
+              <a14:hiddenFill xmlns:a14="http://schemas.microsoft.com/office/drawing/2010/main">
                 <a:solidFill>
                   <a:srgbClr val="FFFFFF"/>
                 </a:solidFill>
               </a14:hiddenFill>
             </a:ext>
             <a:ext uri="{91240B29-F687-4F45-9708-019B960494DF}">
-              <a14:hiddenLine xmlns:a14="http://schemas.microsoft.com/office/drawing/2010/main" xmlns="" w="9525">
+              <a14:hiddenLine xmlns:a14="http://schemas.microsoft.com/office/drawing/2010/main" w="9525">
                 <a:solidFill>
                   <a:srgbClr val="808080"/>
                 </a:solidFill>
@@ -41048,7 +40679,7 @@
               </a14:hiddenLine>
             </a:ext>
             <a:ext uri="{AF507438-7753-43E0-B8FC-AC1667EBCBE1}">
-              <a14:hiddenEffects xmlns:a14="http://schemas.microsoft.com/office/drawing/2010/main" xmlns="">
+              <a14:hiddenEffects xmlns:a14="http://schemas.microsoft.com/office/drawing/2010/main">
                 <a:effectLst>
                   <a:outerShdw dist="35921" dir="2700000" algn="ctr" rotWithShape="0">
                     <a:srgbClr val="808080"/>
@@ -41572,7 +41203,7 @@
             <p:ph idx="1"/>
             <p:extLst>
               <p:ext uri="{D42A27DB-BD31-4B8C-83A1-F6EECF244321}">
-                <p14:modId xmlns:p14="http://schemas.microsoft.com/office/powerpoint/2010/main" xmlns="" val="1483644448"/>
+                <p14:modId xmlns:p14="http://schemas.microsoft.com/office/powerpoint/2010/main" val="1483644448"/>
               </p:ext>
             </p:extLst>
           </p:nvPr>
@@ -42020,21 +41651,8 @@
                   <a:schemeClr val="tx1"/>
                 </a:solidFill>
               </a:rPr>
-              <a:t>This requirement serves as a means to verifying other requirements associated with the completion Rascal’s primary </a:t>
+              <a:t>This requirement serves as a means to verifying other requirements associated with the completion Rascal’s primary mission.</a:t>
             </a:r>
-            <a:r>
-              <a:rPr lang="en-US" sz="2600" b="1" dirty="0" smtClean="0">
-                <a:solidFill>
-                  <a:schemeClr val="tx1"/>
-                </a:solidFill>
-              </a:rPr>
-              <a:t>mission.</a:t>
-            </a:r>
-            <a:endParaRPr lang="en-US" sz="2600" b="1" dirty="0" smtClean="0">
-              <a:solidFill>
-                <a:schemeClr val="tx1"/>
-              </a:solidFill>
-            </a:endParaRPr>
           </a:p>
         </p:txBody>
       </p:sp>
@@ -42070,7 +41688,7 @@
     </p:spTree>
     <p:extLst>
       <p:ext uri="{BB962C8B-B14F-4D97-AF65-F5344CB8AC3E}">
-        <p14:creationId xmlns:p14="http://schemas.microsoft.com/office/powerpoint/2010/main" xmlns="" val="2711901525"/>
+        <p14:creationId xmlns:p14="http://schemas.microsoft.com/office/powerpoint/2010/main" val="2711901525"/>
       </p:ext>
     </p:extLst>
   </p:cSld>
@@ -42114,7 +41732,7 @@
             <p:ph idx="1"/>
             <p:extLst>
               <p:ext uri="{D42A27DB-BD31-4B8C-83A1-F6EECF244321}">
-                <p14:modId xmlns:p14="http://schemas.microsoft.com/office/powerpoint/2010/main" xmlns="" val="1483644448"/>
+                <p14:modId xmlns:p14="http://schemas.microsoft.com/office/powerpoint/2010/main" val="1483644448"/>
               </p:ext>
             </p:extLst>
           </p:nvPr>
@@ -42562,21 +42180,8 @@
                   <a:schemeClr val="tx1"/>
                 </a:solidFill>
               </a:rPr>
-              <a:t>This requirement comes directly from the Team Bravo RFP and is a key factor in meeting the mission success criteria of the proposed </a:t>
+              <a:t>This requirement comes directly from the Team Bravo RFP and is a key factor in meeting the mission success criteria of the proposed mission.</a:t>
             </a:r>
-            <a:r>
-              <a:rPr lang="en-US" sz="2600" b="1" dirty="0" smtClean="0">
-                <a:solidFill>
-                  <a:schemeClr val="tx1"/>
-                </a:solidFill>
-              </a:rPr>
-              <a:t>mission.</a:t>
-            </a:r>
-            <a:endParaRPr lang="en-US" sz="2600" b="1" dirty="0" smtClean="0">
-              <a:solidFill>
-                <a:schemeClr val="tx1"/>
-              </a:solidFill>
-            </a:endParaRPr>
           </a:p>
           <a:p>
             <a:pPr algn="just"/>
@@ -42594,21 +42199,8 @@
                   <a:schemeClr val="tx1"/>
                 </a:solidFill>
               </a:rPr>
-              <a:t>The process will be initiated by a command from the ground, at which time it would be executed autonomously and validated based on relative displacement data obtained after the </a:t>
+              <a:t>The process will be initiated by a command from the ground, at which time it would be executed autonomously and validated based on relative displacement data obtained after the fact.</a:t>
             </a:r>
-            <a:r>
-              <a:rPr lang="en-US" sz="2600" b="1" dirty="0" smtClean="0">
-                <a:solidFill>
-                  <a:schemeClr val="tx1"/>
-                </a:solidFill>
-              </a:rPr>
-              <a:t>fact.</a:t>
-            </a:r>
-            <a:endParaRPr lang="en-US" sz="2600" b="1" dirty="0" smtClean="0">
-              <a:solidFill>
-                <a:schemeClr val="tx1"/>
-              </a:solidFill>
-            </a:endParaRPr>
           </a:p>
         </p:txBody>
       </p:sp>
@@ -42644,7 +42236,7 @@
     </p:spTree>
     <p:extLst>
       <p:ext uri="{BB962C8B-B14F-4D97-AF65-F5344CB8AC3E}">
-        <p14:creationId xmlns:p14="http://schemas.microsoft.com/office/powerpoint/2010/main" xmlns="" val="2711901525"/>
+        <p14:creationId xmlns:p14="http://schemas.microsoft.com/office/powerpoint/2010/main" val="2711901525"/>
       </p:ext>
     </p:extLst>
   </p:cSld>
@@ -42688,7 +42280,7 @@
             <p:ph idx="1"/>
             <p:extLst>
               <p:ext uri="{D42A27DB-BD31-4B8C-83A1-F6EECF244321}">
-                <p14:modId xmlns:p14="http://schemas.microsoft.com/office/powerpoint/2010/main" xmlns="" val="1483644448"/>
+                <p14:modId xmlns:p14="http://schemas.microsoft.com/office/powerpoint/2010/main" val="1483644448"/>
               </p:ext>
             </p:extLst>
           </p:nvPr>
@@ -43136,21 +42728,8 @@
                   <a:schemeClr val="tx1"/>
                 </a:solidFill>
               </a:rPr>
-              <a:t>This requirement comes directly from the Team Bravo RFP and is a key factor in meeting the mission success criteria of the proposed </a:t>
+              <a:t>This requirement comes directly from the Team Bravo RFP and is a key factor in meeting the mission success criteria of the proposed mission.</a:t>
             </a:r>
-            <a:r>
-              <a:rPr lang="en-US" sz="2600" b="1" dirty="0" smtClean="0">
-                <a:solidFill>
-                  <a:schemeClr val="tx1"/>
-                </a:solidFill>
-              </a:rPr>
-              <a:t>mission.</a:t>
-            </a:r>
-            <a:endParaRPr lang="en-US" sz="2600" b="1" dirty="0" smtClean="0">
-              <a:solidFill>
-                <a:schemeClr val="tx1"/>
-              </a:solidFill>
-            </a:endParaRPr>
           </a:p>
           <a:p>
             <a:pPr algn="just"/>
@@ -43168,21 +42747,8 @@
                   <a:schemeClr val="tx1"/>
                 </a:solidFill>
               </a:rPr>
-              <a:t>Once again, this process would likely be executed autonomously, with verification of its completion coming after it has already been </a:t>
+              <a:t>Once again, this process would likely be executed autonomously, with verification of its completion coming after it has already been executed.</a:t>
             </a:r>
-            <a:r>
-              <a:rPr lang="en-US" sz="2600" b="1" dirty="0" smtClean="0">
-                <a:solidFill>
-                  <a:schemeClr val="tx1"/>
-                </a:solidFill>
-              </a:rPr>
-              <a:t>executed.</a:t>
-            </a:r>
-            <a:endParaRPr lang="en-US" sz="2600" b="1" dirty="0" smtClean="0">
-              <a:solidFill>
-                <a:schemeClr val="tx1"/>
-              </a:solidFill>
-            </a:endParaRPr>
           </a:p>
         </p:txBody>
       </p:sp>
@@ -43218,7 +42784,7 @@
     </p:spTree>
     <p:extLst>
       <p:ext uri="{BB962C8B-B14F-4D97-AF65-F5344CB8AC3E}">
-        <p14:creationId xmlns:p14="http://schemas.microsoft.com/office/powerpoint/2010/main" xmlns="" val="2711901525"/>
+        <p14:creationId xmlns:p14="http://schemas.microsoft.com/office/powerpoint/2010/main" val="2711901525"/>
       </p:ext>
     </p:extLst>
   </p:cSld>
@@ -43262,7 +42828,7 @@
             <p:ph idx="1"/>
             <p:extLst>
               <p:ext uri="{D42A27DB-BD31-4B8C-83A1-F6EECF244321}">
-                <p14:modId xmlns:p14="http://schemas.microsoft.com/office/powerpoint/2010/main" xmlns="" val="1483644448"/>
+                <p14:modId xmlns:p14="http://schemas.microsoft.com/office/powerpoint/2010/main" val="1483644448"/>
               </p:ext>
             </p:extLst>
           </p:nvPr>
@@ -43710,21 +43276,8 @@
                   <a:schemeClr val="tx1"/>
                 </a:solidFill>
               </a:rPr>
-              <a:t>This requirement comes directly from the Team Bravo RFP and is a key factor in meeting the mission success criteria of the proposed </a:t>
+              <a:t>This requirement comes directly from the Team Bravo RFP and is a key factor in meeting the mission success criteria of the proposed mission.</a:t>
             </a:r>
-            <a:r>
-              <a:rPr lang="en-US" sz="2600" b="1" dirty="0" smtClean="0">
-                <a:solidFill>
-                  <a:schemeClr val="tx1"/>
-                </a:solidFill>
-              </a:rPr>
-              <a:t>mission.</a:t>
-            </a:r>
-            <a:endParaRPr lang="en-US" sz="2600" b="1" dirty="0" smtClean="0">
-              <a:solidFill>
-                <a:schemeClr val="tx1"/>
-              </a:solidFill>
-            </a:endParaRPr>
           </a:p>
           <a:p>
             <a:pPr algn="just"/>
@@ -43742,21 +43295,8 @@
                   <a:schemeClr val="tx1"/>
                 </a:solidFill>
               </a:rPr>
-              <a:t>This process would be executed at the completion of the “Escape” Maneuver, with verification of its completion coming after it has already </a:t>
+              <a:t>This process would be executed at the completion of the “Escape” Maneuver, with verification of its completion coming after it has already occurred.</a:t>
             </a:r>
-            <a:r>
-              <a:rPr lang="en-US" sz="2600" b="1" dirty="0" smtClean="0">
-                <a:solidFill>
-                  <a:schemeClr val="tx1"/>
-                </a:solidFill>
-              </a:rPr>
-              <a:t>occurred.</a:t>
-            </a:r>
-            <a:endParaRPr lang="en-US" sz="2600" b="1" dirty="0" smtClean="0">
-              <a:solidFill>
-                <a:schemeClr val="tx1"/>
-              </a:solidFill>
-            </a:endParaRPr>
           </a:p>
         </p:txBody>
       </p:sp>
@@ -43792,7 +43332,7 @@
     </p:spTree>
     <p:extLst>
       <p:ext uri="{BB962C8B-B14F-4D97-AF65-F5344CB8AC3E}">
-        <p14:creationId xmlns:p14="http://schemas.microsoft.com/office/powerpoint/2010/main" xmlns="" val="2711901525"/>
+        <p14:creationId xmlns:p14="http://schemas.microsoft.com/office/powerpoint/2010/main" val="2711901525"/>
       </p:ext>
     </p:extLst>
   </p:cSld>
@@ -43897,7 +43437,7 @@
           <a:blip r:embed="rId3" cstate="print">
             <a:extLst>
               <a:ext uri="{28A0092B-C50C-407E-A947-70E740481C1C}">
-                <a14:useLocalDpi xmlns:a14="http://schemas.microsoft.com/office/drawing/2010/main" xmlns="" val="0"/>
+                <a14:useLocalDpi xmlns:a14="http://schemas.microsoft.com/office/drawing/2010/main" val="0"/>
               </a:ext>
             </a:extLst>
           </a:blip>
@@ -43921,7 +43461,7 @@
           <a:effectLst/>
           <a:extLst>
             <a:ext uri="{909E8E84-426E-40DD-AFC4-6F175D3DCCD1}">
-              <a14:hiddenFill xmlns:a14="http://schemas.microsoft.com/office/drawing/2010/main" xmlns="">
+              <a14:hiddenFill xmlns:a14="http://schemas.microsoft.com/office/drawing/2010/main">
                 <a:blipFill dpi="0" rotWithShape="0">
                   <a:blip/>
                   <a:srcRect/>
@@ -43932,7 +43472,7 @@
               </a14:hiddenFill>
             </a:ext>
             <a:ext uri="{91240B29-F687-4F45-9708-019B960494DF}">
-              <a14:hiddenLine xmlns:a14="http://schemas.microsoft.com/office/drawing/2010/main" xmlns="" w="9525">
+              <a14:hiddenLine xmlns:a14="http://schemas.microsoft.com/office/drawing/2010/main" w="9525">
                 <a:solidFill>
                   <a:srgbClr val="808080"/>
                 </a:solidFill>
@@ -43942,7 +43482,7 @@
               </a14:hiddenLine>
             </a:ext>
             <a:ext uri="{AF507438-7753-43E0-B8FC-AC1667EBCBE1}">
-              <a14:hiddenEffects xmlns:a14="http://schemas.microsoft.com/office/drawing/2010/main" xmlns="">
+              <a14:hiddenEffects xmlns:a14="http://schemas.microsoft.com/office/drawing/2010/main">
                 <a:effectLst>
                   <a:outerShdw dist="35921" dir="2700000" algn="ctr" rotWithShape="0">
                     <a:srgbClr val="808080"/>
@@ -44480,14 +44020,14 @@
           <a:effectLst/>
           <a:extLst>
             <a:ext uri="{909E8E84-426E-40DD-AFC4-6F175D3DCCD1}">
-              <a14:hiddenFill xmlns:a14="http://schemas.microsoft.com/office/drawing/2010/main" xmlns="">
+              <a14:hiddenFill xmlns:a14="http://schemas.microsoft.com/office/drawing/2010/main">
                 <a:solidFill>
                   <a:srgbClr val="FFFFFF"/>
                 </a:solidFill>
               </a14:hiddenFill>
             </a:ext>
             <a:ext uri="{91240B29-F687-4F45-9708-019B960494DF}">
-              <a14:hiddenLine xmlns:a14="http://schemas.microsoft.com/office/drawing/2010/main" xmlns="" w="9525">
+              <a14:hiddenLine xmlns:a14="http://schemas.microsoft.com/office/drawing/2010/main" w="9525">
                 <a:solidFill>
                   <a:srgbClr val="808080"/>
                 </a:solidFill>
@@ -44497,7 +44037,7 @@
               </a14:hiddenLine>
             </a:ext>
             <a:ext uri="{AF507438-7753-43E0-B8FC-AC1667EBCBE1}">
-              <a14:hiddenEffects xmlns:a14="http://schemas.microsoft.com/office/drawing/2010/main" xmlns="">
+              <a14:hiddenEffects xmlns:a14="http://schemas.microsoft.com/office/drawing/2010/main">
                 <a:effectLst>
                   <a:outerShdw dist="35921" dir="2700000" algn="ctr" rotWithShape="0">
                     <a:srgbClr val="808080"/>
@@ -45065,15 +44605,7 @@
                   <a:srgbClr val="000000"/>
                 </a:solidFill>
               </a:rPr>
-              <a:t>Preliminary Concept </a:t>
-            </a:r>
-            <a:r>
-              <a:rPr lang="en-US" altLang="en-US" b="1" dirty="0" smtClean="0">
-                <a:solidFill>
-                  <a:srgbClr val="000000"/>
-                </a:solidFill>
-              </a:rPr>
-              <a:t>of Operations</a:t>
+              <a:t>Preliminary Concept of Operations</a:t>
             </a:r>
           </a:p>
         </p:txBody>
@@ -45090,7 +44622,7 @@
           <a:blip r:embed="rId3" cstate="print">
             <a:extLst>
               <a:ext uri="{28A0092B-C50C-407E-A947-70E740481C1C}">
-                <a14:useLocalDpi xmlns:a14="http://schemas.microsoft.com/office/drawing/2010/main" xmlns="" val="0"/>
+                <a14:useLocalDpi xmlns:a14="http://schemas.microsoft.com/office/drawing/2010/main" val="0"/>
               </a:ext>
             </a:extLst>
           </a:blip>
@@ -45114,7 +44646,7 @@
           <a:effectLst/>
           <a:extLst>
             <a:ext uri="{909E8E84-426E-40DD-AFC4-6F175D3DCCD1}">
-              <a14:hiddenFill xmlns:a14="http://schemas.microsoft.com/office/drawing/2010/main" xmlns="">
+              <a14:hiddenFill xmlns:a14="http://schemas.microsoft.com/office/drawing/2010/main">
                 <a:blipFill dpi="0" rotWithShape="0">
                   <a:blip/>
                   <a:srcRect/>
@@ -45125,7 +44657,7 @@
               </a14:hiddenFill>
             </a:ext>
             <a:ext uri="{91240B29-F687-4F45-9708-019B960494DF}">
-              <a14:hiddenLine xmlns:a14="http://schemas.microsoft.com/office/drawing/2010/main" xmlns="" w="9525">
+              <a14:hiddenLine xmlns:a14="http://schemas.microsoft.com/office/drawing/2010/main" w="9525">
                 <a:solidFill>
                   <a:srgbClr val="808080"/>
                 </a:solidFill>
@@ -45135,7 +44667,7 @@
               </a14:hiddenLine>
             </a:ext>
             <a:ext uri="{AF507438-7753-43E0-B8FC-AC1667EBCBE1}">
-              <a14:hiddenEffects xmlns:a14="http://schemas.microsoft.com/office/drawing/2010/main" xmlns="">
+              <a14:hiddenEffects xmlns:a14="http://schemas.microsoft.com/office/drawing/2010/main">
                 <a:effectLst>
                   <a:outerShdw dist="35921" dir="2700000" algn="ctr" rotWithShape="0">
                     <a:srgbClr val="808080"/>
@@ -45366,6 +44898,13 @@
   <p:clrMapOvr>
     <a:masterClrMapping/>
   </p:clrMapOvr>
+  <p:timing>
+    <p:tnLst>
+      <p:par>
+        <p:cTn id="1" dur="indefinite" restart="never" nodeType="tmRoot"/>
+      </p:par>
+    </p:tnLst>
+  </p:timing>
 </p:sld>
 </file>
 
@@ -45450,11 +44989,6 @@
               </a:rPr>
               <a:t>Each requirement listed in the RVM has a specific identifier associated with it, which can be broken down as follows:</a:t>
             </a:r>
-            <a:endParaRPr lang="en-US" dirty="0" smtClean="0">
-              <a:solidFill>
-                <a:schemeClr val="tx1"/>
-              </a:solidFill>
-            </a:endParaRPr>
           </a:p>
           <a:p>
             <a:endParaRPr lang="en-US" dirty="0"/>
@@ -46822,11 +46356,6 @@
               </a:rPr>
               <a:t> Corresponds to the highest priority Structures Subsystem requirement found during the Pre-Launch Mission Phase  </a:t>
             </a:r>
-            <a:endParaRPr lang="en-US" sz="2400" dirty="0" smtClean="0">
-              <a:solidFill>
-                <a:schemeClr val="tx1"/>
-              </a:solidFill>
-            </a:endParaRPr>
           </a:p>
         </p:txBody>
       </p:sp>
@@ -46864,6 +46393,13 @@
   <p:clrMapOvr>
     <a:masterClrMapping/>
   </p:clrMapOvr>
+  <p:timing>
+    <p:tnLst>
+      <p:par>
+        <p:cTn id="1" dur="indefinite" restart="never" nodeType="tmRoot"/>
+      </p:par>
+    </p:tnLst>
+  </p:timing>
 </p:sld>
 </file>
 
@@ -47117,7 +46653,7 @@
         <a:effectLst/>
         <a:extLst>
           <a:ext uri="{AF507438-7753-43E0-B8FC-AC1667EBCBE1}">
-            <a14:hiddenEffects xmlns:a14="http://schemas.microsoft.com/office/drawing/2010/main" xmlns="">
+            <a14:hiddenEffects xmlns:a14="http://schemas.microsoft.com/office/drawing/2010/main">
               <a:effectLst>
                 <a:outerShdw dist="35921" dir="2700000" algn="ctr" rotWithShape="0">
                   <a:schemeClr val="bg2"/>
@@ -47193,7 +46729,7 @@
         <a:effectLst/>
         <a:extLst>
           <a:ext uri="{AF507438-7753-43E0-B8FC-AC1667EBCBE1}">
-            <a14:hiddenEffects xmlns:a14="http://schemas.microsoft.com/office/drawing/2010/main" xmlns="">
+            <a14:hiddenEffects xmlns:a14="http://schemas.microsoft.com/office/drawing/2010/main">
               <a:effectLst>
                 <a:outerShdw dist="35921" dir="2700000" algn="ctr" rotWithShape="0">
                   <a:schemeClr val="bg2"/>
@@ -47783,7 +47319,7 @@
         <a:effectLst/>
         <a:extLst>
           <a:ext uri="{AF507438-7753-43E0-B8FC-AC1667EBCBE1}">
-            <a14:hiddenEffects xmlns:a14="http://schemas.microsoft.com/office/drawing/2010/main" xmlns="">
+            <a14:hiddenEffects xmlns:a14="http://schemas.microsoft.com/office/drawing/2010/main">
               <a:effectLst>
                 <a:outerShdw dist="35921" dir="2700000" algn="ctr" rotWithShape="0">
                   <a:schemeClr val="bg2"/>
@@ -47859,7 +47395,7 @@
         <a:effectLst/>
         <a:extLst>
           <a:ext uri="{AF507438-7753-43E0-B8FC-AC1667EBCBE1}">
-            <a14:hiddenEffects xmlns:a14="http://schemas.microsoft.com/office/drawing/2010/main" xmlns="">
+            <a14:hiddenEffects xmlns:a14="http://schemas.microsoft.com/office/drawing/2010/main">
               <a:effectLst>
                 <a:outerShdw dist="35921" dir="2700000" algn="ctr" rotWithShape="0">
                   <a:schemeClr val="bg2"/>

</xml_diff>